<commit_message>
added draft and presentation content
</commit_message>
<xml_diff>
--- a/Presentation/CT2_2017_Alignment.pptx
+++ b/Presentation/CT2_2017_Alignment.pptx
@@ -5,11 +5,22 @@
     <p:sldMasterId id="2147483648" r:id="rId1"/>
   </p:sldMasterIdLst>
   <p:notesMasterIdLst>
-    <p:notesMasterId r:id="rId4"/>
+    <p:notesMasterId r:id="rId15"/>
   </p:notesMasterIdLst>
   <p:sldIdLst>
     <p:sldId id="256" r:id="rId2"/>
     <p:sldId id="257" r:id="rId3"/>
+    <p:sldId id="266" r:id="rId4"/>
+    <p:sldId id="258" r:id="rId5"/>
+    <p:sldId id="259" r:id="rId6"/>
+    <p:sldId id="267" r:id="rId7"/>
+    <p:sldId id="268" r:id="rId8"/>
+    <p:sldId id="265" r:id="rId9"/>
+    <p:sldId id="260" r:id="rId10"/>
+    <p:sldId id="261" r:id="rId11"/>
+    <p:sldId id="262" r:id="rId12"/>
+    <p:sldId id="264" r:id="rId13"/>
+    <p:sldId id="263" r:id="rId14"/>
   </p:sldIdLst>
   <p:sldSz cx="9144000" cy="6858000" type="screen4x3"/>
   <p:notesSz cx="6858000" cy="9144000"/>
@@ -157,10 +168,6 @@
 </p:presentation>
 </file>
 
-<file path=ppt/revisionInfo.xml><?xml version="1.0" encoding="utf-8"?>
-<p1510:revInfo xmlns:a="http://schemas.openxmlformats.org/drawingml/2006/main" xmlns:r="http://schemas.openxmlformats.org/officeDocument/2006/relationships" xmlns:p1510="http://schemas.microsoft.com/office/powerpoint/2015/10/main"/>
-</file>
-
 <file path=ppt/notesMasters/notesMaster1.xml><?xml version="1.0" encoding="utf-8"?>
 <p:notesMaster xmlns:a="http://schemas.openxmlformats.org/drawingml/2006/main" xmlns:r="http://schemas.openxmlformats.org/officeDocument/2006/relationships" xmlns:p="http://schemas.openxmlformats.org/presentationml/2006/main">
   <p:cSld>
@@ -243,7 +250,7 @@
           <a:p>
             <a:fld id="{115392A8-E3E8-434C-92C0-520E1DF9277B}" type="datetimeFigureOut">
               <a:rPr lang="de-DE" smtClean="0"/>
-              <a:t>10.10.2017</a:t>
+              <a:t>01.03.2018</a:t>
             </a:fld>
             <a:endParaRPr lang="de-DE"/>
           </a:p>
@@ -508,6 +515,174 @@
     </a:lvl9pPr>
   </p:notesStyle>
 </p:notesMaster>
+</file>
+
+<file path=ppt/notesSlides/notesSlide1.xml><?xml version="1.0" encoding="utf-8"?>
+<p:notes xmlns:a="http://schemas.openxmlformats.org/drawingml/2006/main" xmlns:r="http://schemas.openxmlformats.org/officeDocument/2006/relationships" xmlns:p="http://schemas.openxmlformats.org/presentationml/2006/main">
+  <p:cSld>
+    <p:spTree>
+      <p:nvGrpSpPr>
+        <p:cNvPr id="1" name=""/>
+        <p:cNvGrpSpPr/>
+        <p:nvPr/>
+      </p:nvGrpSpPr>
+      <p:grpSpPr>
+        <a:xfrm>
+          <a:off x="0" y="0"/>
+          <a:ext cx="0" cy="0"/>
+          <a:chOff x="0" y="0"/>
+          <a:chExt cx="0" cy="0"/>
+        </a:xfrm>
+      </p:grpSpPr>
+      <p:sp>
+        <p:nvSpPr>
+          <p:cNvPr id="2" name="Folienbildplatzhalter 1"/>
+          <p:cNvSpPr>
+            <a:spLocks noGrp="1" noRot="1" noChangeAspect="1"/>
+          </p:cNvSpPr>
+          <p:nvPr>
+            <p:ph type="sldImg"/>
+          </p:nvPr>
+        </p:nvSpPr>
+        <p:spPr/>
+      </p:sp>
+      <p:sp>
+        <p:nvSpPr>
+          <p:cNvPr id="3" name="Notizenplatzhalter 2"/>
+          <p:cNvSpPr>
+            <a:spLocks noGrp="1"/>
+          </p:cNvSpPr>
+          <p:nvPr>
+            <p:ph type="body" idx="1"/>
+          </p:nvPr>
+        </p:nvSpPr>
+        <p:spPr/>
+        <p:txBody>
+          <a:bodyPr/>
+          <a:lstStyle/>
+          <a:p>
+            <a:endParaRPr lang="de-DE" dirty="0"/>
+          </a:p>
+        </p:txBody>
+      </p:sp>
+      <p:sp>
+        <p:nvSpPr>
+          <p:cNvPr id="4" name="Foliennummernplatzhalter 3"/>
+          <p:cNvSpPr>
+            <a:spLocks noGrp="1"/>
+          </p:cNvSpPr>
+          <p:nvPr>
+            <p:ph type="sldNum" sz="quarter" idx="10"/>
+          </p:nvPr>
+        </p:nvSpPr>
+        <p:spPr/>
+        <p:txBody>
+          <a:bodyPr/>
+          <a:lstStyle/>
+          <a:p>
+            <a:fld id="{AA07C420-CE83-453F-83A5-25E4D2906979}" type="slidenum">
+              <a:rPr lang="de-DE" smtClean="0"/>
+              <a:t>5</a:t>
+            </a:fld>
+            <a:endParaRPr lang="de-DE"/>
+          </a:p>
+        </p:txBody>
+      </p:sp>
+    </p:spTree>
+    <p:extLst>
+      <p:ext uri="{BB962C8B-B14F-4D97-AF65-F5344CB8AC3E}">
+        <p14:creationId xmlns:p14="http://schemas.microsoft.com/office/powerpoint/2010/main" val="1478590066"/>
+      </p:ext>
+    </p:extLst>
+  </p:cSld>
+  <p:clrMapOvr>
+    <a:masterClrMapping/>
+  </p:clrMapOvr>
+</p:notes>
+</file>
+
+<file path=ppt/notesSlides/notesSlide2.xml><?xml version="1.0" encoding="utf-8"?>
+<p:notes xmlns:a="http://schemas.openxmlformats.org/drawingml/2006/main" xmlns:r="http://schemas.openxmlformats.org/officeDocument/2006/relationships" xmlns:p="http://schemas.openxmlformats.org/presentationml/2006/main">
+  <p:cSld>
+    <p:spTree>
+      <p:nvGrpSpPr>
+        <p:cNvPr id="1" name=""/>
+        <p:cNvGrpSpPr/>
+        <p:nvPr/>
+      </p:nvGrpSpPr>
+      <p:grpSpPr>
+        <a:xfrm>
+          <a:off x="0" y="0"/>
+          <a:ext cx="0" cy="0"/>
+          <a:chOff x="0" y="0"/>
+          <a:chExt cx="0" cy="0"/>
+        </a:xfrm>
+      </p:grpSpPr>
+      <p:sp>
+        <p:nvSpPr>
+          <p:cNvPr id="2" name="Folienbildplatzhalter 1"/>
+          <p:cNvSpPr>
+            <a:spLocks noGrp="1" noRot="1" noChangeAspect="1"/>
+          </p:cNvSpPr>
+          <p:nvPr>
+            <p:ph type="sldImg"/>
+          </p:nvPr>
+        </p:nvSpPr>
+        <p:spPr/>
+      </p:sp>
+      <p:sp>
+        <p:nvSpPr>
+          <p:cNvPr id="3" name="Notizenplatzhalter 2"/>
+          <p:cNvSpPr>
+            <a:spLocks noGrp="1"/>
+          </p:cNvSpPr>
+          <p:nvPr>
+            <p:ph type="body" idx="1"/>
+          </p:nvPr>
+        </p:nvSpPr>
+        <p:spPr/>
+        <p:txBody>
+          <a:bodyPr/>
+          <a:lstStyle/>
+          <a:p>
+            <a:endParaRPr lang="de-DE" dirty="0"/>
+          </a:p>
+        </p:txBody>
+      </p:sp>
+      <p:sp>
+        <p:nvSpPr>
+          <p:cNvPr id="4" name="Foliennummernplatzhalter 3"/>
+          <p:cNvSpPr>
+            <a:spLocks noGrp="1"/>
+          </p:cNvSpPr>
+          <p:nvPr>
+            <p:ph type="sldNum" sz="quarter" idx="10"/>
+          </p:nvPr>
+        </p:nvSpPr>
+        <p:spPr/>
+        <p:txBody>
+          <a:bodyPr/>
+          <a:lstStyle/>
+          <a:p>
+            <a:fld id="{AA07C420-CE83-453F-83A5-25E4D2906979}" type="slidenum">
+              <a:rPr lang="de-DE" smtClean="0"/>
+              <a:t>6</a:t>
+            </a:fld>
+            <a:endParaRPr lang="de-DE"/>
+          </a:p>
+        </p:txBody>
+      </p:sp>
+    </p:spTree>
+    <p:extLst>
+      <p:ext uri="{BB962C8B-B14F-4D97-AF65-F5344CB8AC3E}">
+        <p14:creationId xmlns:p14="http://schemas.microsoft.com/office/powerpoint/2010/main" val="1154059475"/>
+      </p:ext>
+    </p:extLst>
+  </p:cSld>
+  <p:clrMapOvr>
+    <a:masterClrMapping/>
+  </p:clrMapOvr>
+</p:notes>
 </file>
 
 <file path=ppt/slideLayouts/slideLayout1.xml><?xml version="1.0" encoding="utf-8"?>
@@ -5431,29 +5606,36 @@
               </a:lnSpc>
             </a:pPr>
             <a:r>
-              <a:rPr lang="en-US" sz="3200" dirty="0"/>
+              <a:rPr lang="en-US" sz="1800" dirty="0"/>
               <a:t>Communication Technologies 2 (CT2)</a:t>
+            </a:r>
+            <a:br>
+              <a:rPr lang="en-US" sz="1800" dirty="0"/>
+            </a:br>
+            <a:r>
+              <a:rPr lang="en-US" sz="1800" dirty="0"/>
+              <a:t>Machine Learning: </a:t>
+            </a:r>
+            <a:br>
+              <a:rPr lang="en-US" sz="1800" dirty="0"/>
+            </a:br>
+            <a:r>
+              <a:rPr lang="en-US" sz="1800" dirty="0"/>
+              <a:t>Applications and Algorithms</a:t>
             </a:r>
             <a:br>
               <a:rPr lang="en-US" sz="3200" dirty="0"/>
             </a:br>
             <a:r>
-              <a:rPr lang="en-US" sz="3200" dirty="0"/>
-              <a:t>Machine Learning: </a:t>
+              <a:rPr lang="en-US" sz="4400" dirty="0"/>
+              <a:t>Using Alignment with </a:t>
             </a:r>
             <a:br>
-              <a:rPr lang="en-US" sz="3200" dirty="0"/>
+              <a:rPr lang="en-US" sz="4400" dirty="0"/>
             </a:br>
             <a:r>
-              <a:rPr lang="en-US" sz="3200" dirty="0"/>
-              <a:t>Applications and Algorithms</a:t>
-            </a:r>
-            <a:br>
-              <a:rPr lang="en-US" sz="3200" dirty="0"/>
-            </a:br>
-            <a:r>
-              <a:rPr lang="en-US" sz="4800" dirty="0"/>
-              <a:t>[topic]</a:t>
+              <a:rPr lang="en-US" sz="4400" dirty="0"/>
+              <a:t>Location Prediction</a:t>
             </a:r>
             <a:endParaRPr lang="de-DE" sz="4800" dirty="0"/>
           </a:p>
@@ -5481,7 +5663,15 @@
           <a:p>
             <a:r>
               <a:rPr lang="en-US" dirty="0"/>
-              <a:t>[name]</a:t>
+              <a:t>Fabian </a:t>
+            </a:r>
+            <a:r>
+              <a:rPr lang="en-US" dirty="0" err="1"/>
+              <a:t>Frölich</a:t>
+            </a:r>
+            <a:r>
+              <a:rPr lang="en-US" dirty="0"/>
+              <a:t>, Johann Götz, Olga Groh</a:t>
             </a:r>
           </a:p>
           <a:p>
@@ -5494,7 +5684,7 @@
             </a:br>
             <a:r>
               <a:rPr lang="en-US" sz="2000" dirty="0"/>
-              <a:t>[date]</a:t>
+              <a:t>2018/03/22</a:t>
             </a:r>
             <a:endParaRPr lang="de-DE" dirty="0"/>
           </a:p>
@@ -5504,6 +5694,375 @@
     <p:extLst>
       <p:ext uri="{BB962C8B-B14F-4D97-AF65-F5344CB8AC3E}">
         <p14:creationId xmlns:p14="http://schemas.microsoft.com/office/powerpoint/2010/main" val="3746281762"/>
+      </p:ext>
+    </p:extLst>
+  </p:cSld>
+  <p:clrMapOvr>
+    <a:masterClrMapping/>
+  </p:clrMapOvr>
+</p:sld>
+</file>
+
+<file path=ppt/slides/slide10.xml><?xml version="1.0" encoding="utf-8"?>
+<p:sld xmlns:a="http://schemas.openxmlformats.org/drawingml/2006/main" xmlns:r="http://schemas.openxmlformats.org/officeDocument/2006/relationships" xmlns:p="http://schemas.openxmlformats.org/presentationml/2006/main">
+  <p:cSld>
+    <p:spTree>
+      <p:nvGrpSpPr>
+        <p:cNvPr id="1" name=""/>
+        <p:cNvGrpSpPr/>
+        <p:nvPr/>
+      </p:nvGrpSpPr>
+      <p:grpSpPr>
+        <a:xfrm>
+          <a:off x="0" y="0"/>
+          <a:ext cx="0" cy="0"/>
+          <a:chOff x="0" y="0"/>
+          <a:chExt cx="0" cy="0"/>
+        </a:xfrm>
+      </p:grpSpPr>
+      <p:sp>
+        <p:nvSpPr>
+          <p:cNvPr id="2" name="Titel 1">
+            <a:extLst>
+              <a:ext uri="{FF2B5EF4-FFF2-40B4-BE49-F238E27FC236}">
+                <a16:creationId xmlns:a16="http://schemas.microsoft.com/office/drawing/2014/main" id="{5CE9B4EF-180C-462D-9742-3A6754B91F32}"/>
+              </a:ext>
+            </a:extLst>
+          </p:cNvPr>
+          <p:cNvSpPr>
+            <a:spLocks noGrp="1"/>
+          </p:cNvSpPr>
+          <p:nvPr>
+            <p:ph type="title"/>
+          </p:nvPr>
+        </p:nvSpPr>
+        <p:spPr/>
+        <p:txBody>
+          <a:bodyPr/>
+          <a:lstStyle/>
+          <a:p>
+            <a:r>
+              <a:rPr lang="de-DE" dirty="0"/>
+              <a:t>Evaluation</a:t>
+            </a:r>
+          </a:p>
+        </p:txBody>
+      </p:sp>
+      <p:sp>
+        <p:nvSpPr>
+          <p:cNvPr id="3" name="Inhaltsplatzhalter 2">
+            <a:extLst>
+              <a:ext uri="{FF2B5EF4-FFF2-40B4-BE49-F238E27FC236}">
+                <a16:creationId xmlns:a16="http://schemas.microsoft.com/office/drawing/2014/main" id="{2A22295E-A53E-4275-BBD8-9D394F219878}"/>
+              </a:ext>
+            </a:extLst>
+          </p:cNvPr>
+          <p:cNvSpPr>
+            <a:spLocks noGrp="1"/>
+          </p:cNvSpPr>
+          <p:nvPr>
+            <p:ph idx="1"/>
+          </p:nvPr>
+        </p:nvSpPr>
+        <p:spPr/>
+        <p:txBody>
+          <a:bodyPr/>
+          <a:lstStyle/>
+          <a:p>
+            <a:endParaRPr lang="de-DE" dirty="0"/>
+          </a:p>
+        </p:txBody>
+      </p:sp>
+    </p:spTree>
+    <p:extLst>
+      <p:ext uri="{BB962C8B-B14F-4D97-AF65-F5344CB8AC3E}">
+        <p14:creationId xmlns:p14="http://schemas.microsoft.com/office/powerpoint/2010/main" val="2461775499"/>
+      </p:ext>
+    </p:extLst>
+  </p:cSld>
+  <p:clrMapOvr>
+    <a:masterClrMapping/>
+  </p:clrMapOvr>
+</p:sld>
+</file>
+
+<file path=ppt/slides/slide11.xml><?xml version="1.0" encoding="utf-8"?>
+<p:sld xmlns:a="http://schemas.openxmlformats.org/drawingml/2006/main" xmlns:r="http://schemas.openxmlformats.org/officeDocument/2006/relationships" xmlns:p="http://schemas.openxmlformats.org/presentationml/2006/main">
+  <p:cSld>
+    <p:spTree>
+      <p:nvGrpSpPr>
+        <p:cNvPr id="1" name=""/>
+        <p:cNvGrpSpPr/>
+        <p:nvPr/>
+      </p:nvGrpSpPr>
+      <p:grpSpPr>
+        <a:xfrm>
+          <a:off x="0" y="0"/>
+          <a:ext cx="0" cy="0"/>
+          <a:chOff x="0" y="0"/>
+          <a:chExt cx="0" cy="0"/>
+        </a:xfrm>
+      </p:grpSpPr>
+      <p:sp>
+        <p:nvSpPr>
+          <p:cNvPr id="2" name="Titel 1">
+            <a:extLst>
+              <a:ext uri="{FF2B5EF4-FFF2-40B4-BE49-F238E27FC236}">
+                <a16:creationId xmlns:a16="http://schemas.microsoft.com/office/drawing/2014/main" id="{5CE9B4EF-180C-462D-9742-3A6754B91F32}"/>
+              </a:ext>
+            </a:extLst>
+          </p:cNvPr>
+          <p:cNvSpPr>
+            <a:spLocks noGrp="1"/>
+          </p:cNvSpPr>
+          <p:nvPr>
+            <p:ph type="title"/>
+          </p:nvPr>
+        </p:nvSpPr>
+        <p:spPr/>
+        <p:txBody>
+          <a:bodyPr/>
+          <a:lstStyle/>
+          <a:p>
+            <a:r>
+              <a:rPr lang="de-DE" dirty="0" err="1"/>
+              <a:t>Conclusion</a:t>
+            </a:r>
+            <a:endParaRPr lang="de-DE" dirty="0"/>
+          </a:p>
+        </p:txBody>
+      </p:sp>
+      <p:sp>
+        <p:nvSpPr>
+          <p:cNvPr id="3" name="Inhaltsplatzhalter 2">
+            <a:extLst>
+              <a:ext uri="{FF2B5EF4-FFF2-40B4-BE49-F238E27FC236}">
+                <a16:creationId xmlns:a16="http://schemas.microsoft.com/office/drawing/2014/main" id="{2A22295E-A53E-4275-BBD8-9D394F219878}"/>
+              </a:ext>
+            </a:extLst>
+          </p:cNvPr>
+          <p:cNvSpPr>
+            <a:spLocks noGrp="1"/>
+          </p:cNvSpPr>
+          <p:nvPr>
+            <p:ph idx="1"/>
+          </p:nvPr>
+        </p:nvSpPr>
+        <p:spPr/>
+        <p:txBody>
+          <a:bodyPr/>
+          <a:lstStyle/>
+          <a:p>
+            <a:endParaRPr lang="de-DE" dirty="0"/>
+          </a:p>
+        </p:txBody>
+      </p:sp>
+    </p:spTree>
+    <p:extLst>
+      <p:ext uri="{BB962C8B-B14F-4D97-AF65-F5344CB8AC3E}">
+        <p14:creationId xmlns:p14="http://schemas.microsoft.com/office/powerpoint/2010/main" val="4086417740"/>
+      </p:ext>
+    </p:extLst>
+  </p:cSld>
+  <p:clrMapOvr>
+    <a:masterClrMapping/>
+  </p:clrMapOvr>
+</p:sld>
+</file>
+
+<file path=ppt/slides/slide12.xml><?xml version="1.0" encoding="utf-8"?>
+<p:sld xmlns:a="http://schemas.openxmlformats.org/drawingml/2006/main" xmlns:r="http://schemas.openxmlformats.org/officeDocument/2006/relationships" xmlns:p="http://schemas.openxmlformats.org/presentationml/2006/main">
+  <p:cSld>
+    <p:spTree>
+      <p:nvGrpSpPr>
+        <p:cNvPr id="1" name=""/>
+        <p:cNvGrpSpPr/>
+        <p:nvPr/>
+      </p:nvGrpSpPr>
+      <p:grpSpPr>
+        <a:xfrm>
+          <a:off x="0" y="0"/>
+          <a:ext cx="0" cy="0"/>
+          <a:chOff x="0" y="0"/>
+          <a:chExt cx="0" cy="0"/>
+        </a:xfrm>
+      </p:grpSpPr>
+      <p:sp>
+        <p:nvSpPr>
+          <p:cNvPr id="2" name="Titel 1">
+            <a:extLst>
+              <a:ext uri="{FF2B5EF4-FFF2-40B4-BE49-F238E27FC236}">
+                <a16:creationId xmlns:a16="http://schemas.microsoft.com/office/drawing/2014/main" id="{5CE9B4EF-180C-462D-9742-3A6754B91F32}"/>
+              </a:ext>
+            </a:extLst>
+          </p:cNvPr>
+          <p:cNvSpPr>
+            <a:spLocks noGrp="1"/>
+          </p:cNvSpPr>
+          <p:nvPr>
+            <p:ph type="title"/>
+          </p:nvPr>
+        </p:nvSpPr>
+        <p:spPr/>
+        <p:txBody>
+          <a:bodyPr/>
+          <a:lstStyle/>
+          <a:p>
+            <a:r>
+              <a:rPr lang="de-DE" dirty="0"/>
+              <a:t>References</a:t>
+            </a:r>
+          </a:p>
+        </p:txBody>
+      </p:sp>
+      <p:sp>
+        <p:nvSpPr>
+          <p:cNvPr id="3" name="Inhaltsplatzhalter 2">
+            <a:extLst>
+              <a:ext uri="{FF2B5EF4-FFF2-40B4-BE49-F238E27FC236}">
+                <a16:creationId xmlns:a16="http://schemas.microsoft.com/office/drawing/2014/main" id="{2A22295E-A53E-4275-BBD8-9D394F219878}"/>
+              </a:ext>
+            </a:extLst>
+          </p:cNvPr>
+          <p:cNvSpPr>
+            <a:spLocks noGrp="1"/>
+          </p:cNvSpPr>
+          <p:nvPr>
+            <p:ph idx="1"/>
+          </p:nvPr>
+        </p:nvSpPr>
+        <p:spPr/>
+        <p:txBody>
+          <a:bodyPr/>
+          <a:lstStyle/>
+          <a:p>
+            <a:endParaRPr lang="de-DE" dirty="0"/>
+          </a:p>
+        </p:txBody>
+      </p:sp>
+    </p:spTree>
+    <p:extLst>
+      <p:ext uri="{BB962C8B-B14F-4D97-AF65-F5344CB8AC3E}">
+        <p14:creationId xmlns:p14="http://schemas.microsoft.com/office/powerpoint/2010/main" val="2226286743"/>
+      </p:ext>
+    </p:extLst>
+  </p:cSld>
+  <p:clrMapOvr>
+    <a:masterClrMapping/>
+  </p:clrMapOvr>
+</p:sld>
+</file>
+
+<file path=ppt/slides/slide13.xml><?xml version="1.0" encoding="utf-8"?>
+<p:sld xmlns:a="http://schemas.openxmlformats.org/drawingml/2006/main" xmlns:r="http://schemas.openxmlformats.org/officeDocument/2006/relationships" xmlns:p="http://schemas.openxmlformats.org/presentationml/2006/main">
+  <p:cSld>
+    <p:spTree>
+      <p:nvGrpSpPr>
+        <p:cNvPr id="1" name=""/>
+        <p:cNvGrpSpPr/>
+        <p:nvPr/>
+      </p:nvGrpSpPr>
+      <p:grpSpPr>
+        <a:xfrm>
+          <a:off x="0" y="0"/>
+          <a:ext cx="0" cy="0"/>
+          <a:chOff x="0" y="0"/>
+          <a:chExt cx="0" cy="0"/>
+        </a:xfrm>
+      </p:grpSpPr>
+      <p:sp>
+        <p:nvSpPr>
+          <p:cNvPr id="4" name="Titel 3">
+            <a:extLst>
+              <a:ext uri="{FF2B5EF4-FFF2-40B4-BE49-F238E27FC236}">
+                <a16:creationId xmlns:a16="http://schemas.microsoft.com/office/drawing/2014/main" id="{EC22E9A1-E7AA-4FA3-BEDE-0AA52CF2E0EB}"/>
+              </a:ext>
+            </a:extLst>
+          </p:cNvPr>
+          <p:cNvSpPr>
+            <a:spLocks noGrp="1"/>
+          </p:cNvSpPr>
+          <p:nvPr>
+            <p:ph type="ctrTitle"/>
+          </p:nvPr>
+        </p:nvSpPr>
+        <p:spPr/>
+        <p:txBody>
+          <a:bodyPr/>
+          <a:lstStyle/>
+          <a:p>
+            <a:r>
+              <a:rPr lang="de-DE" dirty="0" err="1"/>
+              <a:t>Thank</a:t>
+            </a:r>
+            <a:r>
+              <a:rPr lang="de-DE" dirty="0"/>
+              <a:t> </a:t>
+            </a:r>
+            <a:r>
+              <a:rPr lang="de-DE" dirty="0" err="1"/>
+              <a:t>you</a:t>
+            </a:r>
+            <a:r>
+              <a:rPr lang="de-DE" dirty="0"/>
+              <a:t> </a:t>
+            </a:r>
+            <a:r>
+              <a:rPr lang="de-DE" dirty="0" err="1"/>
+              <a:t>for</a:t>
+            </a:r>
+            <a:r>
+              <a:rPr lang="de-DE" dirty="0"/>
+              <a:t> </a:t>
+            </a:r>
+            <a:r>
+              <a:rPr lang="de-DE" dirty="0" err="1"/>
+              <a:t>your</a:t>
+            </a:r>
+            <a:r>
+              <a:rPr lang="de-DE" dirty="0"/>
+              <a:t> </a:t>
+            </a:r>
+            <a:r>
+              <a:rPr lang="de-DE" dirty="0" err="1"/>
+              <a:t>attention</a:t>
+            </a:r>
+            <a:r>
+              <a:rPr lang="de-DE" dirty="0"/>
+              <a:t>!</a:t>
+            </a:r>
+          </a:p>
+        </p:txBody>
+      </p:sp>
+      <p:sp>
+        <p:nvSpPr>
+          <p:cNvPr id="3" name="Inhaltsplatzhalter 2">
+            <a:extLst>
+              <a:ext uri="{FF2B5EF4-FFF2-40B4-BE49-F238E27FC236}">
+                <a16:creationId xmlns:a16="http://schemas.microsoft.com/office/drawing/2014/main" id="{2A22295E-A53E-4275-BBD8-9D394F219878}"/>
+              </a:ext>
+            </a:extLst>
+          </p:cNvPr>
+          <p:cNvSpPr>
+            <a:spLocks noGrp="1"/>
+          </p:cNvSpPr>
+          <p:nvPr>
+            <p:ph type="subTitle" idx="1"/>
+          </p:nvPr>
+        </p:nvSpPr>
+        <p:spPr/>
+        <p:txBody>
+          <a:bodyPr/>
+          <a:lstStyle/>
+          <a:p>
+            <a:endParaRPr lang="de-DE" dirty="0"/>
+          </a:p>
+        </p:txBody>
+      </p:sp>
+    </p:spTree>
+    <p:extLst>
+      <p:ext uri="{BB962C8B-B14F-4D97-AF65-F5344CB8AC3E}">
+        <p14:creationId xmlns:p14="http://schemas.microsoft.com/office/powerpoint/2010/main" val="22395774"/>
       </p:ext>
     </p:extLst>
   </p:cSld>
@@ -5551,6 +6110,145 @@
           <a:bodyPr/>
           <a:lstStyle/>
           <a:p>
+            <a:r>
+              <a:rPr lang="de-DE" dirty="0"/>
+              <a:t>Outline</a:t>
+            </a:r>
+          </a:p>
+        </p:txBody>
+      </p:sp>
+      <p:sp>
+        <p:nvSpPr>
+          <p:cNvPr id="4" name="Inhaltsplatzhalter 3">
+            <a:extLst>
+              <a:ext uri="{FF2B5EF4-FFF2-40B4-BE49-F238E27FC236}">
+                <a16:creationId xmlns:a16="http://schemas.microsoft.com/office/drawing/2014/main" id="{4716AB81-93D3-47DA-9016-187527D6EE37}"/>
+              </a:ext>
+            </a:extLst>
+          </p:cNvPr>
+          <p:cNvSpPr>
+            <a:spLocks noGrp="1"/>
+          </p:cNvSpPr>
+          <p:nvPr>
+            <p:ph idx="1"/>
+          </p:nvPr>
+        </p:nvSpPr>
+        <p:spPr/>
+        <p:txBody>
+          <a:bodyPr/>
+          <a:lstStyle/>
+          <a:p>
+            <a:r>
+              <a:rPr lang="de-DE" dirty="0" err="1"/>
+              <a:t>Introduction</a:t>
+            </a:r>
+            <a:r>
+              <a:rPr lang="de-DE" dirty="0"/>
+              <a:t> / Motivation</a:t>
+            </a:r>
+          </a:p>
+          <a:p>
+            <a:r>
+              <a:rPr lang="de-DE" dirty="0"/>
+              <a:t>Concept</a:t>
+            </a:r>
+          </a:p>
+          <a:p>
+            <a:r>
+              <a:rPr lang="de-DE" dirty="0"/>
+              <a:t>Alignment </a:t>
+            </a:r>
+            <a:r>
+              <a:rPr lang="de-DE" dirty="0" err="1"/>
+              <a:t>Algorithm</a:t>
+            </a:r>
+            <a:endParaRPr lang="de-DE" dirty="0"/>
+          </a:p>
+          <a:p>
+            <a:r>
+              <a:rPr lang="de-DE" dirty="0"/>
+              <a:t>Implementation</a:t>
+            </a:r>
+          </a:p>
+          <a:p>
+            <a:r>
+              <a:rPr lang="de-DE" dirty="0"/>
+              <a:t>Evaluation</a:t>
+            </a:r>
+          </a:p>
+          <a:p>
+            <a:r>
+              <a:rPr lang="de-DE" dirty="0" err="1"/>
+              <a:t>Conclusion</a:t>
+            </a:r>
+            <a:r>
+              <a:rPr lang="de-DE" dirty="0"/>
+              <a:t> and Future Work</a:t>
+            </a:r>
+          </a:p>
+          <a:p>
+            <a:r>
+              <a:rPr lang="de-DE" dirty="0"/>
+              <a:t>References</a:t>
+            </a:r>
+          </a:p>
+        </p:txBody>
+      </p:sp>
+    </p:spTree>
+    <p:extLst>
+      <p:ext uri="{BB962C8B-B14F-4D97-AF65-F5344CB8AC3E}">
+        <p14:creationId xmlns:p14="http://schemas.microsoft.com/office/powerpoint/2010/main" val="2653065009"/>
+      </p:ext>
+    </p:extLst>
+  </p:cSld>
+  <p:clrMapOvr>
+    <a:masterClrMapping/>
+  </p:clrMapOvr>
+</p:sld>
+</file>
+
+<file path=ppt/slides/slide3.xml><?xml version="1.0" encoding="utf-8"?>
+<p:sld xmlns:a="http://schemas.openxmlformats.org/drawingml/2006/main" xmlns:r="http://schemas.openxmlformats.org/officeDocument/2006/relationships" xmlns:p="http://schemas.openxmlformats.org/presentationml/2006/main">
+  <p:cSld>
+    <p:spTree>
+      <p:nvGrpSpPr>
+        <p:cNvPr id="1" name=""/>
+        <p:cNvGrpSpPr/>
+        <p:nvPr/>
+      </p:nvGrpSpPr>
+      <p:grpSpPr>
+        <a:xfrm>
+          <a:off x="0" y="0"/>
+          <a:ext cx="0" cy="0"/>
+          <a:chOff x="0" y="0"/>
+          <a:chExt cx="0" cy="0"/>
+        </a:xfrm>
+      </p:grpSpPr>
+      <p:sp>
+        <p:nvSpPr>
+          <p:cNvPr id="2" name="Titel 1">
+            <a:extLst>
+              <a:ext uri="{FF2B5EF4-FFF2-40B4-BE49-F238E27FC236}">
+                <a16:creationId xmlns:a16="http://schemas.microsoft.com/office/drawing/2014/main" id="{5CE9B4EF-180C-462D-9742-3A6754B91F32}"/>
+              </a:ext>
+            </a:extLst>
+          </p:cNvPr>
+          <p:cNvSpPr>
+            <a:spLocks noGrp="1"/>
+          </p:cNvSpPr>
+          <p:nvPr>
+            <p:ph type="title"/>
+          </p:nvPr>
+        </p:nvSpPr>
+        <p:spPr/>
+        <p:txBody>
+          <a:bodyPr/>
+          <a:lstStyle/>
+          <a:p>
+            <a:r>
+              <a:rPr lang="de-DE" dirty="0" err="1"/>
+              <a:t>Introduction</a:t>
+            </a:r>
             <a:endParaRPr lang="de-DE" dirty="0"/>
           </a:p>
         </p:txBody>
@@ -5576,14 +6274,2693 @@
           <a:bodyPr/>
           <a:lstStyle/>
           <a:p>
+            <a:r>
+              <a:rPr lang="de-DE" b="1" dirty="0"/>
+              <a:t>Goal: </a:t>
+            </a:r>
+            <a:r>
+              <a:rPr lang="de-DE" dirty="0"/>
+              <a:t>Position </a:t>
+            </a:r>
+            <a:r>
+              <a:rPr lang="de-DE" dirty="0" err="1"/>
+              <a:t>prediction</a:t>
+            </a:r>
+            <a:r>
+              <a:rPr lang="de-DE" dirty="0"/>
+              <a:t> </a:t>
+            </a:r>
+            <a:r>
+              <a:rPr lang="de-DE" dirty="0" err="1"/>
+              <a:t>with</a:t>
+            </a:r>
+            <a:r>
+              <a:rPr lang="de-DE" dirty="0"/>
+              <a:t> </a:t>
+            </a:r>
+            <a:r>
+              <a:rPr lang="de-DE" dirty="0" err="1"/>
+              <a:t>alignment</a:t>
+            </a:r>
+            <a:r>
+              <a:rPr lang="de-DE" dirty="0"/>
+              <a:t> </a:t>
+            </a:r>
+            <a:r>
+              <a:rPr lang="de-DE" dirty="0" err="1"/>
+              <a:t>approach</a:t>
+            </a:r>
+            <a:r>
+              <a:rPr lang="de-DE" dirty="0"/>
+              <a:t> on Google Location </a:t>
+            </a:r>
+            <a:r>
+              <a:rPr lang="de-DE" dirty="0" err="1"/>
+              <a:t>History</a:t>
+            </a:r>
+            <a:r>
+              <a:rPr lang="de-DE" dirty="0"/>
+              <a:t> </a:t>
+            </a:r>
+            <a:r>
+              <a:rPr lang="de-DE" dirty="0" err="1"/>
+              <a:t>data</a:t>
+            </a:r>
             <a:endParaRPr lang="de-DE" dirty="0"/>
           </a:p>
-        </p:txBody>
-      </p:sp>
+          <a:p>
+            <a:pPr lvl="1"/>
+            <a:r>
+              <a:rPr lang="de-DE" dirty="0"/>
+              <a:t>Working </a:t>
+            </a:r>
+            <a:r>
+              <a:rPr lang="de-DE" dirty="0" err="1"/>
+              <a:t>with</a:t>
+            </a:r>
+            <a:r>
+              <a:rPr lang="de-DE" dirty="0"/>
+              <a:t> GPS </a:t>
+            </a:r>
+            <a:r>
+              <a:rPr lang="de-DE" dirty="0" err="1"/>
+              <a:t>data</a:t>
+            </a:r>
+            <a:endParaRPr lang="de-DE" dirty="0"/>
+          </a:p>
+          <a:p>
+            <a:pPr lvl="1"/>
+            <a:r>
+              <a:rPr lang="de-DE" dirty="0" err="1"/>
+              <a:t>Gathered</a:t>
+            </a:r>
+            <a:r>
+              <a:rPr lang="de-DE" dirty="0"/>
+              <a:t> </a:t>
+            </a:r>
+            <a:r>
+              <a:rPr lang="de-DE" dirty="0" err="1"/>
+              <a:t>from</a:t>
+            </a:r>
+            <a:r>
+              <a:rPr lang="de-DE" dirty="0"/>
+              <a:t> modern mobile </a:t>
+            </a:r>
+            <a:r>
+              <a:rPr lang="de-DE" dirty="0" err="1"/>
+              <a:t>devices</a:t>
+            </a:r>
+            <a:endParaRPr lang="de-DE" dirty="0"/>
+          </a:p>
+          <a:p>
+            <a:pPr lvl="1"/>
+            <a:r>
+              <a:rPr lang="de-DE" dirty="0" err="1"/>
+              <a:t>Using</a:t>
+            </a:r>
+            <a:r>
+              <a:rPr lang="de-DE" dirty="0"/>
+              <a:t> Smith-Waterman </a:t>
+            </a:r>
+            <a:r>
+              <a:rPr lang="de-DE" dirty="0" err="1"/>
+              <a:t>algorithm</a:t>
+            </a:r>
+            <a:r>
+              <a:rPr lang="de-DE" dirty="0"/>
+              <a:t> </a:t>
+            </a:r>
+          </a:p>
+        </p:txBody>
+      </p:sp>
+      <p:pic>
+        <p:nvPicPr>
+          <p:cNvPr id="7" name="Grafik 6">
+            <a:extLst>
+              <a:ext uri="{FF2B5EF4-FFF2-40B4-BE49-F238E27FC236}">
+                <a16:creationId xmlns:a16="http://schemas.microsoft.com/office/drawing/2014/main" id="{E38B1275-935D-4813-8828-9B820E42C765}"/>
+              </a:ext>
+            </a:extLst>
+          </p:cNvPr>
+          <p:cNvPicPr>
+            <a:picLocks noChangeAspect="1"/>
+          </p:cNvPicPr>
+          <p:nvPr/>
+        </p:nvPicPr>
+        <p:blipFill>
+          <a:blip r:embed="rId2" cstate="print">
+            <a:extLst>
+              <a:ext uri="{28A0092B-C50C-407E-A947-70E740481C1C}">
+                <a14:useLocalDpi xmlns:a14="http://schemas.microsoft.com/office/drawing/2010/main" val="0"/>
+              </a:ext>
+            </a:extLst>
+          </a:blip>
+          <a:stretch>
+            <a:fillRect/>
+          </a:stretch>
+        </p:blipFill>
+        <p:spPr>
+          <a:xfrm>
+            <a:off x="4932040" y="3669911"/>
+            <a:ext cx="3711926" cy="2456251"/>
+          </a:xfrm>
+          <a:prstGeom prst="rect">
+            <a:avLst/>
+          </a:prstGeom>
+        </p:spPr>
+      </p:pic>
     </p:spTree>
     <p:extLst>
       <p:ext uri="{BB962C8B-B14F-4D97-AF65-F5344CB8AC3E}">
-        <p14:creationId xmlns:p14="http://schemas.microsoft.com/office/powerpoint/2010/main" val="2653065009"/>
+        <p14:creationId xmlns:p14="http://schemas.microsoft.com/office/powerpoint/2010/main" val="261707300"/>
+      </p:ext>
+    </p:extLst>
+  </p:cSld>
+  <p:clrMapOvr>
+    <a:masterClrMapping/>
+  </p:clrMapOvr>
+</p:sld>
+</file>
+
+<file path=ppt/slides/slide4.xml><?xml version="1.0" encoding="utf-8"?>
+<p:sld xmlns:a="http://schemas.openxmlformats.org/drawingml/2006/main" xmlns:r="http://schemas.openxmlformats.org/officeDocument/2006/relationships" xmlns:p="http://schemas.openxmlformats.org/presentationml/2006/main">
+  <p:cSld>
+    <p:spTree>
+      <p:nvGrpSpPr>
+        <p:cNvPr id="1" name=""/>
+        <p:cNvGrpSpPr/>
+        <p:nvPr/>
+      </p:nvGrpSpPr>
+      <p:grpSpPr>
+        <a:xfrm>
+          <a:off x="0" y="0"/>
+          <a:ext cx="0" cy="0"/>
+          <a:chOff x="0" y="0"/>
+          <a:chExt cx="0" cy="0"/>
+        </a:xfrm>
+      </p:grpSpPr>
+      <p:sp>
+        <p:nvSpPr>
+          <p:cNvPr id="2" name="Titel 1">
+            <a:extLst>
+              <a:ext uri="{FF2B5EF4-FFF2-40B4-BE49-F238E27FC236}">
+                <a16:creationId xmlns:a16="http://schemas.microsoft.com/office/drawing/2014/main" id="{5CE9B4EF-180C-462D-9742-3A6754B91F32}"/>
+              </a:ext>
+            </a:extLst>
+          </p:cNvPr>
+          <p:cNvSpPr>
+            <a:spLocks noGrp="1"/>
+          </p:cNvSpPr>
+          <p:nvPr>
+            <p:ph type="title"/>
+          </p:nvPr>
+        </p:nvSpPr>
+        <p:spPr/>
+        <p:txBody>
+          <a:bodyPr/>
+          <a:lstStyle/>
+          <a:p>
+            <a:r>
+              <a:rPr lang="de-DE" dirty="0"/>
+              <a:t>Motivation</a:t>
+            </a:r>
+          </a:p>
+        </p:txBody>
+      </p:sp>
+      <p:pic>
+        <p:nvPicPr>
+          <p:cNvPr id="5" name="Inhaltsplatzhalter 4">
+            <a:extLst>
+              <a:ext uri="{FF2B5EF4-FFF2-40B4-BE49-F238E27FC236}">
+                <a16:creationId xmlns:a16="http://schemas.microsoft.com/office/drawing/2014/main" id="{B41D569C-31F3-4BF8-B3E1-AE09334A8A39}"/>
+              </a:ext>
+            </a:extLst>
+          </p:cNvPr>
+          <p:cNvPicPr>
+            <a:picLocks noGrp="1" noChangeAspect="1"/>
+          </p:cNvPicPr>
+          <p:nvPr>
+            <p:ph sz="half" idx="1"/>
+          </p:nvPr>
+        </p:nvPicPr>
+        <p:blipFill>
+          <a:blip r:embed="rId2">
+            <a:extLst>
+              <a:ext uri="{28A0092B-C50C-407E-A947-70E740481C1C}">
+                <a14:useLocalDpi xmlns:a14="http://schemas.microsoft.com/office/drawing/2010/main" val="0"/>
+              </a:ext>
+            </a:extLst>
+          </a:blip>
+          <a:stretch>
+            <a:fillRect/>
+          </a:stretch>
+        </p:blipFill>
+        <p:spPr>
+          <a:xfrm>
+            <a:off x="6444208" y="1479703"/>
+            <a:ext cx="2424370" cy="3121925"/>
+          </a:xfrm>
+        </p:spPr>
+      </p:pic>
+      <p:sp>
+        <p:nvSpPr>
+          <p:cNvPr id="9" name="Inhaltsplatzhalter 8">
+            <a:extLst>
+              <a:ext uri="{FF2B5EF4-FFF2-40B4-BE49-F238E27FC236}">
+                <a16:creationId xmlns:a16="http://schemas.microsoft.com/office/drawing/2014/main" id="{735AA4DB-6687-444C-AF5D-818F0B1F39A4}"/>
+              </a:ext>
+            </a:extLst>
+          </p:cNvPr>
+          <p:cNvSpPr>
+            <a:spLocks noGrp="1"/>
+          </p:cNvSpPr>
+          <p:nvPr>
+            <p:ph sz="half" idx="2"/>
+          </p:nvPr>
+        </p:nvSpPr>
+        <p:spPr>
+          <a:xfrm>
+            <a:off x="537944" y="1479703"/>
+            <a:ext cx="4038600" cy="4525963"/>
+          </a:xfrm>
+        </p:spPr>
+        <p:txBody>
+          <a:bodyPr/>
+          <a:lstStyle/>
+          <a:p>
+            <a:r>
+              <a:rPr lang="de-DE" dirty="0"/>
+              <a:t>Use </a:t>
+            </a:r>
+            <a:r>
+              <a:rPr lang="de-DE" dirty="0" err="1"/>
+              <a:t>case</a:t>
+            </a:r>
+            <a:r>
+              <a:rPr lang="de-DE" dirty="0"/>
+              <a:t>: </a:t>
+            </a:r>
+          </a:p>
+          <a:p>
+            <a:pPr lvl="1"/>
+            <a:r>
+              <a:rPr lang="de-DE" dirty="0"/>
+              <a:t>Position </a:t>
+            </a:r>
+            <a:r>
+              <a:rPr lang="de-DE" dirty="0" err="1"/>
+              <a:t>prediction</a:t>
+            </a:r>
+            <a:r>
+              <a:rPr lang="de-DE" dirty="0"/>
+              <a:t> in </a:t>
+            </a:r>
+            <a:r>
+              <a:rPr lang="de-DE" dirty="0" err="1"/>
+              <a:t>case</a:t>
+            </a:r>
+            <a:r>
+              <a:rPr lang="de-DE" dirty="0"/>
+              <a:t> </a:t>
+            </a:r>
+            <a:r>
+              <a:rPr lang="de-DE" dirty="0" err="1"/>
+              <a:t>of</a:t>
+            </a:r>
+            <a:r>
+              <a:rPr lang="de-DE" dirty="0"/>
+              <a:t> </a:t>
+            </a:r>
+            <a:r>
+              <a:rPr lang="de-DE" dirty="0" err="1"/>
+              <a:t>emergency</a:t>
+            </a:r>
+            <a:endParaRPr lang="de-DE" dirty="0"/>
+          </a:p>
+          <a:p>
+            <a:pPr lvl="1"/>
+            <a:r>
+              <a:rPr lang="de-DE" dirty="0"/>
+              <a:t>Radiator </a:t>
+            </a:r>
+            <a:r>
+              <a:rPr lang="de-DE" dirty="0" err="1"/>
+              <a:t>turns</a:t>
+            </a:r>
+            <a:r>
+              <a:rPr lang="de-DE" dirty="0"/>
+              <a:t> on in time</a:t>
+            </a:r>
+          </a:p>
+        </p:txBody>
+      </p:sp>
+      <p:pic>
+        <p:nvPicPr>
+          <p:cNvPr id="7" name="Grafik 6">
+            <a:extLst>
+              <a:ext uri="{FF2B5EF4-FFF2-40B4-BE49-F238E27FC236}">
+                <a16:creationId xmlns:a16="http://schemas.microsoft.com/office/drawing/2014/main" id="{2CAEB767-2AA6-4375-B268-E19776F546DA}"/>
+              </a:ext>
+            </a:extLst>
+          </p:cNvPr>
+          <p:cNvPicPr>
+            <a:picLocks noChangeAspect="1"/>
+          </p:cNvPicPr>
+          <p:nvPr/>
+        </p:nvPicPr>
+        <p:blipFill>
+          <a:blip r:embed="rId3">
+            <a:extLst>
+              <a:ext uri="{28A0092B-C50C-407E-A947-70E740481C1C}">
+                <a14:useLocalDpi xmlns:a14="http://schemas.microsoft.com/office/drawing/2010/main" val="0"/>
+              </a:ext>
+            </a:extLst>
+          </a:blip>
+          <a:stretch>
+            <a:fillRect/>
+          </a:stretch>
+        </p:blipFill>
+        <p:spPr>
+          <a:xfrm>
+            <a:off x="5669116" y="4601628"/>
+            <a:ext cx="3199461" cy="1779700"/>
+          </a:xfrm>
+          <a:prstGeom prst="rect">
+            <a:avLst/>
+          </a:prstGeom>
+        </p:spPr>
+      </p:pic>
+    </p:spTree>
+    <p:extLst>
+      <p:ext uri="{BB962C8B-B14F-4D97-AF65-F5344CB8AC3E}">
+        <p14:creationId xmlns:p14="http://schemas.microsoft.com/office/powerpoint/2010/main" val="1546341392"/>
+      </p:ext>
+    </p:extLst>
+  </p:cSld>
+  <p:clrMapOvr>
+    <a:masterClrMapping/>
+  </p:clrMapOvr>
+</p:sld>
+</file>
+
+<file path=ppt/slides/slide5.xml><?xml version="1.0" encoding="utf-8"?>
+<p:sld xmlns:a="http://schemas.openxmlformats.org/drawingml/2006/main" xmlns:r="http://schemas.openxmlformats.org/officeDocument/2006/relationships" xmlns:p="http://schemas.openxmlformats.org/presentationml/2006/main">
+  <p:cSld>
+    <p:spTree>
+      <p:nvGrpSpPr>
+        <p:cNvPr id="1" name=""/>
+        <p:cNvGrpSpPr/>
+        <p:nvPr/>
+      </p:nvGrpSpPr>
+      <p:grpSpPr>
+        <a:xfrm>
+          <a:off x="0" y="0"/>
+          <a:ext cx="0" cy="0"/>
+          <a:chOff x="0" y="0"/>
+          <a:chExt cx="0" cy="0"/>
+        </a:xfrm>
+      </p:grpSpPr>
+      <p:sp>
+        <p:nvSpPr>
+          <p:cNvPr id="2" name="Titel 1">
+            <a:extLst>
+              <a:ext uri="{FF2B5EF4-FFF2-40B4-BE49-F238E27FC236}">
+                <a16:creationId xmlns:a16="http://schemas.microsoft.com/office/drawing/2014/main" id="{5CE9B4EF-180C-462D-9742-3A6754B91F32}"/>
+              </a:ext>
+            </a:extLst>
+          </p:cNvPr>
+          <p:cNvSpPr>
+            <a:spLocks noGrp="1"/>
+          </p:cNvSpPr>
+          <p:nvPr>
+            <p:ph type="title"/>
+          </p:nvPr>
+        </p:nvSpPr>
+        <p:spPr/>
+        <p:txBody>
+          <a:bodyPr/>
+          <a:lstStyle/>
+          <a:p>
+            <a:r>
+              <a:rPr lang="de-DE" dirty="0"/>
+              <a:t>Concept</a:t>
+            </a:r>
+          </a:p>
+        </p:txBody>
+      </p:sp>
+      <p:graphicFrame>
+        <p:nvGraphicFramePr>
+          <p:cNvPr id="17" name="Inhaltsplatzhalter 16">
+            <a:extLst>
+              <a:ext uri="{FF2B5EF4-FFF2-40B4-BE49-F238E27FC236}">
+                <a16:creationId xmlns:a16="http://schemas.microsoft.com/office/drawing/2014/main" id="{1DDFFA11-1F80-4678-9C29-60E309D88B9F}"/>
+              </a:ext>
+            </a:extLst>
+          </p:cNvPr>
+          <p:cNvGraphicFramePr>
+            <a:graphicFrameLocks noGrp="1"/>
+          </p:cNvGraphicFramePr>
+          <p:nvPr>
+            <p:ph sz="half" idx="2"/>
+            <p:extLst>
+              <p:ext uri="{D42A27DB-BD31-4B8C-83A1-F6EECF244321}">
+                <p14:modId xmlns:p14="http://schemas.microsoft.com/office/powerpoint/2010/main" val="1902372942"/>
+              </p:ext>
+            </p:extLst>
+          </p:nvPr>
+        </p:nvGraphicFramePr>
+        <p:xfrm>
+          <a:off x="468313" y="1412875"/>
+          <a:ext cx="8207376" cy="1483360"/>
+        </p:xfrm>
+        <a:graphic>
+          <a:graphicData uri="http://schemas.openxmlformats.org/drawingml/2006/table">
+            <a:tbl>
+              <a:tblPr firstRow="1" bandRow="1">
+                <a:tableStyleId>{5C22544A-7EE6-4342-B048-85BDC9FD1C3A}</a:tableStyleId>
+              </a:tblPr>
+              <a:tblGrid>
+                <a:gridCol w="1367896">
+                  <a:extLst>
+                    <a:ext uri="{9D8B030D-6E8A-4147-A177-3AD203B41FA5}">
+                      <a16:colId xmlns:a16="http://schemas.microsoft.com/office/drawing/2014/main" val="70970679"/>
+                    </a:ext>
+                  </a:extLst>
+                </a:gridCol>
+                <a:gridCol w="1367896">
+                  <a:extLst>
+                    <a:ext uri="{9D8B030D-6E8A-4147-A177-3AD203B41FA5}">
+                      <a16:colId xmlns:a16="http://schemas.microsoft.com/office/drawing/2014/main" val="3418980576"/>
+                    </a:ext>
+                  </a:extLst>
+                </a:gridCol>
+                <a:gridCol w="1367896">
+                  <a:extLst>
+                    <a:ext uri="{9D8B030D-6E8A-4147-A177-3AD203B41FA5}">
+                      <a16:colId xmlns:a16="http://schemas.microsoft.com/office/drawing/2014/main" val="1114662502"/>
+                    </a:ext>
+                  </a:extLst>
+                </a:gridCol>
+                <a:gridCol w="1367896">
+                  <a:extLst>
+                    <a:ext uri="{9D8B030D-6E8A-4147-A177-3AD203B41FA5}">
+                      <a16:colId xmlns:a16="http://schemas.microsoft.com/office/drawing/2014/main" val="3716054091"/>
+                    </a:ext>
+                  </a:extLst>
+                </a:gridCol>
+                <a:gridCol w="1367896">
+                  <a:extLst>
+                    <a:ext uri="{9D8B030D-6E8A-4147-A177-3AD203B41FA5}">
+                      <a16:colId xmlns:a16="http://schemas.microsoft.com/office/drawing/2014/main" val="410111227"/>
+                    </a:ext>
+                  </a:extLst>
+                </a:gridCol>
+                <a:gridCol w="1367896">
+                  <a:extLst>
+                    <a:ext uri="{9D8B030D-6E8A-4147-A177-3AD203B41FA5}">
+                      <a16:colId xmlns:a16="http://schemas.microsoft.com/office/drawing/2014/main" val="3271222320"/>
+                    </a:ext>
+                  </a:extLst>
+                </a:gridCol>
+              </a:tblGrid>
+              <a:tr h="370840">
+                <a:tc>
+                  <a:txBody>
+                    <a:bodyPr/>
+                    <a:lstStyle/>
+                    <a:p>
+                      <a:r>
+                        <a:rPr lang="de-DE" dirty="0" err="1"/>
+                        <a:t>Timestamp</a:t>
+                      </a:r>
+                      <a:endParaRPr lang="de-DE" dirty="0"/>
+                    </a:p>
+                  </a:txBody>
+                  <a:tcPr/>
+                </a:tc>
+                <a:tc>
+                  <a:txBody>
+                    <a:bodyPr/>
+                    <a:lstStyle/>
+                    <a:p>
+                      <a:r>
+                        <a:rPr lang="de-DE" dirty="0" err="1"/>
+                        <a:t>Accuracy</a:t>
+                      </a:r>
+                      <a:endParaRPr lang="de-DE" dirty="0"/>
+                    </a:p>
+                  </a:txBody>
+                  <a:tcPr/>
+                </a:tc>
+                <a:tc>
+                  <a:txBody>
+                    <a:bodyPr/>
+                    <a:lstStyle/>
+                    <a:p>
+                      <a:r>
+                        <a:rPr lang="de-DE" dirty="0" err="1"/>
+                        <a:t>Longitude</a:t>
+                      </a:r>
+                      <a:endParaRPr lang="de-DE" dirty="0"/>
+                    </a:p>
+                  </a:txBody>
+                  <a:tcPr/>
+                </a:tc>
+                <a:tc>
+                  <a:txBody>
+                    <a:bodyPr/>
+                    <a:lstStyle/>
+                    <a:p>
+                      <a:r>
+                        <a:rPr lang="de-DE" dirty="0"/>
+                        <a:t>Latitude</a:t>
+                      </a:r>
+                    </a:p>
+                  </a:txBody>
+                  <a:tcPr/>
+                </a:tc>
+                <a:tc>
+                  <a:txBody>
+                    <a:bodyPr/>
+                    <a:lstStyle/>
+                    <a:p>
+                      <a:r>
+                        <a:rPr lang="de-DE" dirty="0" err="1"/>
+                        <a:t>Altitude</a:t>
+                      </a:r>
+                      <a:endParaRPr lang="de-DE" dirty="0"/>
+                    </a:p>
+                  </a:txBody>
+                  <a:tcPr/>
+                </a:tc>
+                <a:tc>
+                  <a:txBody>
+                    <a:bodyPr/>
+                    <a:lstStyle/>
+                    <a:p>
+                      <a:r>
+                        <a:rPr lang="de-DE" dirty="0"/>
+                        <a:t>Location</a:t>
+                      </a:r>
+                    </a:p>
+                  </a:txBody>
+                  <a:tcPr/>
+                </a:tc>
+                <a:extLst>
+                  <a:ext uri="{0D108BD9-81ED-4DB2-BD59-A6C34878D82A}">
+                    <a16:rowId xmlns:a16="http://schemas.microsoft.com/office/drawing/2014/main" val="3641621929"/>
+                  </a:ext>
+                </a:extLst>
+              </a:tr>
+              <a:tr h="370840">
+                <a:tc>
+                  <a:txBody>
+                    <a:bodyPr/>
+                    <a:lstStyle/>
+                    <a:p>
+                      <a:r>
+                        <a:rPr lang="de-DE" dirty="0"/>
+                        <a:t>1300040100</a:t>
+                      </a:r>
+                    </a:p>
+                  </a:txBody>
+                  <a:tcPr/>
+                </a:tc>
+                <a:tc>
+                  <a:txBody>
+                    <a:bodyPr/>
+                    <a:lstStyle/>
+                    <a:p>
+                      <a:r>
+                        <a:rPr lang="de-DE" dirty="0"/>
+                        <a:t>30</a:t>
+                      </a:r>
+                    </a:p>
+                  </a:txBody>
+                  <a:tcPr/>
+                </a:tc>
+                <a:tc>
+                  <a:txBody>
+                    <a:bodyPr/>
+                    <a:lstStyle/>
+                    <a:p>
+                      <a:r>
+                        <a:rPr lang="de-DE" dirty="0"/>
+                        <a:t>9.500.700</a:t>
+                      </a:r>
+                    </a:p>
+                  </a:txBody>
+                  <a:tcPr/>
+                </a:tc>
+                <a:tc>
+                  <a:txBody>
+                    <a:bodyPr/>
+                    <a:lstStyle/>
+                    <a:p>
+                      <a:r>
+                        <a:rPr lang="de-DE" dirty="0"/>
+                        <a:t>51.330.700</a:t>
+                      </a:r>
+                    </a:p>
+                  </a:txBody>
+                  <a:tcPr/>
+                </a:tc>
+                <a:tc>
+                  <a:txBody>
+                    <a:bodyPr/>
+                    <a:lstStyle/>
+                    <a:p>
+                      <a:r>
+                        <a:rPr lang="de-DE" dirty="0"/>
+                        <a:t>0</a:t>
+                      </a:r>
+                    </a:p>
+                  </a:txBody>
+                  <a:tcPr/>
+                </a:tc>
+                <a:tc>
+                  <a:txBody>
+                    <a:bodyPr/>
+                    <a:lstStyle/>
+                    <a:p>
+                      <a:r>
+                        <a:rPr lang="de-DE" dirty="0"/>
+                        <a:t>Home</a:t>
+                      </a:r>
+                    </a:p>
+                  </a:txBody>
+                  <a:tcPr/>
+                </a:tc>
+                <a:extLst>
+                  <a:ext uri="{0D108BD9-81ED-4DB2-BD59-A6C34878D82A}">
+                    <a16:rowId xmlns:a16="http://schemas.microsoft.com/office/drawing/2014/main" val="1985573351"/>
+                  </a:ext>
+                </a:extLst>
+              </a:tr>
+              <a:tr h="370840">
+                <a:tc>
+                  <a:txBody>
+                    <a:bodyPr/>
+                    <a:lstStyle/>
+                    <a:p>
+                      <a:r>
+                        <a:rPr lang="de-DE" dirty="0"/>
+                        <a:t>1300028400</a:t>
+                      </a:r>
+                    </a:p>
+                  </a:txBody>
+                  <a:tcPr/>
+                </a:tc>
+                <a:tc>
+                  <a:txBody>
+                    <a:bodyPr/>
+                    <a:lstStyle/>
+                    <a:p>
+                      <a:r>
+                        <a:rPr lang="de-DE" dirty="0"/>
+                        <a:t>31</a:t>
+                      </a:r>
+                    </a:p>
+                  </a:txBody>
+                  <a:tcPr/>
+                </a:tc>
+                <a:tc>
+                  <a:txBody>
+                    <a:bodyPr/>
+                    <a:lstStyle/>
+                    <a:p>
+                      <a:r>
+                        <a:rPr lang="de-DE" dirty="0"/>
+                        <a:t>9.500.300</a:t>
+                      </a:r>
+                    </a:p>
+                  </a:txBody>
+                  <a:tcPr/>
+                </a:tc>
+                <a:tc>
+                  <a:txBody>
+                    <a:bodyPr/>
+                    <a:lstStyle/>
+                    <a:p>
+                      <a:r>
+                        <a:rPr lang="de-DE" dirty="0"/>
+                        <a:t>51.330.300</a:t>
+                      </a:r>
+                    </a:p>
+                  </a:txBody>
+                  <a:tcPr/>
+                </a:tc>
+                <a:tc>
+                  <a:txBody>
+                    <a:bodyPr/>
+                    <a:lstStyle/>
+                    <a:p>
+                      <a:r>
+                        <a:rPr lang="de-DE" dirty="0"/>
+                        <a:t>0</a:t>
+                      </a:r>
+                    </a:p>
+                  </a:txBody>
+                  <a:tcPr/>
+                </a:tc>
+                <a:tc>
+                  <a:txBody>
+                    <a:bodyPr/>
+                    <a:lstStyle/>
+                    <a:p>
+                      <a:r>
+                        <a:rPr lang="de-DE" dirty="0"/>
+                        <a:t>Sport</a:t>
+                      </a:r>
+                    </a:p>
+                  </a:txBody>
+                  <a:tcPr/>
+                </a:tc>
+                <a:extLst>
+                  <a:ext uri="{0D108BD9-81ED-4DB2-BD59-A6C34878D82A}">
+                    <a16:rowId xmlns:a16="http://schemas.microsoft.com/office/drawing/2014/main" val="309749699"/>
+                  </a:ext>
+                </a:extLst>
+              </a:tr>
+              <a:tr h="370840">
+                <a:tc>
+                  <a:txBody>
+                    <a:bodyPr/>
+                    <a:lstStyle/>
+                    <a:p>
+                      <a:r>
+                        <a:rPr lang="de-DE" dirty="0"/>
+                        <a:t>1300010400</a:t>
+                      </a:r>
+                    </a:p>
+                  </a:txBody>
+                  <a:tcPr/>
+                </a:tc>
+                <a:tc>
+                  <a:txBody>
+                    <a:bodyPr/>
+                    <a:lstStyle/>
+                    <a:p>
+                      <a:r>
+                        <a:rPr lang="de-DE" dirty="0"/>
+                        <a:t>31</a:t>
+                      </a:r>
+                    </a:p>
+                  </a:txBody>
+                  <a:tcPr/>
+                </a:tc>
+                <a:tc>
+                  <a:txBody>
+                    <a:bodyPr/>
+                    <a:lstStyle/>
+                    <a:p>
+                      <a:r>
+                        <a:rPr lang="de-DE" dirty="0"/>
+                        <a:t>9.500.500</a:t>
+                      </a:r>
+                    </a:p>
+                  </a:txBody>
+                  <a:tcPr/>
+                </a:tc>
+                <a:tc>
+                  <a:txBody>
+                    <a:bodyPr/>
+                    <a:lstStyle/>
+                    <a:p>
+                      <a:r>
+                        <a:rPr lang="de-DE" dirty="0"/>
+                        <a:t>51.330.500</a:t>
+                      </a:r>
+                    </a:p>
+                  </a:txBody>
+                  <a:tcPr/>
+                </a:tc>
+                <a:tc>
+                  <a:txBody>
+                    <a:bodyPr/>
+                    <a:lstStyle/>
+                    <a:p>
+                      <a:r>
+                        <a:rPr lang="de-DE" dirty="0"/>
+                        <a:t>0</a:t>
+                      </a:r>
+                    </a:p>
+                  </a:txBody>
+                  <a:tcPr/>
+                </a:tc>
+                <a:tc>
+                  <a:txBody>
+                    <a:bodyPr/>
+                    <a:lstStyle/>
+                    <a:p>
+                      <a:r>
+                        <a:rPr lang="de-DE" dirty="0"/>
+                        <a:t>Work</a:t>
+                      </a:r>
+                    </a:p>
+                  </a:txBody>
+                  <a:tcPr/>
+                </a:tc>
+                <a:extLst>
+                  <a:ext uri="{0D108BD9-81ED-4DB2-BD59-A6C34878D82A}">
+                    <a16:rowId xmlns:a16="http://schemas.microsoft.com/office/drawing/2014/main" val="2901197849"/>
+                  </a:ext>
+                </a:extLst>
+              </a:tr>
+            </a:tbl>
+          </a:graphicData>
+        </a:graphic>
+      </p:graphicFrame>
+      <p:graphicFrame>
+        <p:nvGraphicFramePr>
+          <p:cNvPr id="19" name="Tabelle 18">
+            <a:extLst>
+              <a:ext uri="{FF2B5EF4-FFF2-40B4-BE49-F238E27FC236}">
+                <a16:creationId xmlns:a16="http://schemas.microsoft.com/office/drawing/2014/main" id="{3C91CAF1-7445-4D80-8FEC-D69A3833AD17}"/>
+              </a:ext>
+            </a:extLst>
+          </p:cNvPr>
+          <p:cNvGraphicFramePr>
+            <a:graphicFrameLocks noGrp="1"/>
+          </p:cNvGraphicFramePr>
+          <p:nvPr>
+            <p:extLst>
+              <p:ext uri="{D42A27DB-BD31-4B8C-83A1-F6EECF244321}">
+                <p14:modId xmlns:p14="http://schemas.microsoft.com/office/powerpoint/2010/main" val="1735137459"/>
+              </p:ext>
+            </p:extLst>
+          </p:nvPr>
+        </p:nvGraphicFramePr>
+        <p:xfrm>
+          <a:off x="454615" y="3513048"/>
+          <a:ext cx="2736304" cy="1483360"/>
+        </p:xfrm>
+        <a:graphic>
+          <a:graphicData uri="http://schemas.openxmlformats.org/drawingml/2006/table">
+            <a:tbl>
+              <a:tblPr firstRow="1" bandRow="1">
+                <a:tableStyleId>{5C22544A-7EE6-4342-B048-85BDC9FD1C3A}</a:tableStyleId>
+              </a:tblPr>
+              <a:tblGrid>
+                <a:gridCol w="1368152">
+                  <a:extLst>
+                    <a:ext uri="{9D8B030D-6E8A-4147-A177-3AD203B41FA5}">
+                      <a16:colId xmlns:a16="http://schemas.microsoft.com/office/drawing/2014/main" val="1378048227"/>
+                    </a:ext>
+                  </a:extLst>
+                </a:gridCol>
+                <a:gridCol w="1368152">
+                  <a:extLst>
+                    <a:ext uri="{9D8B030D-6E8A-4147-A177-3AD203B41FA5}">
+                      <a16:colId xmlns:a16="http://schemas.microsoft.com/office/drawing/2014/main" val="426684460"/>
+                    </a:ext>
+                  </a:extLst>
+                </a:gridCol>
+              </a:tblGrid>
+              <a:tr h="370840">
+                <a:tc>
+                  <a:txBody>
+                    <a:bodyPr/>
+                    <a:lstStyle/>
+                    <a:p>
+                      <a:r>
+                        <a:rPr lang="de-DE" dirty="0" err="1"/>
+                        <a:t>Timestamp</a:t>
+                      </a:r>
+                      <a:endParaRPr lang="de-DE" dirty="0"/>
+                    </a:p>
+                  </a:txBody>
+                  <a:tcPr/>
+                </a:tc>
+                <a:tc>
+                  <a:txBody>
+                    <a:bodyPr/>
+                    <a:lstStyle/>
+                    <a:p>
+                      <a:r>
+                        <a:rPr lang="de-DE" dirty="0"/>
+                        <a:t>Location</a:t>
+                      </a:r>
+                    </a:p>
+                  </a:txBody>
+                  <a:tcPr/>
+                </a:tc>
+                <a:extLst>
+                  <a:ext uri="{0D108BD9-81ED-4DB2-BD59-A6C34878D82A}">
+                    <a16:rowId xmlns:a16="http://schemas.microsoft.com/office/drawing/2014/main" val="4085049934"/>
+                  </a:ext>
+                </a:extLst>
+              </a:tr>
+              <a:tr h="370840">
+                <a:tc>
+                  <a:txBody>
+                    <a:bodyPr/>
+                    <a:lstStyle/>
+                    <a:p>
+                      <a:r>
+                        <a:rPr lang="de-DE" dirty="0"/>
+                        <a:t>1300010400</a:t>
+                      </a:r>
+                    </a:p>
+                  </a:txBody>
+                  <a:tcPr/>
+                </a:tc>
+                <a:tc>
+                  <a:txBody>
+                    <a:bodyPr/>
+                    <a:lstStyle/>
+                    <a:p>
+                      <a:r>
+                        <a:rPr lang="de-DE" dirty="0"/>
+                        <a:t>Work</a:t>
+                      </a:r>
+                    </a:p>
+                  </a:txBody>
+                  <a:tcPr/>
+                </a:tc>
+                <a:extLst>
+                  <a:ext uri="{0D108BD9-81ED-4DB2-BD59-A6C34878D82A}">
+                    <a16:rowId xmlns:a16="http://schemas.microsoft.com/office/drawing/2014/main" val="1597026882"/>
+                  </a:ext>
+                </a:extLst>
+              </a:tr>
+              <a:tr h="370840">
+                <a:tc>
+                  <a:txBody>
+                    <a:bodyPr/>
+                    <a:lstStyle/>
+                    <a:p>
+                      <a:r>
+                        <a:rPr lang="de-DE" dirty="0"/>
+                        <a:t>1300028400</a:t>
+                      </a:r>
+                    </a:p>
+                  </a:txBody>
+                  <a:tcPr/>
+                </a:tc>
+                <a:tc>
+                  <a:txBody>
+                    <a:bodyPr/>
+                    <a:lstStyle/>
+                    <a:p>
+                      <a:r>
+                        <a:rPr lang="de-DE" dirty="0"/>
+                        <a:t>Sport</a:t>
+                      </a:r>
+                    </a:p>
+                  </a:txBody>
+                  <a:tcPr/>
+                </a:tc>
+                <a:extLst>
+                  <a:ext uri="{0D108BD9-81ED-4DB2-BD59-A6C34878D82A}">
+                    <a16:rowId xmlns:a16="http://schemas.microsoft.com/office/drawing/2014/main" val="516108169"/>
+                  </a:ext>
+                </a:extLst>
+              </a:tr>
+              <a:tr h="370840">
+                <a:tc>
+                  <a:txBody>
+                    <a:bodyPr/>
+                    <a:lstStyle/>
+                    <a:p>
+                      <a:r>
+                        <a:rPr lang="de-DE" dirty="0"/>
+                        <a:t>1300040100</a:t>
+                      </a:r>
+                    </a:p>
+                  </a:txBody>
+                  <a:tcPr/>
+                </a:tc>
+                <a:tc>
+                  <a:txBody>
+                    <a:bodyPr/>
+                    <a:lstStyle/>
+                    <a:p>
+                      <a:r>
+                        <a:rPr lang="de-DE" dirty="0"/>
+                        <a:t>Home</a:t>
+                      </a:r>
+                    </a:p>
+                  </a:txBody>
+                  <a:tcPr/>
+                </a:tc>
+                <a:extLst>
+                  <a:ext uri="{0D108BD9-81ED-4DB2-BD59-A6C34878D82A}">
+                    <a16:rowId xmlns:a16="http://schemas.microsoft.com/office/drawing/2014/main" val="2357980307"/>
+                  </a:ext>
+                </a:extLst>
+              </a:tr>
+            </a:tbl>
+          </a:graphicData>
+        </a:graphic>
+      </p:graphicFrame>
+      <p:sp>
+        <p:nvSpPr>
+          <p:cNvPr id="24" name="Textfeld 23">
+            <a:extLst>
+              <a:ext uri="{FF2B5EF4-FFF2-40B4-BE49-F238E27FC236}">
+                <a16:creationId xmlns:a16="http://schemas.microsoft.com/office/drawing/2014/main" id="{E83B8274-DED9-4844-86EE-4B4BB91C56D9}"/>
+              </a:ext>
+            </a:extLst>
+          </p:cNvPr>
+          <p:cNvSpPr txBox="1"/>
+          <p:nvPr/>
+        </p:nvSpPr>
+        <p:spPr>
+          <a:xfrm flipH="1">
+            <a:off x="5148064" y="3513048"/>
+            <a:ext cx="2736304" cy="1200329"/>
+          </a:xfrm>
+          <a:prstGeom prst="rect">
+            <a:avLst/>
+          </a:prstGeom>
+          <a:noFill/>
+        </p:spPr>
+        <p:txBody>
+          <a:bodyPr wrap="square" rtlCol="0">
+            <a:spAutoFit/>
+          </a:bodyPr>
+          <a:lstStyle/>
+          <a:p>
+            <a:r>
+              <a:rPr lang="de-DE" dirty="0"/>
+              <a:t>3. </a:t>
+            </a:r>
+            <a:r>
+              <a:rPr lang="de-DE" dirty="0" err="1"/>
+              <a:t>Assigned</a:t>
+            </a:r>
+            <a:r>
+              <a:rPr lang="de-DE" dirty="0"/>
+              <a:t> </a:t>
+            </a:r>
+            <a:r>
+              <a:rPr lang="de-DE" dirty="0" err="1"/>
+              <a:t>characters</a:t>
+            </a:r>
+            <a:r>
+              <a:rPr lang="de-DE" dirty="0"/>
+              <a:t>:</a:t>
+            </a:r>
+          </a:p>
+          <a:p>
+            <a:r>
+              <a:rPr lang="de-DE" dirty="0"/>
+              <a:t>Work </a:t>
+            </a:r>
+            <a:r>
+              <a:rPr lang="de-DE" dirty="0">
+                <a:sym typeface="Wingdings" panose="05000000000000000000" pitchFamily="2" charset="2"/>
+              </a:rPr>
+              <a:t></a:t>
+            </a:r>
+            <a:r>
+              <a:rPr lang="de-DE" dirty="0"/>
+              <a:t> A</a:t>
+            </a:r>
+          </a:p>
+          <a:p>
+            <a:r>
+              <a:rPr lang="de-DE" dirty="0"/>
+              <a:t>Sport </a:t>
+            </a:r>
+            <a:r>
+              <a:rPr lang="de-DE" dirty="0">
+                <a:sym typeface="Wingdings" panose="05000000000000000000" pitchFamily="2" charset="2"/>
+              </a:rPr>
+              <a:t> B</a:t>
+            </a:r>
+          </a:p>
+          <a:p>
+            <a:r>
+              <a:rPr lang="de-DE" dirty="0">
+                <a:sym typeface="Wingdings" panose="05000000000000000000" pitchFamily="2" charset="2"/>
+              </a:rPr>
+              <a:t>Home  C</a:t>
+            </a:r>
+            <a:endParaRPr lang="de-DE" dirty="0"/>
+          </a:p>
+        </p:txBody>
+      </p:sp>
+      <p:sp>
+        <p:nvSpPr>
+          <p:cNvPr id="25" name="Textfeld 24">
+            <a:extLst>
+              <a:ext uri="{FF2B5EF4-FFF2-40B4-BE49-F238E27FC236}">
+                <a16:creationId xmlns:a16="http://schemas.microsoft.com/office/drawing/2014/main" id="{35E4E08E-0F4A-403D-A8F0-A893AE197E8A}"/>
+              </a:ext>
+            </a:extLst>
+          </p:cNvPr>
+          <p:cNvSpPr txBox="1"/>
+          <p:nvPr/>
+        </p:nvSpPr>
+        <p:spPr>
+          <a:xfrm>
+            <a:off x="464983" y="5626145"/>
+            <a:ext cx="2810873" cy="369332"/>
+          </a:xfrm>
+          <a:prstGeom prst="rect">
+            <a:avLst/>
+          </a:prstGeom>
+          <a:noFill/>
+        </p:spPr>
+        <p:txBody>
+          <a:bodyPr wrap="square" rtlCol="0">
+            <a:spAutoFit/>
+          </a:bodyPr>
+          <a:lstStyle/>
+          <a:p>
+            <a:r>
+              <a:rPr lang="de-DE" dirty="0"/>
+              <a:t>4. </a:t>
+            </a:r>
+            <a:r>
+              <a:rPr lang="de-DE" dirty="0" err="1"/>
+              <a:t>Result</a:t>
+            </a:r>
+            <a:r>
+              <a:rPr lang="de-DE" dirty="0"/>
+              <a:t> </a:t>
+            </a:r>
+            <a:r>
+              <a:rPr lang="de-DE" dirty="0" err="1"/>
+              <a:t>Sequence</a:t>
+            </a:r>
+            <a:r>
+              <a:rPr lang="de-DE" dirty="0"/>
+              <a:t>: </a:t>
+            </a:r>
+            <a:r>
+              <a:rPr lang="de-DE" dirty="0">
+                <a:solidFill>
+                  <a:srgbClr val="0E61E6"/>
+                </a:solidFill>
+              </a:rPr>
+              <a:t>ABC</a:t>
+            </a:r>
+          </a:p>
+        </p:txBody>
+      </p:sp>
+      <p:sp>
+        <p:nvSpPr>
+          <p:cNvPr id="26" name="Textfeld 25">
+            <a:extLst>
+              <a:ext uri="{FF2B5EF4-FFF2-40B4-BE49-F238E27FC236}">
+                <a16:creationId xmlns:a16="http://schemas.microsoft.com/office/drawing/2014/main" id="{88340D4F-B76A-49EA-8A18-920781A6F824}"/>
+              </a:ext>
+            </a:extLst>
+          </p:cNvPr>
+          <p:cNvSpPr txBox="1"/>
+          <p:nvPr/>
+        </p:nvSpPr>
+        <p:spPr>
+          <a:xfrm>
+            <a:off x="454615" y="1047189"/>
+            <a:ext cx="1479892" cy="369332"/>
+          </a:xfrm>
+          <a:prstGeom prst="rect">
+            <a:avLst/>
+          </a:prstGeom>
+          <a:noFill/>
+        </p:spPr>
+        <p:txBody>
+          <a:bodyPr wrap="none" rtlCol="0">
+            <a:spAutoFit/>
+          </a:bodyPr>
+          <a:lstStyle/>
+          <a:p>
+            <a:r>
+              <a:rPr lang="de-DE" dirty="0"/>
+              <a:t>1. Raw </a:t>
+            </a:r>
+            <a:r>
+              <a:rPr lang="de-DE" dirty="0" err="1"/>
+              <a:t>data</a:t>
+            </a:r>
+            <a:r>
+              <a:rPr lang="de-DE" dirty="0"/>
+              <a:t>:</a:t>
+            </a:r>
+          </a:p>
+        </p:txBody>
+      </p:sp>
+      <p:sp>
+        <p:nvSpPr>
+          <p:cNvPr id="27" name="Textfeld 26">
+            <a:extLst>
+              <a:ext uri="{FF2B5EF4-FFF2-40B4-BE49-F238E27FC236}">
+                <a16:creationId xmlns:a16="http://schemas.microsoft.com/office/drawing/2014/main" id="{578ED441-6604-437E-9582-121CB1657F77}"/>
+              </a:ext>
+            </a:extLst>
+          </p:cNvPr>
+          <p:cNvSpPr txBox="1"/>
+          <p:nvPr/>
+        </p:nvSpPr>
+        <p:spPr>
+          <a:xfrm>
+            <a:off x="464983" y="3143716"/>
+            <a:ext cx="1730753" cy="369332"/>
+          </a:xfrm>
+          <a:prstGeom prst="rect">
+            <a:avLst/>
+          </a:prstGeom>
+          <a:noFill/>
+        </p:spPr>
+        <p:txBody>
+          <a:bodyPr wrap="square" rtlCol="0">
+            <a:spAutoFit/>
+          </a:bodyPr>
+          <a:lstStyle/>
+          <a:p>
+            <a:r>
+              <a:rPr lang="de-DE" dirty="0"/>
+              <a:t>2. </a:t>
+            </a:r>
+            <a:r>
+              <a:rPr lang="de-DE" dirty="0" err="1"/>
+              <a:t>Sorted</a:t>
+            </a:r>
+            <a:r>
+              <a:rPr lang="de-DE" dirty="0"/>
+              <a:t> </a:t>
+            </a:r>
+            <a:r>
+              <a:rPr lang="de-DE" dirty="0" err="1"/>
+              <a:t>data</a:t>
+            </a:r>
+            <a:r>
+              <a:rPr lang="de-DE" dirty="0"/>
+              <a:t>:</a:t>
+            </a:r>
+          </a:p>
+        </p:txBody>
+      </p:sp>
+    </p:spTree>
+    <p:extLst>
+      <p:ext uri="{BB962C8B-B14F-4D97-AF65-F5344CB8AC3E}">
+        <p14:creationId xmlns:p14="http://schemas.microsoft.com/office/powerpoint/2010/main" val="1923783804"/>
+      </p:ext>
+    </p:extLst>
+  </p:cSld>
+  <p:clrMapOvr>
+    <a:masterClrMapping/>
+  </p:clrMapOvr>
+  <p:timing>
+    <p:tnLst>
+      <p:par>
+        <p:cTn id="1" dur="indefinite" restart="never" nodeType="tmRoot">
+          <p:childTnLst>
+            <p:seq concurrent="1" nextAc="seek">
+              <p:cTn id="2" dur="indefinite" nodeType="mainSeq">
+                <p:childTnLst>
+                  <p:par>
+                    <p:cTn id="3" fill="hold">
+                      <p:stCondLst>
+                        <p:cond delay="indefinite"/>
+                      </p:stCondLst>
+                      <p:childTnLst>
+                        <p:par>
+                          <p:cTn id="4" fill="hold">
+                            <p:stCondLst>
+                              <p:cond delay="0"/>
+                            </p:stCondLst>
+                            <p:childTnLst>
+                              <p:par>
+                                <p:cTn id="5" presetID="1" presetClass="entr" presetSubtype="0" fill="hold" grpId="0" nodeType="clickEffect">
+                                  <p:stCondLst>
+                                    <p:cond delay="0"/>
+                                  </p:stCondLst>
+                                  <p:childTnLst>
+                                    <p:set>
+                                      <p:cBhvr>
+                                        <p:cTn id="6" dur="1" fill="hold">
+                                          <p:stCondLst>
+                                            <p:cond delay="0"/>
+                                          </p:stCondLst>
+                                        </p:cTn>
+                                        <p:tgtEl>
+                                          <p:spTgt spid="26"/>
+                                        </p:tgtEl>
+                                        <p:attrNameLst>
+                                          <p:attrName>style.visibility</p:attrName>
+                                        </p:attrNameLst>
+                                      </p:cBhvr>
+                                      <p:to>
+                                        <p:strVal val="visible"/>
+                                      </p:to>
+                                    </p:set>
+                                  </p:childTnLst>
+                                </p:cTn>
+                              </p:par>
+                              <p:par>
+                                <p:cTn id="7" presetID="1" presetClass="entr" presetSubtype="0" fill="hold" nodeType="withEffect">
+                                  <p:stCondLst>
+                                    <p:cond delay="0"/>
+                                  </p:stCondLst>
+                                  <p:childTnLst>
+                                    <p:set>
+                                      <p:cBhvr>
+                                        <p:cTn id="8" dur="1" fill="hold">
+                                          <p:stCondLst>
+                                            <p:cond delay="0"/>
+                                          </p:stCondLst>
+                                        </p:cTn>
+                                        <p:tgtEl>
+                                          <p:spTgt spid="17"/>
+                                        </p:tgtEl>
+                                        <p:attrNameLst>
+                                          <p:attrName>style.visibility</p:attrName>
+                                        </p:attrNameLst>
+                                      </p:cBhvr>
+                                      <p:to>
+                                        <p:strVal val="visible"/>
+                                      </p:to>
+                                    </p:set>
+                                  </p:childTnLst>
+                                </p:cTn>
+                              </p:par>
+                            </p:childTnLst>
+                          </p:cTn>
+                        </p:par>
+                      </p:childTnLst>
+                    </p:cTn>
+                  </p:par>
+                  <p:par>
+                    <p:cTn id="9" fill="hold">
+                      <p:stCondLst>
+                        <p:cond delay="indefinite"/>
+                      </p:stCondLst>
+                      <p:childTnLst>
+                        <p:par>
+                          <p:cTn id="10" fill="hold">
+                            <p:stCondLst>
+                              <p:cond delay="0"/>
+                            </p:stCondLst>
+                            <p:childTnLst>
+                              <p:par>
+                                <p:cTn id="11" presetID="1" presetClass="entr" presetSubtype="0" fill="hold" grpId="0" nodeType="clickEffect">
+                                  <p:stCondLst>
+                                    <p:cond delay="0"/>
+                                  </p:stCondLst>
+                                  <p:childTnLst>
+                                    <p:set>
+                                      <p:cBhvr>
+                                        <p:cTn id="12" dur="1" fill="hold">
+                                          <p:stCondLst>
+                                            <p:cond delay="0"/>
+                                          </p:stCondLst>
+                                        </p:cTn>
+                                        <p:tgtEl>
+                                          <p:spTgt spid="27"/>
+                                        </p:tgtEl>
+                                        <p:attrNameLst>
+                                          <p:attrName>style.visibility</p:attrName>
+                                        </p:attrNameLst>
+                                      </p:cBhvr>
+                                      <p:to>
+                                        <p:strVal val="visible"/>
+                                      </p:to>
+                                    </p:set>
+                                  </p:childTnLst>
+                                </p:cTn>
+                              </p:par>
+                              <p:par>
+                                <p:cTn id="13" presetID="1" presetClass="entr" presetSubtype="0" fill="hold" nodeType="withEffect">
+                                  <p:stCondLst>
+                                    <p:cond delay="0"/>
+                                  </p:stCondLst>
+                                  <p:childTnLst>
+                                    <p:set>
+                                      <p:cBhvr>
+                                        <p:cTn id="14" dur="1" fill="hold">
+                                          <p:stCondLst>
+                                            <p:cond delay="0"/>
+                                          </p:stCondLst>
+                                        </p:cTn>
+                                        <p:tgtEl>
+                                          <p:spTgt spid="19"/>
+                                        </p:tgtEl>
+                                        <p:attrNameLst>
+                                          <p:attrName>style.visibility</p:attrName>
+                                        </p:attrNameLst>
+                                      </p:cBhvr>
+                                      <p:to>
+                                        <p:strVal val="visible"/>
+                                      </p:to>
+                                    </p:set>
+                                  </p:childTnLst>
+                                </p:cTn>
+                              </p:par>
+                            </p:childTnLst>
+                          </p:cTn>
+                        </p:par>
+                      </p:childTnLst>
+                    </p:cTn>
+                  </p:par>
+                  <p:par>
+                    <p:cTn id="15" fill="hold">
+                      <p:stCondLst>
+                        <p:cond delay="indefinite"/>
+                      </p:stCondLst>
+                      <p:childTnLst>
+                        <p:par>
+                          <p:cTn id="16" fill="hold">
+                            <p:stCondLst>
+                              <p:cond delay="0"/>
+                            </p:stCondLst>
+                            <p:childTnLst>
+                              <p:par>
+                                <p:cTn id="17" presetID="1" presetClass="entr" presetSubtype="0" fill="hold" grpId="0" nodeType="clickEffect">
+                                  <p:stCondLst>
+                                    <p:cond delay="0"/>
+                                  </p:stCondLst>
+                                  <p:childTnLst>
+                                    <p:set>
+                                      <p:cBhvr>
+                                        <p:cTn id="18" dur="1" fill="hold">
+                                          <p:stCondLst>
+                                            <p:cond delay="0"/>
+                                          </p:stCondLst>
+                                        </p:cTn>
+                                        <p:tgtEl>
+                                          <p:spTgt spid="24"/>
+                                        </p:tgtEl>
+                                        <p:attrNameLst>
+                                          <p:attrName>style.visibility</p:attrName>
+                                        </p:attrNameLst>
+                                      </p:cBhvr>
+                                      <p:to>
+                                        <p:strVal val="visible"/>
+                                      </p:to>
+                                    </p:set>
+                                  </p:childTnLst>
+                                </p:cTn>
+                              </p:par>
+                            </p:childTnLst>
+                          </p:cTn>
+                        </p:par>
+                      </p:childTnLst>
+                    </p:cTn>
+                  </p:par>
+                  <p:par>
+                    <p:cTn id="19" fill="hold">
+                      <p:stCondLst>
+                        <p:cond delay="indefinite"/>
+                      </p:stCondLst>
+                      <p:childTnLst>
+                        <p:par>
+                          <p:cTn id="20" fill="hold">
+                            <p:stCondLst>
+                              <p:cond delay="0"/>
+                            </p:stCondLst>
+                            <p:childTnLst>
+                              <p:par>
+                                <p:cTn id="21" presetID="1" presetClass="entr" presetSubtype="0" fill="hold" grpId="0" nodeType="clickEffect">
+                                  <p:stCondLst>
+                                    <p:cond delay="0"/>
+                                  </p:stCondLst>
+                                  <p:childTnLst>
+                                    <p:set>
+                                      <p:cBhvr>
+                                        <p:cTn id="22" dur="1" fill="hold">
+                                          <p:stCondLst>
+                                            <p:cond delay="0"/>
+                                          </p:stCondLst>
+                                        </p:cTn>
+                                        <p:tgtEl>
+                                          <p:spTgt spid="25"/>
+                                        </p:tgtEl>
+                                        <p:attrNameLst>
+                                          <p:attrName>style.visibility</p:attrName>
+                                        </p:attrNameLst>
+                                      </p:cBhvr>
+                                      <p:to>
+                                        <p:strVal val="visible"/>
+                                      </p:to>
+                                    </p:set>
+                                  </p:childTnLst>
+                                </p:cTn>
+                              </p:par>
+                            </p:childTnLst>
+                          </p:cTn>
+                        </p:par>
+                      </p:childTnLst>
+                    </p:cTn>
+                  </p:par>
+                </p:childTnLst>
+              </p:cTn>
+              <p:prevCondLst>
+                <p:cond evt="onPrev" delay="0">
+                  <p:tgtEl>
+                    <p:sldTgt/>
+                  </p:tgtEl>
+                </p:cond>
+              </p:prevCondLst>
+              <p:nextCondLst>
+                <p:cond evt="onNext" delay="0">
+                  <p:tgtEl>
+                    <p:sldTgt/>
+                  </p:tgtEl>
+                </p:cond>
+              </p:nextCondLst>
+            </p:seq>
+          </p:childTnLst>
+        </p:cTn>
+      </p:par>
+    </p:tnLst>
+    <p:bldLst>
+      <p:bldP spid="24" grpId="0"/>
+      <p:bldP spid="25" grpId="0"/>
+      <p:bldP spid="26" grpId="0"/>
+      <p:bldP spid="27" grpId="0"/>
+    </p:bldLst>
+  </p:timing>
+</p:sld>
+</file>
+
+<file path=ppt/slides/slide6.xml><?xml version="1.0" encoding="utf-8"?>
+<p:sld xmlns:a="http://schemas.openxmlformats.org/drawingml/2006/main" xmlns:r="http://schemas.openxmlformats.org/officeDocument/2006/relationships" xmlns:p="http://schemas.openxmlformats.org/presentationml/2006/main">
+  <p:cSld>
+    <p:spTree>
+      <p:nvGrpSpPr>
+        <p:cNvPr id="1" name=""/>
+        <p:cNvGrpSpPr/>
+        <p:nvPr/>
+      </p:nvGrpSpPr>
+      <p:grpSpPr>
+        <a:xfrm>
+          <a:off x="0" y="0"/>
+          <a:ext cx="0" cy="0"/>
+          <a:chOff x="0" y="0"/>
+          <a:chExt cx="0" cy="0"/>
+        </a:xfrm>
+      </p:grpSpPr>
+      <p:sp>
+        <p:nvSpPr>
+          <p:cNvPr id="2" name="Titel 1">
+            <a:extLst>
+              <a:ext uri="{FF2B5EF4-FFF2-40B4-BE49-F238E27FC236}">
+                <a16:creationId xmlns:a16="http://schemas.microsoft.com/office/drawing/2014/main" id="{5CE9B4EF-180C-462D-9742-3A6754B91F32}"/>
+              </a:ext>
+            </a:extLst>
+          </p:cNvPr>
+          <p:cNvSpPr>
+            <a:spLocks noGrp="1"/>
+          </p:cNvSpPr>
+          <p:nvPr>
+            <p:ph type="title"/>
+          </p:nvPr>
+        </p:nvSpPr>
+        <p:spPr/>
+        <p:txBody>
+          <a:bodyPr/>
+          <a:lstStyle/>
+          <a:p>
+            <a:r>
+              <a:rPr lang="de-DE" dirty="0"/>
+              <a:t>Concept</a:t>
+            </a:r>
+          </a:p>
+        </p:txBody>
+      </p:sp>
+      <p:pic>
+        <p:nvPicPr>
+          <p:cNvPr id="6" name="Inhaltsplatzhalter 5">
+            <a:extLst>
+              <a:ext uri="{FF2B5EF4-FFF2-40B4-BE49-F238E27FC236}">
+                <a16:creationId xmlns:a16="http://schemas.microsoft.com/office/drawing/2014/main" id="{7AF26E34-A853-4992-9A9B-7F0465239D92}"/>
+              </a:ext>
+            </a:extLst>
+          </p:cNvPr>
+          <p:cNvPicPr>
+            <a:picLocks noGrp="1" noChangeAspect="1"/>
+          </p:cNvPicPr>
+          <p:nvPr>
+            <p:ph sz="half" idx="1"/>
+          </p:nvPr>
+        </p:nvPicPr>
+        <p:blipFill>
+          <a:blip r:embed="rId3">
+            <a:extLst>
+              <a:ext uri="{28A0092B-C50C-407E-A947-70E740481C1C}">
+                <a14:useLocalDpi xmlns:a14="http://schemas.microsoft.com/office/drawing/2010/main" val="0"/>
+              </a:ext>
+            </a:extLst>
+          </a:blip>
+          <a:stretch>
+            <a:fillRect/>
+          </a:stretch>
+        </p:blipFill>
+        <p:spPr>
+          <a:xfrm>
+            <a:off x="467544" y="4365104"/>
+            <a:ext cx="8208912" cy="1224136"/>
+          </a:xfrm>
+        </p:spPr>
+      </p:pic>
+      <p:sp>
+        <p:nvSpPr>
+          <p:cNvPr id="14" name="Inhaltsplatzhalter 13">
+            <a:extLst>
+              <a:ext uri="{FF2B5EF4-FFF2-40B4-BE49-F238E27FC236}">
+                <a16:creationId xmlns:a16="http://schemas.microsoft.com/office/drawing/2014/main" id="{A56ADED2-9DC7-47B8-8CE3-6E300BDA691C}"/>
+              </a:ext>
+            </a:extLst>
+          </p:cNvPr>
+          <p:cNvSpPr>
+            <a:spLocks noGrp="1"/>
+          </p:cNvSpPr>
+          <p:nvPr>
+            <p:ph sz="half" idx="2"/>
+          </p:nvPr>
+        </p:nvSpPr>
+        <p:spPr>
+          <a:xfrm>
+            <a:off x="467544" y="1412776"/>
+            <a:ext cx="8208912" cy="3168352"/>
+          </a:xfrm>
+        </p:spPr>
+        <p:txBody>
+          <a:bodyPr/>
+          <a:lstStyle/>
+          <a:p>
+            <a:r>
+              <a:rPr lang="de-DE" b="1" dirty="0" err="1"/>
+              <a:t>History</a:t>
+            </a:r>
+            <a:r>
+              <a:rPr lang="de-DE" b="1" dirty="0"/>
+              <a:t> </a:t>
+            </a:r>
+            <a:r>
+              <a:rPr lang="de-DE" b="1" dirty="0" err="1"/>
+              <a:t>sequence</a:t>
+            </a:r>
+            <a:r>
+              <a:rPr lang="de-DE" b="1" dirty="0"/>
+              <a:t>: </a:t>
+            </a:r>
+            <a:r>
+              <a:rPr lang="de-DE" dirty="0"/>
+              <a:t>The </a:t>
+            </a:r>
+            <a:r>
+              <a:rPr lang="de-DE" dirty="0" err="1"/>
+              <a:t>entire</a:t>
+            </a:r>
+            <a:r>
+              <a:rPr lang="de-DE" dirty="0"/>
+              <a:t> </a:t>
+            </a:r>
+            <a:r>
+              <a:rPr lang="de-DE" dirty="0" err="1"/>
+              <a:t>sequence</a:t>
+            </a:r>
+            <a:endParaRPr lang="de-DE" dirty="0"/>
+          </a:p>
+          <a:p>
+            <a:r>
+              <a:rPr lang="de-DE" b="1" dirty="0"/>
+              <a:t>Search </a:t>
+            </a:r>
+            <a:r>
+              <a:rPr lang="de-DE" b="1" dirty="0" err="1"/>
+              <a:t>sequence</a:t>
+            </a:r>
+            <a:r>
+              <a:rPr lang="de-DE" b="1" dirty="0"/>
+              <a:t>: </a:t>
+            </a:r>
+            <a:r>
+              <a:rPr lang="de-DE" dirty="0"/>
+              <a:t>Last x </a:t>
+            </a:r>
+            <a:r>
+              <a:rPr lang="de-DE" dirty="0" err="1"/>
+              <a:t>characters</a:t>
+            </a:r>
+            <a:r>
+              <a:rPr lang="de-DE" dirty="0"/>
+              <a:t> </a:t>
+            </a:r>
+            <a:r>
+              <a:rPr lang="de-DE" dirty="0" err="1"/>
+              <a:t>of</a:t>
+            </a:r>
+            <a:r>
+              <a:rPr lang="de-DE" dirty="0"/>
+              <a:t> </a:t>
+            </a:r>
+            <a:r>
+              <a:rPr lang="de-DE" dirty="0" err="1"/>
+              <a:t>history</a:t>
+            </a:r>
+            <a:r>
+              <a:rPr lang="de-DE" dirty="0"/>
+              <a:t> </a:t>
+            </a:r>
+            <a:r>
+              <a:rPr lang="de-DE" dirty="0" err="1"/>
+              <a:t>sequence</a:t>
+            </a:r>
+            <a:endParaRPr lang="de-DE" dirty="0"/>
+          </a:p>
+          <a:p>
+            <a:r>
+              <a:rPr lang="de-DE" b="1" dirty="0"/>
+              <a:t>Match </a:t>
+            </a:r>
+            <a:r>
+              <a:rPr lang="de-DE" b="1" dirty="0" err="1"/>
+              <a:t>sequence</a:t>
+            </a:r>
+            <a:r>
+              <a:rPr lang="de-DE" b="1" dirty="0"/>
+              <a:t>: </a:t>
+            </a:r>
+            <a:r>
+              <a:rPr lang="de-DE" dirty="0" err="1"/>
+              <a:t>Found</a:t>
+            </a:r>
+            <a:r>
+              <a:rPr lang="de-DE" dirty="0"/>
+              <a:t> </a:t>
+            </a:r>
+            <a:r>
+              <a:rPr lang="de-DE" dirty="0" err="1"/>
+              <a:t>search</a:t>
+            </a:r>
+            <a:r>
+              <a:rPr lang="de-DE" dirty="0"/>
+              <a:t> </a:t>
+            </a:r>
+            <a:r>
+              <a:rPr lang="de-DE" dirty="0" err="1"/>
+              <a:t>sequence</a:t>
+            </a:r>
+            <a:endParaRPr lang="de-DE" dirty="0"/>
+          </a:p>
+          <a:p>
+            <a:r>
+              <a:rPr lang="de-DE" b="1" dirty="0" err="1"/>
+              <a:t>Prediction</a:t>
+            </a:r>
+            <a:r>
+              <a:rPr lang="de-DE" b="1" dirty="0"/>
+              <a:t>:</a:t>
+            </a:r>
+            <a:r>
+              <a:rPr lang="de-DE" dirty="0"/>
+              <a:t> </a:t>
+            </a:r>
+            <a:r>
+              <a:rPr lang="de-DE" dirty="0" err="1"/>
+              <a:t>Continuation</a:t>
+            </a:r>
+            <a:r>
+              <a:rPr lang="de-DE" dirty="0"/>
+              <a:t> </a:t>
+            </a:r>
+            <a:r>
+              <a:rPr lang="de-DE" dirty="0" err="1"/>
+              <a:t>from</a:t>
+            </a:r>
+            <a:r>
+              <a:rPr lang="de-DE" dirty="0"/>
+              <a:t> </a:t>
+            </a:r>
+            <a:r>
+              <a:rPr lang="de-DE" dirty="0" err="1"/>
+              <a:t>match</a:t>
+            </a:r>
+            <a:r>
+              <a:rPr lang="de-DE" dirty="0"/>
+              <a:t> </a:t>
+            </a:r>
+            <a:r>
+              <a:rPr lang="de-DE" dirty="0" err="1"/>
+              <a:t>sequence</a:t>
+            </a:r>
+            <a:endParaRPr lang="de-DE" dirty="0"/>
+          </a:p>
+        </p:txBody>
+      </p:sp>
+    </p:spTree>
+    <p:extLst>
+      <p:ext uri="{BB962C8B-B14F-4D97-AF65-F5344CB8AC3E}">
+        <p14:creationId xmlns:p14="http://schemas.microsoft.com/office/powerpoint/2010/main" val="3301155235"/>
+      </p:ext>
+    </p:extLst>
+  </p:cSld>
+  <p:clrMapOvr>
+    <a:masterClrMapping/>
+  </p:clrMapOvr>
+</p:sld>
+</file>
+
+<file path=ppt/slides/slide7.xml><?xml version="1.0" encoding="utf-8"?>
+<p:sld xmlns:a="http://schemas.openxmlformats.org/drawingml/2006/main" xmlns:r="http://schemas.openxmlformats.org/officeDocument/2006/relationships" xmlns:p="http://schemas.openxmlformats.org/presentationml/2006/main">
+  <p:cSld>
+    <p:spTree>
+      <p:nvGrpSpPr>
+        <p:cNvPr id="1" name=""/>
+        <p:cNvGrpSpPr/>
+        <p:nvPr/>
+      </p:nvGrpSpPr>
+      <p:grpSpPr>
+        <a:xfrm>
+          <a:off x="0" y="0"/>
+          <a:ext cx="0" cy="0"/>
+          <a:chOff x="0" y="0"/>
+          <a:chExt cx="0" cy="0"/>
+        </a:xfrm>
+      </p:grpSpPr>
+      <p:sp>
+        <p:nvSpPr>
+          <p:cNvPr id="2" name="Titel 1">
+            <a:extLst>
+              <a:ext uri="{FF2B5EF4-FFF2-40B4-BE49-F238E27FC236}">
+                <a16:creationId xmlns:a16="http://schemas.microsoft.com/office/drawing/2014/main" id="{8A628275-F77C-4D72-8867-67EB7448664F}"/>
+              </a:ext>
+            </a:extLst>
+          </p:cNvPr>
+          <p:cNvSpPr>
+            <a:spLocks noGrp="1"/>
+          </p:cNvSpPr>
+          <p:nvPr>
+            <p:ph type="title"/>
+          </p:nvPr>
+        </p:nvSpPr>
+        <p:spPr/>
+        <p:txBody>
+          <a:bodyPr/>
+          <a:lstStyle/>
+          <a:p>
+            <a:r>
+              <a:rPr lang="de-DE" dirty="0" err="1"/>
+              <a:t>Conception</a:t>
+            </a:r>
+            <a:endParaRPr lang="de-DE" dirty="0"/>
+          </a:p>
+        </p:txBody>
+      </p:sp>
+      <p:sp>
+        <p:nvSpPr>
+          <p:cNvPr id="5" name="Inhaltsplatzhalter 4">
+            <a:extLst>
+              <a:ext uri="{FF2B5EF4-FFF2-40B4-BE49-F238E27FC236}">
+                <a16:creationId xmlns:a16="http://schemas.microsoft.com/office/drawing/2014/main" id="{B5130A88-94FA-4E8A-84A7-F4B96618C0BB}"/>
+              </a:ext>
+            </a:extLst>
+          </p:cNvPr>
+          <p:cNvSpPr>
+            <a:spLocks noGrp="1"/>
+          </p:cNvSpPr>
+          <p:nvPr>
+            <p:ph idx="1"/>
+          </p:nvPr>
+        </p:nvSpPr>
+        <p:spPr/>
+        <p:txBody>
+          <a:bodyPr/>
+          <a:lstStyle/>
+          <a:p>
+            <a:r>
+              <a:rPr lang="de-DE" dirty="0" err="1"/>
+              <a:t>Compression</a:t>
+            </a:r>
+            <a:endParaRPr lang="de-DE" dirty="0"/>
+          </a:p>
+        </p:txBody>
+      </p:sp>
+    </p:spTree>
+    <p:extLst>
+      <p:ext uri="{BB962C8B-B14F-4D97-AF65-F5344CB8AC3E}">
+        <p14:creationId xmlns:p14="http://schemas.microsoft.com/office/powerpoint/2010/main" val="18879008"/>
+      </p:ext>
+    </p:extLst>
+  </p:cSld>
+  <p:clrMapOvr>
+    <a:masterClrMapping/>
+  </p:clrMapOvr>
+</p:sld>
+</file>
+
+<file path=ppt/slides/slide8.xml><?xml version="1.0" encoding="utf-8"?>
+<p:sld xmlns:a="http://schemas.openxmlformats.org/drawingml/2006/main" xmlns:r="http://schemas.openxmlformats.org/officeDocument/2006/relationships" xmlns:p="http://schemas.openxmlformats.org/presentationml/2006/main">
+  <p:cSld>
+    <p:spTree>
+      <p:nvGrpSpPr>
+        <p:cNvPr id="1" name=""/>
+        <p:cNvGrpSpPr/>
+        <p:nvPr/>
+      </p:nvGrpSpPr>
+      <p:grpSpPr>
+        <a:xfrm>
+          <a:off x="0" y="0"/>
+          <a:ext cx="0" cy="0"/>
+          <a:chOff x="0" y="0"/>
+          <a:chExt cx="0" cy="0"/>
+        </a:xfrm>
+      </p:grpSpPr>
+      <p:sp>
+        <p:nvSpPr>
+          <p:cNvPr id="2" name="Titel 1">
+            <a:extLst>
+              <a:ext uri="{FF2B5EF4-FFF2-40B4-BE49-F238E27FC236}">
+                <a16:creationId xmlns:a16="http://schemas.microsoft.com/office/drawing/2014/main" id="{5CE9B4EF-180C-462D-9742-3A6754B91F32}"/>
+              </a:ext>
+            </a:extLst>
+          </p:cNvPr>
+          <p:cNvSpPr>
+            <a:spLocks noGrp="1"/>
+          </p:cNvSpPr>
+          <p:nvPr>
+            <p:ph type="title"/>
+          </p:nvPr>
+        </p:nvSpPr>
+        <p:spPr/>
+        <p:txBody>
+          <a:bodyPr/>
+          <a:lstStyle/>
+          <a:p>
+            <a:r>
+              <a:rPr lang="de-DE" dirty="0"/>
+              <a:t>Alignment </a:t>
+            </a:r>
+            <a:r>
+              <a:rPr lang="de-DE" dirty="0" err="1"/>
+              <a:t>Algorithm</a:t>
+            </a:r>
+            <a:endParaRPr lang="de-DE" dirty="0"/>
+          </a:p>
+        </p:txBody>
+      </p:sp>
+      <p:graphicFrame>
+        <p:nvGraphicFramePr>
+          <p:cNvPr id="4" name="Inhaltsplatzhalter 3">
+            <a:extLst>
+              <a:ext uri="{FF2B5EF4-FFF2-40B4-BE49-F238E27FC236}">
+                <a16:creationId xmlns:a16="http://schemas.microsoft.com/office/drawing/2014/main" id="{0563E4A5-655F-49BE-8361-5B0425314902}"/>
+              </a:ext>
+            </a:extLst>
+          </p:cNvPr>
+          <p:cNvGraphicFramePr>
+            <a:graphicFrameLocks noGrp="1"/>
+          </p:cNvGraphicFramePr>
+          <p:nvPr>
+            <p:ph idx="1"/>
+            <p:extLst>
+              <p:ext uri="{D42A27DB-BD31-4B8C-83A1-F6EECF244321}">
+                <p14:modId xmlns:p14="http://schemas.microsoft.com/office/powerpoint/2010/main" val="383240081"/>
+              </p:ext>
+            </p:extLst>
+          </p:nvPr>
+        </p:nvGraphicFramePr>
+        <p:xfrm>
+          <a:off x="414338" y="1600200"/>
+          <a:ext cx="2184718" cy="1854200"/>
+        </p:xfrm>
+        <a:graphic>
+          <a:graphicData uri="http://schemas.openxmlformats.org/drawingml/2006/table">
+            <a:tbl>
+              <a:tblPr firstRow="1" bandRow="1">
+                <a:tableStyleId>{5940675A-B579-460E-94D1-54222C63F5DA}</a:tableStyleId>
+              </a:tblPr>
+              <a:tblGrid>
+                <a:gridCol w="373380">
+                  <a:extLst>
+                    <a:ext uri="{9D8B030D-6E8A-4147-A177-3AD203B41FA5}">
+                      <a16:colId xmlns:a16="http://schemas.microsoft.com/office/drawing/2014/main" val="3104117769"/>
+                    </a:ext>
+                  </a:extLst>
+                </a:gridCol>
+                <a:gridCol w="351155">
+                  <a:extLst>
+                    <a:ext uri="{9D8B030D-6E8A-4147-A177-3AD203B41FA5}">
+                      <a16:colId xmlns:a16="http://schemas.microsoft.com/office/drawing/2014/main" val="3961355313"/>
+                    </a:ext>
+                  </a:extLst>
+                </a:gridCol>
+                <a:gridCol w="373380">
+                  <a:extLst>
+                    <a:ext uri="{9D8B030D-6E8A-4147-A177-3AD203B41FA5}">
+                      <a16:colId xmlns:a16="http://schemas.microsoft.com/office/drawing/2014/main" val="667130857"/>
+                    </a:ext>
+                  </a:extLst>
+                </a:gridCol>
+                <a:gridCol w="355918">
+                  <a:extLst>
+                    <a:ext uri="{9D8B030D-6E8A-4147-A177-3AD203B41FA5}">
+                      <a16:colId xmlns:a16="http://schemas.microsoft.com/office/drawing/2014/main" val="3881714311"/>
+                    </a:ext>
+                  </a:extLst>
+                </a:gridCol>
+                <a:gridCol w="363855">
+                  <a:extLst>
+                    <a:ext uri="{9D8B030D-6E8A-4147-A177-3AD203B41FA5}">
+                      <a16:colId xmlns:a16="http://schemas.microsoft.com/office/drawing/2014/main" val="2183170209"/>
+                    </a:ext>
+                  </a:extLst>
+                </a:gridCol>
+                <a:gridCol w="367030">
+                  <a:extLst>
+                    <a:ext uri="{9D8B030D-6E8A-4147-A177-3AD203B41FA5}">
+                      <a16:colId xmlns:a16="http://schemas.microsoft.com/office/drawing/2014/main" val="1952738986"/>
+                    </a:ext>
+                  </a:extLst>
+                </a:gridCol>
+              </a:tblGrid>
+              <a:tr h="370840">
+                <a:tc gridSpan="2">
+                  <a:txBody>
+                    <a:bodyPr/>
+                    <a:lstStyle/>
+                    <a:p>
+                      <a:pPr algn="ctr"/>
+                      <a:endParaRPr lang="de-DE" dirty="0"/>
+                    </a:p>
+                  </a:txBody>
+                  <a:tcPr/>
+                </a:tc>
+                <a:tc hMerge="1">
+                  <a:txBody>
+                    <a:bodyPr/>
+                    <a:lstStyle/>
+                    <a:p>
+                      <a:pPr algn="ctr"/>
+                      <a:endParaRPr lang="de-DE" dirty="0"/>
+                    </a:p>
+                  </a:txBody>
+                  <a:tcPr/>
+                </a:tc>
+                <a:tc>
+                  <a:txBody>
+                    <a:bodyPr/>
+                    <a:lstStyle/>
+                    <a:p>
+                      <a:pPr algn="ctr"/>
+                      <a:r>
+                        <a:rPr lang="de-DE" b="1" dirty="0">
+                          <a:solidFill>
+                            <a:srgbClr val="0E61E6"/>
+                          </a:solidFill>
+                        </a:rPr>
+                        <a:t>A</a:t>
+                      </a:r>
+                    </a:p>
+                  </a:txBody>
+                  <a:tcPr/>
+                </a:tc>
+                <a:tc>
+                  <a:txBody>
+                    <a:bodyPr/>
+                    <a:lstStyle/>
+                    <a:p>
+                      <a:pPr algn="ctr"/>
+                      <a:r>
+                        <a:rPr lang="de-DE" b="1" dirty="0">
+                          <a:solidFill>
+                            <a:srgbClr val="0E61E6"/>
+                          </a:solidFill>
+                        </a:rPr>
+                        <a:t>C</a:t>
+                      </a:r>
+                    </a:p>
+                  </a:txBody>
+                  <a:tcPr/>
+                </a:tc>
+                <a:tc>
+                  <a:txBody>
+                    <a:bodyPr/>
+                    <a:lstStyle/>
+                    <a:p>
+                      <a:pPr algn="ctr"/>
+                      <a:r>
+                        <a:rPr lang="de-DE" b="1" dirty="0">
+                          <a:solidFill>
+                            <a:srgbClr val="0E61E6"/>
+                          </a:solidFill>
+                        </a:rPr>
+                        <a:t>B</a:t>
+                      </a:r>
+                    </a:p>
+                  </a:txBody>
+                  <a:tcPr/>
+                </a:tc>
+                <a:tc>
+                  <a:txBody>
+                    <a:bodyPr/>
+                    <a:lstStyle/>
+                    <a:p>
+                      <a:pPr algn="ctr"/>
+                      <a:r>
+                        <a:rPr lang="de-DE" b="1" dirty="0">
+                          <a:solidFill>
+                            <a:srgbClr val="0E61E6"/>
+                          </a:solidFill>
+                        </a:rPr>
+                        <a:t>A</a:t>
+                      </a:r>
+                    </a:p>
+                  </a:txBody>
+                  <a:tcPr/>
+                </a:tc>
+                <a:extLst>
+                  <a:ext uri="{0D108BD9-81ED-4DB2-BD59-A6C34878D82A}">
+                    <a16:rowId xmlns:a16="http://schemas.microsoft.com/office/drawing/2014/main" val="2461775132"/>
+                  </a:ext>
+                </a:extLst>
+              </a:tr>
+              <a:tr h="370840">
+                <a:tc>
+                  <a:txBody>
+                    <a:bodyPr/>
+                    <a:lstStyle/>
+                    <a:p>
+                      <a:pPr algn="ctr"/>
+                      <a:endParaRPr lang="de-DE" dirty="0"/>
+                    </a:p>
+                  </a:txBody>
+                  <a:tcPr/>
+                </a:tc>
+                <a:tc>
+                  <a:txBody>
+                    <a:bodyPr/>
+                    <a:lstStyle/>
+                    <a:p>
+                      <a:pPr algn="ctr"/>
+                      <a:r>
+                        <a:rPr lang="de-DE" dirty="0"/>
+                        <a:t>0</a:t>
+                      </a:r>
+                    </a:p>
+                  </a:txBody>
+                  <a:tcPr/>
+                </a:tc>
+                <a:tc>
+                  <a:txBody>
+                    <a:bodyPr/>
+                    <a:lstStyle/>
+                    <a:p>
+                      <a:pPr algn="ctr"/>
+                      <a:r>
+                        <a:rPr lang="de-DE" dirty="0"/>
+                        <a:t>0</a:t>
+                      </a:r>
+                    </a:p>
+                  </a:txBody>
+                  <a:tcPr/>
+                </a:tc>
+                <a:tc>
+                  <a:txBody>
+                    <a:bodyPr/>
+                    <a:lstStyle/>
+                    <a:p>
+                      <a:pPr algn="ctr"/>
+                      <a:r>
+                        <a:rPr lang="de-DE" dirty="0"/>
+                        <a:t>0</a:t>
+                      </a:r>
+                    </a:p>
+                  </a:txBody>
+                  <a:tcPr/>
+                </a:tc>
+                <a:tc>
+                  <a:txBody>
+                    <a:bodyPr/>
+                    <a:lstStyle/>
+                    <a:p>
+                      <a:pPr algn="ctr"/>
+                      <a:r>
+                        <a:rPr lang="de-DE" dirty="0"/>
+                        <a:t>0</a:t>
+                      </a:r>
+                    </a:p>
+                  </a:txBody>
+                  <a:tcPr/>
+                </a:tc>
+                <a:tc>
+                  <a:txBody>
+                    <a:bodyPr/>
+                    <a:lstStyle/>
+                    <a:p>
+                      <a:pPr algn="ctr"/>
+                      <a:r>
+                        <a:rPr lang="de-DE" dirty="0"/>
+                        <a:t>0</a:t>
+                      </a:r>
+                    </a:p>
+                  </a:txBody>
+                  <a:tcPr/>
+                </a:tc>
+                <a:extLst>
+                  <a:ext uri="{0D108BD9-81ED-4DB2-BD59-A6C34878D82A}">
+                    <a16:rowId xmlns:a16="http://schemas.microsoft.com/office/drawing/2014/main" val="2453072254"/>
+                  </a:ext>
+                </a:extLst>
+              </a:tr>
+              <a:tr h="370840">
+                <a:tc>
+                  <a:txBody>
+                    <a:bodyPr/>
+                    <a:lstStyle/>
+                    <a:p>
+                      <a:pPr algn="ctr"/>
+                      <a:r>
+                        <a:rPr lang="de-DE" b="1" dirty="0">
+                          <a:solidFill>
+                            <a:srgbClr val="0E61E6"/>
+                          </a:solidFill>
+                        </a:rPr>
+                        <a:t>A</a:t>
+                      </a:r>
+                    </a:p>
+                  </a:txBody>
+                  <a:tcPr/>
+                </a:tc>
+                <a:tc>
+                  <a:txBody>
+                    <a:bodyPr/>
+                    <a:lstStyle/>
+                    <a:p>
+                      <a:pPr algn="ctr"/>
+                      <a:r>
+                        <a:rPr lang="de-DE" dirty="0"/>
+                        <a:t>0</a:t>
+                      </a:r>
+                    </a:p>
+                  </a:txBody>
+                  <a:tcPr/>
+                </a:tc>
+                <a:tc>
+                  <a:txBody>
+                    <a:bodyPr/>
+                    <a:lstStyle/>
+                    <a:p>
+                      <a:pPr algn="ctr"/>
+                      <a:r>
+                        <a:rPr lang="de-DE" dirty="0"/>
+                        <a:t>2</a:t>
+                      </a:r>
+                    </a:p>
+                  </a:txBody>
+                  <a:tcPr/>
+                </a:tc>
+                <a:tc>
+                  <a:txBody>
+                    <a:bodyPr/>
+                    <a:lstStyle/>
+                    <a:p>
+                      <a:pPr algn="ctr"/>
+                      <a:r>
+                        <a:rPr lang="de-DE" dirty="0"/>
+                        <a:t>0</a:t>
+                      </a:r>
+                    </a:p>
+                  </a:txBody>
+                  <a:tcPr/>
+                </a:tc>
+                <a:tc>
+                  <a:txBody>
+                    <a:bodyPr/>
+                    <a:lstStyle/>
+                    <a:p>
+                      <a:pPr algn="ctr"/>
+                      <a:r>
+                        <a:rPr lang="de-DE" dirty="0"/>
+                        <a:t>0</a:t>
+                      </a:r>
+                    </a:p>
+                  </a:txBody>
+                  <a:tcPr/>
+                </a:tc>
+                <a:tc>
+                  <a:txBody>
+                    <a:bodyPr/>
+                    <a:lstStyle/>
+                    <a:p>
+                      <a:pPr algn="ctr"/>
+                      <a:r>
+                        <a:rPr lang="de-DE" dirty="0"/>
+                        <a:t>2</a:t>
+                      </a:r>
+                    </a:p>
+                  </a:txBody>
+                  <a:tcPr/>
+                </a:tc>
+                <a:extLst>
+                  <a:ext uri="{0D108BD9-81ED-4DB2-BD59-A6C34878D82A}">
+                    <a16:rowId xmlns:a16="http://schemas.microsoft.com/office/drawing/2014/main" val="4277523177"/>
+                  </a:ext>
+                </a:extLst>
+              </a:tr>
+              <a:tr h="370840">
+                <a:tc>
+                  <a:txBody>
+                    <a:bodyPr/>
+                    <a:lstStyle/>
+                    <a:p>
+                      <a:pPr algn="ctr"/>
+                      <a:r>
+                        <a:rPr lang="de-DE" b="1" dirty="0">
+                          <a:solidFill>
+                            <a:srgbClr val="0E61E6"/>
+                          </a:solidFill>
+                        </a:rPr>
+                        <a:t>C</a:t>
+                      </a:r>
+                    </a:p>
+                  </a:txBody>
+                  <a:tcPr/>
+                </a:tc>
+                <a:tc>
+                  <a:txBody>
+                    <a:bodyPr/>
+                    <a:lstStyle/>
+                    <a:p>
+                      <a:pPr algn="ctr"/>
+                      <a:r>
+                        <a:rPr lang="de-DE" dirty="0"/>
+                        <a:t>0</a:t>
+                      </a:r>
+                    </a:p>
+                  </a:txBody>
+                  <a:tcPr/>
+                </a:tc>
+                <a:tc>
+                  <a:txBody>
+                    <a:bodyPr/>
+                    <a:lstStyle/>
+                    <a:p>
+                      <a:pPr algn="ctr"/>
+                      <a:r>
+                        <a:rPr lang="de-DE" dirty="0"/>
+                        <a:t>1</a:t>
+                      </a:r>
+                    </a:p>
+                  </a:txBody>
+                  <a:tcPr/>
+                </a:tc>
+                <a:tc>
+                  <a:txBody>
+                    <a:bodyPr/>
+                    <a:lstStyle/>
+                    <a:p>
+                      <a:pPr algn="ctr"/>
+                      <a:r>
+                        <a:rPr lang="de-DE" dirty="0"/>
+                        <a:t>3</a:t>
+                      </a:r>
+                    </a:p>
+                  </a:txBody>
+                  <a:tcPr/>
+                </a:tc>
+                <a:tc>
+                  <a:txBody>
+                    <a:bodyPr/>
+                    <a:lstStyle/>
+                    <a:p>
+                      <a:pPr algn="ctr"/>
+                      <a:r>
+                        <a:rPr lang="de-DE" dirty="0"/>
+                        <a:t>2</a:t>
+                      </a:r>
+                    </a:p>
+                  </a:txBody>
+                  <a:tcPr/>
+                </a:tc>
+                <a:tc>
+                  <a:txBody>
+                    <a:bodyPr/>
+                    <a:lstStyle/>
+                    <a:p>
+                      <a:pPr algn="ctr"/>
+                      <a:r>
+                        <a:rPr lang="de-DE" dirty="0"/>
+                        <a:t>3</a:t>
+                      </a:r>
+                    </a:p>
+                  </a:txBody>
+                  <a:tcPr/>
+                </a:tc>
+                <a:extLst>
+                  <a:ext uri="{0D108BD9-81ED-4DB2-BD59-A6C34878D82A}">
+                    <a16:rowId xmlns:a16="http://schemas.microsoft.com/office/drawing/2014/main" val="189244018"/>
+                  </a:ext>
+                </a:extLst>
+              </a:tr>
+              <a:tr h="370840">
+                <a:tc>
+                  <a:txBody>
+                    <a:bodyPr/>
+                    <a:lstStyle/>
+                    <a:p>
+                      <a:pPr algn="ctr"/>
+                      <a:r>
+                        <a:rPr lang="de-DE" b="1" dirty="0">
+                          <a:solidFill>
+                            <a:srgbClr val="0E61E6"/>
+                          </a:solidFill>
+                        </a:rPr>
+                        <a:t>A</a:t>
+                      </a:r>
+                    </a:p>
+                  </a:txBody>
+                  <a:tcPr/>
+                </a:tc>
+                <a:tc>
+                  <a:txBody>
+                    <a:bodyPr/>
+                    <a:lstStyle/>
+                    <a:p>
+                      <a:pPr algn="ctr"/>
+                      <a:r>
+                        <a:rPr lang="de-DE" dirty="0"/>
+                        <a:t>0</a:t>
+                      </a:r>
+                    </a:p>
+                  </a:txBody>
+                  <a:tcPr/>
+                </a:tc>
+                <a:tc>
+                  <a:txBody>
+                    <a:bodyPr/>
+                    <a:lstStyle/>
+                    <a:p>
+                      <a:pPr algn="ctr"/>
+                      <a:r>
+                        <a:rPr lang="de-DE" dirty="0"/>
+                        <a:t>3</a:t>
+                      </a:r>
+                    </a:p>
+                  </a:txBody>
+                  <a:tcPr/>
+                </a:tc>
+                <a:tc>
+                  <a:txBody>
+                    <a:bodyPr/>
+                    <a:lstStyle/>
+                    <a:p>
+                      <a:pPr algn="ctr"/>
+                      <a:r>
+                        <a:rPr lang="de-DE" dirty="0"/>
+                        <a:t>5</a:t>
+                      </a:r>
+                    </a:p>
+                  </a:txBody>
+                  <a:tcPr/>
+                </a:tc>
+                <a:tc>
+                  <a:txBody>
+                    <a:bodyPr/>
+                    <a:lstStyle/>
+                    <a:p>
+                      <a:pPr algn="ctr"/>
+                      <a:r>
+                        <a:rPr lang="de-DE" dirty="0"/>
+                        <a:t>6</a:t>
+                      </a:r>
+                    </a:p>
+                  </a:txBody>
+                  <a:tcPr/>
+                </a:tc>
+                <a:tc>
+                  <a:txBody>
+                    <a:bodyPr/>
+                    <a:lstStyle/>
+                    <a:p>
+                      <a:pPr algn="ctr"/>
+                      <a:r>
+                        <a:rPr lang="de-DE" sz="1400" dirty="0"/>
+                        <a:t>10</a:t>
+                      </a:r>
+                      <a:endParaRPr lang="de-DE" dirty="0"/>
+                    </a:p>
+                  </a:txBody>
+                  <a:tcPr/>
+                </a:tc>
+                <a:extLst>
+                  <a:ext uri="{0D108BD9-81ED-4DB2-BD59-A6C34878D82A}">
+                    <a16:rowId xmlns:a16="http://schemas.microsoft.com/office/drawing/2014/main" val="3073936107"/>
+                  </a:ext>
+                </a:extLst>
+              </a:tr>
+            </a:tbl>
+          </a:graphicData>
+        </a:graphic>
+      </p:graphicFrame>
+      <p:sp>
+        <p:nvSpPr>
+          <p:cNvPr id="5" name="Textfeld 4">
+            <a:extLst>
+              <a:ext uri="{FF2B5EF4-FFF2-40B4-BE49-F238E27FC236}">
+                <a16:creationId xmlns:a16="http://schemas.microsoft.com/office/drawing/2014/main" id="{3B95A52B-E81B-4812-AE2D-92E7A9F38E74}"/>
+              </a:ext>
+            </a:extLst>
+          </p:cNvPr>
+          <p:cNvSpPr txBox="1"/>
+          <p:nvPr/>
+        </p:nvSpPr>
+        <p:spPr>
+          <a:xfrm>
+            <a:off x="414338" y="4149080"/>
+            <a:ext cx="1640193" cy="1477328"/>
+          </a:xfrm>
+          <a:prstGeom prst="rect">
+            <a:avLst/>
+          </a:prstGeom>
+          <a:noFill/>
+        </p:spPr>
+        <p:txBody>
+          <a:bodyPr wrap="none" rtlCol="0">
+            <a:spAutoFit/>
+          </a:bodyPr>
+          <a:lstStyle/>
+          <a:p>
+            <a:r>
+              <a:rPr lang="de-DE" dirty="0" err="1"/>
+              <a:t>Reccurences</a:t>
+            </a:r>
+            <a:r>
+              <a:rPr lang="de-DE" dirty="0"/>
+              <a:t>:</a:t>
+            </a:r>
+          </a:p>
+          <a:p>
+            <a:r>
+              <a:rPr lang="de-DE" dirty="0"/>
+              <a:t>Match = 2</a:t>
+            </a:r>
+          </a:p>
+          <a:p>
+            <a:r>
+              <a:rPr lang="de-DE" dirty="0" err="1"/>
+              <a:t>Mismatch</a:t>
+            </a:r>
+            <a:r>
+              <a:rPr lang="de-DE" dirty="0"/>
+              <a:t> = -1</a:t>
+            </a:r>
+          </a:p>
+          <a:p>
+            <a:r>
+              <a:rPr lang="de-DE" dirty="0"/>
+              <a:t>Gap = -1</a:t>
+            </a:r>
+          </a:p>
+          <a:p>
+            <a:endParaRPr lang="de-DE" dirty="0"/>
+          </a:p>
+        </p:txBody>
+      </p:sp>
+    </p:spTree>
+    <p:extLst>
+      <p:ext uri="{BB962C8B-B14F-4D97-AF65-F5344CB8AC3E}">
+        <p14:creationId xmlns:p14="http://schemas.microsoft.com/office/powerpoint/2010/main" val="2467360424"/>
+      </p:ext>
+    </p:extLst>
+  </p:cSld>
+  <p:clrMapOvr>
+    <a:masterClrMapping/>
+  </p:clrMapOvr>
+</p:sld>
+</file>
+
+<file path=ppt/slides/slide9.xml><?xml version="1.0" encoding="utf-8"?>
+<p:sld xmlns:a="http://schemas.openxmlformats.org/drawingml/2006/main" xmlns:r="http://schemas.openxmlformats.org/officeDocument/2006/relationships" xmlns:p="http://schemas.openxmlformats.org/presentationml/2006/main">
+  <p:cSld>
+    <p:spTree>
+      <p:nvGrpSpPr>
+        <p:cNvPr id="1" name=""/>
+        <p:cNvGrpSpPr/>
+        <p:nvPr/>
+      </p:nvGrpSpPr>
+      <p:grpSpPr>
+        <a:xfrm>
+          <a:off x="0" y="0"/>
+          <a:ext cx="0" cy="0"/>
+          <a:chOff x="0" y="0"/>
+          <a:chExt cx="0" cy="0"/>
+        </a:xfrm>
+      </p:grpSpPr>
+      <p:sp>
+        <p:nvSpPr>
+          <p:cNvPr id="2" name="Titel 1">
+            <a:extLst>
+              <a:ext uri="{FF2B5EF4-FFF2-40B4-BE49-F238E27FC236}">
+                <a16:creationId xmlns:a16="http://schemas.microsoft.com/office/drawing/2014/main" id="{5CE9B4EF-180C-462D-9742-3A6754B91F32}"/>
+              </a:ext>
+            </a:extLst>
+          </p:cNvPr>
+          <p:cNvSpPr>
+            <a:spLocks noGrp="1"/>
+          </p:cNvSpPr>
+          <p:nvPr>
+            <p:ph type="title"/>
+          </p:nvPr>
+        </p:nvSpPr>
+        <p:spPr/>
+        <p:txBody>
+          <a:bodyPr/>
+          <a:lstStyle/>
+          <a:p>
+            <a:r>
+              <a:rPr lang="de-DE" dirty="0"/>
+              <a:t>Implementation</a:t>
+            </a:r>
+          </a:p>
+        </p:txBody>
+      </p:sp>
+      <p:sp>
+        <p:nvSpPr>
+          <p:cNvPr id="3" name="Inhaltsplatzhalter 2">
+            <a:extLst>
+              <a:ext uri="{FF2B5EF4-FFF2-40B4-BE49-F238E27FC236}">
+                <a16:creationId xmlns:a16="http://schemas.microsoft.com/office/drawing/2014/main" id="{2A22295E-A53E-4275-BBD8-9D394F219878}"/>
+              </a:ext>
+            </a:extLst>
+          </p:cNvPr>
+          <p:cNvSpPr>
+            <a:spLocks noGrp="1"/>
+          </p:cNvSpPr>
+          <p:nvPr>
+            <p:ph idx="1"/>
+          </p:nvPr>
+        </p:nvSpPr>
+        <p:spPr/>
+        <p:txBody>
+          <a:bodyPr/>
+          <a:lstStyle/>
+          <a:p>
+            <a:endParaRPr lang="de-DE" dirty="0"/>
+          </a:p>
+        </p:txBody>
+      </p:sp>
+    </p:spTree>
+    <p:extLst>
+      <p:ext uri="{BB962C8B-B14F-4D97-AF65-F5344CB8AC3E}">
+        <p14:creationId xmlns:p14="http://schemas.microsoft.com/office/powerpoint/2010/main" val="867745506"/>
       </p:ext>
     </p:extLst>
   </p:cSld>

</xml_diff>

<commit_message>
added more to presentation and added sw baba image for paper (not in text)
</commit_message>
<xml_diff>
--- a/Presentation/CT2_2017_Alignment.pptx
+++ b/Presentation/CT2_2017_Alignment.pptx
@@ -5,7 +5,7 @@
     <p:sldMasterId id="2147483648" r:id="rId1"/>
   </p:sldMasterIdLst>
   <p:notesMasterIdLst>
-    <p:notesMasterId r:id="rId15"/>
+    <p:notesMasterId r:id="rId20"/>
   </p:notesMasterIdLst>
   <p:sldIdLst>
     <p:sldId id="256" r:id="rId2"/>
@@ -15,12 +15,17 @@
     <p:sldId id="259" r:id="rId6"/>
     <p:sldId id="267" r:id="rId7"/>
     <p:sldId id="268" r:id="rId8"/>
-    <p:sldId id="265" r:id="rId9"/>
-    <p:sldId id="260" r:id="rId10"/>
-    <p:sldId id="261" r:id="rId11"/>
-    <p:sldId id="262" r:id="rId12"/>
-    <p:sldId id="264" r:id="rId13"/>
-    <p:sldId id="263" r:id="rId14"/>
+    <p:sldId id="275" r:id="rId9"/>
+    <p:sldId id="265" r:id="rId10"/>
+    <p:sldId id="272" r:id="rId11"/>
+    <p:sldId id="273" r:id="rId12"/>
+    <p:sldId id="270" r:id="rId13"/>
+    <p:sldId id="261" r:id="rId14"/>
+    <p:sldId id="269" r:id="rId15"/>
+    <p:sldId id="262" r:id="rId16"/>
+    <p:sldId id="264" r:id="rId17"/>
+    <p:sldId id="263" r:id="rId18"/>
+    <p:sldId id="274" r:id="rId19"/>
   </p:sldIdLst>
   <p:sldSz cx="9144000" cy="6858000" type="screen4x3"/>
   <p:notesSz cx="6858000" cy="9144000"/>
@@ -250,7 +255,7 @@
           <a:p>
             <a:fld id="{115392A8-E3E8-434C-92C0-520E1DF9277B}" type="datetimeFigureOut">
               <a:rPr lang="de-DE" smtClean="0"/>
-              <a:t>01.03.2018</a:t>
+              <a:t>15.03.2018</a:t>
             </a:fld>
             <a:endParaRPr lang="de-DE"/>
           </a:p>
@@ -676,6 +681,268 @@
     <p:extLst>
       <p:ext uri="{BB962C8B-B14F-4D97-AF65-F5344CB8AC3E}">
         <p14:creationId xmlns:p14="http://schemas.microsoft.com/office/powerpoint/2010/main" val="1154059475"/>
+      </p:ext>
+    </p:extLst>
+  </p:cSld>
+  <p:clrMapOvr>
+    <a:masterClrMapping/>
+  </p:clrMapOvr>
+</p:notes>
+</file>
+
+<file path=ppt/notesSlides/notesSlide3.xml><?xml version="1.0" encoding="utf-8"?>
+<p:notes xmlns:a="http://schemas.openxmlformats.org/drawingml/2006/main" xmlns:r="http://schemas.openxmlformats.org/officeDocument/2006/relationships" xmlns:p="http://schemas.openxmlformats.org/presentationml/2006/main">
+  <p:cSld>
+    <p:spTree>
+      <p:nvGrpSpPr>
+        <p:cNvPr id="1" name=""/>
+        <p:cNvGrpSpPr/>
+        <p:nvPr/>
+      </p:nvGrpSpPr>
+      <p:grpSpPr>
+        <a:xfrm>
+          <a:off x="0" y="0"/>
+          <a:ext cx="0" cy="0"/>
+          <a:chOff x="0" y="0"/>
+          <a:chExt cx="0" cy="0"/>
+        </a:xfrm>
+      </p:grpSpPr>
+      <p:sp>
+        <p:nvSpPr>
+          <p:cNvPr id="2" name="Folienbildplatzhalter 1"/>
+          <p:cNvSpPr>
+            <a:spLocks noGrp="1" noRot="1" noChangeAspect="1"/>
+          </p:cNvSpPr>
+          <p:nvPr>
+            <p:ph type="sldImg"/>
+          </p:nvPr>
+        </p:nvSpPr>
+        <p:spPr/>
+      </p:sp>
+      <p:sp>
+        <p:nvSpPr>
+          <p:cNvPr id="3" name="Notizenplatzhalter 2"/>
+          <p:cNvSpPr>
+            <a:spLocks noGrp="1"/>
+          </p:cNvSpPr>
+          <p:nvPr>
+            <p:ph type="body" idx="1"/>
+          </p:nvPr>
+        </p:nvSpPr>
+        <p:spPr/>
+        <p:txBody>
+          <a:bodyPr/>
+          <a:lstStyle/>
+          <a:p>
+            <a:endParaRPr lang="de-DE" dirty="0"/>
+          </a:p>
+        </p:txBody>
+      </p:sp>
+      <p:sp>
+        <p:nvSpPr>
+          <p:cNvPr id="4" name="Foliennummernplatzhalter 3"/>
+          <p:cNvSpPr>
+            <a:spLocks noGrp="1"/>
+          </p:cNvSpPr>
+          <p:nvPr>
+            <p:ph type="sldNum" sz="quarter" idx="10"/>
+          </p:nvPr>
+        </p:nvSpPr>
+        <p:spPr/>
+        <p:txBody>
+          <a:bodyPr/>
+          <a:lstStyle/>
+          <a:p>
+            <a:fld id="{AA07C420-CE83-453F-83A5-25E4D2906979}" type="slidenum">
+              <a:rPr lang="de-DE" smtClean="0"/>
+              <a:t>9</a:t>
+            </a:fld>
+            <a:endParaRPr lang="de-DE"/>
+          </a:p>
+        </p:txBody>
+      </p:sp>
+    </p:spTree>
+    <p:extLst>
+      <p:ext uri="{BB962C8B-B14F-4D97-AF65-F5344CB8AC3E}">
+        <p14:creationId xmlns:p14="http://schemas.microsoft.com/office/powerpoint/2010/main" val="3107268075"/>
+      </p:ext>
+    </p:extLst>
+  </p:cSld>
+  <p:clrMapOvr>
+    <a:masterClrMapping/>
+  </p:clrMapOvr>
+</p:notes>
+</file>
+
+<file path=ppt/notesSlides/notesSlide4.xml><?xml version="1.0" encoding="utf-8"?>
+<p:notes xmlns:a="http://schemas.openxmlformats.org/drawingml/2006/main" xmlns:r="http://schemas.openxmlformats.org/officeDocument/2006/relationships" xmlns:p="http://schemas.openxmlformats.org/presentationml/2006/main">
+  <p:cSld>
+    <p:spTree>
+      <p:nvGrpSpPr>
+        <p:cNvPr id="1" name=""/>
+        <p:cNvGrpSpPr/>
+        <p:nvPr/>
+      </p:nvGrpSpPr>
+      <p:grpSpPr>
+        <a:xfrm>
+          <a:off x="0" y="0"/>
+          <a:ext cx="0" cy="0"/>
+          <a:chOff x="0" y="0"/>
+          <a:chExt cx="0" cy="0"/>
+        </a:xfrm>
+      </p:grpSpPr>
+      <p:sp>
+        <p:nvSpPr>
+          <p:cNvPr id="2" name="Folienbildplatzhalter 1"/>
+          <p:cNvSpPr>
+            <a:spLocks noGrp="1" noRot="1" noChangeAspect="1"/>
+          </p:cNvSpPr>
+          <p:nvPr>
+            <p:ph type="sldImg"/>
+          </p:nvPr>
+        </p:nvSpPr>
+        <p:spPr/>
+      </p:sp>
+      <p:sp>
+        <p:nvSpPr>
+          <p:cNvPr id="3" name="Notizenplatzhalter 2"/>
+          <p:cNvSpPr>
+            <a:spLocks noGrp="1"/>
+          </p:cNvSpPr>
+          <p:nvPr>
+            <p:ph type="body" idx="1"/>
+          </p:nvPr>
+        </p:nvSpPr>
+        <p:spPr/>
+        <p:txBody>
+          <a:bodyPr/>
+          <a:lstStyle/>
+          <a:p>
+            <a:r>
+              <a:rPr lang="de-DE" dirty="0"/>
+              <a:t>- </a:t>
+            </a:r>
+            <a:r>
+              <a:rPr lang="de-DE" dirty="0" err="1"/>
+              <a:t>Accuracy</a:t>
+            </a:r>
+            <a:r>
+              <a:rPr lang="de-DE" dirty="0"/>
+              <a:t> </a:t>
+            </a:r>
+            <a:r>
+              <a:rPr lang="de-DE" dirty="0" err="1"/>
+              <a:t>of</a:t>
+            </a:r>
+            <a:r>
+              <a:rPr lang="de-DE" dirty="0"/>
+              <a:t> </a:t>
+            </a:r>
+            <a:r>
+              <a:rPr lang="de-DE" dirty="0" err="1"/>
+              <a:t>the</a:t>
+            </a:r>
+            <a:r>
+              <a:rPr lang="de-DE" dirty="0"/>
+              <a:t> original </a:t>
+            </a:r>
+            <a:r>
+              <a:rPr lang="de-DE" dirty="0" err="1"/>
+              <a:t>sequence</a:t>
+            </a:r>
+            <a:r>
+              <a:rPr lang="de-DE" dirty="0"/>
+              <a:t> </a:t>
+            </a:r>
+            <a:r>
+              <a:rPr lang="de-DE" dirty="0" err="1"/>
+              <a:t>is</a:t>
+            </a:r>
+            <a:r>
+              <a:rPr lang="de-DE" dirty="0"/>
+              <a:t> </a:t>
+            </a:r>
+            <a:r>
+              <a:rPr lang="de-DE" dirty="0" err="1"/>
+              <a:t>better</a:t>
+            </a:r>
+            <a:endParaRPr lang="de-DE" dirty="0"/>
+          </a:p>
+          <a:p>
+            <a:r>
+              <a:rPr lang="de-DE" dirty="0"/>
+              <a:t>- </a:t>
+            </a:r>
+            <a:r>
+              <a:rPr lang="de-DE" dirty="0" err="1"/>
+              <a:t>Less</a:t>
+            </a:r>
+            <a:r>
+              <a:rPr lang="de-DE" dirty="0"/>
+              <a:t> </a:t>
+            </a:r>
+            <a:r>
+              <a:rPr lang="de-DE" dirty="0" err="1"/>
+              <a:t>redundancy</a:t>
+            </a:r>
+            <a:r>
+              <a:rPr lang="de-DE" dirty="0"/>
+              <a:t> </a:t>
+            </a:r>
+            <a:r>
+              <a:rPr lang="de-DE" dirty="0" err="1"/>
+              <a:t>for</a:t>
+            </a:r>
+            <a:r>
+              <a:rPr lang="de-DE" dirty="0"/>
+              <a:t> </a:t>
+            </a:r>
+            <a:r>
+              <a:rPr lang="de-DE" dirty="0" err="1"/>
+              <a:t>compressed</a:t>
+            </a:r>
+            <a:r>
+              <a:rPr lang="de-DE" dirty="0"/>
+              <a:t> </a:t>
+            </a:r>
+            <a:r>
+              <a:rPr lang="de-DE" dirty="0" err="1"/>
+              <a:t>sequences</a:t>
+            </a:r>
+            <a:endParaRPr lang="de-DE" dirty="0"/>
+          </a:p>
+          <a:p>
+            <a:endParaRPr lang="de-DE" dirty="0"/>
+          </a:p>
+        </p:txBody>
+      </p:sp>
+      <p:sp>
+        <p:nvSpPr>
+          <p:cNvPr id="4" name="Foliennummernplatzhalter 3"/>
+          <p:cNvSpPr>
+            <a:spLocks noGrp="1"/>
+          </p:cNvSpPr>
+          <p:nvPr>
+            <p:ph type="sldNum" sz="quarter" idx="10"/>
+          </p:nvPr>
+        </p:nvSpPr>
+        <p:spPr/>
+        <p:txBody>
+          <a:bodyPr/>
+          <a:lstStyle/>
+          <a:p>
+            <a:fld id="{AA07C420-CE83-453F-83A5-25E4D2906979}" type="slidenum">
+              <a:rPr lang="de-DE" smtClean="0"/>
+              <a:t>14</a:t>
+            </a:fld>
+            <a:endParaRPr lang="de-DE"/>
+          </a:p>
+        </p:txBody>
+      </p:sp>
+    </p:spTree>
+    <p:extLst>
+      <p:ext uri="{BB962C8B-B14F-4D97-AF65-F5344CB8AC3E}">
+        <p14:creationId xmlns:p14="http://schemas.microsoft.com/office/powerpoint/2010/main" val="2390446554"/>
       </p:ext>
     </p:extLst>
   </p:cSld>
@@ -5722,10 +5989,10 @@
       </p:grpSpPr>
       <p:sp>
         <p:nvSpPr>
-          <p:cNvPr id="2" name="Titel 1">
+          <p:cNvPr id="5" name="Titel 4">
             <a:extLst>
               <a:ext uri="{FF2B5EF4-FFF2-40B4-BE49-F238E27FC236}">
-                <a16:creationId xmlns:a16="http://schemas.microsoft.com/office/drawing/2014/main" id="{5CE9B4EF-180C-462D-9742-3A6754B91F32}"/>
+                <a16:creationId xmlns:a16="http://schemas.microsoft.com/office/drawing/2014/main" id="{C9975517-F575-4DD0-9FBE-A866FC89CBC5}"/>
               </a:ext>
             </a:extLst>
           </p:cNvPr>
@@ -5743,17 +6010,17 @@
           <a:p>
             <a:r>
               <a:rPr lang="de-DE" dirty="0"/>
-              <a:t>Evaluation</a:t>
+              <a:t>Implementation – Technical Facts</a:t>
             </a:r>
           </a:p>
         </p:txBody>
       </p:sp>
       <p:sp>
         <p:nvSpPr>
-          <p:cNvPr id="3" name="Inhaltsplatzhalter 2">
+          <p:cNvPr id="6" name="Inhaltsplatzhalter 5">
             <a:extLst>
               <a:ext uri="{FF2B5EF4-FFF2-40B4-BE49-F238E27FC236}">
-                <a16:creationId xmlns:a16="http://schemas.microsoft.com/office/drawing/2014/main" id="{2A22295E-A53E-4275-BBD8-9D394F219878}"/>
+                <a16:creationId xmlns:a16="http://schemas.microsoft.com/office/drawing/2014/main" id="{2508B047-0659-4D32-AF7A-CDD71C6796E4}"/>
               </a:ext>
             </a:extLst>
           </p:cNvPr>
@@ -5769,14 +6036,94 @@
           <a:bodyPr/>
           <a:lstStyle/>
           <a:p>
+            <a:r>
+              <a:rPr lang="de-DE" dirty="0" err="1"/>
+              <a:t>JavaSE</a:t>
+            </a:r>
+            <a:r>
+              <a:rPr lang="de-DE" dirty="0"/>
+              <a:t> 1.8</a:t>
+            </a:r>
+          </a:p>
+          <a:p>
+            <a:r>
+              <a:rPr lang="de-DE" dirty="0" err="1"/>
+              <a:t>JUnit</a:t>
+            </a:r>
+            <a:r>
+              <a:rPr lang="de-DE" dirty="0"/>
+              <a:t> 5.0 </a:t>
+            </a:r>
+            <a:r>
+              <a:rPr lang="de-DE" dirty="0" err="1"/>
+              <a:t>for</a:t>
+            </a:r>
+            <a:r>
+              <a:rPr lang="de-DE" dirty="0"/>
+              <a:t> different </a:t>
+            </a:r>
+            <a:r>
+              <a:rPr lang="de-DE" dirty="0" err="1"/>
+              <a:t>parameter</a:t>
+            </a:r>
+            <a:r>
+              <a:rPr lang="de-DE" dirty="0"/>
+              <a:t> </a:t>
+            </a:r>
+            <a:r>
+              <a:rPr lang="de-DE" dirty="0" err="1"/>
+              <a:t>input</a:t>
+            </a:r>
             <a:endParaRPr lang="de-DE" dirty="0"/>
           </a:p>
+          <a:p>
+            <a:endParaRPr lang="de-DE" dirty="0"/>
+          </a:p>
+          <a:p>
+            <a:endParaRPr lang="de-DE" dirty="0"/>
+          </a:p>
         </p:txBody>
       </p:sp>
+      <p:pic>
+        <p:nvPicPr>
+          <p:cNvPr id="11" name="Grafik 10">
+            <a:extLst>
+              <a:ext uri="{FF2B5EF4-FFF2-40B4-BE49-F238E27FC236}">
+                <a16:creationId xmlns:a16="http://schemas.microsoft.com/office/drawing/2014/main" id="{DCC62AA7-79C6-4941-9C6F-ED989A9D41FE}"/>
+              </a:ext>
+            </a:extLst>
+          </p:cNvPr>
+          <p:cNvPicPr>
+            <a:picLocks noChangeAspect="1"/>
+          </p:cNvPicPr>
+          <p:nvPr/>
+        </p:nvPicPr>
+        <p:blipFill>
+          <a:blip r:embed="rId2">
+            <a:extLst>
+              <a:ext uri="{28A0092B-C50C-407E-A947-70E740481C1C}">
+                <a14:useLocalDpi xmlns:a14="http://schemas.microsoft.com/office/drawing/2010/main" val="0"/>
+              </a:ext>
+            </a:extLst>
+          </a:blip>
+          <a:stretch>
+            <a:fillRect/>
+          </a:stretch>
+        </p:blipFill>
+        <p:spPr>
+          <a:xfrm>
+            <a:off x="251520" y="3863181"/>
+            <a:ext cx="8640960" cy="1574464"/>
+          </a:xfrm>
+          <a:prstGeom prst="rect">
+            <a:avLst/>
+          </a:prstGeom>
+        </p:spPr>
+      </p:pic>
     </p:spTree>
     <p:extLst>
       <p:ext uri="{BB962C8B-B14F-4D97-AF65-F5344CB8AC3E}">
-        <p14:creationId xmlns:p14="http://schemas.microsoft.com/office/powerpoint/2010/main" val="2461775499"/>
+        <p14:creationId xmlns:p14="http://schemas.microsoft.com/office/powerpoint/2010/main" val="679363604"/>
       </p:ext>
     </p:extLst>
   </p:cSld>
@@ -5808,7 +6155,7 @@
           <p:cNvPr id="2" name="Titel 1">
             <a:extLst>
               <a:ext uri="{FF2B5EF4-FFF2-40B4-BE49-F238E27FC236}">
-                <a16:creationId xmlns:a16="http://schemas.microsoft.com/office/drawing/2014/main" id="{5CE9B4EF-180C-462D-9742-3A6754B91F32}"/>
+                <a16:creationId xmlns:a16="http://schemas.microsoft.com/office/drawing/2014/main" id="{C99E73C1-19CC-465E-BE9E-7359830E0ADC}"/>
               </a:ext>
             </a:extLst>
           </p:cNvPr>
@@ -5825,42 +6172,48 @@
           <a:lstStyle/>
           <a:p>
             <a:r>
-              <a:rPr lang="de-DE" dirty="0" err="1"/>
-              <a:t>Conclusion</a:t>
-            </a:r>
-            <a:endParaRPr lang="de-DE" dirty="0"/>
+              <a:rPr lang="de-DE" dirty="0"/>
+              <a:t>Implementation – Output </a:t>
+            </a:r>
           </a:p>
         </p:txBody>
       </p:sp>
-      <p:sp>
-        <p:nvSpPr>
-          <p:cNvPr id="3" name="Inhaltsplatzhalter 2">
+      <p:pic>
+        <p:nvPicPr>
+          <p:cNvPr id="4" name="Inhaltsplatzhalter 3">
             <a:extLst>
               <a:ext uri="{FF2B5EF4-FFF2-40B4-BE49-F238E27FC236}">
-                <a16:creationId xmlns:a16="http://schemas.microsoft.com/office/drawing/2014/main" id="{2A22295E-A53E-4275-BBD8-9D394F219878}"/>
+                <a16:creationId xmlns:a16="http://schemas.microsoft.com/office/drawing/2014/main" id="{3D15A42E-21DE-42F3-A18A-59A4E4725380}"/>
               </a:ext>
             </a:extLst>
           </p:cNvPr>
-          <p:cNvSpPr>
-            <a:spLocks noGrp="1"/>
-          </p:cNvSpPr>
+          <p:cNvPicPr>
+            <a:picLocks noGrp="1" noChangeAspect="1"/>
+          </p:cNvPicPr>
           <p:nvPr>
             <p:ph idx="1"/>
           </p:nvPr>
-        </p:nvSpPr>
-        <p:spPr/>
-        <p:txBody>
-          <a:bodyPr/>
-          <a:lstStyle/>
-          <a:p>
-            <a:endParaRPr lang="de-DE" dirty="0"/>
-          </a:p>
-        </p:txBody>
-      </p:sp>
+        </p:nvPicPr>
+        <p:blipFill>
+          <a:blip r:embed="rId2"/>
+          <a:stretch>
+            <a:fillRect/>
+          </a:stretch>
+        </p:blipFill>
+        <p:spPr>
+          <a:xfrm>
+            <a:off x="414338" y="1735601"/>
+            <a:ext cx="8229600" cy="4255161"/>
+          </a:xfrm>
+          <a:prstGeom prst="rect">
+            <a:avLst/>
+          </a:prstGeom>
+        </p:spPr>
+      </p:pic>
     </p:spTree>
     <p:extLst>
       <p:ext uri="{BB962C8B-B14F-4D97-AF65-F5344CB8AC3E}">
-        <p14:creationId xmlns:p14="http://schemas.microsoft.com/office/powerpoint/2010/main" val="4086417740"/>
+        <p14:creationId xmlns:p14="http://schemas.microsoft.com/office/powerpoint/2010/main" val="1188704702"/>
       </p:ext>
     </p:extLst>
   </p:cSld>
@@ -5892,7 +6245,7 @@
           <p:cNvPr id="2" name="Titel 1">
             <a:extLst>
               <a:ext uri="{FF2B5EF4-FFF2-40B4-BE49-F238E27FC236}">
-                <a16:creationId xmlns:a16="http://schemas.microsoft.com/office/drawing/2014/main" id="{5CE9B4EF-180C-462D-9742-3A6754B91F32}"/>
+                <a16:creationId xmlns:a16="http://schemas.microsoft.com/office/drawing/2014/main" id="{49B1B1DD-BEEE-41C9-A0DA-EACCE33122D9}"/>
               </a:ext>
             </a:extLst>
           </p:cNvPr>
@@ -5910,7 +6263,7 @@
           <a:p>
             <a:r>
               <a:rPr lang="de-DE" dirty="0"/>
-              <a:t>References</a:t>
+              <a:t>Evaluation</a:t>
             </a:r>
           </a:p>
         </p:txBody>
@@ -5920,7 +6273,7 @@
           <p:cNvPr id="3" name="Inhaltsplatzhalter 2">
             <a:extLst>
               <a:ext uri="{FF2B5EF4-FFF2-40B4-BE49-F238E27FC236}">
-                <a16:creationId xmlns:a16="http://schemas.microsoft.com/office/drawing/2014/main" id="{2A22295E-A53E-4275-BBD8-9D394F219878}"/>
+                <a16:creationId xmlns:a16="http://schemas.microsoft.com/office/drawing/2014/main" id="{69A39C1A-B4B9-4111-A725-95C03555E96F}"/>
               </a:ext>
             </a:extLst>
           </p:cNvPr>
@@ -5931,19 +6284,126 @@
             <p:ph idx="1"/>
           </p:nvPr>
         </p:nvSpPr>
-        <p:spPr/>
+        <p:spPr>
+          <a:xfrm>
+            <a:off x="457200" y="2071389"/>
+            <a:ext cx="8229600" cy="4525963"/>
+          </a:xfrm>
+        </p:spPr>
         <p:txBody>
           <a:bodyPr/>
           <a:lstStyle/>
           <a:p>
+            <a:r>
+              <a:rPr lang="de-DE" dirty="0" err="1"/>
+              <a:t>Sequence</a:t>
+            </a:r>
+            <a:r>
+              <a:rPr lang="de-DE" dirty="0"/>
+              <a:t> </a:t>
+            </a:r>
+            <a:r>
+              <a:rPr lang="de-DE" dirty="0" err="1"/>
+              <a:t>testing</a:t>
+            </a:r>
             <a:endParaRPr lang="de-DE" dirty="0"/>
           </a:p>
+          <a:p>
+            <a:pPr lvl="1"/>
+            <a:r>
+              <a:rPr lang="de-DE" dirty="0" err="1"/>
+              <a:t>With</a:t>
+            </a:r>
+            <a:r>
+              <a:rPr lang="de-DE" dirty="0"/>
+              <a:t> original</a:t>
+            </a:r>
+          </a:p>
+          <a:p>
+            <a:pPr lvl="1"/>
+            <a:r>
+              <a:rPr lang="de-DE" dirty="0" err="1"/>
+              <a:t>With</a:t>
+            </a:r>
+            <a:r>
+              <a:rPr lang="de-DE" dirty="0"/>
+              <a:t> </a:t>
+            </a:r>
+            <a:r>
+              <a:rPr lang="de-DE" dirty="0" err="1"/>
+              <a:t>compressed</a:t>
+            </a:r>
+            <a:endParaRPr lang="de-DE" dirty="0"/>
+          </a:p>
+          <a:p>
+            <a:r>
+              <a:rPr lang="de-DE" dirty="0"/>
+              <a:t>Different </a:t>
+            </a:r>
+            <a:r>
+              <a:rPr lang="de-DE" dirty="0" err="1"/>
+              <a:t>search</a:t>
+            </a:r>
+            <a:r>
+              <a:rPr lang="de-DE" dirty="0"/>
+              <a:t> </a:t>
+            </a:r>
+            <a:r>
+              <a:rPr lang="de-DE" dirty="0" err="1"/>
+              <a:t>sequence</a:t>
+            </a:r>
+            <a:r>
+              <a:rPr lang="de-DE" dirty="0"/>
+              <a:t> </a:t>
+            </a:r>
+            <a:r>
+              <a:rPr lang="de-DE" dirty="0" err="1"/>
+              <a:t>lengths</a:t>
+            </a:r>
+            <a:endParaRPr lang="de-DE" dirty="0"/>
+          </a:p>
+          <a:p>
+            <a:pPr marL="457200" lvl="1" indent="0">
+              <a:buNone/>
+            </a:pPr>
+            <a:endParaRPr lang="de-DE" dirty="0"/>
+          </a:p>
         </p:txBody>
       </p:sp>
+      <p:pic>
+        <p:nvPicPr>
+          <p:cNvPr id="4" name="Grafik 3">
+            <a:extLst>
+              <a:ext uri="{FF2B5EF4-FFF2-40B4-BE49-F238E27FC236}">
+                <a16:creationId xmlns:a16="http://schemas.microsoft.com/office/drawing/2014/main" id="{28100B75-3840-4101-B316-9EA56ABBC6C0}"/>
+              </a:ext>
+            </a:extLst>
+          </p:cNvPr>
+          <p:cNvPicPr>
+            <a:picLocks noChangeAspect="1"/>
+          </p:cNvPicPr>
+          <p:nvPr/>
+        </p:nvPicPr>
+        <p:blipFill>
+          <a:blip r:embed="rId2"/>
+          <a:stretch>
+            <a:fillRect/>
+          </a:stretch>
+        </p:blipFill>
+        <p:spPr>
+          <a:xfrm>
+            <a:off x="250017" y="4725144"/>
+            <a:ext cx="8643966" cy="1315748"/>
+          </a:xfrm>
+          <a:prstGeom prst="rect">
+            <a:avLst/>
+          </a:prstGeom>
+        </p:spPr>
+      </p:pic>
     </p:spTree>
     <p:extLst>
       <p:ext uri="{BB962C8B-B14F-4D97-AF65-F5344CB8AC3E}">
-        <p14:creationId xmlns:p14="http://schemas.microsoft.com/office/powerpoint/2010/main" val="2226286743"/>
+        <p14:creationId xmlns:p14="http://schemas.microsoft.com/office/powerpoint/2010/main" val="3383133174"/>
       </p:ext>
     </p:extLst>
   </p:cSld>
@@ -5972,6 +6432,1790 @@
       </p:grpSpPr>
       <p:sp>
         <p:nvSpPr>
+          <p:cNvPr id="2" name="Titel 1">
+            <a:extLst>
+              <a:ext uri="{FF2B5EF4-FFF2-40B4-BE49-F238E27FC236}">
+                <a16:creationId xmlns:a16="http://schemas.microsoft.com/office/drawing/2014/main" id="{5CE9B4EF-180C-462D-9742-3A6754B91F32}"/>
+              </a:ext>
+            </a:extLst>
+          </p:cNvPr>
+          <p:cNvSpPr>
+            <a:spLocks noGrp="1"/>
+          </p:cNvSpPr>
+          <p:nvPr>
+            <p:ph type="title"/>
+          </p:nvPr>
+        </p:nvSpPr>
+        <p:spPr/>
+        <p:txBody>
+          <a:bodyPr/>
+          <a:lstStyle/>
+          <a:p>
+            <a:r>
+              <a:rPr lang="de-DE" dirty="0"/>
+              <a:t>Evaluation</a:t>
+            </a:r>
+          </a:p>
+        </p:txBody>
+      </p:sp>
+      <p:sp>
+        <p:nvSpPr>
+          <p:cNvPr id="3" name="Inhaltsplatzhalter 2">
+            <a:extLst>
+              <a:ext uri="{FF2B5EF4-FFF2-40B4-BE49-F238E27FC236}">
+                <a16:creationId xmlns:a16="http://schemas.microsoft.com/office/drawing/2014/main" id="{2A22295E-A53E-4275-BBD8-9D394F219878}"/>
+              </a:ext>
+            </a:extLst>
+          </p:cNvPr>
+          <p:cNvSpPr>
+            <a:spLocks noGrp="1"/>
+          </p:cNvSpPr>
+          <p:nvPr>
+            <p:ph idx="1"/>
+          </p:nvPr>
+        </p:nvSpPr>
+        <p:spPr>
+          <a:xfrm>
+            <a:off x="367720" y="1200432"/>
+            <a:ext cx="8229600" cy="4525963"/>
+          </a:xfrm>
+        </p:spPr>
+        <p:txBody>
+          <a:bodyPr/>
+          <a:lstStyle/>
+          <a:p>
+            <a:r>
+              <a:rPr lang="de-DE" dirty="0"/>
+              <a:t>Original </a:t>
+            </a:r>
+            <a:r>
+              <a:rPr lang="de-DE" dirty="0" err="1"/>
+              <a:t>sequences</a:t>
+            </a:r>
+            <a:endParaRPr lang="de-DE" dirty="0"/>
+          </a:p>
+        </p:txBody>
+      </p:sp>
+      <p:pic>
+        <p:nvPicPr>
+          <p:cNvPr id="6" name="Grafik 5">
+            <a:extLst>
+              <a:ext uri="{FF2B5EF4-FFF2-40B4-BE49-F238E27FC236}">
+                <a16:creationId xmlns:a16="http://schemas.microsoft.com/office/drawing/2014/main" id="{0C132598-D601-4B1D-8662-5F20431BBFFF}"/>
+              </a:ext>
+            </a:extLst>
+          </p:cNvPr>
+          <p:cNvPicPr>
+            <a:picLocks noChangeAspect="1"/>
+          </p:cNvPicPr>
+          <p:nvPr/>
+        </p:nvPicPr>
+        <p:blipFill>
+          <a:blip r:embed="rId2"/>
+          <a:stretch>
+            <a:fillRect/>
+          </a:stretch>
+        </p:blipFill>
+        <p:spPr>
+          <a:xfrm>
+            <a:off x="0" y="1916832"/>
+            <a:ext cx="9144000" cy="4363495"/>
+          </a:xfrm>
+          <a:prstGeom prst="rect">
+            <a:avLst/>
+          </a:prstGeom>
+        </p:spPr>
+      </p:pic>
+    </p:spTree>
+    <p:extLst>
+      <p:ext uri="{BB962C8B-B14F-4D97-AF65-F5344CB8AC3E}">
+        <p14:creationId xmlns:p14="http://schemas.microsoft.com/office/powerpoint/2010/main" val="2461775499"/>
+      </p:ext>
+    </p:extLst>
+  </p:cSld>
+  <p:clrMapOvr>
+    <a:masterClrMapping/>
+  </p:clrMapOvr>
+</p:sld>
+</file>
+
+<file path=ppt/slides/slide14.xml><?xml version="1.0" encoding="utf-8"?>
+<p:sld xmlns:a="http://schemas.openxmlformats.org/drawingml/2006/main" xmlns:r="http://schemas.openxmlformats.org/officeDocument/2006/relationships" xmlns:p="http://schemas.openxmlformats.org/presentationml/2006/main">
+  <p:cSld>
+    <p:spTree>
+      <p:nvGrpSpPr>
+        <p:cNvPr id="1" name=""/>
+        <p:cNvGrpSpPr/>
+        <p:nvPr/>
+      </p:nvGrpSpPr>
+      <p:grpSpPr>
+        <a:xfrm>
+          <a:off x="0" y="0"/>
+          <a:ext cx="0" cy="0"/>
+          <a:chOff x="0" y="0"/>
+          <a:chExt cx="0" cy="0"/>
+        </a:xfrm>
+      </p:grpSpPr>
+      <p:sp>
+        <p:nvSpPr>
+          <p:cNvPr id="2" name="Titel 1">
+            <a:extLst>
+              <a:ext uri="{FF2B5EF4-FFF2-40B4-BE49-F238E27FC236}">
+                <a16:creationId xmlns:a16="http://schemas.microsoft.com/office/drawing/2014/main" id="{392066FB-B030-47DE-8726-8417CC5A5DBF}"/>
+              </a:ext>
+            </a:extLst>
+          </p:cNvPr>
+          <p:cNvSpPr>
+            <a:spLocks noGrp="1"/>
+          </p:cNvSpPr>
+          <p:nvPr>
+            <p:ph type="title"/>
+          </p:nvPr>
+        </p:nvSpPr>
+        <p:spPr/>
+        <p:txBody>
+          <a:bodyPr/>
+          <a:lstStyle/>
+          <a:p>
+            <a:r>
+              <a:rPr lang="de-DE" dirty="0"/>
+              <a:t>Evaluation</a:t>
+            </a:r>
+          </a:p>
+        </p:txBody>
+      </p:sp>
+      <p:sp>
+        <p:nvSpPr>
+          <p:cNvPr id="3" name="Inhaltsplatzhalter 2">
+            <a:extLst>
+              <a:ext uri="{FF2B5EF4-FFF2-40B4-BE49-F238E27FC236}">
+                <a16:creationId xmlns:a16="http://schemas.microsoft.com/office/drawing/2014/main" id="{8A6851EF-1A58-4CF0-A9CF-CAF2491D735A}"/>
+              </a:ext>
+            </a:extLst>
+          </p:cNvPr>
+          <p:cNvSpPr>
+            <a:spLocks noGrp="1"/>
+          </p:cNvSpPr>
+          <p:nvPr>
+            <p:ph idx="1"/>
+          </p:nvPr>
+        </p:nvSpPr>
+        <p:spPr>
+          <a:xfrm>
+            <a:off x="457200" y="1200432"/>
+            <a:ext cx="8229600" cy="4525963"/>
+          </a:xfrm>
+        </p:spPr>
+        <p:txBody>
+          <a:bodyPr/>
+          <a:lstStyle/>
+          <a:p>
+            <a:r>
+              <a:rPr lang="de-DE" dirty="0"/>
+              <a:t>Compressed </a:t>
+            </a:r>
+            <a:r>
+              <a:rPr lang="de-DE" dirty="0" err="1"/>
+              <a:t>sequences</a:t>
+            </a:r>
+            <a:endParaRPr lang="de-DE" dirty="0"/>
+          </a:p>
+        </p:txBody>
+      </p:sp>
+      <p:pic>
+        <p:nvPicPr>
+          <p:cNvPr id="4" name="Grafik 3">
+            <a:extLst>
+              <a:ext uri="{FF2B5EF4-FFF2-40B4-BE49-F238E27FC236}">
+                <a16:creationId xmlns:a16="http://schemas.microsoft.com/office/drawing/2014/main" id="{F6967154-F899-4863-9EDB-E765A3641096}"/>
+              </a:ext>
+            </a:extLst>
+          </p:cNvPr>
+          <p:cNvPicPr>
+            <a:picLocks noChangeAspect="1"/>
+          </p:cNvPicPr>
+          <p:nvPr/>
+        </p:nvPicPr>
+        <p:blipFill>
+          <a:blip r:embed="rId3"/>
+          <a:stretch>
+            <a:fillRect/>
+          </a:stretch>
+        </p:blipFill>
+        <p:spPr>
+          <a:xfrm>
+            <a:off x="0" y="1916832"/>
+            <a:ext cx="9144000" cy="4359772"/>
+          </a:xfrm>
+          <a:prstGeom prst="rect">
+            <a:avLst/>
+          </a:prstGeom>
+        </p:spPr>
+      </p:pic>
+    </p:spTree>
+    <p:extLst>
+      <p:ext uri="{BB962C8B-B14F-4D97-AF65-F5344CB8AC3E}">
+        <p14:creationId xmlns:p14="http://schemas.microsoft.com/office/powerpoint/2010/main" val="2167645049"/>
+      </p:ext>
+    </p:extLst>
+  </p:cSld>
+  <p:clrMapOvr>
+    <a:masterClrMapping/>
+  </p:clrMapOvr>
+</p:sld>
+</file>
+
+<file path=ppt/slides/slide15.xml><?xml version="1.0" encoding="utf-8"?>
+<p:sld xmlns:a="http://schemas.openxmlformats.org/drawingml/2006/main" xmlns:r="http://schemas.openxmlformats.org/officeDocument/2006/relationships" xmlns:p="http://schemas.openxmlformats.org/presentationml/2006/main">
+  <p:cSld>
+    <p:spTree>
+      <p:nvGrpSpPr>
+        <p:cNvPr id="1" name=""/>
+        <p:cNvGrpSpPr/>
+        <p:nvPr/>
+      </p:nvGrpSpPr>
+      <p:grpSpPr>
+        <a:xfrm>
+          <a:off x="0" y="0"/>
+          <a:ext cx="0" cy="0"/>
+          <a:chOff x="0" y="0"/>
+          <a:chExt cx="0" cy="0"/>
+        </a:xfrm>
+      </p:grpSpPr>
+      <p:sp>
+        <p:nvSpPr>
+          <p:cNvPr id="2" name="Titel 1">
+            <a:extLst>
+              <a:ext uri="{FF2B5EF4-FFF2-40B4-BE49-F238E27FC236}">
+                <a16:creationId xmlns:a16="http://schemas.microsoft.com/office/drawing/2014/main" id="{5CE9B4EF-180C-462D-9742-3A6754B91F32}"/>
+              </a:ext>
+            </a:extLst>
+          </p:cNvPr>
+          <p:cNvSpPr>
+            <a:spLocks noGrp="1"/>
+          </p:cNvSpPr>
+          <p:nvPr>
+            <p:ph type="title"/>
+          </p:nvPr>
+        </p:nvSpPr>
+        <p:spPr/>
+        <p:txBody>
+          <a:bodyPr/>
+          <a:lstStyle/>
+          <a:p>
+            <a:r>
+              <a:rPr lang="de-DE" dirty="0" err="1"/>
+              <a:t>Conclusion</a:t>
+            </a:r>
+            <a:endParaRPr lang="de-DE" dirty="0"/>
+          </a:p>
+        </p:txBody>
+      </p:sp>
+      <p:sp>
+        <p:nvSpPr>
+          <p:cNvPr id="3" name="Inhaltsplatzhalter 2">
+            <a:extLst>
+              <a:ext uri="{FF2B5EF4-FFF2-40B4-BE49-F238E27FC236}">
+                <a16:creationId xmlns:a16="http://schemas.microsoft.com/office/drawing/2014/main" id="{2A22295E-A53E-4275-BBD8-9D394F219878}"/>
+              </a:ext>
+            </a:extLst>
+          </p:cNvPr>
+          <p:cNvSpPr>
+            <a:spLocks noGrp="1"/>
+          </p:cNvSpPr>
+          <p:nvPr>
+            <p:ph idx="1"/>
+          </p:nvPr>
+        </p:nvSpPr>
+        <p:spPr/>
+        <p:txBody>
+          <a:bodyPr/>
+          <a:lstStyle/>
+          <a:p>
+            <a:r>
+              <a:rPr lang="de-DE" sz="2000" dirty="0"/>
+              <a:t>Smith-Waterman </a:t>
+            </a:r>
+            <a:r>
+              <a:rPr lang="de-DE" sz="2000" dirty="0" err="1"/>
+              <a:t>is</a:t>
+            </a:r>
+            <a:r>
+              <a:rPr lang="de-DE" sz="2000" dirty="0"/>
+              <a:t> </a:t>
+            </a:r>
+            <a:r>
+              <a:rPr lang="de-DE" sz="2000" dirty="0" err="1"/>
+              <a:t>suited</a:t>
+            </a:r>
+            <a:r>
+              <a:rPr lang="de-DE" sz="2000" dirty="0"/>
+              <a:t> </a:t>
+            </a:r>
+            <a:r>
+              <a:rPr lang="de-DE" sz="2000" dirty="0" err="1"/>
+              <a:t>for</a:t>
+            </a:r>
+            <a:r>
+              <a:rPr lang="de-DE" sz="2000" dirty="0"/>
+              <a:t> </a:t>
+            </a:r>
+            <a:r>
+              <a:rPr lang="de-DE" sz="2000" dirty="0" err="1"/>
+              <a:t>location</a:t>
+            </a:r>
+            <a:r>
+              <a:rPr lang="de-DE" sz="2000" dirty="0"/>
+              <a:t> </a:t>
+            </a:r>
+            <a:r>
+              <a:rPr lang="de-DE" sz="2000" dirty="0" err="1"/>
+              <a:t>prediction</a:t>
+            </a:r>
+            <a:r>
+              <a:rPr lang="de-DE" sz="2000" dirty="0"/>
+              <a:t> and </a:t>
+            </a:r>
+            <a:r>
+              <a:rPr lang="de-DE" sz="2000" dirty="0" err="1"/>
+              <a:t>other</a:t>
+            </a:r>
+            <a:r>
+              <a:rPr lang="de-DE" sz="2000" dirty="0"/>
+              <a:t> </a:t>
+            </a:r>
+            <a:r>
+              <a:rPr lang="de-DE" sz="2000" dirty="0" err="1"/>
+              <a:t>purposes</a:t>
+            </a:r>
+            <a:endParaRPr lang="de-DE" sz="2000" dirty="0"/>
+          </a:p>
+          <a:p>
+            <a:r>
+              <a:rPr lang="de-DE" sz="2000" dirty="0"/>
+              <a:t>Google Location Data was </a:t>
+            </a:r>
+            <a:r>
+              <a:rPr lang="de-DE" sz="2000" dirty="0" err="1"/>
+              <a:t>gathered</a:t>
+            </a:r>
+            <a:r>
+              <a:rPr lang="de-DE" sz="2000" dirty="0"/>
+              <a:t> </a:t>
+            </a:r>
+            <a:r>
+              <a:rPr lang="de-DE" sz="2000" dirty="0" err="1"/>
+              <a:t>by</a:t>
+            </a:r>
+            <a:r>
+              <a:rPr lang="de-DE" sz="2000" dirty="0"/>
+              <a:t> </a:t>
+            </a:r>
+            <a:r>
+              <a:rPr lang="de-DE" sz="2000" dirty="0" err="1"/>
+              <a:t>the</a:t>
+            </a:r>
+            <a:r>
+              <a:rPr lang="de-DE" sz="2000" dirty="0"/>
+              <a:t> </a:t>
+            </a:r>
+            <a:r>
+              <a:rPr lang="de-DE" sz="2000" dirty="0" err="1"/>
+              <a:t>device</a:t>
+            </a:r>
+            <a:endParaRPr lang="de-DE" sz="2000" dirty="0"/>
+          </a:p>
+          <a:p>
+            <a:r>
+              <a:rPr lang="de-DE" sz="2000" dirty="0" err="1"/>
+              <a:t>Uncompressed</a:t>
+            </a:r>
+            <a:r>
+              <a:rPr lang="de-DE" sz="2000" dirty="0"/>
+              <a:t> </a:t>
+            </a:r>
+            <a:r>
+              <a:rPr lang="de-DE" sz="2000" dirty="0" err="1"/>
+              <a:t>data</a:t>
+            </a:r>
+            <a:r>
+              <a:rPr lang="de-DE" sz="2000" dirty="0"/>
+              <a:t> </a:t>
+            </a:r>
+            <a:r>
+              <a:rPr lang="de-DE" sz="2000" dirty="0" err="1"/>
+              <a:t>accuracy</a:t>
+            </a:r>
+            <a:r>
+              <a:rPr lang="de-DE" sz="2000" dirty="0"/>
+              <a:t> </a:t>
+            </a:r>
+            <a:r>
+              <a:rPr lang="de-DE" sz="2000" dirty="0" err="1"/>
+              <a:t>is</a:t>
+            </a:r>
+            <a:r>
+              <a:rPr lang="de-DE" sz="2000" dirty="0"/>
+              <a:t> </a:t>
+            </a:r>
+            <a:r>
+              <a:rPr lang="de-DE" sz="2000" dirty="0" err="1"/>
+              <a:t>higher</a:t>
+            </a:r>
+            <a:endParaRPr lang="de-DE" sz="2000" dirty="0"/>
+          </a:p>
+          <a:p>
+            <a:pPr lvl="1"/>
+            <a:r>
+              <a:rPr lang="de-DE" dirty="0" err="1"/>
+              <a:t>Usable</a:t>
+            </a:r>
+            <a:r>
+              <a:rPr lang="de-DE" dirty="0"/>
+              <a:t> </a:t>
+            </a:r>
+            <a:r>
+              <a:rPr lang="de-DE" dirty="0" err="1"/>
+              <a:t>for</a:t>
+            </a:r>
+            <a:r>
+              <a:rPr lang="de-DE" dirty="0"/>
+              <a:t> high </a:t>
+            </a:r>
+            <a:r>
+              <a:rPr lang="de-DE" dirty="0" err="1"/>
+              <a:t>performance</a:t>
+            </a:r>
+            <a:r>
+              <a:rPr lang="de-DE" dirty="0"/>
+              <a:t> </a:t>
+            </a:r>
+            <a:r>
+              <a:rPr lang="de-DE" dirty="0" err="1"/>
+              <a:t>devices</a:t>
+            </a:r>
+            <a:endParaRPr lang="de-DE" dirty="0"/>
+          </a:p>
+          <a:p>
+            <a:r>
+              <a:rPr lang="de-DE" sz="2000" dirty="0" err="1"/>
+              <a:t>Compresed</a:t>
+            </a:r>
+            <a:r>
+              <a:rPr lang="de-DE" sz="2000" dirty="0"/>
+              <a:t> </a:t>
+            </a:r>
+            <a:r>
+              <a:rPr lang="de-DE" sz="2000" dirty="0" err="1"/>
+              <a:t>data</a:t>
+            </a:r>
+            <a:r>
+              <a:rPr lang="de-DE" sz="2000" dirty="0"/>
+              <a:t> </a:t>
+            </a:r>
+            <a:r>
+              <a:rPr lang="de-DE" sz="2000" dirty="0" err="1"/>
+              <a:t>redundancy</a:t>
+            </a:r>
+            <a:r>
+              <a:rPr lang="de-DE" sz="2000" dirty="0"/>
+              <a:t> </a:t>
+            </a:r>
+            <a:r>
+              <a:rPr lang="de-DE" sz="2000" dirty="0" err="1"/>
+              <a:t>is</a:t>
+            </a:r>
+            <a:r>
+              <a:rPr lang="de-DE" sz="2000" dirty="0"/>
+              <a:t> </a:t>
+            </a:r>
+            <a:r>
+              <a:rPr lang="de-DE" sz="2000" dirty="0" err="1"/>
+              <a:t>lower</a:t>
+            </a:r>
+            <a:endParaRPr lang="de-DE" sz="2000" dirty="0"/>
+          </a:p>
+          <a:p>
+            <a:pPr lvl="1"/>
+            <a:r>
+              <a:rPr lang="de-DE" dirty="0" err="1"/>
+              <a:t>Usable</a:t>
+            </a:r>
+            <a:r>
+              <a:rPr lang="de-DE" dirty="0"/>
+              <a:t> </a:t>
+            </a:r>
+            <a:r>
+              <a:rPr lang="de-DE" dirty="0" err="1"/>
+              <a:t>for</a:t>
+            </a:r>
+            <a:r>
+              <a:rPr lang="de-DE" dirty="0"/>
+              <a:t> </a:t>
+            </a:r>
+            <a:r>
+              <a:rPr lang="de-DE" dirty="0" err="1"/>
+              <a:t>low</a:t>
+            </a:r>
+            <a:r>
+              <a:rPr lang="de-DE" dirty="0"/>
+              <a:t> </a:t>
+            </a:r>
+            <a:r>
+              <a:rPr lang="de-DE" dirty="0" err="1"/>
+              <a:t>performance</a:t>
+            </a:r>
+            <a:r>
+              <a:rPr lang="de-DE" dirty="0"/>
+              <a:t> </a:t>
+            </a:r>
+            <a:r>
+              <a:rPr lang="de-DE" dirty="0" err="1"/>
+              <a:t>devices</a:t>
+            </a:r>
+            <a:endParaRPr lang="de-DE" dirty="0"/>
+          </a:p>
+          <a:p>
+            <a:r>
+              <a:rPr lang="de-DE" sz="2000" dirty="0"/>
+              <a:t>Future Work:</a:t>
+            </a:r>
+          </a:p>
+          <a:p>
+            <a:pPr lvl="1"/>
+            <a:r>
+              <a:rPr lang="de-DE" dirty="0"/>
+              <a:t>Real-time </a:t>
+            </a:r>
+            <a:r>
+              <a:rPr lang="de-DE" dirty="0" err="1"/>
+              <a:t>applications</a:t>
+            </a:r>
+            <a:endParaRPr lang="de-DE" dirty="0"/>
+          </a:p>
+          <a:p>
+            <a:pPr lvl="1"/>
+            <a:r>
+              <a:rPr lang="de-DE" dirty="0" err="1"/>
+              <a:t>Improve</a:t>
+            </a:r>
+            <a:r>
+              <a:rPr lang="de-DE" dirty="0"/>
+              <a:t> </a:t>
+            </a:r>
+            <a:r>
+              <a:rPr lang="de-DE" dirty="0" err="1"/>
+              <a:t>sequence</a:t>
+            </a:r>
+            <a:r>
+              <a:rPr lang="de-DE" dirty="0"/>
+              <a:t> </a:t>
+            </a:r>
+            <a:r>
+              <a:rPr lang="de-DE" dirty="0" err="1"/>
+              <a:t>prediction</a:t>
+            </a:r>
+            <a:r>
+              <a:rPr lang="de-DE" dirty="0"/>
+              <a:t> </a:t>
+            </a:r>
+            <a:r>
+              <a:rPr lang="de-DE" dirty="0" err="1"/>
+              <a:t>with</a:t>
+            </a:r>
+            <a:r>
+              <a:rPr lang="de-DE" dirty="0"/>
+              <a:t> same </a:t>
+            </a:r>
+            <a:r>
+              <a:rPr lang="de-DE" dirty="0" err="1"/>
+              <a:t>matrix</a:t>
+            </a:r>
+            <a:r>
+              <a:rPr lang="de-DE" dirty="0"/>
+              <a:t> </a:t>
+            </a:r>
+            <a:r>
+              <a:rPr lang="de-DE" dirty="0" err="1"/>
+              <a:t>scores</a:t>
+            </a:r>
+            <a:endParaRPr lang="de-DE" dirty="0"/>
+          </a:p>
+          <a:p>
+            <a:pPr lvl="1"/>
+            <a:r>
+              <a:rPr lang="de-DE" dirty="0"/>
+              <a:t>Take </a:t>
+            </a:r>
+            <a:r>
+              <a:rPr lang="de-DE" dirty="0" err="1"/>
+              <a:t>more</a:t>
+            </a:r>
+            <a:r>
+              <a:rPr lang="de-DE" dirty="0"/>
+              <a:t> </a:t>
+            </a:r>
+            <a:r>
+              <a:rPr lang="de-DE" dirty="0" err="1"/>
+              <a:t>data</a:t>
+            </a:r>
+            <a:r>
+              <a:rPr lang="de-DE" dirty="0"/>
+              <a:t> </a:t>
+            </a:r>
+            <a:r>
+              <a:rPr lang="de-DE" dirty="0" err="1"/>
+              <a:t>into</a:t>
+            </a:r>
+            <a:r>
+              <a:rPr lang="de-DE" dirty="0"/>
+              <a:t> </a:t>
+            </a:r>
+            <a:r>
+              <a:rPr lang="de-DE" dirty="0" err="1"/>
+              <a:t>account</a:t>
+            </a:r>
+            <a:r>
+              <a:rPr lang="de-DE" dirty="0"/>
+              <a:t> (</a:t>
+            </a:r>
+            <a:r>
+              <a:rPr lang="de-DE" dirty="0" err="1"/>
+              <a:t>longer</a:t>
+            </a:r>
+            <a:r>
+              <a:rPr lang="de-DE" dirty="0"/>
+              <a:t> </a:t>
+            </a:r>
+            <a:r>
+              <a:rPr lang="de-DE" dirty="0" err="1"/>
+              <a:t>sequenes</a:t>
+            </a:r>
+            <a:r>
+              <a:rPr lang="de-DE" dirty="0"/>
+              <a:t>, </a:t>
+            </a:r>
+            <a:r>
+              <a:rPr lang="de-DE" dirty="0" err="1"/>
+              <a:t>coordinates</a:t>
+            </a:r>
+            <a:r>
+              <a:rPr lang="de-DE" dirty="0"/>
+              <a:t>)</a:t>
+            </a:r>
+          </a:p>
+          <a:p>
+            <a:pPr lvl="1"/>
+            <a:r>
+              <a:rPr lang="de-DE" dirty="0"/>
+              <a:t>Smart-Home: Radiator, Coffee </a:t>
+            </a:r>
+            <a:r>
+              <a:rPr lang="de-DE" dirty="0" err="1"/>
+              <a:t>machine</a:t>
+            </a:r>
+            <a:r>
+              <a:rPr lang="de-DE" dirty="0"/>
+              <a:t>, …</a:t>
+            </a:r>
+          </a:p>
+        </p:txBody>
+      </p:sp>
+    </p:spTree>
+    <p:extLst>
+      <p:ext uri="{BB962C8B-B14F-4D97-AF65-F5344CB8AC3E}">
+        <p14:creationId xmlns:p14="http://schemas.microsoft.com/office/powerpoint/2010/main" val="4086417740"/>
+      </p:ext>
+    </p:extLst>
+  </p:cSld>
+  <p:clrMapOvr>
+    <a:masterClrMapping/>
+  </p:clrMapOvr>
+</p:sld>
+</file>
+
+<file path=ppt/slides/slide16.xml><?xml version="1.0" encoding="utf-8"?>
+<p:sld xmlns:a="http://schemas.openxmlformats.org/drawingml/2006/main" xmlns:r="http://schemas.openxmlformats.org/officeDocument/2006/relationships" xmlns:p="http://schemas.openxmlformats.org/presentationml/2006/main">
+  <p:cSld>
+    <p:spTree>
+      <p:nvGrpSpPr>
+        <p:cNvPr id="1" name=""/>
+        <p:cNvGrpSpPr/>
+        <p:nvPr/>
+      </p:nvGrpSpPr>
+      <p:grpSpPr>
+        <a:xfrm>
+          <a:off x="0" y="0"/>
+          <a:ext cx="0" cy="0"/>
+          <a:chOff x="0" y="0"/>
+          <a:chExt cx="0" cy="0"/>
+        </a:xfrm>
+      </p:grpSpPr>
+      <p:sp>
+        <p:nvSpPr>
+          <p:cNvPr id="2" name="Titel 1">
+            <a:extLst>
+              <a:ext uri="{FF2B5EF4-FFF2-40B4-BE49-F238E27FC236}">
+                <a16:creationId xmlns:a16="http://schemas.microsoft.com/office/drawing/2014/main" id="{5CE9B4EF-180C-462D-9742-3A6754B91F32}"/>
+              </a:ext>
+            </a:extLst>
+          </p:cNvPr>
+          <p:cNvSpPr>
+            <a:spLocks noGrp="1"/>
+          </p:cNvSpPr>
+          <p:nvPr>
+            <p:ph type="title"/>
+          </p:nvPr>
+        </p:nvSpPr>
+        <p:spPr/>
+        <p:txBody>
+          <a:bodyPr/>
+          <a:lstStyle/>
+          <a:p>
+            <a:r>
+              <a:rPr lang="de-DE" dirty="0"/>
+              <a:t>References</a:t>
+            </a:r>
+          </a:p>
+        </p:txBody>
+      </p:sp>
+      <p:sp>
+        <p:nvSpPr>
+          <p:cNvPr id="3" name="Inhaltsplatzhalter 2">
+            <a:extLst>
+              <a:ext uri="{FF2B5EF4-FFF2-40B4-BE49-F238E27FC236}">
+                <a16:creationId xmlns:a16="http://schemas.microsoft.com/office/drawing/2014/main" id="{2A22295E-A53E-4275-BBD8-9D394F219878}"/>
+              </a:ext>
+            </a:extLst>
+          </p:cNvPr>
+          <p:cNvSpPr>
+            <a:spLocks noGrp="1"/>
+          </p:cNvSpPr>
+          <p:nvPr>
+            <p:ph idx="1"/>
+          </p:nvPr>
+        </p:nvSpPr>
+        <p:spPr/>
+        <p:txBody>
+          <a:bodyPr/>
+          <a:lstStyle/>
+          <a:p>
+            <a:pPr marL="0" indent="0">
+              <a:buNone/>
+            </a:pPr>
+            <a:r>
+              <a:rPr lang="de-DE" sz="1200" b="1" dirty="0"/>
+              <a:t>[1] „</a:t>
+            </a:r>
+            <a:r>
+              <a:rPr lang="de-DE" sz="1200" dirty="0"/>
+              <a:t>Dynamic </a:t>
+            </a:r>
+            <a:r>
+              <a:rPr lang="de-DE" sz="1200" dirty="0" err="1"/>
+              <a:t>programming</a:t>
+            </a:r>
+            <a:r>
+              <a:rPr lang="de-DE" sz="1200" dirty="0"/>
+              <a:t> and </a:t>
+            </a:r>
+            <a:r>
+              <a:rPr lang="de-DE" sz="1200" dirty="0" err="1"/>
+              <a:t>sequence</a:t>
+            </a:r>
+            <a:r>
+              <a:rPr lang="de-DE" sz="1200" dirty="0"/>
+              <a:t> </a:t>
+            </a:r>
+            <a:r>
+              <a:rPr lang="de-DE" sz="1200" dirty="0" err="1"/>
+              <a:t>alignment</a:t>
+            </a:r>
+            <a:r>
+              <a:rPr lang="de-DE" sz="1200" dirty="0"/>
+              <a:t>“ https://www.ibm.com/developerworks/library/j-seqalign/, </a:t>
+            </a:r>
+            <a:r>
+              <a:rPr lang="de-DE" sz="1200" dirty="0" err="1"/>
+              <a:t>accessed</a:t>
+            </a:r>
+            <a:r>
+              <a:rPr lang="de-DE" sz="1200" dirty="0"/>
+              <a:t>: 2018-02-07.</a:t>
+            </a:r>
+          </a:p>
+          <a:p>
+            <a:pPr marL="0" indent="0">
+              <a:buNone/>
+            </a:pPr>
+            <a:r>
+              <a:rPr lang="de-DE" sz="1200" b="1" dirty="0"/>
+              <a:t>[2] „</a:t>
+            </a:r>
+            <a:r>
+              <a:rPr lang="de-DE" sz="1200" dirty="0"/>
+              <a:t>Google </a:t>
+            </a:r>
+            <a:r>
+              <a:rPr lang="de-DE" sz="1200" dirty="0" err="1"/>
+              <a:t>maps</a:t>
+            </a:r>
+            <a:r>
+              <a:rPr lang="de-DE" sz="1200" dirty="0"/>
+              <a:t> – </a:t>
+            </a:r>
+            <a:r>
+              <a:rPr lang="de-DE" sz="1200" dirty="0" err="1"/>
+              <a:t>timeline</a:t>
+            </a:r>
+            <a:r>
+              <a:rPr lang="de-DE" sz="1200" dirty="0"/>
+              <a:t>“ https://www.google.com/maps/timeline, accessed:2018-02-15.</a:t>
+            </a:r>
+          </a:p>
+          <a:p>
+            <a:pPr marL="0" indent="0">
+              <a:buNone/>
+            </a:pPr>
+            <a:r>
+              <a:rPr lang="de-DE" sz="1200" b="1" dirty="0"/>
+              <a:t>[3] </a:t>
+            </a:r>
+            <a:r>
+              <a:rPr lang="de-DE" sz="1200" dirty="0"/>
+              <a:t>I. Craig and M. </a:t>
+            </a:r>
+            <a:r>
+              <a:rPr lang="de-DE" sz="1200" dirty="0" err="1"/>
+              <a:t>Whitty</a:t>
+            </a:r>
+            <a:r>
+              <a:rPr lang="de-DE" sz="1200" dirty="0"/>
+              <a:t>, “Region </a:t>
+            </a:r>
+            <a:r>
+              <a:rPr lang="de-DE" sz="1200" dirty="0" err="1"/>
+              <a:t>formation</a:t>
+            </a:r>
+            <a:r>
+              <a:rPr lang="de-DE" sz="1200" dirty="0"/>
+              <a:t> </a:t>
+            </a:r>
+            <a:r>
+              <a:rPr lang="de-DE" sz="1200" dirty="0" err="1"/>
+              <a:t>for</a:t>
+            </a:r>
+            <a:r>
+              <a:rPr lang="de-DE" sz="1200" dirty="0"/>
+              <a:t> </a:t>
+            </a:r>
+            <a:r>
+              <a:rPr lang="de-DE" sz="1200" dirty="0" err="1"/>
+              <a:t>efficient</a:t>
+            </a:r>
+            <a:r>
+              <a:rPr lang="de-DE" sz="1200" dirty="0"/>
+              <a:t> offline </a:t>
+            </a:r>
+            <a:r>
+              <a:rPr lang="de-DE" sz="1200" dirty="0" err="1"/>
+              <a:t>locationprediction</a:t>
+            </a:r>
+            <a:r>
+              <a:rPr lang="de-DE" sz="1200" dirty="0"/>
+              <a:t>,” IEEE Pervasive Computing, vol. 16, </a:t>
+            </a:r>
+            <a:r>
+              <a:rPr lang="de-DE" sz="1200" dirty="0" err="1"/>
+              <a:t>no</a:t>
+            </a:r>
+            <a:r>
+              <a:rPr lang="de-DE" sz="1200" dirty="0"/>
+              <a:t>. 1, pp. 66–73, 2017.</a:t>
+            </a:r>
+          </a:p>
+          <a:p>
+            <a:pPr marL="0" indent="0">
+              <a:buNone/>
+            </a:pPr>
+            <a:r>
+              <a:rPr lang="de-DE" sz="1200" b="1" dirty="0"/>
+              <a:t>[4] </a:t>
+            </a:r>
+            <a:r>
+              <a:rPr lang="de-DE" sz="1200" dirty="0"/>
+              <a:t>T. </a:t>
+            </a:r>
+            <a:r>
+              <a:rPr lang="de-DE" sz="1200" dirty="0" err="1"/>
+              <a:t>Gueniche</a:t>
+            </a:r>
+            <a:r>
+              <a:rPr lang="de-DE" sz="1200" dirty="0"/>
+              <a:t>, P. Fournier-</a:t>
+            </a:r>
+            <a:r>
+              <a:rPr lang="de-DE" sz="1200" dirty="0" err="1"/>
+              <a:t>Viger</a:t>
+            </a:r>
+            <a:r>
+              <a:rPr lang="de-DE" sz="1200" dirty="0"/>
+              <a:t>, and V. S. </a:t>
+            </a:r>
+            <a:r>
+              <a:rPr lang="de-DE" sz="1200" dirty="0" err="1"/>
+              <a:t>Tseng</a:t>
+            </a:r>
+            <a:r>
+              <a:rPr lang="de-DE" sz="1200" dirty="0"/>
+              <a:t>, „Compact </a:t>
+            </a:r>
+            <a:r>
+              <a:rPr lang="de-DE" sz="1200" dirty="0" err="1"/>
+              <a:t>predictiontree</a:t>
+            </a:r>
+            <a:r>
+              <a:rPr lang="de-DE" sz="1200" dirty="0"/>
+              <a:t>: A </a:t>
+            </a:r>
+            <a:r>
+              <a:rPr lang="de-DE" sz="1200" dirty="0" err="1"/>
+              <a:t>lossless</a:t>
+            </a:r>
+            <a:r>
+              <a:rPr lang="de-DE" sz="1200" dirty="0"/>
+              <a:t> </a:t>
+            </a:r>
+            <a:r>
+              <a:rPr lang="de-DE" sz="1200" dirty="0" err="1"/>
+              <a:t>model</a:t>
+            </a:r>
+            <a:r>
+              <a:rPr lang="de-DE" sz="1200" dirty="0"/>
+              <a:t> </a:t>
+            </a:r>
+            <a:r>
+              <a:rPr lang="de-DE" sz="1200" dirty="0" err="1"/>
+              <a:t>for</a:t>
+            </a:r>
+            <a:r>
+              <a:rPr lang="de-DE" sz="1200" dirty="0"/>
+              <a:t> </a:t>
+            </a:r>
+            <a:r>
+              <a:rPr lang="de-DE" sz="1200" dirty="0" err="1"/>
+              <a:t>accurate</a:t>
+            </a:r>
+            <a:r>
+              <a:rPr lang="de-DE" sz="1200" dirty="0"/>
+              <a:t> </a:t>
+            </a:r>
+            <a:r>
+              <a:rPr lang="de-DE" sz="1200" dirty="0" err="1"/>
+              <a:t>sequence</a:t>
+            </a:r>
+            <a:r>
+              <a:rPr lang="de-DE" sz="1200" dirty="0"/>
+              <a:t> </a:t>
+            </a:r>
+            <a:r>
+              <a:rPr lang="de-DE" sz="1200" dirty="0" err="1"/>
+              <a:t>prediction</a:t>
+            </a:r>
+            <a:r>
+              <a:rPr lang="de-DE" sz="1200" dirty="0"/>
+              <a:t>“ in International Conference on </a:t>
+            </a:r>
+            <a:r>
+              <a:rPr lang="de-DE" sz="1200" dirty="0" err="1"/>
+              <a:t>Advanced</a:t>
+            </a:r>
+            <a:r>
+              <a:rPr lang="de-DE" sz="1200" dirty="0"/>
+              <a:t> Data Mining and </a:t>
+            </a:r>
+            <a:r>
+              <a:rPr lang="de-DE" sz="1200" dirty="0" err="1"/>
+              <a:t>Applications</a:t>
+            </a:r>
+            <a:r>
+              <a:rPr lang="de-DE" sz="1200" dirty="0"/>
+              <a:t>. Springer,2013, pp. 177–188.</a:t>
+            </a:r>
+          </a:p>
+          <a:p>
+            <a:pPr marL="0" indent="0">
+              <a:buNone/>
+            </a:pPr>
+            <a:r>
+              <a:rPr lang="de-DE" sz="1200" b="1" dirty="0"/>
+              <a:t>[5] </a:t>
+            </a:r>
+            <a:r>
+              <a:rPr lang="de-DE" sz="1200" dirty="0"/>
+              <a:t>D. S. Hirschberg, „A linear </a:t>
+            </a:r>
+            <a:r>
+              <a:rPr lang="de-DE" sz="1200" dirty="0" err="1"/>
+              <a:t>space</a:t>
+            </a:r>
+            <a:r>
+              <a:rPr lang="de-DE" sz="1200" dirty="0"/>
+              <a:t> </a:t>
+            </a:r>
+            <a:r>
+              <a:rPr lang="de-DE" sz="1200" dirty="0" err="1"/>
+              <a:t>algorithm</a:t>
+            </a:r>
+            <a:r>
+              <a:rPr lang="de-DE" sz="1200" dirty="0"/>
+              <a:t> </a:t>
+            </a:r>
+            <a:r>
+              <a:rPr lang="de-DE" sz="1200" dirty="0" err="1"/>
+              <a:t>for</a:t>
+            </a:r>
+            <a:r>
+              <a:rPr lang="de-DE" sz="1200" dirty="0"/>
+              <a:t> </a:t>
+            </a:r>
+            <a:r>
+              <a:rPr lang="de-DE" sz="1200" dirty="0" err="1"/>
+              <a:t>computing</a:t>
+            </a:r>
+            <a:r>
+              <a:rPr lang="de-DE" sz="1200" dirty="0"/>
+              <a:t> maximal </a:t>
+            </a:r>
+            <a:r>
+              <a:rPr lang="de-DE" sz="1200" dirty="0" err="1"/>
+              <a:t>common</a:t>
+            </a:r>
+            <a:r>
+              <a:rPr lang="de-DE" sz="1200" dirty="0"/>
+              <a:t> </a:t>
+            </a:r>
+            <a:r>
+              <a:rPr lang="de-DE" sz="1200" dirty="0" err="1"/>
+              <a:t>subsequences</a:t>
+            </a:r>
+            <a:r>
+              <a:rPr lang="de-DE" sz="1200" dirty="0"/>
+              <a:t>“ Communications </a:t>
+            </a:r>
+            <a:r>
+              <a:rPr lang="de-DE" sz="1200" dirty="0" err="1"/>
+              <a:t>of</a:t>
+            </a:r>
+            <a:r>
+              <a:rPr lang="de-DE" sz="1200" dirty="0"/>
+              <a:t> </a:t>
+            </a:r>
+            <a:r>
+              <a:rPr lang="de-DE" sz="1200" dirty="0" err="1"/>
+              <a:t>the</a:t>
+            </a:r>
+            <a:r>
+              <a:rPr lang="de-DE" sz="1200" dirty="0"/>
+              <a:t> ACM, vol. 18, </a:t>
+            </a:r>
+            <a:r>
+              <a:rPr lang="de-DE" sz="1200" dirty="0" err="1"/>
+              <a:t>no</a:t>
+            </a:r>
+            <a:r>
+              <a:rPr lang="de-DE" sz="1200" dirty="0"/>
+              <a:t>. 6, pp. 341–343, 1975.</a:t>
+            </a:r>
+          </a:p>
+          <a:p>
+            <a:pPr marL="0" indent="0">
+              <a:buNone/>
+            </a:pPr>
+            <a:r>
+              <a:rPr lang="de-DE" sz="1200" b="1" dirty="0"/>
+              <a:t>[6] </a:t>
+            </a:r>
+            <a:r>
+              <a:rPr lang="de-DE" sz="1200" dirty="0"/>
+              <a:t>A. Kirmse, T. </a:t>
+            </a:r>
+            <a:r>
+              <a:rPr lang="de-DE" sz="1200" dirty="0" err="1"/>
+              <a:t>Udeshi</a:t>
+            </a:r>
+            <a:r>
+              <a:rPr lang="de-DE" sz="1200" dirty="0"/>
+              <a:t>, P. </a:t>
+            </a:r>
+            <a:r>
+              <a:rPr lang="de-DE" sz="1200" dirty="0" err="1"/>
+              <a:t>Bellver</a:t>
+            </a:r>
+            <a:r>
+              <a:rPr lang="de-DE" sz="1200" dirty="0"/>
+              <a:t>, and J. </a:t>
+            </a:r>
+            <a:r>
+              <a:rPr lang="de-DE" sz="1200" dirty="0" err="1"/>
+              <a:t>Shuma</a:t>
+            </a:r>
+            <a:r>
+              <a:rPr lang="de-DE" sz="1200" dirty="0"/>
+              <a:t>, „</a:t>
+            </a:r>
+            <a:r>
+              <a:rPr lang="de-DE" sz="1200" dirty="0" err="1"/>
+              <a:t>Extracting</a:t>
+            </a:r>
+            <a:r>
+              <a:rPr lang="de-DE" sz="1200" dirty="0"/>
+              <a:t> </a:t>
+            </a:r>
+            <a:r>
+              <a:rPr lang="de-DE" sz="1200" dirty="0" err="1"/>
+              <a:t>patterns</a:t>
+            </a:r>
+            <a:r>
+              <a:rPr lang="de-DE" sz="1200" dirty="0"/>
+              <a:t> </a:t>
+            </a:r>
+            <a:r>
+              <a:rPr lang="de-DE" sz="1200" dirty="0" err="1"/>
+              <a:t>from</a:t>
+            </a:r>
+            <a:r>
+              <a:rPr lang="de-DE" sz="1200" dirty="0"/>
+              <a:t> </a:t>
+            </a:r>
+            <a:r>
+              <a:rPr lang="de-DE" sz="1200" dirty="0" err="1"/>
+              <a:t>location</a:t>
+            </a:r>
+            <a:r>
+              <a:rPr lang="de-DE" sz="1200" dirty="0"/>
+              <a:t> </a:t>
+            </a:r>
+            <a:r>
+              <a:rPr lang="de-DE" sz="1200" dirty="0" err="1"/>
+              <a:t>history</a:t>
+            </a:r>
+            <a:r>
+              <a:rPr lang="de-DE" sz="1200" dirty="0"/>
+              <a:t>“ in ACM SIGSPATIAL GIS 2011, http://www.sigspatial.org/, 2011, pp. 397–400.</a:t>
+            </a:r>
+          </a:p>
+          <a:p>
+            <a:pPr marL="0" indent="0">
+              <a:buNone/>
+            </a:pPr>
+            <a:r>
+              <a:rPr lang="de-DE" sz="1200" b="1" dirty="0"/>
+              <a:t>[7] </a:t>
+            </a:r>
+            <a:r>
+              <a:rPr lang="de-DE" sz="1200" dirty="0"/>
+              <a:t>S. B. </a:t>
+            </a:r>
+            <a:r>
+              <a:rPr lang="de-DE" sz="1200" dirty="0" err="1"/>
+              <a:t>Needleman</a:t>
+            </a:r>
+            <a:r>
+              <a:rPr lang="de-DE" sz="1200" dirty="0"/>
+              <a:t> and C. D. Wunsch, „A </a:t>
+            </a:r>
+            <a:r>
+              <a:rPr lang="de-DE" sz="1200" dirty="0" err="1"/>
+              <a:t>general</a:t>
+            </a:r>
+            <a:r>
+              <a:rPr lang="de-DE" sz="1200" dirty="0"/>
+              <a:t> </a:t>
+            </a:r>
+            <a:r>
+              <a:rPr lang="de-DE" sz="1200" dirty="0" err="1"/>
+              <a:t>method</a:t>
+            </a:r>
+            <a:r>
+              <a:rPr lang="de-DE" sz="1200" dirty="0"/>
+              <a:t> </a:t>
+            </a:r>
+            <a:r>
+              <a:rPr lang="de-DE" sz="1200" dirty="0" err="1"/>
+              <a:t>applicable</a:t>
+            </a:r>
+            <a:r>
+              <a:rPr lang="de-DE" sz="1200" dirty="0"/>
+              <a:t> </a:t>
+            </a:r>
+            <a:r>
+              <a:rPr lang="de-DE" sz="1200" dirty="0" err="1"/>
+              <a:t>to</a:t>
+            </a:r>
+            <a:r>
+              <a:rPr lang="de-DE" sz="1200" dirty="0"/>
+              <a:t> </a:t>
+            </a:r>
+            <a:r>
+              <a:rPr lang="de-DE" sz="1200" dirty="0" err="1"/>
+              <a:t>the</a:t>
+            </a:r>
+            <a:r>
+              <a:rPr lang="de-DE" sz="1200" dirty="0"/>
+              <a:t> </a:t>
+            </a:r>
+            <a:r>
+              <a:rPr lang="de-DE" sz="1200" dirty="0" err="1"/>
+              <a:t>search</a:t>
+            </a:r>
+            <a:r>
+              <a:rPr lang="de-DE" sz="1200" dirty="0"/>
+              <a:t> </a:t>
+            </a:r>
+            <a:r>
+              <a:rPr lang="de-DE" sz="1200" dirty="0" err="1"/>
+              <a:t>for</a:t>
+            </a:r>
+            <a:r>
+              <a:rPr lang="de-DE" sz="1200" dirty="0"/>
+              <a:t> </a:t>
+            </a:r>
+            <a:r>
+              <a:rPr lang="de-DE" sz="1200" dirty="0" err="1"/>
+              <a:t>similarities</a:t>
+            </a:r>
+            <a:r>
+              <a:rPr lang="de-DE" sz="1200" dirty="0"/>
+              <a:t> in </a:t>
+            </a:r>
+            <a:r>
+              <a:rPr lang="de-DE" sz="1200" dirty="0" err="1"/>
+              <a:t>the</a:t>
+            </a:r>
+            <a:r>
+              <a:rPr lang="de-DE" sz="1200" dirty="0"/>
+              <a:t> </a:t>
+            </a:r>
+            <a:r>
+              <a:rPr lang="de-DE" sz="1200" dirty="0" err="1"/>
+              <a:t>amino</a:t>
+            </a:r>
+            <a:r>
+              <a:rPr lang="de-DE" sz="1200" dirty="0"/>
+              <a:t> </a:t>
+            </a:r>
+            <a:r>
+              <a:rPr lang="de-DE" sz="1200" dirty="0" err="1"/>
+              <a:t>acid</a:t>
+            </a:r>
+            <a:r>
+              <a:rPr lang="de-DE" sz="1200" dirty="0"/>
+              <a:t> </a:t>
+            </a:r>
+            <a:r>
+              <a:rPr lang="de-DE" sz="1200" dirty="0" err="1"/>
+              <a:t>sequence</a:t>
+            </a:r>
+            <a:r>
+              <a:rPr lang="de-DE" sz="1200" dirty="0"/>
+              <a:t> </a:t>
+            </a:r>
+            <a:r>
+              <a:rPr lang="de-DE" sz="1200" dirty="0" err="1"/>
+              <a:t>of</a:t>
+            </a:r>
+            <a:r>
+              <a:rPr lang="de-DE" sz="1200" dirty="0"/>
+              <a:t> </a:t>
+            </a:r>
+            <a:r>
+              <a:rPr lang="de-DE" sz="1200" dirty="0" err="1"/>
+              <a:t>two</a:t>
+            </a:r>
+            <a:r>
+              <a:rPr lang="de-DE" sz="1200" dirty="0"/>
+              <a:t> </a:t>
+            </a:r>
+            <a:r>
+              <a:rPr lang="de-DE" sz="1200" dirty="0" err="1"/>
+              <a:t>proteins</a:t>
+            </a:r>
+            <a:r>
+              <a:rPr lang="de-DE" sz="1200" dirty="0"/>
+              <a:t>“ Journal </a:t>
+            </a:r>
+            <a:r>
+              <a:rPr lang="de-DE" sz="1200" dirty="0" err="1"/>
+              <a:t>of</a:t>
+            </a:r>
+            <a:r>
+              <a:rPr lang="de-DE" sz="1200" dirty="0"/>
+              <a:t> </a:t>
+            </a:r>
+            <a:r>
+              <a:rPr lang="de-DE" sz="1200" dirty="0" err="1"/>
+              <a:t>molecular</a:t>
+            </a:r>
+            <a:r>
+              <a:rPr lang="de-DE" sz="1200" dirty="0"/>
+              <a:t> </a:t>
+            </a:r>
+            <a:r>
+              <a:rPr lang="de-DE" sz="1200" dirty="0" err="1"/>
+              <a:t>biology</a:t>
+            </a:r>
+            <a:r>
+              <a:rPr lang="de-DE" sz="1200" dirty="0"/>
+              <a:t>, vol. 48, </a:t>
+            </a:r>
+            <a:r>
+              <a:rPr lang="de-DE" sz="1200" dirty="0" err="1"/>
+              <a:t>no</a:t>
+            </a:r>
+            <a:r>
+              <a:rPr lang="de-DE" sz="1200" dirty="0"/>
+              <a:t>. 3, pp. 443–453, 1970.</a:t>
+            </a:r>
+          </a:p>
+          <a:p>
+            <a:pPr marL="0" indent="0">
+              <a:buNone/>
+            </a:pPr>
+            <a:r>
+              <a:rPr lang="de-DE" sz="1200" b="1" dirty="0"/>
+              <a:t>[8] </a:t>
+            </a:r>
+            <a:r>
+              <a:rPr lang="de-DE" sz="1200" dirty="0"/>
+              <a:t>C. B. </a:t>
+            </a:r>
+            <a:r>
+              <a:rPr lang="de-DE" sz="1200" dirty="0" err="1"/>
+              <a:t>Rjeily</a:t>
+            </a:r>
+            <a:r>
+              <a:rPr lang="de-DE" sz="1200" dirty="0"/>
+              <a:t>, G. </a:t>
+            </a:r>
+            <a:r>
+              <a:rPr lang="de-DE" sz="1200" dirty="0" err="1"/>
+              <a:t>Badr</a:t>
+            </a:r>
+            <a:r>
+              <a:rPr lang="de-DE" sz="1200" dirty="0"/>
+              <a:t>, A. H. A. Hassani, and E. Andres, „</a:t>
+            </a:r>
+            <a:r>
+              <a:rPr lang="de-DE" sz="1200" dirty="0" err="1"/>
+              <a:t>Predicting</a:t>
+            </a:r>
+            <a:r>
+              <a:rPr lang="de-DE" sz="1200" dirty="0"/>
+              <a:t> </a:t>
+            </a:r>
+            <a:r>
+              <a:rPr lang="de-DE" sz="1200" dirty="0" err="1"/>
+              <a:t>heart</a:t>
+            </a:r>
+            <a:r>
+              <a:rPr lang="de-DE" sz="1200" dirty="0"/>
+              <a:t> </a:t>
+            </a:r>
+            <a:r>
+              <a:rPr lang="de-DE" sz="1200" dirty="0" err="1"/>
+              <a:t>failure</a:t>
+            </a:r>
+            <a:r>
+              <a:rPr lang="de-DE" sz="1200" dirty="0"/>
+              <a:t> </a:t>
+            </a:r>
+            <a:r>
+              <a:rPr lang="de-DE" sz="1200" dirty="0" err="1"/>
+              <a:t>class</a:t>
+            </a:r>
+            <a:r>
+              <a:rPr lang="de-DE" sz="1200" dirty="0"/>
+              <a:t> </a:t>
+            </a:r>
+            <a:r>
+              <a:rPr lang="de-DE" sz="1200" dirty="0" err="1"/>
+              <a:t>using</a:t>
+            </a:r>
+            <a:r>
+              <a:rPr lang="de-DE" sz="1200" dirty="0"/>
+              <a:t> a </a:t>
+            </a:r>
+            <a:r>
+              <a:rPr lang="de-DE" sz="1200" dirty="0" err="1"/>
+              <a:t>sequence</a:t>
+            </a:r>
+            <a:r>
+              <a:rPr lang="de-DE" sz="1200" dirty="0"/>
+              <a:t> </a:t>
+            </a:r>
+            <a:r>
+              <a:rPr lang="de-DE" sz="1200" dirty="0" err="1"/>
+              <a:t>prediction</a:t>
+            </a:r>
+            <a:r>
+              <a:rPr lang="de-DE" sz="1200" dirty="0"/>
+              <a:t> </a:t>
+            </a:r>
+            <a:r>
+              <a:rPr lang="de-DE" sz="1200" dirty="0" err="1"/>
+              <a:t>algorithm</a:t>
+            </a:r>
+            <a:r>
+              <a:rPr lang="de-DE" sz="1200" dirty="0"/>
+              <a:t>“ in 2017 </a:t>
+            </a:r>
+            <a:r>
+              <a:rPr lang="de-DE" sz="1200" dirty="0" err="1"/>
+              <a:t>Fourth</a:t>
+            </a:r>
+            <a:r>
+              <a:rPr lang="de-DE" sz="1200" dirty="0"/>
+              <a:t> International Conference on </a:t>
+            </a:r>
+            <a:r>
+              <a:rPr lang="de-DE" sz="1200" dirty="0" err="1"/>
+              <a:t>Advances</a:t>
+            </a:r>
+            <a:r>
+              <a:rPr lang="de-DE" sz="1200" dirty="0"/>
+              <a:t> in Biomedical Engineering (ICABME), </a:t>
+            </a:r>
+            <a:r>
+              <a:rPr lang="de-DE" sz="1200" dirty="0" err="1"/>
+              <a:t>Oct</a:t>
+            </a:r>
+            <a:r>
+              <a:rPr lang="de-DE" sz="1200" dirty="0"/>
+              <a:t> 2017, pp. 1–4.</a:t>
+            </a:r>
+          </a:p>
+          <a:p>
+            <a:pPr marL="0" indent="0">
+              <a:buNone/>
+            </a:pPr>
+            <a:r>
+              <a:rPr lang="de-DE" sz="1200" b="1" dirty="0"/>
+              <a:t>[9] </a:t>
+            </a:r>
+            <a:r>
+              <a:rPr lang="de-DE" sz="1200" dirty="0"/>
+              <a:t>S. Sigg, S. Haseloff, and K. David, „An </a:t>
+            </a:r>
+            <a:r>
+              <a:rPr lang="de-DE" sz="1200" dirty="0" err="1"/>
+              <a:t>alignment</a:t>
+            </a:r>
+            <a:r>
+              <a:rPr lang="de-DE" sz="1200" dirty="0"/>
+              <a:t> </a:t>
+            </a:r>
+            <a:r>
+              <a:rPr lang="de-DE" sz="1200" dirty="0" err="1"/>
+              <a:t>approach</a:t>
+            </a:r>
+            <a:r>
+              <a:rPr lang="de-DE" sz="1200" dirty="0"/>
+              <a:t> </a:t>
+            </a:r>
+            <a:r>
+              <a:rPr lang="de-DE" sz="1200" dirty="0" err="1"/>
+              <a:t>for</a:t>
+            </a:r>
+            <a:r>
+              <a:rPr lang="de-DE" sz="1200" dirty="0"/>
+              <a:t> </a:t>
+            </a:r>
+            <a:r>
+              <a:rPr lang="de-DE" sz="1200" dirty="0" err="1"/>
+              <a:t>context</a:t>
+            </a:r>
+            <a:r>
+              <a:rPr lang="de-DE" sz="1200" dirty="0"/>
+              <a:t> </a:t>
+            </a:r>
+            <a:r>
+              <a:rPr lang="de-DE" sz="1200" dirty="0" err="1"/>
+              <a:t>prediction</a:t>
+            </a:r>
+            <a:r>
+              <a:rPr lang="de-DE" sz="1200" dirty="0"/>
+              <a:t> </a:t>
+            </a:r>
+            <a:r>
+              <a:rPr lang="de-DE" sz="1200" dirty="0" err="1"/>
+              <a:t>tasks</a:t>
+            </a:r>
+            <a:r>
+              <a:rPr lang="de-DE" sz="1200" dirty="0"/>
+              <a:t> in </a:t>
+            </a:r>
+            <a:r>
+              <a:rPr lang="de-DE" sz="1200" dirty="0" err="1"/>
+              <a:t>ubicomp</a:t>
+            </a:r>
+            <a:r>
+              <a:rPr lang="de-DE" sz="1200" dirty="0"/>
+              <a:t> </a:t>
+            </a:r>
+            <a:r>
+              <a:rPr lang="de-DE" sz="1200" dirty="0" err="1"/>
+              <a:t>environments</a:t>
+            </a:r>
+            <a:r>
+              <a:rPr lang="de-DE" sz="1200" dirty="0"/>
+              <a:t>“ IEEE Pervasive Computing, vol. 9, </a:t>
+            </a:r>
+            <a:r>
+              <a:rPr lang="de-DE" sz="1200" dirty="0" err="1"/>
+              <a:t>no</a:t>
+            </a:r>
+            <a:r>
+              <a:rPr lang="de-DE" sz="1200" dirty="0"/>
+              <a:t>. 4, pp. 90–97, 2010.</a:t>
+            </a:r>
+          </a:p>
+          <a:p>
+            <a:pPr marL="0" indent="0">
+              <a:buNone/>
+            </a:pPr>
+            <a:r>
+              <a:rPr lang="de-DE" sz="1200" b="1" dirty="0"/>
+              <a:t>[10] </a:t>
+            </a:r>
+            <a:r>
+              <a:rPr lang="de-DE" sz="1200" dirty="0"/>
+              <a:t>T. F. Smith and M. S. Waterman, „</a:t>
+            </a:r>
+            <a:r>
+              <a:rPr lang="de-DE" sz="1200" dirty="0" err="1"/>
+              <a:t>Identification</a:t>
+            </a:r>
+            <a:r>
+              <a:rPr lang="de-DE" sz="1200" dirty="0"/>
+              <a:t> </a:t>
+            </a:r>
+            <a:r>
+              <a:rPr lang="de-DE" sz="1200" dirty="0" err="1"/>
+              <a:t>of</a:t>
+            </a:r>
+            <a:r>
+              <a:rPr lang="de-DE" sz="1200" dirty="0"/>
+              <a:t> </a:t>
+            </a:r>
+            <a:r>
+              <a:rPr lang="de-DE" sz="1200" dirty="0" err="1"/>
+              <a:t>common</a:t>
+            </a:r>
+            <a:r>
+              <a:rPr lang="de-DE" sz="1200" dirty="0"/>
+              <a:t> </a:t>
+            </a:r>
+            <a:r>
+              <a:rPr lang="de-DE" sz="1200" dirty="0" err="1"/>
+              <a:t>molecular</a:t>
+            </a:r>
+            <a:r>
+              <a:rPr lang="de-DE" sz="1200" dirty="0"/>
+              <a:t> </a:t>
+            </a:r>
+            <a:r>
+              <a:rPr lang="de-DE" sz="1200" dirty="0" err="1"/>
+              <a:t>subsequences</a:t>
+            </a:r>
+            <a:r>
+              <a:rPr lang="de-DE" sz="1200" dirty="0"/>
+              <a:t>“ Journal </a:t>
+            </a:r>
+            <a:r>
+              <a:rPr lang="de-DE" sz="1200" dirty="0" err="1"/>
+              <a:t>of</a:t>
+            </a:r>
+            <a:r>
+              <a:rPr lang="de-DE" sz="1200" dirty="0"/>
+              <a:t> </a:t>
+            </a:r>
+            <a:r>
+              <a:rPr lang="de-DE" sz="1200" dirty="0" err="1"/>
+              <a:t>molecular</a:t>
+            </a:r>
+            <a:r>
+              <a:rPr lang="de-DE" sz="1200" dirty="0"/>
+              <a:t> </a:t>
+            </a:r>
+            <a:r>
+              <a:rPr lang="de-DE" sz="1200" dirty="0" err="1"/>
+              <a:t>biology</a:t>
+            </a:r>
+            <a:r>
+              <a:rPr lang="de-DE" sz="1200" dirty="0"/>
+              <a:t>, vol. 147, </a:t>
+            </a:r>
+            <a:r>
+              <a:rPr lang="de-DE" sz="1200" dirty="0" err="1"/>
+              <a:t>no</a:t>
+            </a:r>
+            <a:r>
+              <a:rPr lang="de-DE" sz="1200" dirty="0"/>
+              <a:t>. 1, pp. 195– 197, 1981.</a:t>
+            </a:r>
+          </a:p>
+          <a:p>
+            <a:pPr marL="0" indent="0">
+              <a:buNone/>
+            </a:pPr>
+            <a:r>
+              <a:rPr lang="de-DE" sz="1200" b="1" dirty="0"/>
+              <a:t>[11] </a:t>
+            </a:r>
+            <a:r>
+              <a:rPr lang="de-DE" sz="1200" dirty="0"/>
+              <a:t>M. S. Waterman, „</a:t>
+            </a:r>
+            <a:r>
+              <a:rPr lang="de-DE" sz="1200" dirty="0" err="1"/>
+              <a:t>Introduction</a:t>
+            </a:r>
+            <a:r>
+              <a:rPr lang="de-DE" sz="1200" dirty="0"/>
+              <a:t> </a:t>
+            </a:r>
+            <a:r>
+              <a:rPr lang="de-DE" sz="1200" dirty="0" err="1"/>
+              <a:t>to</a:t>
+            </a:r>
+            <a:r>
+              <a:rPr lang="de-DE" sz="1200" dirty="0"/>
+              <a:t> </a:t>
+            </a:r>
+            <a:r>
+              <a:rPr lang="de-DE" sz="1200" dirty="0" err="1"/>
+              <a:t>computational</a:t>
+            </a:r>
+            <a:r>
+              <a:rPr lang="de-DE" sz="1200" dirty="0"/>
+              <a:t> </a:t>
+            </a:r>
+            <a:r>
+              <a:rPr lang="de-DE" sz="1200" dirty="0" err="1"/>
+              <a:t>biology</a:t>
+            </a:r>
+            <a:r>
+              <a:rPr lang="de-DE" sz="1200" dirty="0"/>
+              <a:t>: </a:t>
+            </a:r>
+            <a:r>
+              <a:rPr lang="de-DE" sz="1200" dirty="0" err="1"/>
+              <a:t>maps</a:t>
+            </a:r>
+            <a:r>
+              <a:rPr lang="de-DE" sz="1200" dirty="0"/>
+              <a:t>, </a:t>
+            </a:r>
+            <a:r>
+              <a:rPr lang="de-DE" sz="1200" dirty="0" err="1"/>
+              <a:t>sequences</a:t>
+            </a:r>
+            <a:r>
+              <a:rPr lang="de-DE" sz="1200" dirty="0"/>
+              <a:t> and </a:t>
+            </a:r>
+            <a:r>
+              <a:rPr lang="de-DE" sz="1200" dirty="0" err="1"/>
+              <a:t>genomes</a:t>
+            </a:r>
+            <a:r>
+              <a:rPr lang="de-DE" sz="1200" dirty="0"/>
+              <a:t>“. CRC Press, 1995.</a:t>
+            </a:r>
+          </a:p>
+          <a:p>
+            <a:pPr marL="0" indent="0">
+              <a:buNone/>
+            </a:pPr>
+            <a:r>
+              <a:rPr lang="de-DE" sz="1200" b="1" dirty="0"/>
+              <a:t>[12] </a:t>
+            </a:r>
+            <a:r>
+              <a:rPr lang="de-DE" sz="1200" dirty="0"/>
+              <a:t>N. Casagrande</a:t>
+            </a:r>
+            <a:r>
+              <a:rPr lang="de-DE" sz="1200" b="1" dirty="0"/>
+              <a:t>, „</a:t>
+            </a:r>
+            <a:r>
+              <a:rPr lang="de-DE" sz="1200" dirty="0"/>
+              <a:t>Basic-</a:t>
+            </a:r>
+            <a:r>
+              <a:rPr lang="de-DE" sz="1200" dirty="0" err="1"/>
+              <a:t>Algorithms</a:t>
+            </a:r>
+            <a:r>
+              <a:rPr lang="de-DE" sz="1200" dirty="0"/>
+              <a:t>-</a:t>
+            </a:r>
+            <a:r>
+              <a:rPr lang="de-DE" sz="1200" dirty="0" err="1"/>
+              <a:t>of-Bioinformatics</a:t>
+            </a:r>
+            <a:r>
+              <a:rPr lang="de-DE" sz="1200" dirty="0"/>
+              <a:t> Applet“</a:t>
+            </a:r>
+            <a:r>
+              <a:rPr lang="de-DE" sz="1200" b="1" dirty="0"/>
+              <a:t>, </a:t>
+            </a:r>
+            <a:r>
+              <a:rPr lang="de-DE" sz="1200" dirty="0">
+                <a:hlinkClick r:id="rId2"/>
+              </a:rPr>
+              <a:t>http://baba.sourceforge.net/</a:t>
+            </a:r>
+            <a:endParaRPr lang="de-DE" sz="1200" dirty="0"/>
+          </a:p>
+        </p:txBody>
+      </p:sp>
+    </p:spTree>
+    <p:extLst>
+      <p:ext uri="{BB962C8B-B14F-4D97-AF65-F5344CB8AC3E}">
+        <p14:creationId xmlns:p14="http://schemas.microsoft.com/office/powerpoint/2010/main" val="2226286743"/>
+      </p:ext>
+    </p:extLst>
+  </p:cSld>
+  <p:clrMapOvr>
+    <a:masterClrMapping/>
+  </p:clrMapOvr>
+</p:sld>
+</file>
+
+<file path=ppt/slides/slide17.xml><?xml version="1.0" encoding="utf-8"?>
+<p:sld xmlns:a="http://schemas.openxmlformats.org/drawingml/2006/main" xmlns:r="http://schemas.openxmlformats.org/officeDocument/2006/relationships" xmlns:p="http://schemas.openxmlformats.org/presentationml/2006/main">
+  <p:cSld>
+    <p:spTree>
+      <p:nvGrpSpPr>
+        <p:cNvPr id="1" name=""/>
+        <p:cNvGrpSpPr/>
+        <p:nvPr/>
+      </p:nvGrpSpPr>
+      <p:grpSpPr>
+        <a:xfrm>
+          <a:off x="0" y="0"/>
+          <a:ext cx="0" cy="0"/>
+          <a:chOff x="0" y="0"/>
+          <a:chExt cx="0" cy="0"/>
+        </a:xfrm>
+      </p:grpSpPr>
+      <p:sp>
+        <p:nvSpPr>
           <p:cNvPr id="4" name="Titel 3">
             <a:extLst>
               <a:ext uri="{FF2B5EF4-FFF2-40B4-BE49-F238E27FC236}">
@@ -6063,6 +8307,157 @@
     <p:extLst>
       <p:ext uri="{BB962C8B-B14F-4D97-AF65-F5344CB8AC3E}">
         <p14:creationId xmlns:p14="http://schemas.microsoft.com/office/powerpoint/2010/main" val="22395774"/>
+      </p:ext>
+    </p:extLst>
+  </p:cSld>
+  <p:clrMapOvr>
+    <a:masterClrMapping/>
+  </p:clrMapOvr>
+</p:sld>
+</file>
+
+<file path=ppt/slides/slide18.xml><?xml version="1.0" encoding="utf-8"?>
+<p:sld xmlns:a="http://schemas.openxmlformats.org/drawingml/2006/main" xmlns:r="http://schemas.openxmlformats.org/officeDocument/2006/relationships" xmlns:p="http://schemas.openxmlformats.org/presentationml/2006/main">
+  <p:cSld>
+    <p:spTree>
+      <p:nvGrpSpPr>
+        <p:cNvPr id="1" name=""/>
+        <p:cNvGrpSpPr/>
+        <p:nvPr/>
+      </p:nvGrpSpPr>
+      <p:grpSpPr>
+        <a:xfrm>
+          <a:off x="0" y="0"/>
+          <a:ext cx="0" cy="0"/>
+          <a:chOff x="0" y="0"/>
+          <a:chExt cx="0" cy="0"/>
+        </a:xfrm>
+      </p:grpSpPr>
+      <p:sp>
+        <p:nvSpPr>
+          <p:cNvPr id="2" name="Titel 1">
+            <a:extLst>
+              <a:ext uri="{FF2B5EF4-FFF2-40B4-BE49-F238E27FC236}">
+                <a16:creationId xmlns:a16="http://schemas.microsoft.com/office/drawing/2014/main" id="{3A70A07E-AD59-4707-87BC-A15618D62988}"/>
+              </a:ext>
+            </a:extLst>
+          </p:cNvPr>
+          <p:cNvSpPr>
+            <a:spLocks noGrp="1"/>
+          </p:cNvSpPr>
+          <p:nvPr>
+            <p:ph type="title"/>
+          </p:nvPr>
+        </p:nvSpPr>
+        <p:spPr/>
+        <p:txBody>
+          <a:bodyPr/>
+          <a:lstStyle/>
+          <a:p>
+            <a:r>
+              <a:rPr lang="de-DE" dirty="0" err="1"/>
+              <a:t>Related</a:t>
+            </a:r>
+            <a:r>
+              <a:rPr lang="de-DE" dirty="0"/>
+              <a:t> Work</a:t>
+            </a:r>
+          </a:p>
+        </p:txBody>
+      </p:sp>
+      <p:sp>
+        <p:nvSpPr>
+          <p:cNvPr id="3" name="Inhaltsplatzhalter 2">
+            <a:extLst>
+              <a:ext uri="{FF2B5EF4-FFF2-40B4-BE49-F238E27FC236}">
+                <a16:creationId xmlns:a16="http://schemas.microsoft.com/office/drawing/2014/main" id="{5DFD4EC8-918F-4C11-8EE3-68341A905047}"/>
+              </a:ext>
+            </a:extLst>
+          </p:cNvPr>
+          <p:cNvSpPr>
+            <a:spLocks noGrp="1"/>
+          </p:cNvSpPr>
+          <p:nvPr>
+            <p:ph idx="1"/>
+          </p:nvPr>
+        </p:nvSpPr>
+        <p:spPr/>
+        <p:txBody>
+          <a:bodyPr/>
+          <a:lstStyle/>
+          <a:p>
+            <a:endParaRPr lang="de-DE" dirty="0"/>
+          </a:p>
+          <a:p>
+            <a:r>
+              <a:rPr lang="en-US" dirty="0" err="1"/>
+              <a:t>Sigg</a:t>
+            </a:r>
+            <a:r>
+              <a:rPr lang="en-US" dirty="0"/>
+              <a:t> et al. [9] describe an approach where context sequences can be predicted by using alignment. The utilization of alignment algorithms allows </a:t>
+            </a:r>
+            <a:r>
+              <a:rPr lang="en-US" dirty="0" err="1"/>
+              <a:t>Sigg</a:t>
+            </a:r>
+            <a:r>
+              <a:rPr lang="en-US" dirty="0"/>
+              <a:t> et al. to find the most similar partial sequences and with the aid of these to predict the next entry. </a:t>
+            </a:r>
+          </a:p>
+          <a:p>
+            <a:r>
+              <a:rPr lang="de-DE" dirty="0"/>
+              <a:t>Craig et al. [3] </a:t>
+            </a:r>
+            <a:r>
+              <a:rPr lang="en-US" dirty="0"/>
+              <a:t>use a clustering approach for defining whereabouts of one person trough clusters. This is done by dividing a location in preferably small regions and then combining similar adjacent </a:t>
+            </a:r>
+            <a:r>
+              <a:rPr lang="de-DE" dirty="0" err="1"/>
+              <a:t>regions</a:t>
+            </a:r>
+            <a:r>
+              <a:rPr lang="de-DE" dirty="0"/>
+              <a:t> </a:t>
+            </a:r>
+            <a:r>
+              <a:rPr lang="de-DE" dirty="0" err="1"/>
+              <a:t>to</a:t>
+            </a:r>
+            <a:r>
+              <a:rPr lang="de-DE" dirty="0"/>
+              <a:t> </a:t>
+            </a:r>
+            <a:r>
+              <a:rPr lang="de-DE" dirty="0" err="1"/>
+              <a:t>bigger</a:t>
+            </a:r>
+            <a:r>
+              <a:rPr lang="de-DE" dirty="0"/>
+              <a:t> </a:t>
+            </a:r>
+            <a:r>
+              <a:rPr lang="de-DE" dirty="0" err="1"/>
+              <a:t>clusters</a:t>
+            </a:r>
+            <a:r>
+              <a:rPr lang="de-DE" dirty="0"/>
+              <a:t>.</a:t>
+            </a:r>
+            <a:endParaRPr lang="en-US" dirty="0"/>
+          </a:p>
+          <a:p>
+            <a:endParaRPr lang="en-US" dirty="0"/>
+          </a:p>
+        </p:txBody>
+      </p:sp>
+    </p:spTree>
+    <p:extLst>
+      <p:ext uri="{BB962C8B-B14F-4D97-AF65-F5344CB8AC3E}">
+        <p14:creationId xmlns:p14="http://schemas.microsoft.com/office/powerpoint/2010/main" val="819796879"/>
       </p:ext>
     </p:extLst>
   </p:cSld>
@@ -6144,23 +8539,19 @@
             </a:r>
             <a:r>
               <a:rPr lang="de-DE" dirty="0"/>
-              <a:t> / Motivation</a:t>
-            </a:r>
-          </a:p>
-          <a:p>
-            <a:r>
-              <a:rPr lang="de-DE" dirty="0"/>
-              <a:t>Concept</a:t>
-            </a:r>
-          </a:p>
-          <a:p>
-            <a:r>
-              <a:rPr lang="de-DE" dirty="0"/>
-              <a:t>Alignment </a:t>
-            </a:r>
-            <a:r>
-              <a:rPr lang="de-DE" dirty="0" err="1"/>
-              <a:t>Algorithm</a:t>
+              <a:t> </a:t>
+            </a:r>
+          </a:p>
+          <a:p>
+            <a:r>
+              <a:rPr lang="de-DE" dirty="0"/>
+              <a:t>Motivation</a:t>
+            </a:r>
+          </a:p>
+          <a:p>
+            <a:r>
+              <a:rPr lang="de-DE" dirty="0" err="1"/>
+              <a:t>Conception</a:t>
             </a:r>
             <a:endParaRPr lang="de-DE" dirty="0"/>
           </a:p>
@@ -6517,7 +8908,7 @@
         </p:blipFill>
         <p:spPr>
           <a:xfrm>
-            <a:off x="6444208" y="1479703"/>
+            <a:off x="5636180" y="1340075"/>
             <a:ext cx="2424370" cy="3121925"/>
           </a:xfrm>
         </p:spPr>
@@ -6642,7 +9033,7 @@
         </p:blipFill>
         <p:spPr>
           <a:xfrm>
-            <a:off x="5669116" y="4601628"/>
+            <a:off x="4861089" y="4601627"/>
             <a:ext cx="3199461" cy="1779700"/>
           </a:xfrm>
           <a:prstGeom prst="rect">
@@ -6702,9 +9093,10 @@
           <a:lstStyle/>
           <a:p>
             <a:r>
-              <a:rPr lang="de-DE" dirty="0"/>
-              <a:t>Concept</a:t>
-            </a:r>
+              <a:rPr lang="de-DE" dirty="0" err="1"/>
+              <a:t>Conception</a:t>
+            </a:r>
+            <a:endParaRPr lang="de-DE" dirty="0"/>
           </a:p>
         </p:txBody>
       </p:sp>
@@ -7877,9 +10269,10 @@
           <a:lstStyle/>
           <a:p>
             <a:r>
-              <a:rPr lang="de-DE" dirty="0"/>
-              <a:t>Concept</a:t>
-            </a:r>
+              <a:rPr lang="de-DE" dirty="0" err="1"/>
+              <a:t>Conception</a:t>
+            </a:r>
+            <a:endParaRPr lang="de-DE" dirty="0"/>
           </a:p>
         </p:txBody>
       </p:sp>
@@ -8193,6 +10586,326 @@
           </a:p>
         </p:txBody>
       </p:sp>
+      <p:graphicFrame>
+        <p:nvGraphicFramePr>
+          <p:cNvPr id="3" name="Tabelle 2">
+            <a:extLst>
+              <a:ext uri="{FF2B5EF4-FFF2-40B4-BE49-F238E27FC236}">
+                <a16:creationId xmlns:a16="http://schemas.microsoft.com/office/drawing/2014/main" id="{A26AFAB3-E258-4A61-B569-6693B4A536BE}"/>
+              </a:ext>
+            </a:extLst>
+          </p:cNvPr>
+          <p:cNvGraphicFramePr>
+            <a:graphicFrameLocks noGrp="1"/>
+          </p:cNvGraphicFramePr>
+          <p:nvPr>
+            <p:extLst>
+              <p:ext uri="{D42A27DB-BD31-4B8C-83A1-F6EECF244321}">
+                <p14:modId xmlns:p14="http://schemas.microsoft.com/office/powerpoint/2010/main" val="523299473"/>
+              </p:ext>
+            </p:extLst>
+          </p:nvPr>
+        </p:nvGraphicFramePr>
+        <p:xfrm>
+          <a:off x="500034" y="2379821"/>
+          <a:ext cx="8143932" cy="1483360"/>
+        </p:xfrm>
+        <a:graphic>
+          <a:graphicData uri="http://schemas.openxmlformats.org/drawingml/2006/table">
+            <a:tbl>
+              <a:tblPr firstRow="1" bandRow="1">
+                <a:tableStyleId>{5C22544A-7EE6-4342-B048-85BDC9FD1C3A}</a:tableStyleId>
+              </a:tblPr>
+              <a:tblGrid>
+                <a:gridCol w="2035983">
+                  <a:extLst>
+                    <a:ext uri="{9D8B030D-6E8A-4147-A177-3AD203B41FA5}">
+                      <a16:colId xmlns:a16="http://schemas.microsoft.com/office/drawing/2014/main" val="3105924198"/>
+                    </a:ext>
+                  </a:extLst>
+                </a:gridCol>
+                <a:gridCol w="2035983">
+                  <a:extLst>
+                    <a:ext uri="{9D8B030D-6E8A-4147-A177-3AD203B41FA5}">
+                      <a16:colId xmlns:a16="http://schemas.microsoft.com/office/drawing/2014/main" val="2302927119"/>
+                    </a:ext>
+                  </a:extLst>
+                </a:gridCol>
+                <a:gridCol w="2035983">
+                  <a:extLst>
+                    <a:ext uri="{9D8B030D-6E8A-4147-A177-3AD203B41FA5}">
+                      <a16:colId xmlns:a16="http://schemas.microsoft.com/office/drawing/2014/main" val="3171748794"/>
+                    </a:ext>
+                  </a:extLst>
+                </a:gridCol>
+                <a:gridCol w="2035983">
+                  <a:extLst>
+                    <a:ext uri="{9D8B030D-6E8A-4147-A177-3AD203B41FA5}">
+                      <a16:colId xmlns:a16="http://schemas.microsoft.com/office/drawing/2014/main" val="2946563087"/>
+                    </a:ext>
+                  </a:extLst>
+                </a:gridCol>
+              </a:tblGrid>
+              <a:tr h="370840">
+                <a:tc>
+                  <a:txBody>
+                    <a:bodyPr/>
+                    <a:lstStyle/>
+                    <a:p>
+                      <a:r>
+                        <a:rPr lang="de-DE" dirty="0"/>
+                        <a:t>Data </a:t>
+                      </a:r>
+                      <a:r>
+                        <a:rPr lang="de-DE" dirty="0" err="1"/>
+                        <a:t>set</a:t>
+                      </a:r>
+                      <a:endParaRPr lang="de-DE" dirty="0"/>
+                    </a:p>
+                  </a:txBody>
+                  <a:tcPr/>
+                </a:tc>
+                <a:tc>
+                  <a:txBody>
+                    <a:bodyPr/>
+                    <a:lstStyle/>
+                    <a:p>
+                      <a:r>
+                        <a:rPr lang="de-DE" dirty="0" err="1"/>
+                        <a:t>uncompressed</a:t>
+                      </a:r>
+                      <a:endParaRPr lang="de-DE" dirty="0"/>
+                    </a:p>
+                  </a:txBody>
+                  <a:tcPr/>
+                </a:tc>
+                <a:tc>
+                  <a:txBody>
+                    <a:bodyPr/>
+                    <a:lstStyle/>
+                    <a:p>
+                      <a:r>
+                        <a:rPr lang="de-DE" dirty="0" err="1"/>
+                        <a:t>compressed</a:t>
+                      </a:r>
+                      <a:endParaRPr lang="de-DE" dirty="0"/>
+                    </a:p>
+                  </a:txBody>
+                  <a:tcPr/>
+                </a:tc>
+                <a:tc>
+                  <a:txBody>
+                    <a:bodyPr/>
+                    <a:lstStyle/>
+                    <a:p>
+                      <a:r>
+                        <a:rPr lang="de-DE" dirty="0" err="1"/>
+                        <a:t>reduction</a:t>
+                      </a:r>
+                      <a:endParaRPr lang="de-DE" dirty="0"/>
+                    </a:p>
+                  </a:txBody>
+                  <a:tcPr/>
+                </a:tc>
+                <a:extLst>
+                  <a:ext uri="{0D108BD9-81ED-4DB2-BD59-A6C34878D82A}">
+                    <a16:rowId xmlns:a16="http://schemas.microsoft.com/office/drawing/2014/main" val="2606655564"/>
+                  </a:ext>
+                </a:extLst>
+              </a:tr>
+              <a:tr h="370840">
+                <a:tc>
+                  <a:txBody>
+                    <a:bodyPr/>
+                    <a:lstStyle/>
+                    <a:p>
+                      <a:r>
+                        <a:rPr lang="de-DE" dirty="0" err="1"/>
+                        <a:t>Sequence</a:t>
+                      </a:r>
+                      <a:r>
+                        <a:rPr lang="de-DE" dirty="0"/>
+                        <a:t> 1</a:t>
+                      </a:r>
+                    </a:p>
+                  </a:txBody>
+                  <a:tcPr/>
+                </a:tc>
+                <a:tc>
+                  <a:txBody>
+                    <a:bodyPr/>
+                    <a:lstStyle/>
+                    <a:p>
+                      <a:r>
+                        <a:rPr lang="de-DE" dirty="0"/>
+                        <a:t>1858</a:t>
+                      </a:r>
+                    </a:p>
+                  </a:txBody>
+                  <a:tcPr/>
+                </a:tc>
+                <a:tc>
+                  <a:txBody>
+                    <a:bodyPr/>
+                    <a:lstStyle/>
+                    <a:p>
+                      <a:r>
+                        <a:rPr lang="de-DE" dirty="0"/>
+                        <a:t>436</a:t>
+                      </a:r>
+                    </a:p>
+                  </a:txBody>
+                  <a:tcPr/>
+                </a:tc>
+                <a:tc>
+                  <a:txBody>
+                    <a:bodyPr/>
+                    <a:lstStyle/>
+                    <a:p>
+                      <a:r>
+                        <a:rPr lang="de-DE" dirty="0"/>
+                        <a:t>76,53%</a:t>
+                      </a:r>
+                    </a:p>
+                  </a:txBody>
+                  <a:tcPr/>
+                </a:tc>
+                <a:extLst>
+                  <a:ext uri="{0D108BD9-81ED-4DB2-BD59-A6C34878D82A}">
+                    <a16:rowId xmlns:a16="http://schemas.microsoft.com/office/drawing/2014/main" val="3010467313"/>
+                  </a:ext>
+                </a:extLst>
+              </a:tr>
+              <a:tr h="370840">
+                <a:tc>
+                  <a:txBody>
+                    <a:bodyPr/>
+                    <a:lstStyle/>
+                    <a:p>
+                      <a:r>
+                        <a:rPr lang="de-DE" dirty="0" err="1"/>
+                        <a:t>Sequence</a:t>
+                      </a:r>
+                      <a:r>
+                        <a:rPr lang="de-DE" dirty="0"/>
+                        <a:t> 2</a:t>
+                      </a:r>
+                    </a:p>
+                  </a:txBody>
+                  <a:tcPr/>
+                </a:tc>
+                <a:tc>
+                  <a:txBody>
+                    <a:bodyPr/>
+                    <a:lstStyle/>
+                    <a:p>
+                      <a:r>
+                        <a:rPr lang="de-DE" dirty="0"/>
+                        <a:t>5499</a:t>
+                      </a:r>
+                    </a:p>
+                  </a:txBody>
+                  <a:tcPr/>
+                </a:tc>
+                <a:tc>
+                  <a:txBody>
+                    <a:bodyPr/>
+                    <a:lstStyle/>
+                    <a:p>
+                      <a:r>
+                        <a:rPr lang="de-DE" dirty="0"/>
+                        <a:t>1015</a:t>
+                      </a:r>
+                    </a:p>
+                  </a:txBody>
+                  <a:tcPr/>
+                </a:tc>
+                <a:tc>
+                  <a:txBody>
+                    <a:bodyPr/>
+                    <a:lstStyle/>
+                    <a:p>
+                      <a:r>
+                        <a:rPr lang="de-DE" dirty="0"/>
+                        <a:t>81,54%</a:t>
+                      </a:r>
+                    </a:p>
+                  </a:txBody>
+                  <a:tcPr/>
+                </a:tc>
+                <a:extLst>
+                  <a:ext uri="{0D108BD9-81ED-4DB2-BD59-A6C34878D82A}">
+                    <a16:rowId xmlns:a16="http://schemas.microsoft.com/office/drawing/2014/main" val="388392856"/>
+                  </a:ext>
+                </a:extLst>
+              </a:tr>
+              <a:tr h="370840">
+                <a:tc>
+                  <a:txBody>
+                    <a:bodyPr/>
+                    <a:lstStyle/>
+                    <a:p>
+                      <a:r>
+                        <a:rPr lang="de-DE" dirty="0" err="1"/>
+                        <a:t>Sequence</a:t>
+                      </a:r>
+                      <a:r>
+                        <a:rPr lang="de-DE" dirty="0"/>
+                        <a:t> 3</a:t>
+                      </a:r>
+                    </a:p>
+                  </a:txBody>
+                  <a:tcPr/>
+                </a:tc>
+                <a:tc>
+                  <a:txBody>
+                    <a:bodyPr/>
+                    <a:lstStyle/>
+                    <a:p>
+                      <a:r>
+                        <a:rPr lang="de-DE" dirty="0"/>
+                        <a:t>2222</a:t>
+                      </a:r>
+                    </a:p>
+                  </a:txBody>
+                  <a:tcPr/>
+                </a:tc>
+                <a:tc>
+                  <a:txBody>
+                    <a:bodyPr/>
+                    <a:lstStyle/>
+                    <a:p>
+                      <a:r>
+                        <a:rPr lang="de-DE" dirty="0"/>
+                        <a:t>581</a:t>
+                      </a:r>
+                    </a:p>
+                  </a:txBody>
+                  <a:tcPr/>
+                </a:tc>
+                <a:tc>
+                  <a:txBody>
+                    <a:bodyPr/>
+                    <a:lstStyle/>
+                    <a:p>
+                      <a:r>
+                        <a:rPr lang="de-DE" dirty="0"/>
+                        <a:t>73,85%</a:t>
+                      </a:r>
+                    </a:p>
+                  </a:txBody>
+                  <a:tcPr/>
+                </a:tc>
+                <a:extLst>
+                  <a:ext uri="{0D108BD9-81ED-4DB2-BD59-A6C34878D82A}">
+                    <a16:rowId xmlns:a16="http://schemas.microsoft.com/office/drawing/2014/main" val="632087114"/>
+                  </a:ext>
+                </a:extLst>
+              </a:tr>
+            </a:tbl>
+          </a:graphicData>
+        </a:graphic>
+      </p:graphicFrame>
     </p:spTree>
     <p:extLst>
       <p:ext uri="{BB962C8B-B14F-4D97-AF65-F5344CB8AC3E}">
@@ -8228,7 +10941,7 @@
           <p:cNvPr id="2" name="Titel 1">
             <a:extLst>
               <a:ext uri="{FF2B5EF4-FFF2-40B4-BE49-F238E27FC236}">
-                <a16:creationId xmlns:a16="http://schemas.microsoft.com/office/drawing/2014/main" id="{5CE9B4EF-180C-462D-9742-3A6754B91F32}"/>
+                <a16:creationId xmlns:a16="http://schemas.microsoft.com/office/drawing/2014/main" id="{329B5184-3F6F-4FB4-8E34-43B6A3C96DBE}"/>
               </a:ext>
             </a:extLst>
           </p:cNvPr>
@@ -8245,639 +10958,183 @@
           <a:lstStyle/>
           <a:p>
             <a:r>
-              <a:rPr lang="de-DE" dirty="0"/>
-              <a:t>Alignment </a:t>
-            </a:r>
-            <a:r>
-              <a:rPr lang="de-DE" dirty="0" err="1"/>
-              <a:t>Algorithm</a:t>
+              <a:rPr lang="de-DE" dirty="0" err="1"/>
+              <a:t>Conception</a:t>
             </a:r>
             <a:endParaRPr lang="de-DE" dirty="0"/>
           </a:p>
         </p:txBody>
       </p:sp>
-      <p:graphicFrame>
-        <p:nvGraphicFramePr>
-          <p:cNvPr id="4" name="Inhaltsplatzhalter 3">
+      <p:sp>
+        <p:nvSpPr>
+          <p:cNvPr id="3" name="Inhaltsplatzhalter 2">
             <a:extLst>
               <a:ext uri="{FF2B5EF4-FFF2-40B4-BE49-F238E27FC236}">
-                <a16:creationId xmlns:a16="http://schemas.microsoft.com/office/drawing/2014/main" id="{0563E4A5-655F-49BE-8361-5B0425314902}"/>
+                <a16:creationId xmlns:a16="http://schemas.microsoft.com/office/drawing/2014/main" id="{2D64D179-A41A-477C-8219-D9475BDAD2CA}"/>
               </a:ext>
             </a:extLst>
           </p:cNvPr>
-          <p:cNvGraphicFramePr>
-            <a:graphicFrameLocks noGrp="1"/>
-          </p:cNvGraphicFramePr>
+          <p:cNvSpPr>
+            <a:spLocks noGrp="1"/>
+          </p:cNvSpPr>
           <p:nvPr>
             <p:ph idx="1"/>
-            <p:extLst>
-              <p:ext uri="{D42A27DB-BD31-4B8C-83A1-F6EECF244321}">
-                <p14:modId xmlns:p14="http://schemas.microsoft.com/office/powerpoint/2010/main" val="383240081"/>
-              </p:ext>
-            </p:extLst>
           </p:nvPr>
-        </p:nvGraphicFramePr>
-        <p:xfrm>
-          <a:off x="414338" y="1600200"/>
-          <a:ext cx="2184718" cy="1854200"/>
-        </p:xfrm>
-        <a:graphic>
-          <a:graphicData uri="http://schemas.openxmlformats.org/drawingml/2006/table">
-            <a:tbl>
-              <a:tblPr firstRow="1" bandRow="1">
-                <a:tableStyleId>{5940675A-B579-460E-94D1-54222C63F5DA}</a:tableStyleId>
-              </a:tblPr>
-              <a:tblGrid>
-                <a:gridCol w="373380">
-                  <a:extLst>
-                    <a:ext uri="{9D8B030D-6E8A-4147-A177-3AD203B41FA5}">
-                      <a16:colId xmlns:a16="http://schemas.microsoft.com/office/drawing/2014/main" val="3104117769"/>
-                    </a:ext>
-                  </a:extLst>
-                </a:gridCol>
-                <a:gridCol w="351155">
-                  <a:extLst>
-                    <a:ext uri="{9D8B030D-6E8A-4147-A177-3AD203B41FA5}">
-                      <a16:colId xmlns:a16="http://schemas.microsoft.com/office/drawing/2014/main" val="3961355313"/>
-                    </a:ext>
-                  </a:extLst>
-                </a:gridCol>
-                <a:gridCol w="373380">
-                  <a:extLst>
-                    <a:ext uri="{9D8B030D-6E8A-4147-A177-3AD203B41FA5}">
-                      <a16:colId xmlns:a16="http://schemas.microsoft.com/office/drawing/2014/main" val="667130857"/>
-                    </a:ext>
-                  </a:extLst>
-                </a:gridCol>
-                <a:gridCol w="355918">
-                  <a:extLst>
-                    <a:ext uri="{9D8B030D-6E8A-4147-A177-3AD203B41FA5}">
-                      <a16:colId xmlns:a16="http://schemas.microsoft.com/office/drawing/2014/main" val="3881714311"/>
-                    </a:ext>
-                  </a:extLst>
-                </a:gridCol>
-                <a:gridCol w="363855">
-                  <a:extLst>
-                    <a:ext uri="{9D8B030D-6E8A-4147-A177-3AD203B41FA5}">
-                      <a16:colId xmlns:a16="http://schemas.microsoft.com/office/drawing/2014/main" val="2183170209"/>
-                    </a:ext>
-                  </a:extLst>
-                </a:gridCol>
-                <a:gridCol w="367030">
-                  <a:extLst>
-                    <a:ext uri="{9D8B030D-6E8A-4147-A177-3AD203B41FA5}">
-                      <a16:colId xmlns:a16="http://schemas.microsoft.com/office/drawing/2014/main" val="1952738986"/>
-                    </a:ext>
-                  </a:extLst>
-                </a:gridCol>
-              </a:tblGrid>
-              <a:tr h="370840">
-                <a:tc gridSpan="2">
-                  <a:txBody>
-                    <a:bodyPr/>
-                    <a:lstStyle/>
-                    <a:p>
-                      <a:pPr algn="ctr"/>
-                      <a:endParaRPr lang="de-DE" dirty="0"/>
-                    </a:p>
-                  </a:txBody>
-                  <a:tcPr/>
-                </a:tc>
-                <a:tc hMerge="1">
-                  <a:txBody>
-                    <a:bodyPr/>
-                    <a:lstStyle/>
-                    <a:p>
-                      <a:pPr algn="ctr"/>
-                      <a:endParaRPr lang="de-DE" dirty="0"/>
-                    </a:p>
-                  </a:txBody>
-                  <a:tcPr/>
-                </a:tc>
-                <a:tc>
-                  <a:txBody>
-                    <a:bodyPr/>
-                    <a:lstStyle/>
-                    <a:p>
-                      <a:pPr algn="ctr"/>
-                      <a:r>
-                        <a:rPr lang="de-DE" b="1" dirty="0">
-                          <a:solidFill>
-                            <a:srgbClr val="0E61E6"/>
-                          </a:solidFill>
-                        </a:rPr>
-                        <a:t>A</a:t>
-                      </a:r>
-                    </a:p>
-                  </a:txBody>
-                  <a:tcPr/>
-                </a:tc>
-                <a:tc>
-                  <a:txBody>
-                    <a:bodyPr/>
-                    <a:lstStyle/>
-                    <a:p>
-                      <a:pPr algn="ctr"/>
-                      <a:r>
-                        <a:rPr lang="de-DE" b="1" dirty="0">
-                          <a:solidFill>
-                            <a:srgbClr val="0E61E6"/>
-                          </a:solidFill>
-                        </a:rPr>
-                        <a:t>C</a:t>
-                      </a:r>
-                    </a:p>
-                  </a:txBody>
-                  <a:tcPr/>
-                </a:tc>
-                <a:tc>
-                  <a:txBody>
-                    <a:bodyPr/>
-                    <a:lstStyle/>
-                    <a:p>
-                      <a:pPr algn="ctr"/>
-                      <a:r>
-                        <a:rPr lang="de-DE" b="1" dirty="0">
-                          <a:solidFill>
-                            <a:srgbClr val="0E61E6"/>
-                          </a:solidFill>
-                        </a:rPr>
-                        <a:t>B</a:t>
-                      </a:r>
-                    </a:p>
-                  </a:txBody>
-                  <a:tcPr/>
-                </a:tc>
-                <a:tc>
-                  <a:txBody>
-                    <a:bodyPr/>
-                    <a:lstStyle/>
-                    <a:p>
-                      <a:pPr algn="ctr"/>
-                      <a:r>
-                        <a:rPr lang="de-DE" b="1" dirty="0">
-                          <a:solidFill>
-                            <a:srgbClr val="0E61E6"/>
-                          </a:solidFill>
-                        </a:rPr>
-                        <a:t>A</a:t>
-                      </a:r>
-                    </a:p>
-                  </a:txBody>
-                  <a:tcPr/>
-                </a:tc>
-                <a:extLst>
-                  <a:ext uri="{0D108BD9-81ED-4DB2-BD59-A6C34878D82A}">
-                    <a16:rowId xmlns:a16="http://schemas.microsoft.com/office/drawing/2014/main" val="2461775132"/>
-                  </a:ext>
-                </a:extLst>
-              </a:tr>
-              <a:tr h="370840">
-                <a:tc>
-                  <a:txBody>
-                    <a:bodyPr/>
-                    <a:lstStyle/>
-                    <a:p>
-                      <a:pPr algn="ctr"/>
-                      <a:endParaRPr lang="de-DE" dirty="0"/>
-                    </a:p>
-                  </a:txBody>
-                  <a:tcPr/>
-                </a:tc>
-                <a:tc>
-                  <a:txBody>
-                    <a:bodyPr/>
-                    <a:lstStyle/>
-                    <a:p>
-                      <a:pPr algn="ctr"/>
-                      <a:r>
-                        <a:rPr lang="de-DE" dirty="0"/>
-                        <a:t>0</a:t>
-                      </a:r>
-                    </a:p>
-                  </a:txBody>
-                  <a:tcPr/>
-                </a:tc>
-                <a:tc>
-                  <a:txBody>
-                    <a:bodyPr/>
-                    <a:lstStyle/>
-                    <a:p>
-                      <a:pPr algn="ctr"/>
-                      <a:r>
-                        <a:rPr lang="de-DE" dirty="0"/>
-                        <a:t>0</a:t>
-                      </a:r>
-                    </a:p>
-                  </a:txBody>
-                  <a:tcPr/>
-                </a:tc>
-                <a:tc>
-                  <a:txBody>
-                    <a:bodyPr/>
-                    <a:lstStyle/>
-                    <a:p>
-                      <a:pPr algn="ctr"/>
-                      <a:r>
-                        <a:rPr lang="de-DE" dirty="0"/>
-                        <a:t>0</a:t>
-                      </a:r>
-                    </a:p>
-                  </a:txBody>
-                  <a:tcPr/>
-                </a:tc>
-                <a:tc>
-                  <a:txBody>
-                    <a:bodyPr/>
-                    <a:lstStyle/>
-                    <a:p>
-                      <a:pPr algn="ctr"/>
-                      <a:r>
-                        <a:rPr lang="de-DE" dirty="0"/>
-                        <a:t>0</a:t>
-                      </a:r>
-                    </a:p>
-                  </a:txBody>
-                  <a:tcPr/>
-                </a:tc>
-                <a:tc>
-                  <a:txBody>
-                    <a:bodyPr/>
-                    <a:lstStyle/>
-                    <a:p>
-                      <a:pPr algn="ctr"/>
-                      <a:r>
-                        <a:rPr lang="de-DE" dirty="0"/>
-                        <a:t>0</a:t>
-                      </a:r>
-                    </a:p>
-                  </a:txBody>
-                  <a:tcPr/>
-                </a:tc>
-                <a:extLst>
-                  <a:ext uri="{0D108BD9-81ED-4DB2-BD59-A6C34878D82A}">
-                    <a16:rowId xmlns:a16="http://schemas.microsoft.com/office/drawing/2014/main" val="2453072254"/>
-                  </a:ext>
-                </a:extLst>
-              </a:tr>
-              <a:tr h="370840">
-                <a:tc>
-                  <a:txBody>
-                    <a:bodyPr/>
-                    <a:lstStyle/>
-                    <a:p>
-                      <a:pPr algn="ctr"/>
-                      <a:r>
-                        <a:rPr lang="de-DE" b="1" dirty="0">
-                          <a:solidFill>
-                            <a:srgbClr val="0E61E6"/>
-                          </a:solidFill>
-                        </a:rPr>
-                        <a:t>A</a:t>
-                      </a:r>
-                    </a:p>
-                  </a:txBody>
-                  <a:tcPr/>
-                </a:tc>
-                <a:tc>
-                  <a:txBody>
-                    <a:bodyPr/>
-                    <a:lstStyle/>
-                    <a:p>
-                      <a:pPr algn="ctr"/>
-                      <a:r>
-                        <a:rPr lang="de-DE" dirty="0"/>
-                        <a:t>0</a:t>
-                      </a:r>
-                    </a:p>
-                  </a:txBody>
-                  <a:tcPr/>
-                </a:tc>
-                <a:tc>
-                  <a:txBody>
-                    <a:bodyPr/>
-                    <a:lstStyle/>
-                    <a:p>
-                      <a:pPr algn="ctr"/>
-                      <a:r>
-                        <a:rPr lang="de-DE" dirty="0"/>
-                        <a:t>2</a:t>
-                      </a:r>
-                    </a:p>
-                  </a:txBody>
-                  <a:tcPr/>
-                </a:tc>
-                <a:tc>
-                  <a:txBody>
-                    <a:bodyPr/>
-                    <a:lstStyle/>
-                    <a:p>
-                      <a:pPr algn="ctr"/>
-                      <a:r>
-                        <a:rPr lang="de-DE" dirty="0"/>
-                        <a:t>0</a:t>
-                      </a:r>
-                    </a:p>
-                  </a:txBody>
-                  <a:tcPr/>
-                </a:tc>
-                <a:tc>
-                  <a:txBody>
-                    <a:bodyPr/>
-                    <a:lstStyle/>
-                    <a:p>
-                      <a:pPr algn="ctr"/>
-                      <a:r>
-                        <a:rPr lang="de-DE" dirty="0"/>
-                        <a:t>0</a:t>
-                      </a:r>
-                    </a:p>
-                  </a:txBody>
-                  <a:tcPr/>
-                </a:tc>
-                <a:tc>
-                  <a:txBody>
-                    <a:bodyPr/>
-                    <a:lstStyle/>
-                    <a:p>
-                      <a:pPr algn="ctr"/>
-                      <a:r>
-                        <a:rPr lang="de-DE" dirty="0"/>
-                        <a:t>2</a:t>
-                      </a:r>
-                    </a:p>
-                  </a:txBody>
-                  <a:tcPr/>
-                </a:tc>
-                <a:extLst>
-                  <a:ext uri="{0D108BD9-81ED-4DB2-BD59-A6C34878D82A}">
-                    <a16:rowId xmlns:a16="http://schemas.microsoft.com/office/drawing/2014/main" val="4277523177"/>
-                  </a:ext>
-                </a:extLst>
-              </a:tr>
-              <a:tr h="370840">
-                <a:tc>
-                  <a:txBody>
-                    <a:bodyPr/>
-                    <a:lstStyle/>
-                    <a:p>
-                      <a:pPr algn="ctr"/>
-                      <a:r>
-                        <a:rPr lang="de-DE" b="1" dirty="0">
-                          <a:solidFill>
-                            <a:srgbClr val="0E61E6"/>
-                          </a:solidFill>
-                        </a:rPr>
-                        <a:t>C</a:t>
-                      </a:r>
-                    </a:p>
-                  </a:txBody>
-                  <a:tcPr/>
-                </a:tc>
-                <a:tc>
-                  <a:txBody>
-                    <a:bodyPr/>
-                    <a:lstStyle/>
-                    <a:p>
-                      <a:pPr algn="ctr"/>
-                      <a:r>
-                        <a:rPr lang="de-DE" dirty="0"/>
-                        <a:t>0</a:t>
-                      </a:r>
-                    </a:p>
-                  </a:txBody>
-                  <a:tcPr/>
-                </a:tc>
-                <a:tc>
-                  <a:txBody>
-                    <a:bodyPr/>
-                    <a:lstStyle/>
-                    <a:p>
-                      <a:pPr algn="ctr"/>
-                      <a:r>
-                        <a:rPr lang="de-DE" dirty="0"/>
-                        <a:t>1</a:t>
-                      </a:r>
-                    </a:p>
-                  </a:txBody>
-                  <a:tcPr/>
-                </a:tc>
-                <a:tc>
-                  <a:txBody>
-                    <a:bodyPr/>
-                    <a:lstStyle/>
-                    <a:p>
-                      <a:pPr algn="ctr"/>
-                      <a:r>
-                        <a:rPr lang="de-DE" dirty="0"/>
-                        <a:t>3</a:t>
-                      </a:r>
-                    </a:p>
-                  </a:txBody>
-                  <a:tcPr/>
-                </a:tc>
-                <a:tc>
-                  <a:txBody>
-                    <a:bodyPr/>
-                    <a:lstStyle/>
-                    <a:p>
-                      <a:pPr algn="ctr"/>
-                      <a:r>
-                        <a:rPr lang="de-DE" dirty="0"/>
-                        <a:t>2</a:t>
-                      </a:r>
-                    </a:p>
-                  </a:txBody>
-                  <a:tcPr/>
-                </a:tc>
-                <a:tc>
-                  <a:txBody>
-                    <a:bodyPr/>
-                    <a:lstStyle/>
-                    <a:p>
-                      <a:pPr algn="ctr"/>
-                      <a:r>
-                        <a:rPr lang="de-DE" dirty="0"/>
-                        <a:t>3</a:t>
-                      </a:r>
-                    </a:p>
-                  </a:txBody>
-                  <a:tcPr/>
-                </a:tc>
-                <a:extLst>
-                  <a:ext uri="{0D108BD9-81ED-4DB2-BD59-A6C34878D82A}">
-                    <a16:rowId xmlns:a16="http://schemas.microsoft.com/office/drawing/2014/main" val="189244018"/>
-                  </a:ext>
-                </a:extLst>
-              </a:tr>
-              <a:tr h="370840">
-                <a:tc>
-                  <a:txBody>
-                    <a:bodyPr/>
-                    <a:lstStyle/>
-                    <a:p>
-                      <a:pPr algn="ctr"/>
-                      <a:r>
-                        <a:rPr lang="de-DE" b="1" dirty="0">
-                          <a:solidFill>
-                            <a:srgbClr val="0E61E6"/>
-                          </a:solidFill>
-                        </a:rPr>
-                        <a:t>A</a:t>
-                      </a:r>
-                    </a:p>
-                  </a:txBody>
-                  <a:tcPr/>
-                </a:tc>
-                <a:tc>
-                  <a:txBody>
-                    <a:bodyPr/>
-                    <a:lstStyle/>
-                    <a:p>
-                      <a:pPr algn="ctr"/>
-                      <a:r>
-                        <a:rPr lang="de-DE" dirty="0"/>
-                        <a:t>0</a:t>
-                      </a:r>
-                    </a:p>
-                  </a:txBody>
-                  <a:tcPr/>
-                </a:tc>
-                <a:tc>
-                  <a:txBody>
-                    <a:bodyPr/>
-                    <a:lstStyle/>
-                    <a:p>
-                      <a:pPr algn="ctr"/>
-                      <a:r>
-                        <a:rPr lang="de-DE" dirty="0"/>
-                        <a:t>3</a:t>
-                      </a:r>
-                    </a:p>
-                  </a:txBody>
-                  <a:tcPr/>
-                </a:tc>
-                <a:tc>
-                  <a:txBody>
-                    <a:bodyPr/>
-                    <a:lstStyle/>
-                    <a:p>
-                      <a:pPr algn="ctr"/>
-                      <a:r>
-                        <a:rPr lang="de-DE" dirty="0"/>
-                        <a:t>5</a:t>
-                      </a:r>
-                    </a:p>
-                  </a:txBody>
-                  <a:tcPr/>
-                </a:tc>
-                <a:tc>
-                  <a:txBody>
-                    <a:bodyPr/>
-                    <a:lstStyle/>
-                    <a:p>
-                      <a:pPr algn="ctr"/>
-                      <a:r>
-                        <a:rPr lang="de-DE" dirty="0"/>
-                        <a:t>6</a:t>
-                      </a:r>
-                    </a:p>
-                  </a:txBody>
-                  <a:tcPr/>
-                </a:tc>
-                <a:tc>
-                  <a:txBody>
-                    <a:bodyPr/>
-                    <a:lstStyle/>
-                    <a:p>
-                      <a:pPr algn="ctr"/>
-                      <a:r>
-                        <a:rPr lang="de-DE" sz="1400" dirty="0"/>
-                        <a:t>10</a:t>
-                      </a:r>
-                      <a:endParaRPr lang="de-DE" dirty="0"/>
-                    </a:p>
-                  </a:txBody>
-                  <a:tcPr/>
-                </a:tc>
-                <a:extLst>
-                  <a:ext uri="{0D108BD9-81ED-4DB2-BD59-A6C34878D82A}">
-                    <a16:rowId xmlns:a16="http://schemas.microsoft.com/office/drawing/2014/main" val="3073936107"/>
-                  </a:ext>
-                </a:extLst>
-              </a:tr>
-            </a:tbl>
-          </a:graphicData>
-        </a:graphic>
-      </p:graphicFrame>
-      <p:sp>
-        <p:nvSpPr>
-          <p:cNvPr id="5" name="Textfeld 4">
-            <a:extLst>
-              <a:ext uri="{FF2B5EF4-FFF2-40B4-BE49-F238E27FC236}">
-                <a16:creationId xmlns:a16="http://schemas.microsoft.com/office/drawing/2014/main" id="{3B95A52B-E81B-4812-AE2D-92E7A9F38E74}"/>
-              </a:ext>
-            </a:extLst>
-          </p:cNvPr>
-          <p:cNvSpPr txBox="1"/>
-          <p:nvPr/>
-        </p:nvSpPr>
-        <p:spPr>
-          <a:xfrm>
-            <a:off x="414338" y="4149080"/>
-            <a:ext cx="1640193" cy="1477328"/>
-          </a:xfrm>
-          <a:prstGeom prst="rect">
-            <a:avLst/>
-          </a:prstGeom>
-          <a:noFill/>
-        </p:spPr>
+        </p:nvSpPr>
+        <p:spPr/>
         <p:txBody>
-          <a:bodyPr wrap="none" rtlCol="0">
-            <a:spAutoFit/>
-          </a:bodyPr>
+          <a:bodyPr/>
           <a:lstStyle/>
           <a:p>
             <a:r>
-              <a:rPr lang="de-DE" dirty="0" err="1"/>
-              <a:t>Reccurences</a:t>
-            </a:r>
-            <a:r>
-              <a:rPr lang="de-DE" dirty="0"/>
-              <a:t>:</a:t>
-            </a:r>
-          </a:p>
-          <a:p>
-            <a:r>
-              <a:rPr lang="de-DE" dirty="0"/>
-              <a:t>Match = 2</a:t>
-            </a:r>
-          </a:p>
-          <a:p>
-            <a:r>
-              <a:rPr lang="de-DE" dirty="0" err="1"/>
-              <a:t>Mismatch</a:t>
-            </a:r>
-            <a:r>
-              <a:rPr lang="de-DE" dirty="0"/>
-              <a:t> = -1</a:t>
-            </a:r>
-          </a:p>
-          <a:p>
-            <a:r>
-              <a:rPr lang="de-DE" dirty="0"/>
-              <a:t>Gap = -1</a:t>
-            </a:r>
-          </a:p>
-          <a:p>
+              <a:rPr lang="de-DE" dirty="0"/>
+              <a:t>Smith-Waterman </a:t>
+            </a:r>
+            <a:r>
+              <a:rPr lang="de-DE" dirty="0" err="1"/>
+              <a:t>algorithm</a:t>
+            </a:r>
+            <a:r>
+              <a:rPr lang="de-DE" dirty="0"/>
+              <a:t> </a:t>
+            </a:r>
+            <a:r>
+              <a:rPr lang="de-DE" dirty="0" err="1"/>
+              <a:t>used</a:t>
+            </a:r>
+            <a:r>
+              <a:rPr lang="de-DE" dirty="0"/>
+              <a:t> </a:t>
+            </a:r>
+            <a:r>
+              <a:rPr lang="de-DE" dirty="0" err="1"/>
+              <a:t>mainly</a:t>
+            </a:r>
+            <a:r>
+              <a:rPr lang="de-DE" dirty="0"/>
+              <a:t> in </a:t>
+            </a:r>
+            <a:r>
+              <a:rPr lang="de-DE" dirty="0" err="1"/>
+              <a:t>bioinformatics</a:t>
+            </a:r>
             <a:endParaRPr lang="de-DE" dirty="0"/>
+          </a:p>
+          <a:p>
+            <a:pPr lvl="1"/>
+            <a:r>
+              <a:rPr lang="de-DE" dirty="0"/>
+              <a:t>Alignment </a:t>
+            </a:r>
+            <a:r>
+              <a:rPr lang="de-DE" dirty="0" err="1"/>
+              <a:t>algorithm</a:t>
+            </a:r>
+            <a:r>
+              <a:rPr lang="de-DE" dirty="0"/>
+              <a:t> </a:t>
+            </a:r>
+            <a:r>
+              <a:rPr lang="de-DE" dirty="0" err="1"/>
+              <a:t>invented</a:t>
+            </a:r>
+            <a:r>
+              <a:rPr lang="de-DE" dirty="0"/>
+              <a:t> </a:t>
+            </a:r>
+            <a:r>
+              <a:rPr lang="de-DE" dirty="0" err="1"/>
+              <a:t>by</a:t>
+            </a:r>
+            <a:r>
+              <a:rPr lang="de-DE" dirty="0"/>
+              <a:t> Temple F. Smith and Micheal S. Waterman in 1981</a:t>
+            </a:r>
+          </a:p>
+          <a:p>
+            <a:pPr lvl="1"/>
+            <a:r>
+              <a:rPr lang="de-DE" dirty="0" err="1"/>
+              <a:t>Local</a:t>
+            </a:r>
+            <a:r>
+              <a:rPr lang="de-DE" dirty="0"/>
+              <a:t> Alignment </a:t>
+            </a:r>
+            <a:r>
+              <a:rPr lang="de-DE" dirty="0" err="1"/>
+              <a:t>algorithm</a:t>
+            </a:r>
+            <a:endParaRPr lang="de-DE" dirty="0"/>
+          </a:p>
+          <a:p>
+            <a:pPr lvl="1"/>
+            <a:r>
+              <a:rPr lang="de-DE" dirty="0" err="1"/>
+              <a:t>Compares</a:t>
+            </a:r>
+            <a:r>
+              <a:rPr lang="de-DE" dirty="0"/>
+              <a:t> </a:t>
+            </a:r>
+            <a:r>
+              <a:rPr lang="de-DE" dirty="0" err="1"/>
+              <a:t>evolution</a:t>
+            </a:r>
+            <a:r>
+              <a:rPr lang="de-DE" dirty="0"/>
+              <a:t> </a:t>
+            </a:r>
+            <a:r>
+              <a:rPr lang="de-DE" dirty="0" err="1"/>
+              <a:t>based</a:t>
+            </a:r>
+            <a:r>
+              <a:rPr lang="de-DE" dirty="0"/>
+              <a:t> </a:t>
+            </a:r>
+            <a:r>
+              <a:rPr lang="de-DE" dirty="0" err="1"/>
+              <a:t>differences</a:t>
+            </a:r>
+            <a:r>
+              <a:rPr lang="de-DE" dirty="0"/>
+              <a:t> in DNA and </a:t>
+            </a:r>
+            <a:r>
+              <a:rPr lang="de-DE" dirty="0" err="1"/>
+              <a:t>protein</a:t>
+            </a:r>
+            <a:r>
+              <a:rPr lang="de-DE" dirty="0"/>
+              <a:t> </a:t>
+            </a:r>
+            <a:r>
+              <a:rPr lang="de-DE" dirty="0" err="1"/>
+              <a:t>sequences</a:t>
+            </a:r>
+            <a:r>
+              <a:rPr lang="de-DE" dirty="0"/>
+              <a:t> [11]</a:t>
+            </a:r>
+          </a:p>
+          <a:p>
+            <a:pPr lvl="1"/>
+            <a:r>
+              <a:rPr lang="de-DE" dirty="0" err="1"/>
+              <a:t>Runtime</a:t>
+            </a:r>
+            <a:r>
+              <a:rPr lang="de-DE" dirty="0"/>
+              <a:t> O(n²)</a:t>
+            </a:r>
           </a:p>
         </p:txBody>
       </p:sp>
     </p:spTree>
     <p:extLst>
       <p:ext uri="{BB962C8B-B14F-4D97-AF65-F5344CB8AC3E}">
-        <p14:creationId xmlns:p14="http://schemas.microsoft.com/office/powerpoint/2010/main" val="2467360424"/>
+        <p14:creationId xmlns:p14="http://schemas.microsoft.com/office/powerpoint/2010/main" val="2441996664"/>
       </p:ext>
     </p:extLst>
   </p:cSld>
@@ -8926,41 +11183,321 @@
           <a:lstStyle/>
           <a:p>
             <a:r>
-              <a:rPr lang="de-DE" dirty="0"/>
-              <a:t>Implementation</a:t>
-            </a:r>
+              <a:rPr lang="de-DE" dirty="0" err="1"/>
+              <a:t>Conception</a:t>
+            </a:r>
+            <a:r>
+              <a:rPr lang="de-DE" dirty="0"/>
+              <a:t> – Alignment </a:t>
+            </a:r>
+            <a:r>
+              <a:rPr lang="de-DE" dirty="0" err="1"/>
+              <a:t>Algorithm</a:t>
+            </a:r>
+            <a:endParaRPr lang="de-DE" dirty="0"/>
           </a:p>
         </p:txBody>
       </p:sp>
       <p:sp>
         <p:nvSpPr>
-          <p:cNvPr id="3" name="Inhaltsplatzhalter 2">
+          <p:cNvPr id="5" name="Textfeld 4">
             <a:extLst>
               <a:ext uri="{FF2B5EF4-FFF2-40B4-BE49-F238E27FC236}">
-                <a16:creationId xmlns:a16="http://schemas.microsoft.com/office/drawing/2014/main" id="{2A22295E-A53E-4275-BBD8-9D394F219878}"/>
+                <a16:creationId xmlns:a16="http://schemas.microsoft.com/office/drawing/2014/main" id="{3B95A52B-E81B-4812-AE2D-92E7A9F38E74}"/>
               </a:ext>
             </a:extLst>
           </p:cNvPr>
-          <p:cNvSpPr>
-            <a:spLocks noGrp="1"/>
-          </p:cNvSpPr>
-          <p:nvPr>
-            <p:ph idx="1"/>
-          </p:nvPr>
-        </p:nvSpPr>
-        <p:spPr/>
+          <p:cNvSpPr txBox="1"/>
+          <p:nvPr/>
+        </p:nvSpPr>
+        <p:spPr>
+          <a:xfrm>
+            <a:off x="405304" y="5882818"/>
+            <a:ext cx="8360424" cy="369332"/>
+          </a:xfrm>
+          <a:prstGeom prst="rect">
+            <a:avLst/>
+          </a:prstGeom>
+          <a:noFill/>
+        </p:spPr>
         <p:txBody>
-          <a:bodyPr/>
+          <a:bodyPr wrap="square" rtlCol="0">
+            <a:spAutoFit/>
+          </a:bodyPr>
           <a:lstStyle/>
           <a:p>
-            <a:endParaRPr lang="de-DE" dirty="0"/>
+            <a:r>
+              <a:rPr lang="de-DE" b="1" dirty="0" err="1"/>
+              <a:t>Reccurences</a:t>
+            </a:r>
+            <a:r>
+              <a:rPr lang="de-DE" dirty="0"/>
+              <a:t>: Match = 2	 </a:t>
+            </a:r>
+            <a:r>
+              <a:rPr lang="de-DE" dirty="0" err="1"/>
+              <a:t>Mismatch</a:t>
+            </a:r>
+            <a:r>
+              <a:rPr lang="de-DE" dirty="0"/>
+              <a:t> = -1	 Gap = -1</a:t>
+            </a:r>
           </a:p>
         </p:txBody>
       </p:sp>
+      <p:pic>
+        <p:nvPicPr>
+          <p:cNvPr id="7" name="Grafik 6">
+            <a:extLst>
+              <a:ext uri="{FF2B5EF4-FFF2-40B4-BE49-F238E27FC236}">
+                <a16:creationId xmlns:a16="http://schemas.microsoft.com/office/drawing/2014/main" id="{7F9BF914-3E0B-4EBF-A875-01FEE302008D}"/>
+              </a:ext>
+            </a:extLst>
+          </p:cNvPr>
+          <p:cNvPicPr>
+            <a:picLocks noChangeAspect="1"/>
+          </p:cNvPicPr>
+          <p:nvPr/>
+        </p:nvPicPr>
+        <p:blipFill>
+          <a:blip r:embed="rId3"/>
+          <a:stretch>
+            <a:fillRect/>
+          </a:stretch>
+        </p:blipFill>
+        <p:spPr>
+          <a:xfrm>
+            <a:off x="378272" y="1412776"/>
+            <a:ext cx="3819525" cy="1914525"/>
+          </a:xfrm>
+          <a:prstGeom prst="rect">
+            <a:avLst/>
+          </a:prstGeom>
+        </p:spPr>
+      </p:pic>
+      <p:pic>
+        <p:nvPicPr>
+          <p:cNvPr id="9" name="Grafik 8">
+            <a:extLst>
+              <a:ext uri="{FF2B5EF4-FFF2-40B4-BE49-F238E27FC236}">
+                <a16:creationId xmlns:a16="http://schemas.microsoft.com/office/drawing/2014/main" id="{C7D1B237-BDA2-47B4-AB85-8E0D7E64DC02}"/>
+              </a:ext>
+            </a:extLst>
+          </p:cNvPr>
+          <p:cNvPicPr>
+            <a:picLocks noChangeAspect="1"/>
+          </p:cNvPicPr>
+          <p:nvPr/>
+        </p:nvPicPr>
+        <p:blipFill>
+          <a:blip r:embed="rId4"/>
+          <a:stretch>
+            <a:fillRect/>
+          </a:stretch>
+        </p:blipFill>
+        <p:spPr>
+          <a:xfrm>
+            <a:off x="378272" y="3755949"/>
+            <a:ext cx="3819525" cy="1914525"/>
+          </a:xfrm>
+          <a:prstGeom prst="rect">
+            <a:avLst/>
+          </a:prstGeom>
+        </p:spPr>
+      </p:pic>
+      <p:pic>
+        <p:nvPicPr>
+          <p:cNvPr id="10" name="Grafik 9">
+            <a:extLst>
+              <a:ext uri="{FF2B5EF4-FFF2-40B4-BE49-F238E27FC236}">
+                <a16:creationId xmlns:a16="http://schemas.microsoft.com/office/drawing/2014/main" id="{6E3700D3-0185-4D68-8940-A9D10C4C6AEC}"/>
+              </a:ext>
+            </a:extLst>
+          </p:cNvPr>
+          <p:cNvPicPr>
+            <a:picLocks noChangeAspect="1"/>
+          </p:cNvPicPr>
+          <p:nvPr/>
+        </p:nvPicPr>
+        <p:blipFill>
+          <a:blip r:embed="rId5"/>
+          <a:stretch>
+            <a:fillRect/>
+          </a:stretch>
+        </p:blipFill>
+        <p:spPr>
+          <a:xfrm>
+            <a:off x="4946203" y="3756981"/>
+            <a:ext cx="3819525" cy="1914525"/>
+          </a:xfrm>
+          <a:prstGeom prst="rect">
+            <a:avLst/>
+          </a:prstGeom>
+        </p:spPr>
+      </p:pic>
+      <p:pic>
+        <p:nvPicPr>
+          <p:cNvPr id="11" name="Grafik 10">
+            <a:extLst>
+              <a:ext uri="{FF2B5EF4-FFF2-40B4-BE49-F238E27FC236}">
+                <a16:creationId xmlns:a16="http://schemas.microsoft.com/office/drawing/2014/main" id="{7B2F8B7E-80E2-4B88-9712-666730E27C87}"/>
+              </a:ext>
+            </a:extLst>
+          </p:cNvPr>
+          <p:cNvPicPr>
+            <a:picLocks noChangeAspect="1"/>
+          </p:cNvPicPr>
+          <p:nvPr/>
+        </p:nvPicPr>
+        <p:blipFill>
+          <a:blip r:embed="rId6"/>
+          <a:stretch>
+            <a:fillRect/>
+          </a:stretch>
+        </p:blipFill>
+        <p:spPr>
+          <a:xfrm>
+            <a:off x="4942755" y="1412776"/>
+            <a:ext cx="3819525" cy="1914525"/>
+          </a:xfrm>
+          <a:prstGeom prst="rect">
+            <a:avLst/>
+          </a:prstGeom>
+        </p:spPr>
+      </p:pic>
+      <p:cxnSp>
+        <p:nvCxnSpPr>
+          <p:cNvPr id="19" name="Gerade Verbindung mit Pfeil 18">
+            <a:extLst>
+              <a:ext uri="{FF2B5EF4-FFF2-40B4-BE49-F238E27FC236}">
+                <a16:creationId xmlns:a16="http://schemas.microsoft.com/office/drawing/2014/main" id="{629D034F-CD0D-43A2-868E-A97F0F722B1E}"/>
+              </a:ext>
+            </a:extLst>
+          </p:cNvPr>
+          <p:cNvCxnSpPr>
+            <a:stCxn id="7" idx="2"/>
+            <a:endCxn id="9" idx="0"/>
+          </p:cNvCxnSpPr>
+          <p:nvPr/>
+        </p:nvCxnSpPr>
+        <p:spPr>
+          <a:xfrm>
+            <a:off x="2288035" y="3327301"/>
+            <a:ext cx="0" cy="432000"/>
+          </a:xfrm>
+          <a:prstGeom prst="straightConnector1">
+            <a:avLst/>
+          </a:prstGeom>
+          <a:ln w="38100">
+            <a:solidFill>
+              <a:schemeClr val="accent1"/>
+            </a:solidFill>
+            <a:tailEnd type="triangle"/>
+          </a:ln>
+        </p:spPr>
+        <p:style>
+          <a:lnRef idx="1">
+            <a:schemeClr val="accent1"/>
+          </a:lnRef>
+          <a:fillRef idx="0">
+            <a:schemeClr val="accent1"/>
+          </a:fillRef>
+          <a:effectRef idx="0">
+            <a:schemeClr val="accent1"/>
+          </a:effectRef>
+          <a:fontRef idx="minor">
+            <a:schemeClr val="tx1"/>
+          </a:fontRef>
+        </p:style>
+      </p:cxnSp>
+      <p:cxnSp>
+        <p:nvCxnSpPr>
+          <p:cNvPr id="21" name="Gerade Verbindung mit Pfeil 20">
+            <a:extLst>
+              <a:ext uri="{FF2B5EF4-FFF2-40B4-BE49-F238E27FC236}">
+                <a16:creationId xmlns:a16="http://schemas.microsoft.com/office/drawing/2014/main" id="{E70047F6-4F02-478E-A014-BFF0281D1046}"/>
+              </a:ext>
+            </a:extLst>
+          </p:cNvPr>
+          <p:cNvCxnSpPr>
+            <a:stCxn id="9" idx="3"/>
+            <a:endCxn id="10" idx="1"/>
+          </p:cNvCxnSpPr>
+          <p:nvPr/>
+        </p:nvCxnSpPr>
+        <p:spPr>
+          <a:xfrm>
+            <a:off x="4197797" y="4713212"/>
+            <a:ext cx="748406" cy="1032"/>
+          </a:xfrm>
+          <a:prstGeom prst="straightConnector1">
+            <a:avLst/>
+          </a:prstGeom>
+          <a:ln w="38100">
+            <a:tailEnd type="triangle"/>
+          </a:ln>
+        </p:spPr>
+        <p:style>
+          <a:lnRef idx="1">
+            <a:schemeClr val="accent1"/>
+          </a:lnRef>
+          <a:fillRef idx="0">
+            <a:schemeClr val="accent1"/>
+          </a:fillRef>
+          <a:effectRef idx="0">
+            <a:schemeClr val="accent1"/>
+          </a:effectRef>
+          <a:fontRef idx="minor">
+            <a:schemeClr val="tx1"/>
+          </a:fontRef>
+        </p:style>
+      </p:cxnSp>
+      <p:cxnSp>
+        <p:nvCxnSpPr>
+          <p:cNvPr id="23" name="Gerade Verbindung mit Pfeil 22">
+            <a:extLst>
+              <a:ext uri="{FF2B5EF4-FFF2-40B4-BE49-F238E27FC236}">
+                <a16:creationId xmlns:a16="http://schemas.microsoft.com/office/drawing/2014/main" id="{573FAFA3-2133-4C5C-9C8B-BAB226B84C45}"/>
+              </a:ext>
+            </a:extLst>
+          </p:cNvPr>
+          <p:cNvCxnSpPr>
+            <a:stCxn id="10" idx="0"/>
+            <a:endCxn id="11" idx="2"/>
+          </p:cNvCxnSpPr>
+          <p:nvPr/>
+        </p:nvCxnSpPr>
+        <p:spPr>
+          <a:xfrm flipH="1" flipV="1">
+            <a:off x="6852518" y="3327301"/>
+            <a:ext cx="3448" cy="429680"/>
+          </a:xfrm>
+          <a:prstGeom prst="straightConnector1">
+            <a:avLst/>
+          </a:prstGeom>
+          <a:ln w="38100">
+            <a:tailEnd type="triangle"/>
+          </a:ln>
+        </p:spPr>
+        <p:style>
+          <a:lnRef idx="1">
+            <a:schemeClr val="accent1"/>
+          </a:lnRef>
+          <a:fillRef idx="0">
+            <a:schemeClr val="accent1"/>
+          </a:fillRef>
+          <a:effectRef idx="0">
+            <a:schemeClr val="accent1"/>
+          </a:effectRef>
+          <a:fontRef idx="minor">
+            <a:schemeClr val="tx1"/>
+          </a:fontRef>
+        </p:style>
+      </p:cxnSp>
     </p:spTree>
     <p:extLst>
       <p:ext uri="{BB962C8B-B14F-4D97-AF65-F5344CB8AC3E}">
-        <p14:creationId xmlns:p14="http://schemas.microsoft.com/office/powerpoint/2010/main" val="867745506"/>
+        <p14:creationId xmlns:p14="http://schemas.microsoft.com/office/powerpoint/2010/main" val="2467360424"/>
       </p:ext>
     </p:extLst>
   </p:cSld>

</xml_diff>

<commit_message>
small changes in presentation and program output
</commit_message>
<xml_diff>
--- a/Presentation/CT2_2017_Alignment.pptx
+++ b/Presentation/CT2_2017_Alignment.pptx
@@ -13,8 +13,8 @@
     <p:sldId id="266" r:id="rId4"/>
     <p:sldId id="258" r:id="rId5"/>
     <p:sldId id="259" r:id="rId6"/>
-    <p:sldId id="267" r:id="rId7"/>
-    <p:sldId id="268" r:id="rId8"/>
+    <p:sldId id="268" r:id="rId7"/>
+    <p:sldId id="267" r:id="rId8"/>
     <p:sldId id="275" r:id="rId9"/>
     <p:sldId id="265" r:id="rId10"/>
     <p:sldId id="272" r:id="rId11"/>
@@ -255,7 +255,7 @@
           <a:p>
             <a:fld id="{115392A8-E3E8-434C-92C0-520E1DF9277B}" type="datetimeFigureOut">
               <a:rPr lang="de-DE" smtClean="0"/>
-              <a:t>15.03.2018</a:t>
+              <a:t>19.03.2018</a:t>
             </a:fld>
             <a:endParaRPr lang="de-DE"/>
           </a:p>
@@ -566,7 +566,978 @@
           <a:bodyPr/>
           <a:lstStyle/>
           <a:p>
-            <a:endParaRPr lang="de-DE" dirty="0"/>
+            <a:r>
+              <a:rPr lang="de-DE" dirty="0"/>
+              <a:t>In </a:t>
+            </a:r>
+            <a:r>
+              <a:rPr lang="de-DE" dirty="0" err="1"/>
+              <a:t>our</a:t>
+            </a:r>
+            <a:r>
+              <a:rPr lang="de-DE" dirty="0"/>
+              <a:t> </a:t>
+            </a:r>
+            <a:r>
+              <a:rPr lang="de-DE" dirty="0" err="1"/>
+              <a:t>group</a:t>
+            </a:r>
+            <a:r>
+              <a:rPr lang="de-DE" dirty="0"/>
+              <a:t>, </a:t>
+            </a:r>
+            <a:r>
+              <a:rPr lang="de-DE" dirty="0" err="1"/>
+              <a:t>we</a:t>
+            </a:r>
+            <a:r>
+              <a:rPr lang="de-DE" dirty="0"/>
+              <a:t> </a:t>
+            </a:r>
+            <a:r>
+              <a:rPr lang="de-DE" dirty="0" err="1"/>
+              <a:t>implemented</a:t>
+            </a:r>
+            <a:r>
+              <a:rPr lang="de-DE" dirty="0"/>
+              <a:t> an </a:t>
+            </a:r>
+            <a:r>
+              <a:rPr lang="de-DE" dirty="0" err="1"/>
+              <a:t>approach</a:t>
+            </a:r>
+            <a:r>
+              <a:rPr lang="de-DE" dirty="0"/>
+              <a:t> </a:t>
+            </a:r>
+            <a:r>
+              <a:rPr lang="de-DE" dirty="0" err="1"/>
+              <a:t>that</a:t>
+            </a:r>
+            <a:r>
+              <a:rPr lang="de-DE" dirty="0"/>
+              <a:t> </a:t>
+            </a:r>
+            <a:r>
+              <a:rPr lang="de-DE" dirty="0" err="1"/>
+              <a:t>converts</a:t>
+            </a:r>
+            <a:r>
+              <a:rPr lang="de-DE" dirty="0"/>
+              <a:t> </a:t>
+            </a:r>
+            <a:r>
+              <a:rPr lang="de-DE" dirty="0" err="1"/>
+              <a:t>raw</a:t>
+            </a:r>
+            <a:r>
+              <a:rPr lang="de-DE" dirty="0"/>
+              <a:t> </a:t>
+            </a:r>
+            <a:r>
+              <a:rPr lang="de-DE" dirty="0" err="1"/>
+              <a:t>data</a:t>
+            </a:r>
+            <a:r>
+              <a:rPr lang="de-DE" dirty="0"/>
+              <a:t> </a:t>
+            </a:r>
+            <a:r>
+              <a:rPr lang="de-DE" dirty="0" err="1"/>
+              <a:t>into</a:t>
+            </a:r>
+            <a:r>
+              <a:rPr lang="de-DE" dirty="0"/>
+              <a:t> a </a:t>
+            </a:r>
+            <a:r>
+              <a:rPr lang="de-DE" dirty="0" err="1"/>
+              <a:t>sequence</a:t>
+            </a:r>
+            <a:r>
+              <a:rPr lang="de-DE" dirty="0"/>
+              <a:t>. First, </a:t>
+            </a:r>
+            <a:r>
+              <a:rPr lang="de-DE" dirty="0" err="1"/>
+              <a:t>this</a:t>
+            </a:r>
+            <a:r>
+              <a:rPr lang="de-DE" dirty="0"/>
+              <a:t> </a:t>
+            </a:r>
+            <a:r>
+              <a:rPr lang="de-DE" dirty="0" err="1"/>
+              <a:t>is</a:t>
+            </a:r>
+            <a:r>
+              <a:rPr lang="de-DE" dirty="0"/>
+              <a:t> </a:t>
+            </a:r>
+            <a:r>
+              <a:rPr lang="de-DE" dirty="0" err="1"/>
+              <a:t>how</a:t>
+            </a:r>
+            <a:r>
+              <a:rPr lang="de-DE" dirty="0"/>
+              <a:t> </a:t>
+            </a:r>
+            <a:r>
+              <a:rPr lang="de-DE" dirty="0" err="1"/>
+              <a:t>the</a:t>
+            </a:r>
+            <a:r>
+              <a:rPr lang="de-DE" dirty="0"/>
+              <a:t> </a:t>
+            </a:r>
+            <a:r>
+              <a:rPr lang="de-DE" dirty="0" err="1"/>
+              <a:t>raw</a:t>
+            </a:r>
+            <a:r>
+              <a:rPr lang="de-DE" dirty="0"/>
+              <a:t> </a:t>
+            </a:r>
+            <a:r>
+              <a:rPr lang="de-DE" dirty="0" err="1"/>
+              <a:t>data</a:t>
+            </a:r>
+            <a:r>
+              <a:rPr lang="de-DE" dirty="0"/>
+              <a:t>, </a:t>
+            </a:r>
+            <a:r>
+              <a:rPr lang="de-DE" dirty="0" err="1"/>
+              <a:t>that</a:t>
+            </a:r>
+            <a:r>
+              <a:rPr lang="de-DE" dirty="0"/>
+              <a:t> </a:t>
+            </a:r>
+            <a:r>
+              <a:rPr lang="de-DE" dirty="0" err="1"/>
+              <a:t>we</a:t>
+            </a:r>
+            <a:r>
+              <a:rPr lang="de-DE" dirty="0"/>
+              <a:t> </a:t>
+            </a:r>
+            <a:r>
+              <a:rPr lang="de-DE" dirty="0" err="1"/>
+              <a:t>reveive</a:t>
+            </a:r>
+            <a:r>
+              <a:rPr lang="de-DE" dirty="0"/>
+              <a:t>, </a:t>
+            </a:r>
+            <a:r>
+              <a:rPr lang="de-DE" dirty="0" err="1"/>
+              <a:t>looks</a:t>
+            </a:r>
+            <a:r>
+              <a:rPr lang="de-DE" dirty="0"/>
+              <a:t> like. The </a:t>
+            </a:r>
+            <a:r>
+              <a:rPr lang="de-DE" dirty="0" err="1"/>
+              <a:t>data</a:t>
+            </a:r>
+            <a:r>
+              <a:rPr lang="de-DE" dirty="0"/>
+              <a:t> </a:t>
+            </a:r>
+            <a:r>
+              <a:rPr lang="de-DE" dirty="0" err="1"/>
+              <a:t>is</a:t>
+            </a:r>
+            <a:r>
+              <a:rPr lang="de-DE" dirty="0"/>
+              <a:t> </a:t>
+            </a:r>
+            <a:r>
+              <a:rPr lang="de-DE" dirty="0" err="1"/>
+              <a:t>devided</a:t>
+            </a:r>
+            <a:r>
+              <a:rPr lang="de-DE" dirty="0"/>
+              <a:t> in </a:t>
+            </a:r>
+            <a:r>
+              <a:rPr lang="de-DE" dirty="0" err="1"/>
+              <a:t>rows</a:t>
+            </a:r>
+            <a:r>
+              <a:rPr lang="de-DE" dirty="0"/>
+              <a:t> </a:t>
+            </a:r>
+            <a:r>
+              <a:rPr lang="de-DE" dirty="0" err="1"/>
+              <a:t>which</a:t>
+            </a:r>
+            <a:r>
+              <a:rPr lang="de-DE" dirty="0"/>
+              <a:t> </a:t>
+            </a:r>
+            <a:r>
+              <a:rPr lang="de-DE" dirty="0" err="1"/>
+              <a:t>contains</a:t>
+            </a:r>
+            <a:r>
+              <a:rPr lang="de-DE" dirty="0"/>
+              <a:t> </a:t>
+            </a:r>
+            <a:r>
+              <a:rPr lang="de-DE" dirty="0" err="1"/>
+              <a:t>the</a:t>
+            </a:r>
+            <a:r>
+              <a:rPr lang="de-DE" dirty="0"/>
+              <a:t> </a:t>
+            </a:r>
+            <a:r>
+              <a:rPr lang="de-DE" dirty="0" err="1"/>
+              <a:t>latest</a:t>
+            </a:r>
+            <a:r>
+              <a:rPr lang="de-DE" dirty="0"/>
+              <a:t> </a:t>
+            </a:r>
+            <a:r>
+              <a:rPr lang="de-DE" dirty="0" err="1"/>
+              <a:t>timestamp</a:t>
+            </a:r>
+            <a:r>
+              <a:rPr lang="de-DE" dirty="0"/>
+              <a:t> on </a:t>
+            </a:r>
+            <a:r>
+              <a:rPr lang="de-DE" dirty="0" err="1"/>
+              <a:t>the</a:t>
+            </a:r>
+            <a:r>
+              <a:rPr lang="de-DE" dirty="0"/>
+              <a:t> top. </a:t>
+            </a:r>
+            <a:r>
+              <a:rPr lang="de-DE" dirty="0" err="1"/>
+              <a:t>Then</a:t>
+            </a:r>
+            <a:r>
+              <a:rPr lang="de-DE" dirty="0"/>
+              <a:t>, </a:t>
+            </a:r>
+            <a:r>
+              <a:rPr lang="de-DE" dirty="0" err="1"/>
+              <a:t>the</a:t>
+            </a:r>
+            <a:r>
+              <a:rPr lang="de-DE" dirty="0"/>
+              <a:t> </a:t>
+            </a:r>
+            <a:r>
+              <a:rPr lang="de-DE" dirty="0" err="1"/>
+              <a:t>three</a:t>
+            </a:r>
+            <a:r>
+              <a:rPr lang="de-DE" dirty="0"/>
+              <a:t> </a:t>
+            </a:r>
+            <a:r>
+              <a:rPr lang="de-DE" dirty="0" err="1"/>
+              <a:t>components</a:t>
+            </a:r>
+            <a:r>
+              <a:rPr lang="de-DE" dirty="0"/>
+              <a:t> </a:t>
+            </a:r>
+            <a:r>
+              <a:rPr lang="de-DE" dirty="0" err="1"/>
+              <a:t>longitude</a:t>
+            </a:r>
+            <a:r>
+              <a:rPr lang="de-DE" dirty="0"/>
+              <a:t>, </a:t>
+            </a:r>
+            <a:r>
+              <a:rPr lang="de-DE" dirty="0" err="1"/>
+              <a:t>latitude</a:t>
+            </a:r>
+            <a:r>
+              <a:rPr lang="de-DE" dirty="0"/>
+              <a:t> and </a:t>
+            </a:r>
+            <a:r>
+              <a:rPr lang="de-DE" dirty="0" err="1"/>
+              <a:t>altitude</a:t>
+            </a:r>
+            <a:r>
+              <a:rPr lang="de-DE" dirty="0"/>
+              <a:t> form </a:t>
+            </a:r>
+            <a:r>
+              <a:rPr lang="de-DE" dirty="0" err="1"/>
+              <a:t>the</a:t>
+            </a:r>
+            <a:r>
+              <a:rPr lang="de-DE" dirty="0"/>
+              <a:t> </a:t>
+            </a:r>
+            <a:r>
+              <a:rPr lang="de-DE" dirty="0" err="1"/>
+              <a:t>exact</a:t>
+            </a:r>
+            <a:r>
+              <a:rPr lang="de-DE" dirty="0"/>
+              <a:t> </a:t>
+            </a:r>
+            <a:r>
+              <a:rPr lang="de-DE" dirty="0" err="1"/>
+              <a:t>gps</a:t>
+            </a:r>
+            <a:r>
+              <a:rPr lang="de-DE" dirty="0"/>
+              <a:t> </a:t>
+            </a:r>
+            <a:r>
+              <a:rPr lang="de-DE" dirty="0" err="1"/>
+              <a:t>coordinates</a:t>
+            </a:r>
+            <a:r>
+              <a:rPr lang="de-DE" dirty="0"/>
+              <a:t> </a:t>
+            </a:r>
+            <a:r>
+              <a:rPr lang="de-DE" dirty="0" err="1"/>
+              <a:t>with</a:t>
+            </a:r>
+            <a:r>
+              <a:rPr lang="de-DE" dirty="0"/>
+              <a:t> </a:t>
+            </a:r>
+            <a:r>
+              <a:rPr lang="de-DE" dirty="0" err="1"/>
+              <a:t>the</a:t>
+            </a:r>
+            <a:r>
+              <a:rPr lang="de-DE" dirty="0"/>
+              <a:t> </a:t>
+            </a:r>
+            <a:r>
+              <a:rPr lang="de-DE" dirty="0" err="1"/>
+              <a:t>correpsonding</a:t>
+            </a:r>
+            <a:r>
+              <a:rPr lang="de-DE" dirty="0"/>
+              <a:t> </a:t>
+            </a:r>
+            <a:r>
+              <a:rPr lang="de-DE" dirty="0" err="1"/>
+              <a:t>accuracy</a:t>
+            </a:r>
+            <a:r>
+              <a:rPr lang="de-DE" dirty="0"/>
+              <a:t>. </a:t>
+            </a:r>
+            <a:r>
+              <a:rPr lang="de-DE" dirty="0" err="1"/>
+              <a:t>Since</a:t>
+            </a:r>
+            <a:r>
+              <a:rPr lang="de-DE" dirty="0"/>
+              <a:t> </a:t>
+            </a:r>
+            <a:r>
+              <a:rPr lang="de-DE" dirty="0" err="1"/>
+              <a:t>the</a:t>
+            </a:r>
+            <a:r>
+              <a:rPr lang="de-DE" dirty="0"/>
+              <a:t> </a:t>
+            </a:r>
+            <a:r>
+              <a:rPr lang="de-DE" dirty="0" err="1"/>
+              <a:t>coordinates</a:t>
+            </a:r>
+            <a:r>
+              <a:rPr lang="de-DE" dirty="0"/>
+              <a:t> </a:t>
+            </a:r>
+            <a:r>
+              <a:rPr lang="de-DE" dirty="0" err="1"/>
+              <a:t>are</a:t>
+            </a:r>
+            <a:r>
+              <a:rPr lang="de-DE" dirty="0"/>
+              <a:t> </a:t>
+            </a:r>
+            <a:r>
+              <a:rPr lang="de-DE" dirty="0" err="1"/>
+              <a:t>too</a:t>
+            </a:r>
+            <a:r>
+              <a:rPr lang="de-DE" dirty="0"/>
+              <a:t> </a:t>
+            </a:r>
+            <a:r>
+              <a:rPr lang="de-DE" dirty="0" err="1"/>
+              <a:t>complicated</a:t>
+            </a:r>
+            <a:r>
+              <a:rPr lang="de-DE" dirty="0"/>
+              <a:t> </a:t>
+            </a:r>
+            <a:r>
+              <a:rPr lang="de-DE" dirty="0" err="1"/>
+              <a:t>for</a:t>
+            </a:r>
+            <a:r>
+              <a:rPr lang="de-DE" dirty="0"/>
+              <a:t> </a:t>
+            </a:r>
+            <a:r>
+              <a:rPr lang="de-DE" dirty="0" err="1"/>
+              <a:t>alignment</a:t>
+            </a:r>
+            <a:r>
+              <a:rPr lang="de-DE" dirty="0"/>
+              <a:t>, </a:t>
+            </a:r>
+            <a:r>
+              <a:rPr lang="de-DE" dirty="0" err="1"/>
+              <a:t>we</a:t>
+            </a:r>
+            <a:r>
+              <a:rPr lang="de-DE" dirty="0"/>
+              <a:t> </a:t>
+            </a:r>
+            <a:r>
+              <a:rPr lang="de-DE" dirty="0" err="1"/>
+              <a:t>only</a:t>
+            </a:r>
+            <a:r>
+              <a:rPr lang="de-DE" dirty="0"/>
+              <a:t> </a:t>
+            </a:r>
+            <a:r>
+              <a:rPr lang="de-DE" dirty="0" err="1"/>
+              <a:t>used</a:t>
+            </a:r>
+            <a:r>
+              <a:rPr lang="de-DE" dirty="0"/>
+              <a:t> </a:t>
+            </a:r>
+            <a:r>
+              <a:rPr lang="de-DE" dirty="0" err="1"/>
+              <a:t>the</a:t>
+            </a:r>
+            <a:r>
+              <a:rPr lang="de-DE" dirty="0"/>
+              <a:t> </a:t>
+            </a:r>
+            <a:r>
+              <a:rPr lang="de-DE" dirty="0" err="1"/>
+              <a:t>location</a:t>
+            </a:r>
+            <a:r>
+              <a:rPr lang="de-DE" dirty="0"/>
+              <a:t> </a:t>
+            </a:r>
+            <a:r>
+              <a:rPr lang="de-DE" dirty="0" err="1"/>
+              <a:t>name</a:t>
+            </a:r>
+            <a:r>
+              <a:rPr lang="de-DE" dirty="0"/>
+              <a:t>, </a:t>
+            </a:r>
+            <a:r>
+              <a:rPr lang="de-DE" dirty="0" err="1"/>
+              <a:t>here</a:t>
+            </a:r>
+            <a:r>
+              <a:rPr lang="de-DE" dirty="0"/>
+              <a:t> on </a:t>
+            </a:r>
+            <a:r>
+              <a:rPr lang="de-DE" dirty="0" err="1"/>
+              <a:t>the</a:t>
+            </a:r>
+            <a:r>
+              <a:rPr lang="de-DE" dirty="0"/>
+              <a:t> </a:t>
+            </a:r>
+            <a:r>
+              <a:rPr lang="de-DE" dirty="0" err="1"/>
+              <a:t>right</a:t>
+            </a:r>
+            <a:r>
+              <a:rPr lang="de-DE" dirty="0"/>
+              <a:t>. So </a:t>
+            </a:r>
+            <a:r>
+              <a:rPr lang="de-DE" dirty="0" err="1"/>
+              <a:t>the</a:t>
+            </a:r>
+            <a:r>
+              <a:rPr lang="de-DE" dirty="0"/>
+              <a:t> </a:t>
+            </a:r>
+            <a:r>
+              <a:rPr lang="de-DE" dirty="0" err="1"/>
+              <a:t>next</a:t>
+            </a:r>
+            <a:r>
+              <a:rPr lang="de-DE" dirty="0"/>
+              <a:t> </a:t>
+            </a:r>
+            <a:r>
+              <a:rPr lang="de-DE" dirty="0" err="1"/>
+              <a:t>step</a:t>
+            </a:r>
+            <a:r>
+              <a:rPr lang="de-DE" dirty="0"/>
+              <a:t> </a:t>
+            </a:r>
+            <a:r>
+              <a:rPr lang="de-DE" dirty="0" err="1"/>
+              <a:t>is</a:t>
+            </a:r>
+            <a:r>
+              <a:rPr lang="de-DE" dirty="0"/>
+              <a:t> </a:t>
+            </a:r>
+            <a:r>
+              <a:rPr lang="de-DE" dirty="0" err="1"/>
+              <a:t>to</a:t>
+            </a:r>
+            <a:r>
+              <a:rPr lang="de-DE" dirty="0"/>
+              <a:t> </a:t>
+            </a:r>
+            <a:r>
+              <a:rPr lang="de-DE" dirty="0" err="1"/>
+              <a:t>sort</a:t>
+            </a:r>
+            <a:r>
+              <a:rPr lang="de-DE" dirty="0"/>
+              <a:t> </a:t>
+            </a:r>
+            <a:r>
+              <a:rPr lang="de-DE" dirty="0" err="1"/>
+              <a:t>every</a:t>
+            </a:r>
+            <a:r>
+              <a:rPr lang="de-DE" dirty="0"/>
+              <a:t> </a:t>
+            </a:r>
+            <a:r>
+              <a:rPr lang="de-DE" dirty="0" err="1"/>
+              <a:t>row</a:t>
+            </a:r>
+            <a:r>
+              <a:rPr lang="de-DE" dirty="0"/>
+              <a:t> </a:t>
+            </a:r>
+            <a:r>
+              <a:rPr lang="de-DE" dirty="0" err="1"/>
+              <a:t>by</a:t>
+            </a:r>
+            <a:r>
+              <a:rPr lang="de-DE" dirty="0"/>
+              <a:t> </a:t>
+            </a:r>
+            <a:r>
+              <a:rPr lang="de-DE" dirty="0" err="1"/>
+              <a:t>the</a:t>
+            </a:r>
+            <a:r>
+              <a:rPr lang="de-DE" dirty="0"/>
+              <a:t> </a:t>
+            </a:r>
+            <a:r>
+              <a:rPr lang="de-DE" dirty="0" err="1"/>
+              <a:t>earliest</a:t>
+            </a:r>
+            <a:r>
+              <a:rPr lang="de-DE" dirty="0"/>
+              <a:t> </a:t>
+            </a:r>
+            <a:r>
+              <a:rPr lang="de-DE" dirty="0" err="1"/>
+              <a:t>timestamp</a:t>
+            </a:r>
+            <a:r>
+              <a:rPr lang="de-DE" dirty="0"/>
+              <a:t> and </a:t>
+            </a:r>
+            <a:r>
+              <a:rPr lang="de-DE" dirty="0" err="1"/>
+              <a:t>throw</a:t>
+            </a:r>
+            <a:r>
+              <a:rPr lang="de-DE" dirty="0"/>
+              <a:t> </a:t>
+            </a:r>
+            <a:r>
+              <a:rPr lang="de-DE" dirty="0" err="1"/>
+              <a:t>away</a:t>
+            </a:r>
+            <a:r>
+              <a:rPr lang="de-DE" dirty="0"/>
+              <a:t> </a:t>
+            </a:r>
+            <a:r>
+              <a:rPr lang="de-DE" dirty="0" err="1"/>
+              <a:t>everything</a:t>
+            </a:r>
+            <a:r>
+              <a:rPr lang="de-DE" dirty="0"/>
+              <a:t> </a:t>
+            </a:r>
+            <a:r>
+              <a:rPr lang="de-DE" dirty="0" err="1"/>
+              <a:t>else</a:t>
+            </a:r>
+            <a:r>
+              <a:rPr lang="de-DE" dirty="0"/>
+              <a:t> </a:t>
+            </a:r>
+            <a:r>
+              <a:rPr lang="de-DE" dirty="0" err="1"/>
+              <a:t>except</a:t>
+            </a:r>
+            <a:r>
+              <a:rPr lang="de-DE" dirty="0"/>
+              <a:t> </a:t>
+            </a:r>
+            <a:r>
+              <a:rPr lang="de-DE" dirty="0" err="1"/>
+              <a:t>the</a:t>
+            </a:r>
+            <a:r>
+              <a:rPr lang="de-DE" dirty="0"/>
+              <a:t> </a:t>
+            </a:r>
+            <a:r>
+              <a:rPr lang="de-DE" dirty="0" err="1"/>
+              <a:t>location</a:t>
+            </a:r>
+            <a:r>
+              <a:rPr lang="de-DE" dirty="0"/>
+              <a:t> </a:t>
+            </a:r>
+            <a:r>
+              <a:rPr lang="de-DE" dirty="0" err="1"/>
+              <a:t>name</a:t>
+            </a:r>
+            <a:r>
+              <a:rPr lang="de-DE" dirty="0"/>
+              <a:t>. </a:t>
+            </a:r>
+            <a:r>
+              <a:rPr lang="de-DE" dirty="0" err="1"/>
+              <a:t>Then</a:t>
+            </a:r>
+            <a:r>
+              <a:rPr lang="de-DE" dirty="0"/>
+              <a:t>, </a:t>
+            </a:r>
+            <a:r>
+              <a:rPr lang="de-DE" dirty="0" err="1"/>
+              <a:t>every</a:t>
+            </a:r>
+            <a:r>
+              <a:rPr lang="de-DE" dirty="0"/>
+              <a:t> </a:t>
+            </a:r>
+            <a:r>
+              <a:rPr lang="de-DE" dirty="0" err="1"/>
+              <a:t>location</a:t>
+            </a:r>
+            <a:r>
+              <a:rPr lang="de-DE" dirty="0"/>
+              <a:t> </a:t>
+            </a:r>
+            <a:r>
+              <a:rPr lang="de-DE" dirty="0" err="1"/>
+              <a:t>is</a:t>
+            </a:r>
+            <a:r>
+              <a:rPr lang="de-DE" dirty="0"/>
+              <a:t> </a:t>
+            </a:r>
+            <a:r>
+              <a:rPr lang="de-DE" dirty="0" err="1"/>
+              <a:t>assigned</a:t>
+            </a:r>
+            <a:r>
+              <a:rPr lang="de-DE" dirty="0"/>
+              <a:t> </a:t>
+            </a:r>
+            <a:r>
+              <a:rPr lang="de-DE" dirty="0" err="1"/>
+              <a:t>to</a:t>
+            </a:r>
+            <a:r>
+              <a:rPr lang="de-DE" dirty="0"/>
+              <a:t> a </a:t>
+            </a:r>
+            <a:r>
+              <a:rPr lang="de-DE" dirty="0" err="1"/>
+              <a:t>character</a:t>
+            </a:r>
+            <a:r>
+              <a:rPr lang="de-DE" dirty="0"/>
+              <a:t> </a:t>
+            </a:r>
+            <a:r>
+              <a:rPr lang="de-DE" dirty="0" err="1"/>
+              <a:t>from</a:t>
+            </a:r>
+            <a:r>
+              <a:rPr lang="de-DE" dirty="0"/>
+              <a:t> </a:t>
+            </a:r>
+            <a:r>
+              <a:rPr lang="de-DE" dirty="0" err="1"/>
+              <a:t>the</a:t>
+            </a:r>
+            <a:r>
+              <a:rPr lang="de-DE" dirty="0"/>
+              <a:t> </a:t>
+            </a:r>
+            <a:r>
+              <a:rPr lang="de-DE" dirty="0" err="1"/>
+              <a:t>alphabet</a:t>
+            </a:r>
+            <a:r>
+              <a:rPr lang="de-DE" dirty="0"/>
+              <a:t> </a:t>
+            </a:r>
+            <a:r>
+              <a:rPr lang="de-DE" dirty="0" err="1"/>
+              <a:t>which</a:t>
+            </a:r>
+            <a:r>
+              <a:rPr lang="de-DE" dirty="0"/>
+              <a:t> </a:t>
+            </a:r>
+            <a:r>
+              <a:rPr lang="de-DE" dirty="0" err="1"/>
+              <a:t>is</a:t>
+            </a:r>
+            <a:r>
+              <a:rPr lang="de-DE" dirty="0"/>
+              <a:t> </a:t>
+            </a:r>
+            <a:r>
+              <a:rPr lang="de-DE" dirty="0" err="1"/>
+              <a:t>sufficient</a:t>
+            </a:r>
+            <a:r>
+              <a:rPr lang="de-DE" dirty="0"/>
+              <a:t> </a:t>
+            </a:r>
+            <a:r>
+              <a:rPr lang="de-DE" dirty="0" err="1"/>
+              <a:t>for</a:t>
+            </a:r>
+            <a:r>
+              <a:rPr lang="de-DE" dirty="0"/>
+              <a:t> personal </a:t>
+            </a:r>
+            <a:r>
+              <a:rPr lang="de-DE" dirty="0" err="1"/>
+              <a:t>use</a:t>
+            </a:r>
+            <a:r>
+              <a:rPr lang="de-DE" dirty="0"/>
+              <a:t>. Last, </a:t>
+            </a:r>
+            <a:r>
+              <a:rPr lang="de-DE" dirty="0" err="1"/>
+              <a:t>the</a:t>
+            </a:r>
+            <a:r>
+              <a:rPr lang="de-DE" dirty="0"/>
+              <a:t> </a:t>
+            </a:r>
+            <a:r>
+              <a:rPr lang="de-DE" dirty="0" err="1"/>
+              <a:t>location</a:t>
+            </a:r>
+            <a:r>
+              <a:rPr lang="de-DE" dirty="0"/>
+              <a:t> </a:t>
+            </a:r>
+            <a:r>
+              <a:rPr lang="de-DE" dirty="0" err="1"/>
+              <a:t>names</a:t>
+            </a:r>
+            <a:r>
+              <a:rPr lang="de-DE" dirty="0"/>
+              <a:t> form a </a:t>
+            </a:r>
+            <a:r>
+              <a:rPr lang="de-DE" dirty="0" err="1"/>
+              <a:t>sequence</a:t>
+            </a:r>
+            <a:r>
+              <a:rPr lang="de-DE" dirty="0"/>
+              <a:t> out </a:t>
+            </a:r>
+            <a:r>
+              <a:rPr lang="de-DE" dirty="0" err="1"/>
+              <a:t>of</a:t>
+            </a:r>
+            <a:r>
+              <a:rPr lang="de-DE" dirty="0"/>
+              <a:t> </a:t>
+            </a:r>
+            <a:r>
+              <a:rPr lang="de-DE" dirty="0" err="1"/>
+              <a:t>the</a:t>
+            </a:r>
+            <a:r>
+              <a:rPr lang="de-DE" dirty="0"/>
+              <a:t> </a:t>
+            </a:r>
+            <a:r>
+              <a:rPr lang="de-DE" dirty="0" err="1"/>
+              <a:t>assigned</a:t>
+            </a:r>
+            <a:r>
+              <a:rPr lang="de-DE" dirty="0"/>
+              <a:t> </a:t>
+            </a:r>
+            <a:r>
+              <a:rPr lang="de-DE" dirty="0" err="1"/>
+              <a:t>characters</a:t>
+            </a:r>
+            <a:r>
+              <a:rPr lang="de-DE" dirty="0"/>
+              <a:t> in </a:t>
+            </a:r>
+            <a:r>
+              <a:rPr lang="de-DE" dirty="0" err="1"/>
+              <a:t>the</a:t>
+            </a:r>
+            <a:r>
+              <a:rPr lang="de-DE" dirty="0"/>
+              <a:t> </a:t>
+            </a:r>
+            <a:r>
+              <a:rPr lang="de-DE" dirty="0" err="1"/>
+              <a:t>timestamp</a:t>
+            </a:r>
+            <a:r>
+              <a:rPr lang="de-DE" dirty="0"/>
+              <a:t> </a:t>
+            </a:r>
+            <a:r>
+              <a:rPr lang="de-DE" dirty="0" err="1"/>
+              <a:t>order</a:t>
+            </a:r>
+            <a:r>
+              <a:rPr lang="de-DE" dirty="0"/>
+              <a:t>. This </a:t>
+            </a:r>
+            <a:r>
+              <a:rPr lang="de-DE" dirty="0" err="1"/>
+              <a:t>is</a:t>
+            </a:r>
+            <a:r>
+              <a:rPr lang="de-DE" dirty="0"/>
+              <a:t> </a:t>
+            </a:r>
+            <a:r>
+              <a:rPr lang="de-DE" dirty="0" err="1"/>
+              <a:t>only</a:t>
+            </a:r>
+            <a:r>
+              <a:rPr lang="de-DE" dirty="0"/>
+              <a:t> a </a:t>
+            </a:r>
+            <a:r>
+              <a:rPr lang="de-DE" dirty="0" err="1"/>
+              <a:t>small</a:t>
+            </a:r>
+            <a:r>
+              <a:rPr lang="de-DE" dirty="0"/>
+              <a:t> </a:t>
+            </a:r>
+            <a:r>
+              <a:rPr lang="de-DE" dirty="0" err="1"/>
+              <a:t>example</a:t>
+            </a:r>
+            <a:r>
+              <a:rPr lang="de-DE" dirty="0"/>
+              <a:t>. </a:t>
+            </a:r>
+            <a:r>
+              <a:rPr lang="de-DE" dirty="0" err="1"/>
+              <a:t>Usually</a:t>
+            </a:r>
+            <a:r>
+              <a:rPr lang="de-DE" dirty="0"/>
+              <a:t> </a:t>
+            </a:r>
+            <a:r>
+              <a:rPr lang="de-DE" dirty="0" err="1"/>
+              <a:t>the</a:t>
+            </a:r>
+            <a:r>
+              <a:rPr lang="de-DE" dirty="0"/>
+              <a:t> </a:t>
+            </a:r>
+            <a:r>
+              <a:rPr lang="de-DE" dirty="0" err="1"/>
+              <a:t>sequences</a:t>
+            </a:r>
+            <a:r>
+              <a:rPr lang="de-DE" dirty="0"/>
+              <a:t> </a:t>
+            </a:r>
+            <a:r>
+              <a:rPr lang="de-DE" dirty="0" err="1"/>
+              <a:t>are</a:t>
+            </a:r>
+            <a:r>
+              <a:rPr lang="de-DE" dirty="0"/>
+              <a:t> </a:t>
+            </a:r>
+            <a:r>
+              <a:rPr lang="de-DE" dirty="0" err="1"/>
+              <a:t>much</a:t>
+            </a:r>
+            <a:r>
+              <a:rPr lang="de-DE" dirty="0"/>
+              <a:t> </a:t>
+            </a:r>
+            <a:r>
+              <a:rPr lang="de-DE" dirty="0" err="1"/>
+              <a:t>longer</a:t>
+            </a:r>
+            <a:r>
+              <a:rPr lang="de-DE" dirty="0"/>
+              <a:t> </a:t>
+            </a:r>
+            <a:r>
+              <a:rPr lang="de-DE" dirty="0" err="1"/>
+              <a:t>than</a:t>
+            </a:r>
+            <a:r>
+              <a:rPr lang="de-DE" dirty="0"/>
+              <a:t> </a:t>
+            </a:r>
+            <a:r>
+              <a:rPr lang="de-DE" dirty="0" err="1"/>
+              <a:t>that</a:t>
+            </a:r>
+            <a:r>
+              <a:rPr lang="de-DE" dirty="0"/>
+              <a:t>.</a:t>
+            </a:r>
           </a:p>
         </p:txBody>
       </p:sp>
@@ -650,7 +1621,474 @@
           <a:bodyPr/>
           <a:lstStyle/>
           <a:p>
-            <a:endParaRPr lang="de-DE" dirty="0"/>
+            <a:r>
+              <a:rPr lang="de-DE" dirty="0"/>
+              <a:t>In </a:t>
+            </a:r>
+            <a:r>
+              <a:rPr lang="de-DE" dirty="0" err="1"/>
+              <a:t>this</a:t>
+            </a:r>
+            <a:r>
+              <a:rPr lang="de-DE" dirty="0"/>
+              <a:t> </a:t>
+            </a:r>
+            <a:r>
+              <a:rPr lang="de-DE" dirty="0" err="1"/>
+              <a:t>approach</a:t>
+            </a:r>
+            <a:r>
+              <a:rPr lang="de-DE" dirty="0"/>
+              <a:t> </a:t>
+            </a:r>
+            <a:r>
+              <a:rPr lang="de-DE" dirty="0" err="1"/>
+              <a:t>we</a:t>
+            </a:r>
+            <a:r>
+              <a:rPr lang="de-DE" dirty="0"/>
+              <a:t> also </a:t>
+            </a:r>
+            <a:r>
+              <a:rPr lang="de-DE" dirty="0" err="1"/>
+              <a:t>introduced</a:t>
+            </a:r>
+            <a:r>
+              <a:rPr lang="de-DE" dirty="0"/>
+              <a:t> a </a:t>
+            </a:r>
+            <a:r>
+              <a:rPr lang="de-DE" dirty="0" err="1"/>
+              <a:t>compression</a:t>
+            </a:r>
+            <a:r>
+              <a:rPr lang="de-DE" dirty="0"/>
+              <a:t> </a:t>
+            </a:r>
+            <a:r>
+              <a:rPr lang="de-DE" dirty="0" err="1"/>
+              <a:t>method</a:t>
+            </a:r>
+            <a:r>
+              <a:rPr lang="de-DE" dirty="0"/>
+              <a:t>. </a:t>
+            </a:r>
+            <a:r>
+              <a:rPr lang="de-DE" dirty="0" err="1"/>
+              <a:t>Since</a:t>
+            </a:r>
+            <a:r>
+              <a:rPr lang="de-DE" dirty="0"/>
+              <a:t> </a:t>
+            </a:r>
+            <a:r>
+              <a:rPr lang="de-DE" dirty="0" err="1"/>
+              <a:t>the</a:t>
+            </a:r>
+            <a:r>
+              <a:rPr lang="de-DE" dirty="0"/>
+              <a:t> </a:t>
+            </a:r>
+            <a:r>
+              <a:rPr lang="de-DE" dirty="0" err="1"/>
+              <a:t>data</a:t>
+            </a:r>
+            <a:r>
+              <a:rPr lang="de-DE" dirty="0"/>
+              <a:t> </a:t>
+            </a:r>
+            <a:r>
+              <a:rPr lang="de-DE" dirty="0" err="1"/>
+              <a:t>is</a:t>
+            </a:r>
+            <a:r>
+              <a:rPr lang="de-DE" dirty="0"/>
+              <a:t> </a:t>
+            </a:r>
+            <a:r>
+              <a:rPr lang="de-DE" dirty="0" err="1"/>
+              <a:t>sometimes</a:t>
+            </a:r>
+            <a:r>
+              <a:rPr lang="de-DE" dirty="0"/>
+              <a:t> </a:t>
+            </a:r>
+            <a:r>
+              <a:rPr lang="de-DE" dirty="0" err="1"/>
+              <a:t>being</a:t>
+            </a:r>
+            <a:r>
+              <a:rPr lang="de-DE" dirty="0"/>
+              <a:t> </a:t>
+            </a:r>
+            <a:r>
+              <a:rPr lang="de-DE" dirty="0" err="1"/>
+              <a:t>collected</a:t>
+            </a:r>
+            <a:r>
+              <a:rPr lang="de-DE" dirty="0"/>
+              <a:t> in </a:t>
+            </a:r>
+            <a:r>
+              <a:rPr lang="de-DE" dirty="0" err="1"/>
+              <a:t>random</a:t>
+            </a:r>
+            <a:r>
+              <a:rPr lang="de-DE" dirty="0"/>
+              <a:t> time </a:t>
+            </a:r>
+            <a:r>
+              <a:rPr lang="de-DE" dirty="0" err="1"/>
+              <a:t>intervals</a:t>
+            </a:r>
+            <a:r>
+              <a:rPr lang="de-DE" dirty="0"/>
+              <a:t>, </a:t>
+            </a:r>
+            <a:r>
+              <a:rPr lang="de-DE" dirty="0" err="1"/>
+              <a:t>the</a:t>
+            </a:r>
+            <a:r>
+              <a:rPr lang="de-DE" dirty="0"/>
+              <a:t> </a:t>
+            </a:r>
+            <a:r>
+              <a:rPr lang="de-DE" dirty="0" err="1"/>
+              <a:t>sets</a:t>
+            </a:r>
+            <a:r>
+              <a:rPr lang="de-DE" dirty="0"/>
+              <a:t> </a:t>
+            </a:r>
+            <a:r>
+              <a:rPr lang="de-DE" dirty="0" err="1"/>
+              <a:t>contain</a:t>
+            </a:r>
+            <a:r>
+              <a:rPr lang="de-DE" dirty="0"/>
+              <a:t> redundant </a:t>
+            </a:r>
+            <a:r>
+              <a:rPr lang="de-DE" dirty="0" err="1"/>
+              <a:t>information</a:t>
+            </a:r>
+            <a:r>
+              <a:rPr lang="de-DE" dirty="0"/>
+              <a:t>. This </a:t>
+            </a:r>
+            <a:r>
+              <a:rPr lang="de-DE" dirty="0" err="1"/>
+              <a:t>is</a:t>
+            </a:r>
+            <a:r>
+              <a:rPr lang="de-DE" dirty="0"/>
+              <a:t> </a:t>
+            </a:r>
+            <a:r>
+              <a:rPr lang="de-DE" dirty="0" err="1"/>
+              <a:t>why</a:t>
+            </a:r>
+            <a:r>
+              <a:rPr lang="de-DE" dirty="0"/>
+              <a:t> </a:t>
+            </a:r>
+            <a:r>
+              <a:rPr lang="de-DE" dirty="0" err="1"/>
+              <a:t>we</a:t>
+            </a:r>
+            <a:r>
+              <a:rPr lang="de-DE" dirty="0"/>
+              <a:t> </a:t>
+            </a:r>
+            <a:r>
+              <a:rPr lang="de-DE" dirty="0" err="1"/>
+              <a:t>use</a:t>
+            </a:r>
+            <a:r>
+              <a:rPr lang="de-DE" dirty="0"/>
+              <a:t> </a:t>
+            </a:r>
+            <a:r>
+              <a:rPr lang="de-DE" dirty="0" err="1"/>
+              <a:t>this</a:t>
+            </a:r>
+            <a:r>
+              <a:rPr lang="de-DE" dirty="0"/>
+              <a:t> </a:t>
+            </a:r>
+            <a:r>
+              <a:rPr lang="de-DE" dirty="0" err="1"/>
+              <a:t>method</a:t>
+            </a:r>
+            <a:r>
+              <a:rPr lang="de-DE" dirty="0"/>
+              <a:t> </a:t>
+            </a:r>
+            <a:r>
+              <a:rPr lang="de-DE" dirty="0" err="1"/>
+              <a:t>to</a:t>
+            </a:r>
+            <a:r>
+              <a:rPr lang="de-DE" dirty="0"/>
+              <a:t> </a:t>
+            </a:r>
+            <a:r>
+              <a:rPr lang="de-DE" dirty="0" err="1"/>
+              <a:t>remove</a:t>
+            </a:r>
+            <a:r>
+              <a:rPr lang="de-DE" dirty="0"/>
+              <a:t> repetitive </a:t>
+            </a:r>
+            <a:r>
+              <a:rPr lang="de-DE" dirty="0" err="1"/>
+              <a:t>characters</a:t>
+            </a:r>
+            <a:r>
+              <a:rPr lang="de-DE" dirty="0"/>
+              <a:t> </a:t>
+            </a:r>
+            <a:r>
+              <a:rPr lang="de-DE" dirty="0" err="1"/>
+              <a:t>of</a:t>
+            </a:r>
+            <a:r>
+              <a:rPr lang="de-DE" dirty="0"/>
+              <a:t> a </a:t>
+            </a:r>
+            <a:r>
+              <a:rPr lang="de-DE" dirty="0" err="1"/>
+              <a:t>sequence</a:t>
+            </a:r>
+            <a:r>
+              <a:rPr lang="de-DE" dirty="0"/>
+              <a:t> </a:t>
+            </a:r>
+            <a:r>
+              <a:rPr lang="de-DE" dirty="0" err="1"/>
+              <a:t>within</a:t>
+            </a:r>
+            <a:r>
+              <a:rPr lang="de-DE" dirty="0"/>
+              <a:t> a 30 </a:t>
+            </a:r>
+            <a:r>
+              <a:rPr lang="de-DE" dirty="0" err="1"/>
+              <a:t>minutes</a:t>
+            </a:r>
+            <a:r>
+              <a:rPr lang="de-DE" dirty="0"/>
+              <a:t> </a:t>
+            </a:r>
+            <a:r>
+              <a:rPr lang="de-DE" dirty="0" err="1"/>
+              <a:t>interval</a:t>
+            </a:r>
+            <a:r>
+              <a:rPr lang="de-DE" dirty="0"/>
+              <a:t>. </a:t>
+            </a:r>
+            <a:r>
+              <a:rPr lang="de-DE" dirty="0" err="1"/>
+              <a:t>We</a:t>
+            </a:r>
+            <a:r>
+              <a:rPr lang="de-DE" dirty="0"/>
+              <a:t> </a:t>
+            </a:r>
+            <a:r>
+              <a:rPr lang="de-DE" dirty="0" err="1"/>
+              <a:t>tested</a:t>
+            </a:r>
+            <a:r>
+              <a:rPr lang="de-DE" dirty="0"/>
+              <a:t> </a:t>
+            </a:r>
+            <a:r>
+              <a:rPr lang="de-DE" dirty="0" err="1"/>
+              <a:t>it</a:t>
+            </a:r>
+            <a:r>
+              <a:rPr lang="de-DE" dirty="0"/>
+              <a:t> on all </a:t>
+            </a:r>
+            <a:r>
+              <a:rPr lang="de-DE" dirty="0" err="1"/>
+              <a:t>three</a:t>
+            </a:r>
+            <a:r>
+              <a:rPr lang="de-DE" dirty="0"/>
+              <a:t> </a:t>
+            </a:r>
+            <a:r>
+              <a:rPr lang="de-DE" dirty="0" err="1"/>
+              <a:t>available</a:t>
+            </a:r>
+            <a:r>
+              <a:rPr lang="de-DE" dirty="0"/>
+              <a:t> </a:t>
+            </a:r>
+            <a:r>
+              <a:rPr lang="de-DE" dirty="0" err="1"/>
+              <a:t>sequences</a:t>
+            </a:r>
+            <a:r>
+              <a:rPr lang="de-DE" dirty="0"/>
+              <a:t>. As </a:t>
+            </a:r>
+            <a:r>
+              <a:rPr lang="de-DE" dirty="0" err="1"/>
+              <a:t>you</a:t>
+            </a:r>
+            <a:r>
+              <a:rPr lang="de-DE" dirty="0"/>
+              <a:t> </a:t>
+            </a:r>
+            <a:r>
+              <a:rPr lang="de-DE" dirty="0" err="1"/>
+              <a:t>can</a:t>
+            </a:r>
+            <a:r>
+              <a:rPr lang="de-DE" dirty="0"/>
+              <a:t> </a:t>
+            </a:r>
+            <a:r>
+              <a:rPr lang="de-DE" dirty="0" err="1"/>
+              <a:t>see</a:t>
+            </a:r>
+            <a:r>
+              <a:rPr lang="de-DE" dirty="0"/>
+              <a:t>, </a:t>
+            </a:r>
+            <a:r>
+              <a:rPr lang="de-DE" dirty="0" err="1"/>
+              <a:t>this</a:t>
+            </a:r>
+            <a:r>
+              <a:rPr lang="de-DE" dirty="0"/>
+              <a:t> </a:t>
+            </a:r>
+            <a:r>
+              <a:rPr lang="de-DE" dirty="0" err="1"/>
+              <a:t>method</a:t>
+            </a:r>
+            <a:r>
+              <a:rPr lang="de-DE" dirty="0"/>
+              <a:t> </a:t>
+            </a:r>
+            <a:r>
+              <a:rPr lang="de-DE" dirty="0" err="1"/>
+              <a:t>compresses</a:t>
+            </a:r>
+            <a:r>
+              <a:rPr lang="de-DE" dirty="0"/>
+              <a:t> </a:t>
+            </a:r>
+            <a:r>
+              <a:rPr lang="de-DE" dirty="0" err="1"/>
+              <a:t>them</a:t>
+            </a:r>
+            <a:r>
+              <a:rPr lang="de-DE" dirty="0"/>
+              <a:t> </a:t>
+            </a:r>
+            <a:r>
+              <a:rPr lang="de-DE" dirty="0" err="1"/>
+              <a:t>greatly</a:t>
+            </a:r>
+            <a:r>
+              <a:rPr lang="de-DE" dirty="0"/>
+              <a:t> </a:t>
+            </a:r>
+            <a:r>
+              <a:rPr lang="de-DE" dirty="0" err="1"/>
+              <a:t>by</a:t>
+            </a:r>
+            <a:r>
+              <a:rPr lang="de-DE" dirty="0"/>
+              <a:t> </a:t>
+            </a:r>
+            <a:r>
+              <a:rPr lang="de-DE" dirty="0" err="1"/>
+              <a:t>about</a:t>
+            </a:r>
+            <a:r>
+              <a:rPr lang="de-DE" dirty="0"/>
+              <a:t> 75 </a:t>
+            </a:r>
+            <a:r>
+              <a:rPr lang="de-DE" dirty="0" err="1"/>
+              <a:t>to</a:t>
+            </a:r>
+            <a:r>
+              <a:rPr lang="de-DE" dirty="0"/>
+              <a:t> 80 </a:t>
+            </a:r>
+            <a:r>
+              <a:rPr lang="de-DE" dirty="0" err="1"/>
+              <a:t>percent</a:t>
+            </a:r>
+            <a:r>
+              <a:rPr lang="de-DE" dirty="0"/>
+              <a:t>. This </a:t>
+            </a:r>
+            <a:r>
+              <a:rPr lang="de-DE" dirty="0" err="1"/>
+              <a:t>enables</a:t>
+            </a:r>
+            <a:r>
+              <a:rPr lang="de-DE" dirty="0"/>
+              <a:t> </a:t>
+            </a:r>
+            <a:r>
+              <a:rPr lang="de-DE" dirty="0" err="1"/>
+              <a:t>us</a:t>
+            </a:r>
+            <a:r>
+              <a:rPr lang="de-DE" dirty="0"/>
+              <a:t> </a:t>
+            </a:r>
+            <a:r>
+              <a:rPr lang="de-DE" dirty="0" err="1"/>
+              <a:t>to</a:t>
+            </a:r>
+            <a:r>
+              <a:rPr lang="de-DE" dirty="0"/>
+              <a:t> </a:t>
+            </a:r>
+            <a:r>
+              <a:rPr lang="de-DE" dirty="0" err="1"/>
+              <a:t>work</a:t>
+            </a:r>
+            <a:r>
+              <a:rPr lang="de-DE" dirty="0"/>
+              <a:t> on </a:t>
+            </a:r>
+            <a:r>
+              <a:rPr lang="de-DE" dirty="0" err="1"/>
+              <a:t>low</a:t>
+            </a:r>
+            <a:r>
+              <a:rPr lang="de-DE" dirty="0"/>
+              <a:t> </a:t>
+            </a:r>
+            <a:r>
+              <a:rPr lang="de-DE" dirty="0" err="1"/>
+              <a:t>performance</a:t>
+            </a:r>
+            <a:r>
+              <a:rPr lang="de-DE" dirty="0"/>
+              <a:t> </a:t>
+            </a:r>
+            <a:r>
+              <a:rPr lang="de-DE" dirty="0" err="1"/>
+              <a:t>devices</a:t>
+            </a:r>
+            <a:r>
+              <a:rPr lang="de-DE" dirty="0"/>
+              <a:t>.</a:t>
+            </a:r>
           </a:p>
         </p:txBody>
       </p:sp>
@@ -680,7 +2118,7 @@
     </p:spTree>
     <p:extLst>
       <p:ext uri="{BB962C8B-B14F-4D97-AF65-F5344CB8AC3E}">
-        <p14:creationId xmlns:p14="http://schemas.microsoft.com/office/powerpoint/2010/main" val="1154059475"/>
+        <p14:creationId xmlns:p14="http://schemas.microsoft.com/office/powerpoint/2010/main" val="142671871"/>
       </p:ext>
     </p:extLst>
   </p:cSld>
@@ -734,7 +2172,582 @@
           <a:bodyPr/>
           <a:lstStyle/>
           <a:p>
-            <a:endParaRPr lang="de-DE" dirty="0"/>
+            <a:r>
+              <a:rPr lang="de-DE" dirty="0" err="1"/>
+              <a:t>When</a:t>
+            </a:r>
+            <a:r>
+              <a:rPr lang="de-DE" dirty="0"/>
+              <a:t> </a:t>
+            </a:r>
+            <a:r>
+              <a:rPr lang="de-DE" dirty="0" err="1"/>
+              <a:t>we</a:t>
+            </a:r>
+            <a:r>
+              <a:rPr lang="de-DE" dirty="0"/>
+              <a:t> </a:t>
+            </a:r>
+            <a:r>
+              <a:rPr lang="de-DE" dirty="0" err="1"/>
+              <a:t>have</a:t>
+            </a:r>
+            <a:r>
+              <a:rPr lang="de-DE" dirty="0"/>
+              <a:t> </a:t>
+            </a:r>
+            <a:r>
+              <a:rPr lang="de-DE" dirty="0" err="1"/>
+              <a:t>the</a:t>
+            </a:r>
+            <a:r>
+              <a:rPr lang="de-DE" dirty="0"/>
+              <a:t> </a:t>
+            </a:r>
+            <a:r>
+              <a:rPr lang="de-DE" dirty="0" err="1"/>
+              <a:t>sequence</a:t>
+            </a:r>
+            <a:r>
+              <a:rPr lang="de-DE" dirty="0"/>
+              <a:t>, original </a:t>
+            </a:r>
+            <a:r>
+              <a:rPr lang="de-DE" dirty="0" err="1"/>
+              <a:t>or</a:t>
+            </a:r>
+            <a:r>
+              <a:rPr lang="de-DE" dirty="0"/>
+              <a:t> </a:t>
+            </a:r>
+            <a:r>
+              <a:rPr lang="de-DE" dirty="0" err="1"/>
+              <a:t>compressed</a:t>
+            </a:r>
+            <a:r>
+              <a:rPr lang="de-DE" dirty="0"/>
+              <a:t>, </a:t>
+            </a:r>
+            <a:r>
+              <a:rPr lang="de-DE" dirty="0" err="1"/>
+              <a:t>the</a:t>
+            </a:r>
+            <a:r>
+              <a:rPr lang="de-DE" dirty="0"/>
+              <a:t> </a:t>
+            </a:r>
+            <a:r>
+              <a:rPr lang="de-DE" dirty="0" err="1"/>
+              <a:t>next</a:t>
+            </a:r>
+            <a:r>
+              <a:rPr lang="de-DE" dirty="0"/>
+              <a:t> </a:t>
+            </a:r>
+            <a:r>
+              <a:rPr lang="de-DE" dirty="0" err="1"/>
+              <a:t>step</a:t>
+            </a:r>
+            <a:r>
+              <a:rPr lang="de-DE" dirty="0"/>
+              <a:t> </a:t>
+            </a:r>
+            <a:r>
+              <a:rPr lang="de-DE" dirty="0" err="1"/>
+              <a:t>is</a:t>
+            </a:r>
+            <a:r>
+              <a:rPr lang="de-DE" dirty="0"/>
+              <a:t> </a:t>
+            </a:r>
+            <a:r>
+              <a:rPr lang="de-DE" dirty="0" err="1"/>
+              <a:t>now</a:t>
+            </a:r>
+            <a:r>
+              <a:rPr lang="de-DE" dirty="0"/>
+              <a:t> </a:t>
+            </a:r>
+            <a:r>
+              <a:rPr lang="de-DE" dirty="0" err="1"/>
+              <a:t>to</a:t>
+            </a:r>
+            <a:r>
+              <a:rPr lang="de-DE" dirty="0"/>
+              <a:t> </a:t>
+            </a:r>
+            <a:r>
+              <a:rPr lang="de-DE" dirty="0" err="1"/>
+              <a:t>predict</a:t>
+            </a:r>
+            <a:r>
+              <a:rPr lang="de-DE" dirty="0"/>
+              <a:t> </a:t>
+            </a:r>
+            <a:r>
+              <a:rPr lang="de-DE" dirty="0" err="1"/>
+              <a:t>the</a:t>
+            </a:r>
+            <a:r>
+              <a:rPr lang="de-DE" dirty="0"/>
+              <a:t> </a:t>
+            </a:r>
+            <a:r>
+              <a:rPr lang="de-DE" dirty="0" err="1"/>
+              <a:t>next</a:t>
+            </a:r>
+            <a:r>
+              <a:rPr lang="de-DE" dirty="0"/>
+              <a:t> </a:t>
+            </a:r>
+            <a:r>
+              <a:rPr lang="de-DE" dirty="0" err="1"/>
+              <a:t>characters</a:t>
+            </a:r>
+            <a:r>
+              <a:rPr lang="de-DE" dirty="0"/>
+              <a:t> after </a:t>
+            </a:r>
+            <a:r>
+              <a:rPr lang="de-DE" dirty="0" err="1"/>
+              <a:t>the</a:t>
+            </a:r>
+            <a:r>
+              <a:rPr lang="de-DE" dirty="0"/>
+              <a:t> </a:t>
+            </a:r>
+            <a:r>
+              <a:rPr lang="de-DE" dirty="0" err="1"/>
+              <a:t>sequence</a:t>
+            </a:r>
+            <a:r>
+              <a:rPr lang="de-DE" dirty="0"/>
+              <a:t>. </a:t>
+            </a:r>
+            <a:r>
+              <a:rPr lang="de-DE" dirty="0" err="1"/>
+              <a:t>We</a:t>
+            </a:r>
+            <a:r>
+              <a:rPr lang="de-DE" dirty="0"/>
+              <a:t> </a:t>
+            </a:r>
+            <a:r>
+              <a:rPr lang="de-DE" dirty="0" err="1"/>
+              <a:t>call</a:t>
+            </a:r>
+            <a:r>
+              <a:rPr lang="de-DE" dirty="0"/>
+              <a:t> </a:t>
+            </a:r>
+            <a:r>
+              <a:rPr lang="de-DE" dirty="0" err="1"/>
+              <a:t>the</a:t>
+            </a:r>
+            <a:r>
+              <a:rPr lang="de-DE" dirty="0"/>
+              <a:t> </a:t>
+            </a:r>
+            <a:r>
+              <a:rPr lang="de-DE" dirty="0" err="1"/>
+              <a:t>whole</a:t>
+            </a:r>
+            <a:r>
+              <a:rPr lang="de-DE" dirty="0"/>
+              <a:t> </a:t>
+            </a:r>
+            <a:r>
+              <a:rPr lang="de-DE" dirty="0" err="1"/>
+              <a:t>sequence</a:t>
+            </a:r>
+            <a:r>
+              <a:rPr lang="de-DE" dirty="0"/>
+              <a:t> „</a:t>
+            </a:r>
+            <a:r>
+              <a:rPr lang="de-DE" dirty="0" err="1"/>
+              <a:t>history</a:t>
+            </a:r>
+            <a:r>
+              <a:rPr lang="de-DE" dirty="0"/>
+              <a:t> </a:t>
+            </a:r>
+            <a:r>
+              <a:rPr lang="de-DE" dirty="0" err="1"/>
+              <a:t>sequence</a:t>
+            </a:r>
+            <a:r>
+              <a:rPr lang="de-DE" dirty="0"/>
+              <a:t>“. At </a:t>
+            </a:r>
+            <a:r>
+              <a:rPr lang="de-DE" dirty="0" err="1"/>
+              <a:t>the</a:t>
+            </a:r>
+            <a:r>
+              <a:rPr lang="de-DE" dirty="0"/>
+              <a:t> end </a:t>
+            </a:r>
+            <a:r>
+              <a:rPr lang="de-DE" dirty="0" err="1"/>
+              <a:t>of</a:t>
+            </a:r>
+            <a:r>
+              <a:rPr lang="de-DE" dirty="0"/>
+              <a:t> </a:t>
+            </a:r>
+            <a:r>
+              <a:rPr lang="de-DE" dirty="0" err="1"/>
+              <a:t>it</a:t>
+            </a:r>
+            <a:r>
+              <a:rPr lang="de-DE" dirty="0"/>
+              <a:t>, </a:t>
+            </a:r>
+            <a:r>
+              <a:rPr lang="de-DE" dirty="0" err="1"/>
+              <a:t>we</a:t>
+            </a:r>
+            <a:r>
+              <a:rPr lang="de-DE" dirty="0"/>
+              <a:t> </a:t>
+            </a:r>
+            <a:r>
+              <a:rPr lang="de-DE" dirty="0" err="1"/>
+              <a:t>take</a:t>
+            </a:r>
+            <a:r>
+              <a:rPr lang="de-DE" dirty="0"/>
+              <a:t> </a:t>
+            </a:r>
+            <a:r>
+              <a:rPr lang="de-DE" dirty="0" err="1"/>
+              <a:t>about</a:t>
+            </a:r>
+            <a:r>
+              <a:rPr lang="de-DE" dirty="0"/>
+              <a:t> 4-5 </a:t>
+            </a:r>
+            <a:r>
+              <a:rPr lang="de-DE" dirty="0" err="1"/>
+              <a:t>characters</a:t>
+            </a:r>
+            <a:r>
+              <a:rPr lang="de-DE" dirty="0"/>
+              <a:t>, </a:t>
+            </a:r>
+            <a:r>
+              <a:rPr lang="de-DE" dirty="0" err="1"/>
+              <a:t>which</a:t>
+            </a:r>
+            <a:r>
+              <a:rPr lang="de-DE" dirty="0"/>
+              <a:t> form </a:t>
+            </a:r>
+            <a:r>
+              <a:rPr lang="de-DE" dirty="0" err="1"/>
+              <a:t>the</a:t>
+            </a:r>
+            <a:r>
+              <a:rPr lang="de-DE" dirty="0"/>
+              <a:t> „</a:t>
+            </a:r>
+            <a:r>
+              <a:rPr lang="de-DE" dirty="0" err="1"/>
+              <a:t>search</a:t>
+            </a:r>
+            <a:r>
+              <a:rPr lang="de-DE" dirty="0"/>
+              <a:t> </a:t>
+            </a:r>
+            <a:r>
+              <a:rPr lang="de-DE" dirty="0" err="1"/>
+              <a:t>sequence</a:t>
+            </a:r>
+            <a:r>
+              <a:rPr lang="de-DE" dirty="0"/>
+              <a:t>“. </a:t>
+            </a:r>
+            <a:r>
+              <a:rPr lang="de-DE" dirty="0" err="1"/>
+              <a:t>Now</a:t>
+            </a:r>
+            <a:r>
+              <a:rPr lang="de-DE" dirty="0"/>
+              <a:t> </a:t>
+            </a:r>
+            <a:r>
+              <a:rPr lang="de-DE" dirty="0" err="1"/>
+              <a:t>we</a:t>
+            </a:r>
+            <a:r>
+              <a:rPr lang="de-DE" dirty="0"/>
+              <a:t> </a:t>
+            </a:r>
+            <a:r>
+              <a:rPr lang="de-DE" dirty="0" err="1"/>
+              <a:t>use</a:t>
+            </a:r>
+            <a:r>
+              <a:rPr lang="de-DE" dirty="0"/>
+              <a:t> </a:t>
+            </a:r>
+            <a:r>
+              <a:rPr lang="de-DE" dirty="0" err="1"/>
+              <a:t>the</a:t>
+            </a:r>
+            <a:r>
+              <a:rPr lang="de-DE" dirty="0"/>
+              <a:t> </a:t>
+            </a:r>
+            <a:r>
+              <a:rPr lang="de-DE" dirty="0" err="1"/>
+              <a:t>alignment</a:t>
+            </a:r>
+            <a:r>
+              <a:rPr lang="de-DE" dirty="0"/>
+              <a:t> </a:t>
+            </a:r>
+            <a:r>
+              <a:rPr lang="de-DE" dirty="0" err="1"/>
+              <a:t>algorithm</a:t>
+            </a:r>
+            <a:r>
+              <a:rPr lang="de-DE" dirty="0"/>
+              <a:t> </a:t>
+            </a:r>
+            <a:r>
+              <a:rPr lang="de-DE" dirty="0" err="1"/>
+              <a:t>to</a:t>
+            </a:r>
+            <a:r>
+              <a:rPr lang="de-DE" dirty="0"/>
+              <a:t> find </a:t>
+            </a:r>
+            <a:r>
+              <a:rPr lang="de-DE" dirty="0" err="1"/>
+              <a:t>the</a:t>
+            </a:r>
+            <a:r>
+              <a:rPr lang="de-DE" dirty="0"/>
+              <a:t> </a:t>
+            </a:r>
+            <a:r>
+              <a:rPr lang="de-DE" dirty="0" err="1"/>
+              <a:t>most</a:t>
+            </a:r>
+            <a:r>
+              <a:rPr lang="de-DE" dirty="0"/>
+              <a:t> </a:t>
+            </a:r>
+            <a:r>
+              <a:rPr lang="de-DE" dirty="0" err="1"/>
+              <a:t>similar</a:t>
+            </a:r>
+            <a:r>
+              <a:rPr lang="de-DE" dirty="0"/>
+              <a:t> </a:t>
+            </a:r>
+            <a:r>
+              <a:rPr lang="de-DE" dirty="0" err="1"/>
+              <a:t>sequence</a:t>
+            </a:r>
+            <a:r>
+              <a:rPr lang="de-DE" dirty="0"/>
+              <a:t> in </a:t>
+            </a:r>
+            <a:r>
+              <a:rPr lang="de-DE" dirty="0" err="1"/>
+              <a:t>the</a:t>
+            </a:r>
+            <a:r>
+              <a:rPr lang="de-DE" dirty="0"/>
+              <a:t> </a:t>
+            </a:r>
+            <a:r>
+              <a:rPr lang="de-DE" dirty="0" err="1"/>
+              <a:t>previous</a:t>
+            </a:r>
+            <a:r>
+              <a:rPr lang="de-DE" dirty="0"/>
+              <a:t> </a:t>
+            </a:r>
+            <a:r>
+              <a:rPr lang="de-DE" dirty="0" err="1"/>
+              <a:t>part</a:t>
+            </a:r>
+            <a:r>
+              <a:rPr lang="de-DE" dirty="0"/>
+              <a:t> </a:t>
+            </a:r>
+            <a:r>
+              <a:rPr lang="de-DE" dirty="0" err="1"/>
+              <a:t>of</a:t>
+            </a:r>
+            <a:r>
+              <a:rPr lang="de-DE" dirty="0"/>
+              <a:t> </a:t>
+            </a:r>
+            <a:r>
+              <a:rPr lang="de-DE" dirty="0" err="1"/>
+              <a:t>the</a:t>
+            </a:r>
+            <a:r>
+              <a:rPr lang="de-DE" dirty="0"/>
+              <a:t> </a:t>
+            </a:r>
+            <a:r>
+              <a:rPr lang="de-DE" dirty="0" err="1"/>
+              <a:t>history</a:t>
+            </a:r>
+            <a:r>
+              <a:rPr lang="de-DE" dirty="0"/>
+              <a:t> </a:t>
+            </a:r>
+            <a:r>
+              <a:rPr lang="de-DE" dirty="0" err="1"/>
+              <a:t>sequence</a:t>
+            </a:r>
+            <a:r>
+              <a:rPr lang="de-DE" dirty="0"/>
+              <a:t>, </a:t>
+            </a:r>
+            <a:r>
+              <a:rPr lang="de-DE" dirty="0" err="1"/>
+              <a:t>which</a:t>
+            </a:r>
+            <a:r>
+              <a:rPr lang="de-DE" dirty="0"/>
+              <a:t> </a:t>
+            </a:r>
+            <a:r>
+              <a:rPr lang="de-DE" dirty="0" err="1"/>
+              <a:t>we</a:t>
+            </a:r>
+            <a:r>
+              <a:rPr lang="de-DE" dirty="0"/>
+              <a:t> </a:t>
+            </a:r>
+            <a:r>
+              <a:rPr lang="de-DE" dirty="0" err="1"/>
+              <a:t>call</a:t>
+            </a:r>
+            <a:r>
+              <a:rPr lang="de-DE" dirty="0"/>
+              <a:t> „</a:t>
+            </a:r>
+            <a:r>
+              <a:rPr lang="de-DE" dirty="0" err="1"/>
+              <a:t>match</a:t>
+            </a:r>
+            <a:r>
+              <a:rPr lang="de-DE" dirty="0"/>
+              <a:t> </a:t>
+            </a:r>
+            <a:r>
+              <a:rPr lang="de-DE" dirty="0" err="1"/>
+              <a:t>sequence</a:t>
+            </a:r>
+            <a:r>
+              <a:rPr lang="de-DE" dirty="0"/>
+              <a:t>“. Every </a:t>
+            </a:r>
+            <a:r>
+              <a:rPr lang="de-DE" dirty="0" err="1"/>
+              <a:t>character</a:t>
+            </a:r>
+            <a:r>
+              <a:rPr lang="de-DE" dirty="0"/>
+              <a:t> after </a:t>
+            </a:r>
+            <a:r>
+              <a:rPr lang="de-DE" dirty="0" err="1"/>
+              <a:t>the</a:t>
+            </a:r>
+            <a:r>
+              <a:rPr lang="de-DE" dirty="0"/>
+              <a:t> </a:t>
+            </a:r>
+            <a:r>
+              <a:rPr lang="de-DE" dirty="0" err="1"/>
+              <a:t>the</a:t>
+            </a:r>
+            <a:r>
+              <a:rPr lang="de-DE" dirty="0"/>
+              <a:t> </a:t>
+            </a:r>
+            <a:r>
+              <a:rPr lang="de-DE" dirty="0" err="1"/>
+              <a:t>match</a:t>
+            </a:r>
+            <a:r>
+              <a:rPr lang="de-DE" dirty="0"/>
+              <a:t> </a:t>
+            </a:r>
+            <a:r>
+              <a:rPr lang="de-DE" dirty="0" err="1"/>
+              <a:t>sequence</a:t>
+            </a:r>
+            <a:r>
+              <a:rPr lang="de-DE" dirty="0"/>
+              <a:t> form </a:t>
+            </a:r>
+            <a:r>
+              <a:rPr lang="de-DE" dirty="0" err="1"/>
+              <a:t>our</a:t>
+            </a:r>
+            <a:r>
+              <a:rPr lang="de-DE" dirty="0"/>
+              <a:t> </a:t>
+            </a:r>
+            <a:r>
+              <a:rPr lang="de-DE" dirty="0" err="1"/>
+              <a:t>needed</a:t>
+            </a:r>
+            <a:r>
+              <a:rPr lang="de-DE" dirty="0"/>
+              <a:t> </a:t>
+            </a:r>
+            <a:r>
+              <a:rPr lang="de-DE" dirty="0" err="1"/>
+              <a:t>prediction</a:t>
+            </a:r>
+            <a:r>
+              <a:rPr lang="de-DE" dirty="0"/>
+              <a:t> </a:t>
+            </a:r>
+            <a:r>
+              <a:rPr lang="de-DE" dirty="0" err="1"/>
+              <a:t>which</a:t>
+            </a:r>
+            <a:r>
+              <a:rPr lang="de-DE" dirty="0"/>
+              <a:t> </a:t>
+            </a:r>
+            <a:r>
+              <a:rPr lang="de-DE" dirty="0" err="1"/>
+              <a:t>we</a:t>
+            </a:r>
+            <a:r>
+              <a:rPr lang="de-DE" dirty="0"/>
+              <a:t> </a:t>
+            </a:r>
+            <a:r>
+              <a:rPr lang="de-DE" dirty="0" err="1"/>
+              <a:t>append</a:t>
+            </a:r>
+            <a:r>
+              <a:rPr lang="de-DE" dirty="0"/>
+              <a:t> at </a:t>
+            </a:r>
+            <a:r>
+              <a:rPr lang="de-DE" dirty="0" err="1"/>
+              <a:t>the</a:t>
+            </a:r>
+            <a:r>
+              <a:rPr lang="de-DE" dirty="0"/>
+              <a:t> end.</a:t>
+            </a:r>
           </a:p>
         </p:txBody>
       </p:sp>
@@ -755,6 +2768,1320 @@
           <a:p>
             <a:fld id="{AA07C420-CE83-453F-83A5-25E4D2906979}" type="slidenum">
               <a:rPr lang="de-DE" smtClean="0"/>
+              <a:t>7</a:t>
+            </a:fld>
+            <a:endParaRPr lang="de-DE"/>
+          </a:p>
+        </p:txBody>
+      </p:sp>
+    </p:spTree>
+    <p:extLst>
+      <p:ext uri="{BB962C8B-B14F-4D97-AF65-F5344CB8AC3E}">
+        <p14:creationId xmlns:p14="http://schemas.microsoft.com/office/powerpoint/2010/main" val="1154059475"/>
+      </p:ext>
+    </p:extLst>
+  </p:cSld>
+  <p:clrMapOvr>
+    <a:masterClrMapping/>
+  </p:clrMapOvr>
+</p:notes>
+</file>
+
+<file path=ppt/notesSlides/notesSlide4.xml><?xml version="1.0" encoding="utf-8"?>
+<p:notes xmlns:a="http://schemas.openxmlformats.org/drawingml/2006/main" xmlns:r="http://schemas.openxmlformats.org/officeDocument/2006/relationships" xmlns:p="http://schemas.openxmlformats.org/presentationml/2006/main">
+  <p:cSld>
+    <p:spTree>
+      <p:nvGrpSpPr>
+        <p:cNvPr id="1" name=""/>
+        <p:cNvGrpSpPr/>
+        <p:nvPr/>
+      </p:nvGrpSpPr>
+      <p:grpSpPr>
+        <a:xfrm>
+          <a:off x="0" y="0"/>
+          <a:ext cx="0" cy="0"/>
+          <a:chOff x="0" y="0"/>
+          <a:chExt cx="0" cy="0"/>
+        </a:xfrm>
+      </p:grpSpPr>
+      <p:sp>
+        <p:nvSpPr>
+          <p:cNvPr id="2" name="Folienbildplatzhalter 1"/>
+          <p:cNvSpPr>
+            <a:spLocks noGrp="1" noRot="1" noChangeAspect="1"/>
+          </p:cNvSpPr>
+          <p:nvPr>
+            <p:ph type="sldImg"/>
+          </p:nvPr>
+        </p:nvSpPr>
+        <p:spPr/>
+      </p:sp>
+      <p:sp>
+        <p:nvSpPr>
+          <p:cNvPr id="3" name="Notizenplatzhalter 2"/>
+          <p:cNvSpPr>
+            <a:spLocks noGrp="1"/>
+          </p:cNvSpPr>
+          <p:nvPr>
+            <p:ph type="body" idx="1"/>
+          </p:nvPr>
+        </p:nvSpPr>
+        <p:spPr/>
+        <p:txBody>
+          <a:bodyPr/>
+          <a:lstStyle/>
+          <a:p>
+            <a:r>
+              <a:rPr lang="de-DE" dirty="0"/>
+              <a:t>The </a:t>
+            </a:r>
+            <a:r>
+              <a:rPr lang="de-DE" dirty="0" err="1"/>
+              <a:t>alignment</a:t>
+            </a:r>
+            <a:r>
+              <a:rPr lang="de-DE" dirty="0"/>
+              <a:t> </a:t>
+            </a:r>
+            <a:r>
+              <a:rPr lang="de-DE" dirty="0" err="1"/>
+              <a:t>algorithm</a:t>
+            </a:r>
+            <a:r>
+              <a:rPr lang="de-DE" dirty="0"/>
+              <a:t> </a:t>
+            </a:r>
+            <a:r>
+              <a:rPr lang="de-DE" dirty="0" err="1"/>
+              <a:t>that</a:t>
+            </a:r>
+            <a:r>
+              <a:rPr lang="de-DE" dirty="0"/>
+              <a:t> </a:t>
+            </a:r>
+            <a:r>
+              <a:rPr lang="de-DE" dirty="0" err="1"/>
+              <a:t>we</a:t>
+            </a:r>
+            <a:r>
+              <a:rPr lang="de-DE" dirty="0"/>
+              <a:t> </a:t>
+            </a:r>
+            <a:r>
+              <a:rPr lang="de-DE" dirty="0" err="1"/>
+              <a:t>use</a:t>
+            </a:r>
+            <a:r>
+              <a:rPr lang="de-DE" dirty="0"/>
+              <a:t> </a:t>
+            </a:r>
+            <a:r>
+              <a:rPr lang="de-DE" dirty="0" err="1"/>
+              <a:t>is</a:t>
+            </a:r>
+            <a:r>
+              <a:rPr lang="de-DE" dirty="0"/>
+              <a:t> </a:t>
+            </a:r>
+            <a:r>
+              <a:rPr lang="de-DE" dirty="0" err="1"/>
+              <a:t>called</a:t>
+            </a:r>
+            <a:r>
+              <a:rPr lang="de-DE" dirty="0"/>
+              <a:t> Smith-Waterman-</a:t>
+            </a:r>
+            <a:r>
+              <a:rPr lang="de-DE" dirty="0" err="1"/>
+              <a:t>Algorithm</a:t>
+            </a:r>
+            <a:r>
+              <a:rPr lang="de-DE" dirty="0"/>
+              <a:t>. </a:t>
+            </a:r>
+            <a:r>
+              <a:rPr lang="de-DE" dirty="0" err="1"/>
+              <a:t>It</a:t>
+            </a:r>
+            <a:r>
+              <a:rPr lang="de-DE" dirty="0"/>
+              <a:t> </a:t>
+            </a:r>
+            <a:r>
+              <a:rPr lang="de-DE" dirty="0" err="1"/>
+              <a:t>is</a:t>
+            </a:r>
+            <a:r>
+              <a:rPr lang="de-DE" dirty="0"/>
+              <a:t> a </a:t>
+            </a:r>
+            <a:r>
+              <a:rPr lang="de-DE" dirty="0" err="1"/>
+              <a:t>local</a:t>
+            </a:r>
+            <a:r>
+              <a:rPr lang="de-DE" dirty="0"/>
+              <a:t> </a:t>
+            </a:r>
+            <a:r>
+              <a:rPr lang="de-DE" dirty="0" err="1"/>
+              <a:t>algorithm</a:t>
+            </a:r>
+            <a:r>
+              <a:rPr lang="de-DE" dirty="0"/>
+              <a:t>, </a:t>
+            </a:r>
+            <a:r>
+              <a:rPr lang="de-DE" dirty="0" err="1"/>
+              <a:t>that</a:t>
+            </a:r>
+            <a:r>
+              <a:rPr lang="de-DE" dirty="0"/>
+              <a:t> </a:t>
+            </a:r>
+            <a:r>
+              <a:rPr lang="de-DE" dirty="0" err="1"/>
+              <a:t>finds</a:t>
+            </a:r>
+            <a:r>
+              <a:rPr lang="de-DE" dirty="0"/>
+              <a:t> </a:t>
+            </a:r>
+            <a:r>
+              <a:rPr lang="de-DE" dirty="0" err="1"/>
+              <a:t>the</a:t>
+            </a:r>
+            <a:r>
+              <a:rPr lang="de-DE" dirty="0"/>
+              <a:t> </a:t>
+            </a:r>
+            <a:r>
+              <a:rPr lang="de-DE" dirty="0" err="1"/>
+              <a:t>most</a:t>
+            </a:r>
+            <a:r>
+              <a:rPr lang="de-DE" dirty="0"/>
+              <a:t> </a:t>
+            </a:r>
+            <a:r>
+              <a:rPr lang="de-DE" dirty="0" err="1"/>
+              <a:t>similar</a:t>
+            </a:r>
+            <a:r>
+              <a:rPr lang="de-DE" dirty="0"/>
+              <a:t> partial </a:t>
+            </a:r>
+            <a:r>
+              <a:rPr lang="de-DE" dirty="0" err="1"/>
+              <a:t>sequence</a:t>
+            </a:r>
+            <a:r>
+              <a:rPr lang="de-DE" dirty="0"/>
+              <a:t> in </a:t>
+            </a:r>
+            <a:r>
+              <a:rPr lang="de-DE" dirty="0" err="1"/>
+              <a:t>another</a:t>
+            </a:r>
+            <a:r>
+              <a:rPr lang="de-DE" dirty="0"/>
+              <a:t> </a:t>
+            </a:r>
+            <a:r>
+              <a:rPr lang="de-DE" dirty="0" err="1"/>
+              <a:t>sequence</a:t>
+            </a:r>
+            <a:r>
+              <a:rPr lang="de-DE" dirty="0"/>
+              <a:t>, in </a:t>
+            </a:r>
+            <a:r>
+              <a:rPr lang="de-DE" dirty="0" err="1"/>
+              <a:t>our</a:t>
+            </a:r>
+            <a:r>
+              <a:rPr lang="de-DE" dirty="0"/>
+              <a:t> </a:t>
+            </a:r>
+            <a:r>
+              <a:rPr lang="de-DE" dirty="0" err="1"/>
+              <a:t>case</a:t>
+            </a:r>
+            <a:r>
+              <a:rPr lang="de-DE" dirty="0"/>
+              <a:t>, </a:t>
+            </a:r>
+            <a:r>
+              <a:rPr lang="de-DE" dirty="0" err="1"/>
+              <a:t>the</a:t>
+            </a:r>
+            <a:r>
+              <a:rPr lang="de-DE" dirty="0"/>
+              <a:t> </a:t>
+            </a:r>
+            <a:r>
+              <a:rPr lang="de-DE" dirty="0" err="1"/>
+              <a:t>history</a:t>
+            </a:r>
+            <a:r>
+              <a:rPr lang="de-DE" dirty="0"/>
+              <a:t> </a:t>
+            </a:r>
+            <a:r>
+              <a:rPr lang="de-DE" dirty="0" err="1"/>
+              <a:t>sequence</a:t>
+            </a:r>
+            <a:r>
+              <a:rPr lang="de-DE" dirty="0"/>
+              <a:t>, in a </a:t>
+            </a:r>
+            <a:r>
+              <a:rPr lang="de-DE" dirty="0" err="1"/>
+              <a:t>runtime</a:t>
+            </a:r>
+            <a:r>
+              <a:rPr lang="de-DE" dirty="0"/>
+              <a:t> </a:t>
+            </a:r>
+            <a:r>
+              <a:rPr lang="de-DE" dirty="0" err="1"/>
+              <a:t>of</a:t>
+            </a:r>
+            <a:r>
+              <a:rPr lang="de-DE" dirty="0"/>
+              <a:t> n </a:t>
+            </a:r>
+            <a:r>
+              <a:rPr lang="de-DE" dirty="0" err="1"/>
+              <a:t>squared</a:t>
+            </a:r>
+            <a:r>
+              <a:rPr lang="de-DE" dirty="0"/>
+              <a:t>. </a:t>
+            </a:r>
+            <a:r>
+              <a:rPr lang="de-DE" dirty="0" err="1"/>
+              <a:t>Usually</a:t>
+            </a:r>
+            <a:r>
+              <a:rPr lang="de-DE" dirty="0"/>
+              <a:t>, </a:t>
+            </a:r>
+            <a:r>
+              <a:rPr lang="de-DE" dirty="0" err="1"/>
+              <a:t>the</a:t>
+            </a:r>
+            <a:r>
+              <a:rPr lang="de-DE" dirty="0"/>
+              <a:t> </a:t>
+            </a:r>
+            <a:r>
+              <a:rPr lang="de-DE" dirty="0" err="1"/>
+              <a:t>algorithm</a:t>
+            </a:r>
+            <a:r>
+              <a:rPr lang="de-DE" dirty="0"/>
+              <a:t> </a:t>
+            </a:r>
+            <a:r>
+              <a:rPr lang="de-DE" dirty="0" err="1"/>
+              <a:t>is</a:t>
+            </a:r>
+            <a:r>
+              <a:rPr lang="de-DE" dirty="0"/>
+              <a:t> </a:t>
+            </a:r>
+            <a:r>
+              <a:rPr lang="de-DE" dirty="0" err="1"/>
+              <a:t>used</a:t>
+            </a:r>
+            <a:r>
+              <a:rPr lang="de-DE" dirty="0"/>
+              <a:t> </a:t>
+            </a:r>
+            <a:r>
+              <a:rPr lang="de-DE" dirty="0" err="1"/>
+              <a:t>mainly</a:t>
+            </a:r>
+            <a:r>
+              <a:rPr lang="de-DE" dirty="0"/>
+              <a:t> in </a:t>
+            </a:r>
+            <a:r>
+              <a:rPr lang="de-DE" dirty="0" err="1"/>
+              <a:t>bioinformatics</a:t>
+            </a:r>
+            <a:r>
+              <a:rPr lang="de-DE" dirty="0"/>
+              <a:t> </a:t>
+            </a:r>
+            <a:r>
+              <a:rPr lang="de-DE" dirty="0" err="1"/>
+              <a:t>to</a:t>
+            </a:r>
+            <a:r>
+              <a:rPr lang="de-DE" dirty="0"/>
+              <a:t> </a:t>
+            </a:r>
+            <a:r>
+              <a:rPr lang="de-DE" dirty="0" err="1"/>
+              <a:t>compare</a:t>
+            </a:r>
+            <a:r>
+              <a:rPr lang="de-DE" dirty="0"/>
+              <a:t> </a:t>
+            </a:r>
+            <a:r>
+              <a:rPr lang="de-DE" dirty="0" err="1"/>
+              <a:t>evolution</a:t>
+            </a:r>
+            <a:r>
+              <a:rPr lang="de-DE" dirty="0"/>
+              <a:t> </a:t>
+            </a:r>
+            <a:r>
+              <a:rPr lang="de-DE" dirty="0" err="1"/>
+              <a:t>based</a:t>
+            </a:r>
+            <a:r>
+              <a:rPr lang="de-DE" dirty="0"/>
+              <a:t> </a:t>
+            </a:r>
+            <a:r>
+              <a:rPr lang="de-DE" dirty="0" err="1"/>
+              <a:t>differences</a:t>
+            </a:r>
+            <a:r>
+              <a:rPr lang="de-DE" dirty="0"/>
+              <a:t> in DNA and </a:t>
+            </a:r>
+            <a:r>
+              <a:rPr lang="de-DE" dirty="0" err="1"/>
+              <a:t>protein</a:t>
+            </a:r>
+            <a:r>
+              <a:rPr lang="de-DE" dirty="0"/>
+              <a:t> </a:t>
+            </a:r>
+            <a:r>
+              <a:rPr lang="de-DE" dirty="0" err="1"/>
+              <a:t>sequences</a:t>
+            </a:r>
+            <a:r>
+              <a:rPr lang="de-DE" dirty="0"/>
+              <a:t>. </a:t>
+            </a:r>
+            <a:r>
+              <a:rPr lang="de-DE" dirty="0" err="1"/>
+              <a:t>It</a:t>
+            </a:r>
+            <a:r>
+              <a:rPr lang="de-DE" dirty="0"/>
+              <a:t> was </a:t>
+            </a:r>
+            <a:r>
+              <a:rPr lang="de-DE" dirty="0" err="1"/>
+              <a:t>invented</a:t>
+            </a:r>
+            <a:r>
+              <a:rPr lang="de-DE" dirty="0"/>
+              <a:t> </a:t>
+            </a:r>
+            <a:r>
+              <a:rPr lang="de-DE" dirty="0" err="1"/>
+              <a:t>by</a:t>
+            </a:r>
+            <a:r>
+              <a:rPr lang="de-DE" dirty="0"/>
+              <a:t> Temple F. Smith and Michael S. Waterman in 1981. </a:t>
+            </a:r>
+          </a:p>
+        </p:txBody>
+      </p:sp>
+      <p:sp>
+        <p:nvSpPr>
+          <p:cNvPr id="4" name="Foliennummernplatzhalter 3"/>
+          <p:cNvSpPr>
+            <a:spLocks noGrp="1"/>
+          </p:cNvSpPr>
+          <p:nvPr>
+            <p:ph type="sldNum" sz="quarter" idx="10"/>
+          </p:nvPr>
+        </p:nvSpPr>
+        <p:spPr/>
+        <p:txBody>
+          <a:bodyPr/>
+          <a:lstStyle/>
+          <a:p>
+            <a:fld id="{AA07C420-CE83-453F-83A5-25E4D2906979}" type="slidenum">
+              <a:rPr lang="de-DE" smtClean="0"/>
+              <a:t>8</a:t>
+            </a:fld>
+            <a:endParaRPr lang="de-DE"/>
+          </a:p>
+        </p:txBody>
+      </p:sp>
+    </p:spTree>
+    <p:extLst>
+      <p:ext uri="{BB962C8B-B14F-4D97-AF65-F5344CB8AC3E}">
+        <p14:creationId xmlns:p14="http://schemas.microsoft.com/office/powerpoint/2010/main" val="1517725522"/>
+      </p:ext>
+    </p:extLst>
+  </p:cSld>
+  <p:clrMapOvr>
+    <a:masterClrMapping/>
+  </p:clrMapOvr>
+</p:notes>
+</file>
+
+<file path=ppt/notesSlides/notesSlide5.xml><?xml version="1.0" encoding="utf-8"?>
+<p:notes xmlns:a="http://schemas.openxmlformats.org/drawingml/2006/main" xmlns:r="http://schemas.openxmlformats.org/officeDocument/2006/relationships" xmlns:p="http://schemas.openxmlformats.org/presentationml/2006/main">
+  <p:cSld>
+    <p:spTree>
+      <p:nvGrpSpPr>
+        <p:cNvPr id="1" name=""/>
+        <p:cNvGrpSpPr/>
+        <p:nvPr/>
+      </p:nvGrpSpPr>
+      <p:grpSpPr>
+        <a:xfrm>
+          <a:off x="0" y="0"/>
+          <a:ext cx="0" cy="0"/>
+          <a:chOff x="0" y="0"/>
+          <a:chExt cx="0" cy="0"/>
+        </a:xfrm>
+      </p:grpSpPr>
+      <p:sp>
+        <p:nvSpPr>
+          <p:cNvPr id="2" name="Folienbildplatzhalter 1"/>
+          <p:cNvSpPr>
+            <a:spLocks noGrp="1" noRot="1" noChangeAspect="1"/>
+          </p:cNvSpPr>
+          <p:nvPr>
+            <p:ph type="sldImg"/>
+          </p:nvPr>
+        </p:nvSpPr>
+        <p:spPr/>
+      </p:sp>
+      <p:sp>
+        <p:nvSpPr>
+          <p:cNvPr id="3" name="Notizenplatzhalter 2"/>
+          <p:cNvSpPr>
+            <a:spLocks noGrp="1"/>
+          </p:cNvSpPr>
+          <p:nvPr>
+            <p:ph type="body" idx="1"/>
+          </p:nvPr>
+        </p:nvSpPr>
+        <p:spPr/>
+        <p:txBody>
+          <a:bodyPr/>
+          <a:lstStyle/>
+          <a:p>
+            <a:r>
+              <a:rPr lang="de-DE" dirty="0" err="1"/>
+              <a:t>Why</a:t>
+            </a:r>
+            <a:r>
+              <a:rPr lang="de-DE" dirty="0"/>
+              <a:t> n </a:t>
+            </a:r>
+            <a:r>
+              <a:rPr lang="de-DE" dirty="0" err="1"/>
+              <a:t>squared</a:t>
+            </a:r>
+            <a:r>
+              <a:rPr lang="de-DE" dirty="0"/>
+              <a:t>? Well, </a:t>
+            </a:r>
+            <a:r>
+              <a:rPr lang="de-DE" dirty="0" err="1"/>
+              <a:t>it‘s</a:t>
+            </a:r>
+            <a:r>
+              <a:rPr lang="de-DE" dirty="0"/>
+              <a:t> </a:t>
+            </a:r>
+            <a:r>
+              <a:rPr lang="de-DE" dirty="0" err="1"/>
+              <a:t>because</a:t>
+            </a:r>
+            <a:r>
+              <a:rPr lang="de-DE" dirty="0"/>
+              <a:t> </a:t>
+            </a:r>
+            <a:r>
+              <a:rPr lang="de-DE" dirty="0" err="1"/>
+              <a:t>both</a:t>
+            </a:r>
+            <a:r>
+              <a:rPr lang="de-DE" dirty="0"/>
+              <a:t> </a:t>
+            </a:r>
+            <a:r>
+              <a:rPr lang="de-DE" dirty="0" err="1"/>
+              <a:t>sequences</a:t>
+            </a:r>
+            <a:r>
+              <a:rPr lang="de-DE" dirty="0"/>
+              <a:t>, </a:t>
+            </a:r>
+            <a:r>
+              <a:rPr lang="de-DE" dirty="0" err="1"/>
+              <a:t>the</a:t>
+            </a:r>
+            <a:r>
+              <a:rPr lang="de-DE" dirty="0"/>
+              <a:t> </a:t>
+            </a:r>
+            <a:r>
+              <a:rPr lang="de-DE" dirty="0" err="1"/>
+              <a:t>history</a:t>
+            </a:r>
+            <a:r>
+              <a:rPr lang="de-DE" dirty="0"/>
+              <a:t> and </a:t>
+            </a:r>
+            <a:r>
+              <a:rPr lang="de-DE" dirty="0" err="1"/>
+              <a:t>search</a:t>
+            </a:r>
+            <a:r>
+              <a:rPr lang="de-DE" dirty="0"/>
+              <a:t> </a:t>
+            </a:r>
+            <a:r>
+              <a:rPr lang="de-DE" dirty="0" err="1"/>
+              <a:t>sequence</a:t>
+            </a:r>
+            <a:r>
+              <a:rPr lang="de-DE" dirty="0"/>
+              <a:t>, </a:t>
+            </a:r>
+            <a:r>
+              <a:rPr lang="de-DE" dirty="0" err="1"/>
+              <a:t>are</a:t>
+            </a:r>
+            <a:r>
+              <a:rPr lang="de-DE" dirty="0"/>
+              <a:t> </a:t>
+            </a:r>
+            <a:r>
+              <a:rPr lang="de-DE" dirty="0" err="1"/>
+              <a:t>aligned</a:t>
+            </a:r>
+            <a:r>
+              <a:rPr lang="de-DE" dirty="0"/>
+              <a:t> in a </a:t>
+            </a:r>
+            <a:r>
+              <a:rPr lang="de-DE" dirty="0" err="1"/>
+              <a:t>matrix</a:t>
+            </a:r>
+            <a:r>
+              <a:rPr lang="de-DE" dirty="0"/>
+              <a:t> like </a:t>
+            </a:r>
+            <a:r>
+              <a:rPr lang="de-DE" dirty="0" err="1"/>
+              <a:t>here</a:t>
+            </a:r>
+            <a:r>
+              <a:rPr lang="de-DE" dirty="0"/>
+              <a:t>. The </a:t>
+            </a:r>
+            <a:r>
+              <a:rPr lang="de-DE" dirty="0" err="1"/>
+              <a:t>first</a:t>
+            </a:r>
+            <a:r>
+              <a:rPr lang="de-DE" dirty="0"/>
+              <a:t> </a:t>
+            </a:r>
+            <a:r>
+              <a:rPr lang="de-DE" dirty="0" err="1"/>
+              <a:t>row</a:t>
+            </a:r>
+            <a:r>
+              <a:rPr lang="de-DE" dirty="0"/>
+              <a:t> and </a:t>
+            </a:r>
+            <a:r>
+              <a:rPr lang="de-DE" dirty="0" err="1"/>
+              <a:t>column</a:t>
+            </a:r>
+            <a:r>
+              <a:rPr lang="de-DE" dirty="0"/>
+              <a:t> </a:t>
+            </a:r>
+            <a:r>
+              <a:rPr lang="de-DE" dirty="0" err="1"/>
+              <a:t>are</a:t>
+            </a:r>
+            <a:r>
+              <a:rPr lang="de-DE" dirty="0"/>
+              <a:t> </a:t>
+            </a:r>
+            <a:r>
+              <a:rPr lang="de-DE" dirty="0" err="1"/>
+              <a:t>initialized</a:t>
+            </a:r>
+            <a:r>
+              <a:rPr lang="de-DE" dirty="0"/>
+              <a:t> </a:t>
+            </a:r>
+            <a:r>
+              <a:rPr lang="de-DE" dirty="0" err="1"/>
+              <a:t>with</a:t>
+            </a:r>
+            <a:r>
+              <a:rPr lang="de-DE" dirty="0"/>
+              <a:t> </a:t>
+            </a:r>
+            <a:r>
+              <a:rPr lang="de-DE" dirty="0" err="1"/>
+              <a:t>zeros</a:t>
+            </a:r>
+            <a:r>
+              <a:rPr lang="de-DE" dirty="0"/>
+              <a:t>. </a:t>
+            </a:r>
+            <a:r>
+              <a:rPr lang="de-DE" dirty="0" err="1"/>
+              <a:t>Then</a:t>
+            </a:r>
+            <a:r>
+              <a:rPr lang="de-DE" dirty="0"/>
+              <a:t>, </a:t>
+            </a:r>
+            <a:r>
+              <a:rPr lang="de-DE" dirty="0" err="1"/>
+              <a:t>we</a:t>
+            </a:r>
+            <a:r>
+              <a:rPr lang="de-DE" dirty="0"/>
+              <a:t> </a:t>
+            </a:r>
+            <a:r>
+              <a:rPr lang="de-DE" dirty="0" err="1"/>
+              <a:t>use</a:t>
+            </a:r>
+            <a:r>
+              <a:rPr lang="de-DE" dirty="0"/>
+              <a:t> </a:t>
+            </a:r>
+            <a:r>
+              <a:rPr lang="de-DE" dirty="0" err="1"/>
+              <a:t>reccurence</a:t>
+            </a:r>
+            <a:r>
+              <a:rPr lang="de-DE" dirty="0"/>
+              <a:t> </a:t>
+            </a:r>
+            <a:r>
+              <a:rPr lang="de-DE" dirty="0" err="1"/>
+              <a:t>values</a:t>
+            </a:r>
+            <a:r>
+              <a:rPr lang="de-DE" dirty="0"/>
+              <a:t>, </a:t>
+            </a:r>
+            <a:r>
+              <a:rPr lang="de-DE" dirty="0" err="1"/>
+              <a:t>as</a:t>
+            </a:r>
+            <a:r>
+              <a:rPr lang="de-DE" dirty="0"/>
+              <a:t> </a:t>
+            </a:r>
+            <a:r>
+              <a:rPr lang="de-DE" dirty="0" err="1"/>
+              <a:t>seen</a:t>
+            </a:r>
+            <a:r>
+              <a:rPr lang="de-DE" dirty="0"/>
+              <a:t> on </a:t>
+            </a:r>
+            <a:r>
+              <a:rPr lang="de-DE" dirty="0" err="1"/>
+              <a:t>the</a:t>
+            </a:r>
+            <a:r>
+              <a:rPr lang="de-DE" dirty="0"/>
+              <a:t> </a:t>
+            </a:r>
+            <a:r>
+              <a:rPr lang="de-DE" dirty="0" err="1"/>
+              <a:t>bottom</a:t>
+            </a:r>
+            <a:r>
+              <a:rPr lang="de-DE" dirty="0"/>
+              <a:t>, </a:t>
+            </a:r>
+            <a:r>
+              <a:rPr lang="de-DE" dirty="0" err="1"/>
+              <a:t>to</a:t>
+            </a:r>
+            <a:r>
+              <a:rPr lang="de-DE" dirty="0"/>
+              <a:t> </a:t>
+            </a:r>
+            <a:r>
+              <a:rPr lang="de-DE" dirty="0" err="1"/>
+              <a:t>determine</a:t>
+            </a:r>
+            <a:r>
+              <a:rPr lang="de-DE" dirty="0"/>
+              <a:t> </a:t>
+            </a:r>
+            <a:r>
+              <a:rPr lang="de-DE" dirty="0" err="1"/>
+              <a:t>the</a:t>
+            </a:r>
+            <a:r>
+              <a:rPr lang="de-DE" dirty="0"/>
+              <a:t> </a:t>
+            </a:r>
+            <a:r>
+              <a:rPr lang="de-DE" dirty="0" err="1"/>
+              <a:t>next</a:t>
+            </a:r>
+            <a:r>
+              <a:rPr lang="de-DE" dirty="0"/>
+              <a:t> score </a:t>
+            </a:r>
+            <a:r>
+              <a:rPr lang="de-DE" dirty="0" err="1"/>
+              <a:t>dependent</a:t>
+            </a:r>
+            <a:r>
+              <a:rPr lang="de-DE" dirty="0"/>
+              <a:t> on </a:t>
+            </a:r>
+            <a:r>
+              <a:rPr lang="de-DE" dirty="0" err="1"/>
+              <a:t>the</a:t>
+            </a:r>
+            <a:r>
+              <a:rPr lang="de-DE" dirty="0"/>
+              <a:t> </a:t>
+            </a:r>
+            <a:r>
+              <a:rPr lang="de-DE" dirty="0" err="1"/>
+              <a:t>previous</a:t>
+            </a:r>
+            <a:r>
+              <a:rPr lang="de-DE" dirty="0"/>
+              <a:t> </a:t>
+            </a:r>
+            <a:r>
+              <a:rPr lang="de-DE" dirty="0" err="1"/>
+              <a:t>north</a:t>
+            </a:r>
+            <a:r>
+              <a:rPr lang="de-DE" dirty="0"/>
+              <a:t> and west </a:t>
+            </a:r>
+            <a:r>
+              <a:rPr lang="de-DE" dirty="0" err="1"/>
+              <a:t>scores</a:t>
+            </a:r>
+            <a:r>
+              <a:rPr lang="de-DE" dirty="0"/>
+              <a:t>. After </a:t>
+            </a:r>
+            <a:r>
+              <a:rPr lang="de-DE" dirty="0" err="1"/>
+              <a:t>the</a:t>
+            </a:r>
+            <a:r>
+              <a:rPr lang="de-DE" dirty="0"/>
+              <a:t> </a:t>
+            </a:r>
+            <a:r>
+              <a:rPr lang="de-DE" dirty="0" err="1"/>
+              <a:t>whole</a:t>
+            </a:r>
+            <a:r>
+              <a:rPr lang="de-DE" dirty="0"/>
+              <a:t> </a:t>
+            </a:r>
+            <a:r>
+              <a:rPr lang="de-DE" dirty="0" err="1"/>
+              <a:t>matrix</a:t>
+            </a:r>
+            <a:r>
+              <a:rPr lang="de-DE" dirty="0"/>
+              <a:t> </a:t>
+            </a:r>
+            <a:r>
+              <a:rPr lang="de-DE" dirty="0" err="1"/>
+              <a:t>is</a:t>
+            </a:r>
+            <a:r>
+              <a:rPr lang="de-DE" dirty="0"/>
+              <a:t> </a:t>
+            </a:r>
+            <a:r>
+              <a:rPr lang="de-DE" dirty="0" err="1"/>
+              <a:t>filled</a:t>
+            </a:r>
+            <a:r>
+              <a:rPr lang="de-DE" dirty="0"/>
+              <a:t>, </a:t>
+            </a:r>
+            <a:r>
+              <a:rPr lang="de-DE" dirty="0" err="1"/>
+              <a:t>the</a:t>
+            </a:r>
+            <a:r>
+              <a:rPr lang="de-DE" dirty="0"/>
+              <a:t> </a:t>
+            </a:r>
+            <a:r>
+              <a:rPr lang="de-DE" dirty="0" err="1"/>
+              <a:t>next</a:t>
+            </a:r>
+            <a:r>
+              <a:rPr lang="de-DE" dirty="0"/>
+              <a:t> </a:t>
+            </a:r>
+            <a:r>
+              <a:rPr lang="de-DE" dirty="0" err="1"/>
+              <a:t>step</a:t>
+            </a:r>
+            <a:r>
+              <a:rPr lang="de-DE" dirty="0"/>
+              <a:t> </a:t>
+            </a:r>
+            <a:r>
+              <a:rPr lang="de-DE" dirty="0" err="1"/>
+              <a:t>is</a:t>
+            </a:r>
+            <a:r>
+              <a:rPr lang="de-DE" dirty="0"/>
+              <a:t> </a:t>
+            </a:r>
+            <a:r>
+              <a:rPr lang="de-DE" dirty="0" err="1"/>
+              <a:t>to</a:t>
+            </a:r>
+            <a:r>
+              <a:rPr lang="de-DE" dirty="0"/>
+              <a:t> </a:t>
+            </a:r>
+            <a:r>
+              <a:rPr lang="de-DE" dirty="0" err="1"/>
+              <a:t>backtrace</a:t>
+            </a:r>
+            <a:r>
+              <a:rPr lang="de-DE" dirty="0"/>
+              <a:t> </a:t>
+            </a:r>
+            <a:r>
+              <a:rPr lang="de-DE" dirty="0" err="1"/>
+              <a:t>the</a:t>
+            </a:r>
+            <a:r>
+              <a:rPr lang="de-DE" dirty="0"/>
+              <a:t> </a:t>
+            </a:r>
+            <a:r>
+              <a:rPr lang="de-DE" dirty="0" err="1"/>
+              <a:t>sequence</a:t>
+            </a:r>
+            <a:r>
+              <a:rPr lang="de-DE" dirty="0"/>
+              <a:t>. In </a:t>
+            </a:r>
+            <a:r>
+              <a:rPr lang="de-DE" dirty="0" err="1"/>
+              <a:t>order</a:t>
+            </a:r>
+            <a:r>
+              <a:rPr lang="de-DE" dirty="0"/>
+              <a:t> </a:t>
+            </a:r>
+            <a:r>
+              <a:rPr lang="de-DE" dirty="0" err="1"/>
+              <a:t>to</a:t>
+            </a:r>
+            <a:r>
+              <a:rPr lang="de-DE" dirty="0"/>
+              <a:t> </a:t>
+            </a:r>
+            <a:r>
+              <a:rPr lang="de-DE" dirty="0" err="1"/>
+              <a:t>to</a:t>
+            </a:r>
+            <a:r>
+              <a:rPr lang="de-DE" dirty="0"/>
+              <a:t> </a:t>
+            </a:r>
+            <a:r>
+              <a:rPr lang="de-DE" dirty="0" err="1"/>
+              <a:t>that</a:t>
+            </a:r>
+            <a:r>
+              <a:rPr lang="de-DE" dirty="0"/>
+              <a:t>, </a:t>
+            </a:r>
+            <a:r>
+              <a:rPr lang="de-DE" dirty="0" err="1"/>
+              <a:t>we</a:t>
+            </a:r>
+            <a:r>
+              <a:rPr lang="de-DE" dirty="0"/>
+              <a:t> find </a:t>
+            </a:r>
+            <a:r>
+              <a:rPr lang="de-DE" dirty="0" err="1"/>
+              <a:t>the</a:t>
+            </a:r>
+            <a:r>
+              <a:rPr lang="de-DE" dirty="0"/>
+              <a:t> </a:t>
+            </a:r>
+            <a:r>
+              <a:rPr lang="de-DE" dirty="0" err="1"/>
+              <a:t>highest</a:t>
+            </a:r>
+            <a:r>
+              <a:rPr lang="de-DE" dirty="0"/>
+              <a:t> score in </a:t>
+            </a:r>
+            <a:r>
+              <a:rPr lang="de-DE" dirty="0" err="1"/>
+              <a:t>the</a:t>
+            </a:r>
+            <a:r>
+              <a:rPr lang="de-DE" dirty="0"/>
+              <a:t> </a:t>
+            </a:r>
+            <a:r>
+              <a:rPr lang="de-DE" dirty="0" err="1"/>
+              <a:t>matrix</a:t>
+            </a:r>
+            <a:r>
+              <a:rPr lang="de-DE" dirty="0"/>
+              <a:t> and </a:t>
+            </a:r>
+            <a:r>
+              <a:rPr lang="de-DE" dirty="0" err="1"/>
+              <a:t>then</a:t>
+            </a:r>
+            <a:r>
+              <a:rPr lang="de-DE" dirty="0"/>
+              <a:t> </a:t>
+            </a:r>
+            <a:r>
+              <a:rPr lang="de-DE" dirty="0" err="1"/>
+              <a:t>we</a:t>
+            </a:r>
+            <a:r>
+              <a:rPr lang="de-DE" dirty="0"/>
+              <a:t> follow </a:t>
+            </a:r>
+            <a:r>
+              <a:rPr lang="de-DE" dirty="0" err="1"/>
+              <a:t>the</a:t>
+            </a:r>
+            <a:r>
+              <a:rPr lang="de-DE" dirty="0"/>
+              <a:t> </a:t>
+            </a:r>
+            <a:r>
+              <a:rPr lang="de-DE" dirty="0" err="1"/>
+              <a:t>path</a:t>
+            </a:r>
+            <a:r>
+              <a:rPr lang="de-DE" dirty="0"/>
+              <a:t> </a:t>
+            </a:r>
+            <a:r>
+              <a:rPr lang="de-DE" dirty="0" err="1"/>
+              <a:t>recursively</a:t>
+            </a:r>
+            <a:r>
+              <a:rPr lang="de-DE" dirty="0"/>
+              <a:t> </a:t>
+            </a:r>
+            <a:r>
+              <a:rPr lang="de-DE" dirty="0" err="1"/>
+              <a:t>backwards</a:t>
+            </a:r>
+            <a:r>
+              <a:rPr lang="de-DE" dirty="0"/>
+              <a:t> </a:t>
+            </a:r>
+            <a:r>
+              <a:rPr lang="de-DE" dirty="0" err="1"/>
+              <a:t>to</a:t>
+            </a:r>
+            <a:r>
+              <a:rPr lang="de-DE" dirty="0"/>
+              <a:t> </a:t>
+            </a:r>
+            <a:r>
+              <a:rPr lang="de-DE" dirty="0" err="1"/>
+              <a:t>the</a:t>
+            </a:r>
+            <a:r>
+              <a:rPr lang="de-DE" dirty="0"/>
+              <a:t> </a:t>
+            </a:r>
+            <a:r>
+              <a:rPr lang="de-DE" dirty="0" err="1"/>
+              <a:t>excluded</a:t>
+            </a:r>
+            <a:r>
+              <a:rPr lang="de-DE" dirty="0"/>
+              <a:t> </a:t>
+            </a:r>
+            <a:r>
+              <a:rPr lang="de-DE" dirty="0" err="1"/>
+              <a:t>zero</a:t>
+            </a:r>
+            <a:r>
+              <a:rPr lang="de-DE" dirty="0"/>
+              <a:t>, </a:t>
+            </a:r>
+            <a:r>
+              <a:rPr lang="de-DE" dirty="0" err="1"/>
+              <a:t>which</a:t>
+            </a:r>
+            <a:r>
+              <a:rPr lang="de-DE" dirty="0"/>
+              <a:t> </a:t>
+            </a:r>
+            <a:r>
+              <a:rPr lang="de-DE" dirty="0" err="1"/>
+              <a:t>is</a:t>
+            </a:r>
+            <a:r>
+              <a:rPr lang="de-DE" dirty="0"/>
+              <a:t> not </a:t>
+            </a:r>
+            <a:r>
+              <a:rPr lang="de-DE" dirty="0" err="1"/>
+              <a:t>included</a:t>
+            </a:r>
+            <a:r>
+              <a:rPr lang="de-DE" dirty="0"/>
+              <a:t> in </a:t>
+            </a:r>
+            <a:r>
+              <a:rPr lang="de-DE" dirty="0" err="1"/>
+              <a:t>the</a:t>
+            </a:r>
+            <a:r>
+              <a:rPr lang="de-DE" dirty="0"/>
+              <a:t> </a:t>
+            </a:r>
+            <a:r>
+              <a:rPr lang="de-DE" dirty="0" err="1"/>
+              <a:t>result</a:t>
+            </a:r>
+            <a:r>
+              <a:rPr lang="de-DE" dirty="0"/>
+              <a:t>.  The </a:t>
+            </a:r>
+            <a:r>
+              <a:rPr lang="de-DE" dirty="0" err="1"/>
+              <a:t>path</a:t>
+            </a:r>
+            <a:r>
+              <a:rPr lang="de-DE" dirty="0"/>
+              <a:t> </a:t>
+            </a:r>
+            <a:r>
+              <a:rPr lang="de-DE" dirty="0" err="1"/>
+              <a:t>is</a:t>
+            </a:r>
+            <a:r>
+              <a:rPr lang="de-DE" dirty="0"/>
+              <a:t> </a:t>
+            </a:r>
+            <a:r>
+              <a:rPr lang="de-DE" dirty="0" err="1"/>
+              <a:t>decided</a:t>
+            </a:r>
+            <a:r>
+              <a:rPr lang="de-DE" dirty="0"/>
+              <a:t> </a:t>
+            </a:r>
+            <a:r>
+              <a:rPr lang="de-DE" dirty="0" err="1"/>
+              <a:t>counterclockwise</a:t>
+            </a:r>
+            <a:r>
+              <a:rPr lang="de-DE" dirty="0"/>
+              <a:t> </a:t>
+            </a:r>
+            <a:r>
+              <a:rPr lang="de-DE" dirty="0" err="1"/>
+              <a:t>when</a:t>
+            </a:r>
+            <a:r>
+              <a:rPr lang="de-DE" dirty="0"/>
+              <a:t> </a:t>
+            </a:r>
+            <a:r>
+              <a:rPr lang="de-DE" dirty="0" err="1"/>
+              <a:t>more</a:t>
+            </a:r>
+            <a:r>
+              <a:rPr lang="de-DE" dirty="0"/>
+              <a:t> </a:t>
+            </a:r>
+            <a:r>
+              <a:rPr lang="de-DE" dirty="0" err="1"/>
+              <a:t>possibilities</a:t>
+            </a:r>
+            <a:r>
+              <a:rPr lang="de-DE" dirty="0"/>
+              <a:t> </a:t>
+            </a:r>
+            <a:r>
+              <a:rPr lang="de-DE" dirty="0" err="1"/>
+              <a:t>are</a:t>
+            </a:r>
+            <a:r>
+              <a:rPr lang="de-DE" dirty="0"/>
+              <a:t> </a:t>
+            </a:r>
+            <a:r>
+              <a:rPr lang="de-DE" dirty="0" err="1"/>
+              <a:t>found</a:t>
+            </a:r>
+            <a:r>
+              <a:rPr lang="de-DE" dirty="0"/>
+              <a:t>. In </a:t>
+            </a:r>
+            <a:r>
+              <a:rPr lang="de-DE" dirty="0" err="1"/>
+              <a:t>this</a:t>
+            </a:r>
+            <a:r>
+              <a:rPr lang="de-DE" dirty="0"/>
+              <a:t> </a:t>
+            </a:r>
+            <a:r>
+              <a:rPr lang="de-DE" dirty="0" err="1"/>
+              <a:t>case</a:t>
+            </a:r>
+            <a:r>
+              <a:rPr lang="de-DE" dirty="0"/>
+              <a:t>, </a:t>
+            </a:r>
+            <a:r>
+              <a:rPr lang="de-DE" dirty="0" err="1"/>
+              <a:t>the</a:t>
+            </a:r>
+            <a:r>
+              <a:rPr lang="de-DE" dirty="0"/>
+              <a:t> </a:t>
+            </a:r>
+            <a:r>
+              <a:rPr lang="de-DE" dirty="0" err="1"/>
+              <a:t>result</a:t>
+            </a:r>
+            <a:r>
+              <a:rPr lang="de-DE" dirty="0"/>
+              <a:t> </a:t>
+            </a:r>
+            <a:r>
+              <a:rPr lang="de-DE" dirty="0" err="1"/>
+              <a:t>is</a:t>
+            </a:r>
+            <a:r>
+              <a:rPr lang="de-DE" dirty="0"/>
+              <a:t> A-CA, </a:t>
+            </a:r>
+            <a:r>
+              <a:rPr lang="de-DE" dirty="0" err="1"/>
+              <a:t>because</a:t>
+            </a:r>
+            <a:r>
+              <a:rPr lang="de-DE" dirty="0"/>
+              <a:t> </a:t>
+            </a:r>
+            <a:r>
+              <a:rPr lang="de-DE" dirty="0" err="1"/>
+              <a:t>the</a:t>
+            </a:r>
+            <a:r>
+              <a:rPr lang="de-DE" dirty="0"/>
+              <a:t> </a:t>
+            </a:r>
+            <a:r>
+              <a:rPr lang="de-DE" dirty="0" err="1"/>
+              <a:t>algorithm</a:t>
+            </a:r>
+            <a:r>
+              <a:rPr lang="de-DE" dirty="0"/>
+              <a:t> </a:t>
+            </a:r>
+            <a:r>
+              <a:rPr lang="de-DE" dirty="0" err="1"/>
+              <a:t>found</a:t>
+            </a:r>
+            <a:r>
+              <a:rPr lang="de-DE" dirty="0"/>
+              <a:t> a </a:t>
+            </a:r>
+            <a:r>
+              <a:rPr lang="de-DE" dirty="0" err="1"/>
+              <a:t>gap</a:t>
+            </a:r>
+            <a:r>
+              <a:rPr lang="de-DE" dirty="0"/>
+              <a:t> in </a:t>
+            </a:r>
+            <a:r>
+              <a:rPr lang="de-DE" dirty="0" err="1"/>
+              <a:t>the</a:t>
+            </a:r>
+            <a:r>
+              <a:rPr lang="de-DE" dirty="0"/>
+              <a:t> </a:t>
+            </a:r>
+            <a:r>
+              <a:rPr lang="de-DE" dirty="0" err="1"/>
+              <a:t>history</a:t>
+            </a:r>
+            <a:r>
+              <a:rPr lang="de-DE" dirty="0"/>
+              <a:t> </a:t>
+            </a:r>
+            <a:r>
+              <a:rPr lang="de-DE" dirty="0" err="1"/>
+              <a:t>sequence</a:t>
+            </a:r>
+            <a:r>
+              <a:rPr lang="de-DE" dirty="0"/>
+              <a:t>. </a:t>
+            </a:r>
+          </a:p>
+        </p:txBody>
+      </p:sp>
+      <p:sp>
+        <p:nvSpPr>
+          <p:cNvPr id="4" name="Foliennummernplatzhalter 3"/>
+          <p:cNvSpPr>
+            <a:spLocks noGrp="1"/>
+          </p:cNvSpPr>
+          <p:nvPr>
+            <p:ph type="sldNum" sz="quarter" idx="10"/>
+          </p:nvPr>
+        </p:nvSpPr>
+        <p:spPr/>
+        <p:txBody>
+          <a:bodyPr/>
+          <a:lstStyle/>
+          <a:p>
+            <a:fld id="{AA07C420-CE83-453F-83A5-25E4D2906979}" type="slidenum">
+              <a:rPr lang="de-DE" smtClean="0"/>
               <a:t>9</a:t>
             </a:fld>
             <a:endParaRPr lang="de-DE"/>
@@ -774,7 +4101,557 @@
 </p:notes>
 </file>
 
-<file path=ppt/notesSlides/notesSlide4.xml><?xml version="1.0" encoding="utf-8"?>
+<file path=ppt/notesSlides/notesSlide6.xml><?xml version="1.0" encoding="utf-8"?>
+<p:notes xmlns:a="http://schemas.openxmlformats.org/drawingml/2006/main" xmlns:r="http://schemas.openxmlformats.org/officeDocument/2006/relationships" xmlns:p="http://schemas.openxmlformats.org/presentationml/2006/main">
+  <p:cSld>
+    <p:spTree>
+      <p:nvGrpSpPr>
+        <p:cNvPr id="1" name=""/>
+        <p:cNvGrpSpPr/>
+        <p:nvPr/>
+      </p:nvGrpSpPr>
+      <p:grpSpPr>
+        <a:xfrm>
+          <a:off x="0" y="0"/>
+          <a:ext cx="0" cy="0"/>
+          <a:chOff x="0" y="0"/>
+          <a:chExt cx="0" cy="0"/>
+        </a:xfrm>
+      </p:grpSpPr>
+      <p:sp>
+        <p:nvSpPr>
+          <p:cNvPr id="2" name="Folienbildplatzhalter 1"/>
+          <p:cNvSpPr>
+            <a:spLocks noGrp="1" noRot="1" noChangeAspect="1"/>
+          </p:cNvSpPr>
+          <p:nvPr>
+            <p:ph type="sldImg"/>
+          </p:nvPr>
+        </p:nvSpPr>
+        <p:spPr/>
+      </p:sp>
+      <p:sp>
+        <p:nvSpPr>
+          <p:cNvPr id="3" name="Notizenplatzhalter 2"/>
+          <p:cNvSpPr>
+            <a:spLocks noGrp="1"/>
+          </p:cNvSpPr>
+          <p:nvPr>
+            <p:ph type="body" idx="1"/>
+          </p:nvPr>
+        </p:nvSpPr>
+        <p:spPr/>
+        <p:txBody>
+          <a:bodyPr/>
+          <a:lstStyle/>
+          <a:p>
+            <a:r>
+              <a:rPr lang="de-DE" dirty="0"/>
+              <a:t>Here </a:t>
+            </a:r>
+            <a:r>
+              <a:rPr lang="de-DE" dirty="0" err="1"/>
+              <a:t>you</a:t>
+            </a:r>
+            <a:r>
+              <a:rPr lang="de-DE" dirty="0"/>
+              <a:t> </a:t>
+            </a:r>
+            <a:r>
+              <a:rPr lang="de-DE" dirty="0" err="1"/>
+              <a:t>can</a:t>
+            </a:r>
+            <a:r>
+              <a:rPr lang="de-DE" dirty="0"/>
+              <a:t> </a:t>
+            </a:r>
+            <a:r>
+              <a:rPr lang="de-DE" dirty="0" err="1"/>
+              <a:t>see</a:t>
+            </a:r>
+            <a:r>
+              <a:rPr lang="de-DE" dirty="0"/>
+              <a:t> </a:t>
+            </a:r>
+            <a:r>
+              <a:rPr lang="de-DE" dirty="0" err="1"/>
+              <a:t>once</a:t>
+            </a:r>
+            <a:r>
+              <a:rPr lang="de-DE" dirty="0"/>
+              <a:t> </a:t>
+            </a:r>
+            <a:r>
+              <a:rPr lang="de-DE" dirty="0" err="1"/>
+              <a:t>again</a:t>
+            </a:r>
+            <a:r>
+              <a:rPr lang="de-DE" dirty="0"/>
+              <a:t> </a:t>
+            </a:r>
+            <a:r>
+              <a:rPr lang="de-DE" dirty="0" err="1"/>
+              <a:t>the</a:t>
+            </a:r>
+            <a:r>
+              <a:rPr lang="de-DE" dirty="0"/>
+              <a:t> </a:t>
+            </a:r>
+            <a:r>
+              <a:rPr lang="de-DE" dirty="0" err="1"/>
+              <a:t>flow</a:t>
+            </a:r>
+            <a:r>
+              <a:rPr lang="de-DE" dirty="0"/>
+              <a:t> </a:t>
+            </a:r>
+            <a:r>
+              <a:rPr lang="de-DE" dirty="0" err="1"/>
+              <a:t>of</a:t>
+            </a:r>
+            <a:r>
+              <a:rPr lang="de-DE" dirty="0"/>
+              <a:t> </a:t>
+            </a:r>
+            <a:r>
+              <a:rPr lang="de-DE" dirty="0" err="1"/>
+              <a:t>the</a:t>
+            </a:r>
+            <a:r>
+              <a:rPr lang="de-DE" dirty="0"/>
+              <a:t> </a:t>
+            </a:r>
+            <a:r>
+              <a:rPr lang="de-DE" dirty="0" err="1"/>
+              <a:t>approach</a:t>
+            </a:r>
+            <a:r>
+              <a:rPr lang="de-DE" dirty="0"/>
+              <a:t>. First </a:t>
+            </a:r>
+            <a:r>
+              <a:rPr lang="de-DE" dirty="0" err="1"/>
+              <a:t>we</a:t>
+            </a:r>
+            <a:r>
+              <a:rPr lang="de-DE" dirty="0"/>
+              <a:t> </a:t>
+            </a:r>
+            <a:r>
+              <a:rPr lang="de-DE" dirty="0" err="1"/>
+              <a:t>have</a:t>
+            </a:r>
+            <a:r>
+              <a:rPr lang="de-DE" dirty="0"/>
+              <a:t> </a:t>
+            </a:r>
+            <a:r>
+              <a:rPr lang="de-DE" dirty="0" err="1"/>
+              <a:t>google</a:t>
+            </a:r>
+            <a:r>
+              <a:rPr lang="de-DE" dirty="0"/>
+              <a:t> </a:t>
+            </a:r>
+            <a:r>
+              <a:rPr lang="de-DE" dirty="0" err="1"/>
+              <a:t>location</a:t>
+            </a:r>
+            <a:r>
+              <a:rPr lang="de-DE" dirty="0"/>
+              <a:t> </a:t>
+            </a:r>
+            <a:r>
+              <a:rPr lang="de-DE" dirty="0" err="1"/>
+              <a:t>data</a:t>
+            </a:r>
+            <a:r>
+              <a:rPr lang="de-DE" dirty="0"/>
+              <a:t>, </a:t>
+            </a:r>
+            <a:r>
+              <a:rPr lang="de-DE" dirty="0" err="1"/>
+              <a:t>which</a:t>
+            </a:r>
+            <a:r>
+              <a:rPr lang="de-DE" dirty="0"/>
+              <a:t> </a:t>
+            </a:r>
+            <a:r>
+              <a:rPr lang="de-DE" dirty="0" err="1"/>
+              <a:t>we</a:t>
+            </a:r>
+            <a:r>
+              <a:rPr lang="de-DE" dirty="0"/>
+              <a:t> </a:t>
+            </a:r>
+            <a:r>
+              <a:rPr lang="de-DE" dirty="0" err="1"/>
+              <a:t>compress</a:t>
+            </a:r>
+            <a:r>
+              <a:rPr lang="de-DE" dirty="0"/>
+              <a:t>. </a:t>
+            </a:r>
+            <a:r>
+              <a:rPr lang="de-DE" dirty="0" err="1"/>
+              <a:t>Then</a:t>
+            </a:r>
+            <a:r>
+              <a:rPr lang="de-DE" dirty="0"/>
+              <a:t>, </a:t>
+            </a:r>
+            <a:r>
+              <a:rPr lang="de-DE" dirty="0" err="1"/>
+              <a:t>we</a:t>
+            </a:r>
+            <a:r>
+              <a:rPr lang="de-DE" dirty="0"/>
+              <a:t> </a:t>
+            </a:r>
+            <a:r>
+              <a:rPr lang="de-DE" dirty="0" err="1"/>
+              <a:t>use</a:t>
+            </a:r>
+            <a:r>
+              <a:rPr lang="de-DE" dirty="0"/>
+              <a:t> </a:t>
+            </a:r>
+            <a:r>
+              <a:rPr lang="de-DE" dirty="0" err="1"/>
+              <a:t>smith-waterman</a:t>
+            </a:r>
+            <a:r>
+              <a:rPr lang="de-DE" dirty="0"/>
+              <a:t> </a:t>
+            </a:r>
+            <a:r>
+              <a:rPr lang="de-DE" dirty="0" err="1"/>
+              <a:t>algorithm</a:t>
+            </a:r>
+            <a:r>
+              <a:rPr lang="de-DE" dirty="0"/>
+              <a:t> </a:t>
+            </a:r>
+            <a:r>
+              <a:rPr lang="de-DE" dirty="0" err="1"/>
+              <a:t>to</a:t>
+            </a:r>
+            <a:r>
+              <a:rPr lang="de-DE" dirty="0"/>
+              <a:t> </a:t>
+            </a:r>
+            <a:r>
+              <a:rPr lang="de-DE" dirty="0" err="1"/>
+              <a:t>get</a:t>
+            </a:r>
+            <a:r>
+              <a:rPr lang="de-DE" dirty="0"/>
+              <a:t> </a:t>
+            </a:r>
+            <a:r>
+              <a:rPr lang="de-DE" dirty="0" err="1"/>
+              <a:t>the</a:t>
+            </a:r>
+            <a:r>
+              <a:rPr lang="de-DE" dirty="0"/>
+              <a:t> </a:t>
+            </a:r>
+            <a:r>
+              <a:rPr lang="de-DE" dirty="0" err="1"/>
+              <a:t>prediction</a:t>
+            </a:r>
+            <a:r>
+              <a:rPr lang="de-DE" dirty="0"/>
+              <a:t>. </a:t>
+            </a:r>
+            <a:r>
+              <a:rPr lang="de-DE" dirty="0" err="1"/>
+              <a:t>Our</a:t>
+            </a:r>
+            <a:r>
+              <a:rPr lang="de-DE" dirty="0"/>
+              <a:t> </a:t>
+            </a:r>
+            <a:r>
+              <a:rPr lang="de-DE" dirty="0" err="1"/>
+              <a:t>program</a:t>
+            </a:r>
+            <a:r>
+              <a:rPr lang="de-DE" dirty="0"/>
+              <a:t> </a:t>
+            </a:r>
+            <a:r>
+              <a:rPr lang="de-DE" dirty="0" err="1"/>
+              <a:t>is</a:t>
+            </a:r>
+            <a:r>
+              <a:rPr lang="de-DE" dirty="0"/>
+              <a:t> </a:t>
+            </a:r>
+            <a:r>
+              <a:rPr lang="de-DE" dirty="0" err="1"/>
+              <a:t>written</a:t>
+            </a:r>
+            <a:r>
+              <a:rPr lang="de-DE" dirty="0"/>
+              <a:t> in </a:t>
+            </a:r>
+            <a:r>
+              <a:rPr lang="de-DE" dirty="0" err="1"/>
+              <a:t>JavaSE</a:t>
+            </a:r>
+            <a:r>
+              <a:rPr lang="de-DE" dirty="0"/>
+              <a:t> 1.8. </a:t>
+            </a:r>
+            <a:r>
+              <a:rPr lang="de-DE" dirty="0" err="1"/>
+              <a:t>For</a:t>
+            </a:r>
+            <a:r>
+              <a:rPr lang="de-DE" dirty="0"/>
+              <a:t> </a:t>
+            </a:r>
+            <a:r>
+              <a:rPr lang="de-DE" dirty="0" err="1"/>
+              <a:t>testing</a:t>
+            </a:r>
+            <a:r>
+              <a:rPr lang="de-DE" dirty="0"/>
+              <a:t> </a:t>
+            </a:r>
+            <a:r>
+              <a:rPr lang="de-DE" dirty="0" err="1"/>
+              <a:t>with</a:t>
+            </a:r>
+            <a:r>
+              <a:rPr lang="de-DE" dirty="0"/>
+              <a:t> different paramater </a:t>
+            </a:r>
+            <a:r>
+              <a:rPr lang="de-DE" dirty="0" err="1"/>
+              <a:t>inputs</a:t>
+            </a:r>
+            <a:r>
+              <a:rPr lang="de-DE" dirty="0"/>
+              <a:t>, </a:t>
+            </a:r>
+            <a:r>
+              <a:rPr lang="de-DE" dirty="0" err="1"/>
+              <a:t>we</a:t>
+            </a:r>
+            <a:r>
+              <a:rPr lang="de-DE" dirty="0"/>
+              <a:t> </a:t>
+            </a:r>
+            <a:r>
+              <a:rPr lang="de-DE" dirty="0" err="1"/>
+              <a:t>used</a:t>
+            </a:r>
+            <a:r>
+              <a:rPr lang="de-DE" dirty="0"/>
+              <a:t> </a:t>
+            </a:r>
+            <a:r>
+              <a:rPr lang="de-DE" dirty="0" err="1"/>
+              <a:t>Junit</a:t>
+            </a:r>
+            <a:r>
+              <a:rPr lang="de-DE" dirty="0"/>
+              <a:t> 5.0.</a:t>
+            </a:r>
+          </a:p>
+        </p:txBody>
+      </p:sp>
+      <p:sp>
+        <p:nvSpPr>
+          <p:cNvPr id="4" name="Foliennummernplatzhalter 3"/>
+          <p:cNvSpPr>
+            <a:spLocks noGrp="1"/>
+          </p:cNvSpPr>
+          <p:nvPr>
+            <p:ph type="sldNum" sz="quarter" idx="10"/>
+          </p:nvPr>
+        </p:nvSpPr>
+        <p:spPr/>
+        <p:txBody>
+          <a:bodyPr/>
+          <a:lstStyle/>
+          <a:p>
+            <a:fld id="{AA07C420-CE83-453F-83A5-25E4D2906979}" type="slidenum">
+              <a:rPr lang="de-DE" smtClean="0"/>
+              <a:t>10</a:t>
+            </a:fld>
+            <a:endParaRPr lang="de-DE"/>
+          </a:p>
+        </p:txBody>
+      </p:sp>
+    </p:spTree>
+    <p:extLst>
+      <p:ext uri="{BB962C8B-B14F-4D97-AF65-F5344CB8AC3E}">
+        <p14:creationId xmlns:p14="http://schemas.microsoft.com/office/powerpoint/2010/main" val="140930319"/>
+      </p:ext>
+    </p:extLst>
+  </p:cSld>
+  <p:clrMapOvr>
+    <a:masterClrMapping/>
+  </p:clrMapOvr>
+</p:notes>
+</file>
+
+<file path=ppt/notesSlides/notesSlide7.xml><?xml version="1.0" encoding="utf-8"?>
+<p:notes xmlns:a="http://schemas.openxmlformats.org/drawingml/2006/main" xmlns:r="http://schemas.openxmlformats.org/officeDocument/2006/relationships" xmlns:p="http://schemas.openxmlformats.org/presentationml/2006/main">
+  <p:cSld>
+    <p:spTree>
+      <p:nvGrpSpPr>
+        <p:cNvPr id="1" name=""/>
+        <p:cNvGrpSpPr/>
+        <p:nvPr/>
+      </p:nvGrpSpPr>
+      <p:grpSpPr>
+        <a:xfrm>
+          <a:off x="0" y="0"/>
+          <a:ext cx="0" cy="0"/>
+          <a:chOff x="0" y="0"/>
+          <a:chExt cx="0" cy="0"/>
+        </a:xfrm>
+      </p:grpSpPr>
+      <p:sp>
+        <p:nvSpPr>
+          <p:cNvPr id="2" name="Folienbildplatzhalter 1"/>
+          <p:cNvSpPr>
+            <a:spLocks noGrp="1" noRot="1" noChangeAspect="1"/>
+          </p:cNvSpPr>
+          <p:nvPr>
+            <p:ph type="sldImg"/>
+          </p:nvPr>
+        </p:nvSpPr>
+        <p:spPr/>
+      </p:sp>
+      <p:sp>
+        <p:nvSpPr>
+          <p:cNvPr id="3" name="Notizenplatzhalter 2"/>
+          <p:cNvSpPr>
+            <a:spLocks noGrp="1"/>
+          </p:cNvSpPr>
+          <p:nvPr>
+            <p:ph type="body" idx="1"/>
+          </p:nvPr>
+        </p:nvSpPr>
+        <p:spPr/>
+        <p:txBody>
+          <a:bodyPr/>
+          <a:lstStyle/>
+          <a:p>
+            <a:r>
+              <a:rPr lang="de-DE" dirty="0"/>
+              <a:t>And </a:t>
+            </a:r>
+            <a:r>
+              <a:rPr lang="de-DE" dirty="0" err="1"/>
+              <a:t>this</a:t>
+            </a:r>
+            <a:r>
+              <a:rPr lang="de-DE" dirty="0"/>
+              <a:t> </a:t>
+            </a:r>
+            <a:r>
+              <a:rPr lang="de-DE" dirty="0" err="1"/>
+              <a:t>is</a:t>
+            </a:r>
+            <a:r>
+              <a:rPr lang="de-DE" dirty="0"/>
+              <a:t>, </a:t>
+            </a:r>
+            <a:r>
+              <a:rPr lang="de-DE" dirty="0" err="1"/>
+              <a:t>how</a:t>
+            </a:r>
+            <a:r>
+              <a:rPr lang="de-DE" dirty="0"/>
+              <a:t> </a:t>
+            </a:r>
+            <a:r>
+              <a:rPr lang="de-DE" dirty="0" err="1"/>
+              <a:t>the</a:t>
+            </a:r>
+            <a:r>
+              <a:rPr lang="de-DE" dirty="0"/>
+              <a:t> </a:t>
+            </a:r>
+            <a:r>
+              <a:rPr lang="de-DE" dirty="0" err="1"/>
+              <a:t>output</a:t>
+            </a:r>
+            <a:r>
+              <a:rPr lang="de-DE" dirty="0"/>
+              <a:t> </a:t>
+            </a:r>
+            <a:r>
+              <a:rPr lang="de-DE" dirty="0" err="1"/>
+              <a:t>looks</a:t>
+            </a:r>
+            <a:r>
+              <a:rPr lang="de-DE" dirty="0"/>
+              <a:t> in </a:t>
+            </a:r>
+            <a:r>
+              <a:rPr lang="de-DE" dirty="0" err="1"/>
+              <a:t>our</a:t>
+            </a:r>
+            <a:r>
+              <a:rPr lang="de-DE" dirty="0"/>
+              <a:t> </a:t>
+            </a:r>
+            <a:r>
+              <a:rPr lang="de-DE" dirty="0" err="1"/>
+              <a:t>program</a:t>
+            </a:r>
+            <a:r>
+              <a:rPr lang="de-DE" dirty="0"/>
+              <a:t>.</a:t>
+            </a:r>
+          </a:p>
+        </p:txBody>
+      </p:sp>
+      <p:sp>
+        <p:nvSpPr>
+          <p:cNvPr id="4" name="Foliennummernplatzhalter 3"/>
+          <p:cNvSpPr>
+            <a:spLocks noGrp="1"/>
+          </p:cNvSpPr>
+          <p:nvPr>
+            <p:ph type="sldNum" sz="quarter" idx="10"/>
+          </p:nvPr>
+        </p:nvSpPr>
+        <p:spPr/>
+        <p:txBody>
+          <a:bodyPr/>
+          <a:lstStyle/>
+          <a:p>
+            <a:fld id="{AA07C420-CE83-453F-83A5-25E4D2906979}" type="slidenum">
+              <a:rPr lang="de-DE" smtClean="0"/>
+              <a:t>11</a:t>
+            </a:fld>
+            <a:endParaRPr lang="de-DE"/>
+          </a:p>
+        </p:txBody>
+      </p:sp>
+    </p:spTree>
+    <p:extLst>
+      <p:ext uri="{BB962C8B-B14F-4D97-AF65-F5344CB8AC3E}">
+        <p14:creationId xmlns:p14="http://schemas.microsoft.com/office/powerpoint/2010/main" val="2054701830"/>
+      </p:ext>
+    </p:extLst>
+  </p:cSld>
+  <p:clrMapOvr>
+    <a:masterClrMapping/>
+  </p:clrMapOvr>
+</p:notes>
+</file>
+
+<file path=ppt/notesSlides/notesSlide8.xml><?xml version="1.0" encoding="utf-8"?>
 <p:notes xmlns:a="http://schemas.openxmlformats.org/drawingml/2006/main" xmlns:r="http://schemas.openxmlformats.org/officeDocument/2006/relationships" xmlns:p="http://schemas.openxmlformats.org/presentationml/2006/main">
   <p:cSld>
     <p:spTree>
@@ -6099,7 +9976,7 @@
           <p:nvPr/>
         </p:nvPicPr>
         <p:blipFill>
-          <a:blip r:embed="rId2">
+          <a:blip r:embed="rId3">
             <a:extLst>
               <a:ext uri="{28A0092B-C50C-407E-A947-70E740481C1C}">
                 <a14:useLocalDpi xmlns:a14="http://schemas.microsoft.com/office/drawing/2010/main" val="0"/>
@@ -6178,32 +10055,55 @@
           </a:p>
         </p:txBody>
       </p:sp>
+      <p:sp>
+        <p:nvSpPr>
+          <p:cNvPr id="5" name="Inhaltsplatzhalter 4">
+            <a:extLst>
+              <a:ext uri="{FF2B5EF4-FFF2-40B4-BE49-F238E27FC236}">
+                <a16:creationId xmlns:a16="http://schemas.microsoft.com/office/drawing/2014/main" id="{68ADAB55-D3D8-4CB8-AA74-6A57A8848A47}"/>
+              </a:ext>
+            </a:extLst>
+          </p:cNvPr>
+          <p:cNvSpPr>
+            <a:spLocks noGrp="1"/>
+          </p:cNvSpPr>
+          <p:nvPr>
+            <p:ph idx="1"/>
+          </p:nvPr>
+        </p:nvSpPr>
+        <p:spPr/>
+        <p:txBody>
+          <a:bodyPr/>
+          <a:lstStyle/>
+          <a:p>
+            <a:endParaRPr lang="de-DE"/>
+          </a:p>
+        </p:txBody>
+      </p:sp>
       <p:pic>
         <p:nvPicPr>
-          <p:cNvPr id="4" name="Inhaltsplatzhalter 3">
+          <p:cNvPr id="6" name="Grafik 5">
             <a:extLst>
               <a:ext uri="{FF2B5EF4-FFF2-40B4-BE49-F238E27FC236}">
-                <a16:creationId xmlns:a16="http://schemas.microsoft.com/office/drawing/2014/main" id="{3D15A42E-21DE-42F3-A18A-59A4E4725380}"/>
+                <a16:creationId xmlns:a16="http://schemas.microsoft.com/office/drawing/2014/main" id="{B1F709F3-DAB7-4FB0-BB1D-C1A73B192FCF}"/>
               </a:ext>
             </a:extLst>
           </p:cNvPr>
           <p:cNvPicPr>
-            <a:picLocks noGrp="1" noChangeAspect="1"/>
+            <a:picLocks noChangeAspect="1"/>
           </p:cNvPicPr>
-          <p:nvPr>
-            <p:ph idx="1"/>
-          </p:nvPr>
+          <p:nvPr/>
         </p:nvPicPr>
         <p:blipFill>
-          <a:blip r:embed="rId2"/>
+          <a:blip r:embed="rId3"/>
           <a:stretch>
             <a:fillRect/>
           </a:stretch>
         </p:blipFill>
         <p:spPr>
           <a:xfrm>
-            <a:off x="414338" y="1735601"/>
-            <a:ext cx="8229600" cy="4255161"/>
+            <a:off x="107504" y="1505807"/>
+            <a:ext cx="8928992" cy="4714748"/>
           </a:xfrm>
           <a:prstGeom prst="rect">
             <a:avLst/>
@@ -10252,287 +14152,6 @@
           <p:cNvPr id="2" name="Titel 1">
             <a:extLst>
               <a:ext uri="{FF2B5EF4-FFF2-40B4-BE49-F238E27FC236}">
-                <a16:creationId xmlns:a16="http://schemas.microsoft.com/office/drawing/2014/main" id="{5CE9B4EF-180C-462D-9742-3A6754B91F32}"/>
-              </a:ext>
-            </a:extLst>
-          </p:cNvPr>
-          <p:cNvSpPr>
-            <a:spLocks noGrp="1"/>
-          </p:cNvSpPr>
-          <p:nvPr>
-            <p:ph type="title"/>
-          </p:nvPr>
-        </p:nvSpPr>
-        <p:spPr/>
-        <p:txBody>
-          <a:bodyPr/>
-          <a:lstStyle/>
-          <a:p>
-            <a:r>
-              <a:rPr lang="de-DE" dirty="0" err="1"/>
-              <a:t>Conception</a:t>
-            </a:r>
-            <a:endParaRPr lang="de-DE" dirty="0"/>
-          </a:p>
-        </p:txBody>
-      </p:sp>
-      <p:pic>
-        <p:nvPicPr>
-          <p:cNvPr id="6" name="Inhaltsplatzhalter 5">
-            <a:extLst>
-              <a:ext uri="{FF2B5EF4-FFF2-40B4-BE49-F238E27FC236}">
-                <a16:creationId xmlns:a16="http://schemas.microsoft.com/office/drawing/2014/main" id="{7AF26E34-A853-4992-9A9B-7F0465239D92}"/>
-              </a:ext>
-            </a:extLst>
-          </p:cNvPr>
-          <p:cNvPicPr>
-            <a:picLocks noGrp="1" noChangeAspect="1"/>
-          </p:cNvPicPr>
-          <p:nvPr>
-            <p:ph sz="half" idx="1"/>
-          </p:nvPr>
-        </p:nvPicPr>
-        <p:blipFill>
-          <a:blip r:embed="rId3">
-            <a:extLst>
-              <a:ext uri="{28A0092B-C50C-407E-A947-70E740481C1C}">
-                <a14:useLocalDpi xmlns:a14="http://schemas.microsoft.com/office/drawing/2010/main" val="0"/>
-              </a:ext>
-            </a:extLst>
-          </a:blip>
-          <a:stretch>
-            <a:fillRect/>
-          </a:stretch>
-        </p:blipFill>
-        <p:spPr>
-          <a:xfrm>
-            <a:off x="467544" y="4365104"/>
-            <a:ext cx="8208912" cy="1224136"/>
-          </a:xfrm>
-        </p:spPr>
-      </p:pic>
-      <p:sp>
-        <p:nvSpPr>
-          <p:cNvPr id="14" name="Inhaltsplatzhalter 13">
-            <a:extLst>
-              <a:ext uri="{FF2B5EF4-FFF2-40B4-BE49-F238E27FC236}">
-                <a16:creationId xmlns:a16="http://schemas.microsoft.com/office/drawing/2014/main" id="{A56ADED2-9DC7-47B8-8CE3-6E300BDA691C}"/>
-              </a:ext>
-            </a:extLst>
-          </p:cNvPr>
-          <p:cNvSpPr>
-            <a:spLocks noGrp="1"/>
-          </p:cNvSpPr>
-          <p:nvPr>
-            <p:ph sz="half" idx="2"/>
-          </p:nvPr>
-        </p:nvSpPr>
-        <p:spPr>
-          <a:xfrm>
-            <a:off x="467544" y="1412776"/>
-            <a:ext cx="8208912" cy="3168352"/>
-          </a:xfrm>
-        </p:spPr>
-        <p:txBody>
-          <a:bodyPr/>
-          <a:lstStyle/>
-          <a:p>
-            <a:r>
-              <a:rPr lang="de-DE" b="1" dirty="0" err="1"/>
-              <a:t>History</a:t>
-            </a:r>
-            <a:r>
-              <a:rPr lang="de-DE" b="1" dirty="0"/>
-              <a:t> </a:t>
-            </a:r>
-            <a:r>
-              <a:rPr lang="de-DE" b="1" dirty="0" err="1"/>
-              <a:t>sequence</a:t>
-            </a:r>
-            <a:r>
-              <a:rPr lang="de-DE" b="1" dirty="0"/>
-              <a:t>: </a:t>
-            </a:r>
-            <a:r>
-              <a:rPr lang="de-DE" dirty="0"/>
-              <a:t>The </a:t>
-            </a:r>
-            <a:r>
-              <a:rPr lang="de-DE" dirty="0" err="1"/>
-              <a:t>entire</a:t>
-            </a:r>
-            <a:r>
-              <a:rPr lang="de-DE" dirty="0"/>
-              <a:t> </a:t>
-            </a:r>
-            <a:r>
-              <a:rPr lang="de-DE" dirty="0" err="1"/>
-              <a:t>sequence</a:t>
-            </a:r>
-            <a:endParaRPr lang="de-DE" dirty="0"/>
-          </a:p>
-          <a:p>
-            <a:r>
-              <a:rPr lang="de-DE" b="1" dirty="0"/>
-              <a:t>Search </a:t>
-            </a:r>
-            <a:r>
-              <a:rPr lang="de-DE" b="1" dirty="0" err="1"/>
-              <a:t>sequence</a:t>
-            </a:r>
-            <a:r>
-              <a:rPr lang="de-DE" b="1" dirty="0"/>
-              <a:t>: </a:t>
-            </a:r>
-            <a:r>
-              <a:rPr lang="de-DE" dirty="0"/>
-              <a:t>Last x </a:t>
-            </a:r>
-            <a:r>
-              <a:rPr lang="de-DE" dirty="0" err="1"/>
-              <a:t>characters</a:t>
-            </a:r>
-            <a:r>
-              <a:rPr lang="de-DE" dirty="0"/>
-              <a:t> </a:t>
-            </a:r>
-            <a:r>
-              <a:rPr lang="de-DE" dirty="0" err="1"/>
-              <a:t>of</a:t>
-            </a:r>
-            <a:r>
-              <a:rPr lang="de-DE" dirty="0"/>
-              <a:t> </a:t>
-            </a:r>
-            <a:r>
-              <a:rPr lang="de-DE" dirty="0" err="1"/>
-              <a:t>history</a:t>
-            </a:r>
-            <a:r>
-              <a:rPr lang="de-DE" dirty="0"/>
-              <a:t> </a:t>
-            </a:r>
-            <a:r>
-              <a:rPr lang="de-DE" dirty="0" err="1"/>
-              <a:t>sequence</a:t>
-            </a:r>
-            <a:endParaRPr lang="de-DE" dirty="0"/>
-          </a:p>
-          <a:p>
-            <a:r>
-              <a:rPr lang="de-DE" b="1" dirty="0"/>
-              <a:t>Match </a:t>
-            </a:r>
-            <a:r>
-              <a:rPr lang="de-DE" b="1" dirty="0" err="1"/>
-              <a:t>sequence</a:t>
-            </a:r>
-            <a:r>
-              <a:rPr lang="de-DE" b="1" dirty="0"/>
-              <a:t>: </a:t>
-            </a:r>
-            <a:r>
-              <a:rPr lang="de-DE" dirty="0" err="1"/>
-              <a:t>Found</a:t>
-            </a:r>
-            <a:r>
-              <a:rPr lang="de-DE" dirty="0"/>
-              <a:t> </a:t>
-            </a:r>
-            <a:r>
-              <a:rPr lang="de-DE" dirty="0" err="1"/>
-              <a:t>search</a:t>
-            </a:r>
-            <a:r>
-              <a:rPr lang="de-DE" dirty="0"/>
-              <a:t> </a:t>
-            </a:r>
-            <a:r>
-              <a:rPr lang="de-DE" dirty="0" err="1"/>
-              <a:t>sequence</a:t>
-            </a:r>
-            <a:endParaRPr lang="de-DE" dirty="0"/>
-          </a:p>
-          <a:p>
-            <a:r>
-              <a:rPr lang="de-DE" b="1" dirty="0" err="1"/>
-              <a:t>Prediction</a:t>
-            </a:r>
-            <a:r>
-              <a:rPr lang="de-DE" b="1" dirty="0"/>
-              <a:t>:</a:t>
-            </a:r>
-            <a:r>
-              <a:rPr lang="de-DE" dirty="0"/>
-              <a:t> </a:t>
-            </a:r>
-            <a:r>
-              <a:rPr lang="de-DE" dirty="0" err="1"/>
-              <a:t>Continuation</a:t>
-            </a:r>
-            <a:r>
-              <a:rPr lang="de-DE" dirty="0"/>
-              <a:t> </a:t>
-            </a:r>
-            <a:r>
-              <a:rPr lang="de-DE" dirty="0" err="1"/>
-              <a:t>from</a:t>
-            </a:r>
-            <a:r>
-              <a:rPr lang="de-DE" dirty="0"/>
-              <a:t> </a:t>
-            </a:r>
-            <a:r>
-              <a:rPr lang="de-DE" dirty="0" err="1"/>
-              <a:t>match</a:t>
-            </a:r>
-            <a:r>
-              <a:rPr lang="de-DE" dirty="0"/>
-              <a:t> </a:t>
-            </a:r>
-            <a:r>
-              <a:rPr lang="de-DE" dirty="0" err="1"/>
-              <a:t>sequence</a:t>
-            </a:r>
-            <a:endParaRPr lang="de-DE" dirty="0"/>
-          </a:p>
-        </p:txBody>
-      </p:sp>
-    </p:spTree>
-    <p:extLst>
-      <p:ext uri="{BB962C8B-B14F-4D97-AF65-F5344CB8AC3E}">
-        <p14:creationId xmlns:p14="http://schemas.microsoft.com/office/powerpoint/2010/main" val="3301155235"/>
-      </p:ext>
-    </p:extLst>
-  </p:cSld>
-  <p:clrMapOvr>
-    <a:masterClrMapping/>
-  </p:clrMapOvr>
-</p:sld>
-</file>
-
-<file path=ppt/slides/slide7.xml><?xml version="1.0" encoding="utf-8"?>
-<p:sld xmlns:a="http://schemas.openxmlformats.org/drawingml/2006/main" xmlns:r="http://schemas.openxmlformats.org/officeDocument/2006/relationships" xmlns:p="http://schemas.openxmlformats.org/presentationml/2006/main">
-  <p:cSld>
-    <p:spTree>
-      <p:nvGrpSpPr>
-        <p:cNvPr id="1" name=""/>
-        <p:cNvGrpSpPr/>
-        <p:nvPr/>
-      </p:nvGrpSpPr>
-      <p:grpSpPr>
-        <a:xfrm>
-          <a:off x="0" y="0"/>
-          <a:ext cx="0" cy="0"/>
-          <a:chOff x="0" y="0"/>
-          <a:chExt cx="0" cy="0"/>
-        </a:xfrm>
-      </p:grpSpPr>
-      <p:sp>
-        <p:nvSpPr>
-          <p:cNvPr id="2" name="Titel 1">
-            <a:extLst>
-              <a:ext uri="{FF2B5EF4-FFF2-40B4-BE49-F238E27FC236}">
                 <a16:creationId xmlns:a16="http://schemas.microsoft.com/office/drawing/2014/main" id="{8A628275-F77C-4D72-8867-67EB7448664F}"/>
               </a:ext>
             </a:extLst>
@@ -10919,6 +14538,287 @@
 </p:sld>
 </file>
 
+<file path=ppt/slides/slide7.xml><?xml version="1.0" encoding="utf-8"?>
+<p:sld xmlns:a="http://schemas.openxmlformats.org/drawingml/2006/main" xmlns:r="http://schemas.openxmlformats.org/officeDocument/2006/relationships" xmlns:p="http://schemas.openxmlformats.org/presentationml/2006/main">
+  <p:cSld>
+    <p:spTree>
+      <p:nvGrpSpPr>
+        <p:cNvPr id="1" name=""/>
+        <p:cNvGrpSpPr/>
+        <p:nvPr/>
+      </p:nvGrpSpPr>
+      <p:grpSpPr>
+        <a:xfrm>
+          <a:off x="0" y="0"/>
+          <a:ext cx="0" cy="0"/>
+          <a:chOff x="0" y="0"/>
+          <a:chExt cx="0" cy="0"/>
+        </a:xfrm>
+      </p:grpSpPr>
+      <p:sp>
+        <p:nvSpPr>
+          <p:cNvPr id="2" name="Titel 1">
+            <a:extLst>
+              <a:ext uri="{FF2B5EF4-FFF2-40B4-BE49-F238E27FC236}">
+                <a16:creationId xmlns:a16="http://schemas.microsoft.com/office/drawing/2014/main" id="{5CE9B4EF-180C-462D-9742-3A6754B91F32}"/>
+              </a:ext>
+            </a:extLst>
+          </p:cNvPr>
+          <p:cNvSpPr>
+            <a:spLocks noGrp="1"/>
+          </p:cNvSpPr>
+          <p:nvPr>
+            <p:ph type="title"/>
+          </p:nvPr>
+        </p:nvSpPr>
+        <p:spPr/>
+        <p:txBody>
+          <a:bodyPr/>
+          <a:lstStyle/>
+          <a:p>
+            <a:r>
+              <a:rPr lang="de-DE" dirty="0" err="1"/>
+              <a:t>Conception</a:t>
+            </a:r>
+            <a:endParaRPr lang="de-DE" dirty="0"/>
+          </a:p>
+        </p:txBody>
+      </p:sp>
+      <p:pic>
+        <p:nvPicPr>
+          <p:cNvPr id="6" name="Inhaltsplatzhalter 5">
+            <a:extLst>
+              <a:ext uri="{FF2B5EF4-FFF2-40B4-BE49-F238E27FC236}">
+                <a16:creationId xmlns:a16="http://schemas.microsoft.com/office/drawing/2014/main" id="{7AF26E34-A853-4992-9A9B-7F0465239D92}"/>
+              </a:ext>
+            </a:extLst>
+          </p:cNvPr>
+          <p:cNvPicPr>
+            <a:picLocks noGrp="1" noChangeAspect="1"/>
+          </p:cNvPicPr>
+          <p:nvPr>
+            <p:ph sz="half" idx="1"/>
+          </p:nvPr>
+        </p:nvPicPr>
+        <p:blipFill>
+          <a:blip r:embed="rId3">
+            <a:extLst>
+              <a:ext uri="{28A0092B-C50C-407E-A947-70E740481C1C}">
+                <a14:useLocalDpi xmlns:a14="http://schemas.microsoft.com/office/drawing/2010/main" val="0"/>
+              </a:ext>
+            </a:extLst>
+          </a:blip>
+          <a:stretch>
+            <a:fillRect/>
+          </a:stretch>
+        </p:blipFill>
+        <p:spPr>
+          <a:xfrm>
+            <a:off x="467544" y="4365104"/>
+            <a:ext cx="8208912" cy="1224136"/>
+          </a:xfrm>
+        </p:spPr>
+      </p:pic>
+      <p:sp>
+        <p:nvSpPr>
+          <p:cNvPr id="14" name="Inhaltsplatzhalter 13">
+            <a:extLst>
+              <a:ext uri="{FF2B5EF4-FFF2-40B4-BE49-F238E27FC236}">
+                <a16:creationId xmlns:a16="http://schemas.microsoft.com/office/drawing/2014/main" id="{A56ADED2-9DC7-47B8-8CE3-6E300BDA691C}"/>
+              </a:ext>
+            </a:extLst>
+          </p:cNvPr>
+          <p:cNvSpPr>
+            <a:spLocks noGrp="1"/>
+          </p:cNvSpPr>
+          <p:nvPr>
+            <p:ph sz="half" idx="2"/>
+          </p:nvPr>
+        </p:nvSpPr>
+        <p:spPr>
+          <a:xfrm>
+            <a:off x="467544" y="1412776"/>
+            <a:ext cx="8208912" cy="3168352"/>
+          </a:xfrm>
+        </p:spPr>
+        <p:txBody>
+          <a:bodyPr/>
+          <a:lstStyle/>
+          <a:p>
+            <a:r>
+              <a:rPr lang="de-DE" b="1" dirty="0" err="1"/>
+              <a:t>History</a:t>
+            </a:r>
+            <a:r>
+              <a:rPr lang="de-DE" b="1" dirty="0"/>
+              <a:t> </a:t>
+            </a:r>
+            <a:r>
+              <a:rPr lang="de-DE" b="1" dirty="0" err="1"/>
+              <a:t>sequence</a:t>
+            </a:r>
+            <a:r>
+              <a:rPr lang="de-DE" b="1" dirty="0"/>
+              <a:t>: </a:t>
+            </a:r>
+            <a:r>
+              <a:rPr lang="de-DE" dirty="0"/>
+              <a:t>The </a:t>
+            </a:r>
+            <a:r>
+              <a:rPr lang="de-DE" dirty="0" err="1"/>
+              <a:t>entire</a:t>
+            </a:r>
+            <a:r>
+              <a:rPr lang="de-DE" dirty="0"/>
+              <a:t> </a:t>
+            </a:r>
+            <a:r>
+              <a:rPr lang="de-DE" dirty="0" err="1"/>
+              <a:t>sequence</a:t>
+            </a:r>
+            <a:endParaRPr lang="de-DE" dirty="0"/>
+          </a:p>
+          <a:p>
+            <a:r>
+              <a:rPr lang="de-DE" b="1" dirty="0"/>
+              <a:t>Search </a:t>
+            </a:r>
+            <a:r>
+              <a:rPr lang="de-DE" b="1" dirty="0" err="1"/>
+              <a:t>sequence</a:t>
+            </a:r>
+            <a:r>
+              <a:rPr lang="de-DE" b="1" dirty="0"/>
+              <a:t>: </a:t>
+            </a:r>
+            <a:r>
+              <a:rPr lang="de-DE" dirty="0"/>
+              <a:t>Last x </a:t>
+            </a:r>
+            <a:r>
+              <a:rPr lang="de-DE" dirty="0" err="1"/>
+              <a:t>characters</a:t>
+            </a:r>
+            <a:r>
+              <a:rPr lang="de-DE" dirty="0"/>
+              <a:t> </a:t>
+            </a:r>
+            <a:r>
+              <a:rPr lang="de-DE" dirty="0" err="1"/>
+              <a:t>of</a:t>
+            </a:r>
+            <a:r>
+              <a:rPr lang="de-DE" dirty="0"/>
+              <a:t> </a:t>
+            </a:r>
+            <a:r>
+              <a:rPr lang="de-DE" dirty="0" err="1"/>
+              <a:t>history</a:t>
+            </a:r>
+            <a:r>
+              <a:rPr lang="de-DE" dirty="0"/>
+              <a:t> </a:t>
+            </a:r>
+            <a:r>
+              <a:rPr lang="de-DE" dirty="0" err="1"/>
+              <a:t>sequence</a:t>
+            </a:r>
+            <a:endParaRPr lang="de-DE" dirty="0"/>
+          </a:p>
+          <a:p>
+            <a:r>
+              <a:rPr lang="de-DE" b="1" dirty="0"/>
+              <a:t>Match </a:t>
+            </a:r>
+            <a:r>
+              <a:rPr lang="de-DE" b="1" dirty="0" err="1"/>
+              <a:t>sequence</a:t>
+            </a:r>
+            <a:r>
+              <a:rPr lang="de-DE" b="1" dirty="0"/>
+              <a:t>: </a:t>
+            </a:r>
+            <a:r>
+              <a:rPr lang="de-DE" dirty="0" err="1"/>
+              <a:t>Found</a:t>
+            </a:r>
+            <a:r>
+              <a:rPr lang="de-DE" dirty="0"/>
+              <a:t> </a:t>
+            </a:r>
+            <a:r>
+              <a:rPr lang="de-DE" dirty="0" err="1"/>
+              <a:t>search</a:t>
+            </a:r>
+            <a:r>
+              <a:rPr lang="de-DE" dirty="0"/>
+              <a:t> </a:t>
+            </a:r>
+            <a:r>
+              <a:rPr lang="de-DE" dirty="0" err="1"/>
+              <a:t>sequence</a:t>
+            </a:r>
+            <a:endParaRPr lang="de-DE" dirty="0"/>
+          </a:p>
+          <a:p>
+            <a:r>
+              <a:rPr lang="de-DE" b="1" dirty="0" err="1"/>
+              <a:t>Prediction</a:t>
+            </a:r>
+            <a:r>
+              <a:rPr lang="de-DE" b="1" dirty="0"/>
+              <a:t>:</a:t>
+            </a:r>
+            <a:r>
+              <a:rPr lang="de-DE" dirty="0"/>
+              <a:t> </a:t>
+            </a:r>
+            <a:r>
+              <a:rPr lang="de-DE" dirty="0" err="1"/>
+              <a:t>Continuation</a:t>
+            </a:r>
+            <a:r>
+              <a:rPr lang="de-DE" dirty="0"/>
+              <a:t> </a:t>
+            </a:r>
+            <a:r>
+              <a:rPr lang="de-DE" dirty="0" err="1"/>
+              <a:t>from</a:t>
+            </a:r>
+            <a:r>
+              <a:rPr lang="de-DE" dirty="0"/>
+              <a:t> </a:t>
+            </a:r>
+            <a:r>
+              <a:rPr lang="de-DE" dirty="0" err="1"/>
+              <a:t>match</a:t>
+            </a:r>
+            <a:r>
+              <a:rPr lang="de-DE" dirty="0"/>
+              <a:t> </a:t>
+            </a:r>
+            <a:r>
+              <a:rPr lang="de-DE" dirty="0" err="1"/>
+              <a:t>sequence</a:t>
+            </a:r>
+            <a:endParaRPr lang="de-DE" dirty="0"/>
+          </a:p>
+        </p:txBody>
+      </p:sp>
+    </p:spTree>
+    <p:extLst>
+      <p:ext uri="{BB962C8B-B14F-4D97-AF65-F5344CB8AC3E}">
+        <p14:creationId xmlns:p14="http://schemas.microsoft.com/office/powerpoint/2010/main" val="3301155235"/>
+      </p:ext>
+    </p:extLst>
+  </p:cSld>
+  <p:clrMapOvr>
+    <a:masterClrMapping/>
+  </p:clrMapOvr>
+</p:sld>
+</file>
+
 <file path=ppt/slides/slide8.xml><?xml version="1.0" encoding="utf-8"?>
 <p:sld xmlns:a="http://schemas.openxmlformats.org/drawingml/2006/main" xmlns:r="http://schemas.openxmlformats.org/officeDocument/2006/relationships" xmlns:p="http://schemas.openxmlformats.org/presentationml/2006/main">
   <p:cSld>
@@ -11048,7 +14948,7 @@
             </a:r>
             <a:r>
               <a:rPr lang="de-DE" dirty="0"/>
-              <a:t> Temple F. Smith and Micheal S. Waterman in 1981</a:t>
+              <a:t> Temple F. Smith and Michael S. Waterman in 1981</a:t>
             </a:r>
           </a:p>
           <a:p>
@@ -11213,7 +15113,7 @@
         <p:spPr>
           <a:xfrm>
             <a:off x="405304" y="5882818"/>
-            <a:ext cx="8360424" cy="369332"/>
+            <a:ext cx="8360424" cy="646331"/>
           </a:xfrm>
           <a:prstGeom prst="rect">
             <a:avLst/>
@@ -11225,6 +15125,16 @@
             <a:spAutoFit/>
           </a:bodyPr>
           <a:lstStyle/>
+          <a:p>
+            <a:r>
+              <a:rPr lang="de-DE" b="1" dirty="0" err="1"/>
+              <a:t>Result</a:t>
+            </a:r>
+            <a:r>
+              <a:rPr lang="de-DE" b="1" dirty="0"/>
+              <a:t>: A-CA</a:t>
+            </a:r>
+          </a:p>
           <a:p>
             <a:r>
               <a:rPr lang="de-DE" b="1" dirty="0" err="1"/>

</xml_diff>